<commit_message>
prezentácia po Hellotalk a oprava vyhod nevyhod
</commit_message>
<xml_diff>
--- a/Prezentacia_clanok.pptx
+++ b/Prezentacia_clanok.pptx
@@ -12,6 +12,10 @@
     <p:sldId id="260" r:id="rId6"/>
     <p:sldId id="261" r:id="rId7"/>
     <p:sldId id="262" r:id="rId8"/>
+    <p:sldId id="263" r:id="rId9"/>
+    <p:sldId id="264" r:id="rId10"/>
+    <p:sldId id="265" r:id="rId11"/>
+    <p:sldId id="266" r:id="rId12"/>
   </p:sldIdLst>
   <p:sldSz cx="12192000" cy="6858000"/>
   <p:notesSz cx="6858000" cy="9144000"/>
@@ -110,6 +114,11 @@
       </a:defRPr>
     </a:lvl9pPr>
   </p:defaultTextStyle>
+  <p:extLst>
+    <p:ext uri="{EFAFB233-063F-42B5-8137-9DF3F51BA10A}">
+      <p15:sldGuideLst xmlns:p15="http://schemas.microsoft.com/office/powerpoint/2012/main"/>
+    </p:ext>
+  </p:extLst>
 </p:presentation>
 </file>
 
@@ -10202,6 +10211,332 @@
 </p:sld>
 </file>
 
+<file path=ppt/slides/slide10.xml><?xml version="1.0" encoding="utf-8"?>
+<p:sld xmlns:a="http://schemas.openxmlformats.org/drawingml/2006/main" xmlns:r="http://schemas.openxmlformats.org/officeDocument/2006/relationships" xmlns:p="http://schemas.openxmlformats.org/presentationml/2006/main">
+  <p:cSld>
+    <p:spTree>
+      <p:nvGrpSpPr>
+        <p:cNvPr id="1" name=""/>
+        <p:cNvGrpSpPr/>
+        <p:nvPr/>
+      </p:nvGrpSpPr>
+      <p:grpSpPr>
+        <a:xfrm>
+          <a:off x="0" y="0"/>
+          <a:ext cx="0" cy="0"/>
+          <a:chOff x="0" y="0"/>
+          <a:chExt cx="0" cy="0"/>
+        </a:xfrm>
+      </p:grpSpPr>
+      <p:grpSp>
+        <p:nvGrpSpPr>
+          <p:cNvPr id="2" name="Skupina 1">
+            <a:extLst>
+              <a:ext uri="{FF2B5EF4-FFF2-40B4-BE49-F238E27FC236}">
+                <a16:creationId xmlns:a16="http://schemas.microsoft.com/office/drawing/2014/main" id="{2D7A735F-2869-4E77-9586-E6F8779A2E26}"/>
+              </a:ext>
+            </a:extLst>
+          </p:cNvPr>
+          <p:cNvGrpSpPr/>
+          <p:nvPr/>
+        </p:nvGrpSpPr>
+        <p:grpSpPr>
+          <a:xfrm>
+            <a:off x="2677213" y="257389"/>
+            <a:ext cx="6329850" cy="874575"/>
+            <a:chOff x="-63839" y="1524483"/>
+            <a:chExt cx="6329850" cy="874575"/>
+          </a:xfrm>
+        </p:grpSpPr>
+        <p:sp>
+          <p:nvSpPr>
+            <p:cNvPr id="3" name="Obdĺžnik: zaoblené rohy 2">
+              <a:extLst>
+                <a:ext uri="{FF2B5EF4-FFF2-40B4-BE49-F238E27FC236}">
+                  <a16:creationId xmlns:a16="http://schemas.microsoft.com/office/drawing/2014/main" id="{BF8D663C-5263-4DBA-A076-81EF5ED71F48}"/>
+                </a:ext>
+              </a:extLst>
+            </p:cNvPr>
+            <p:cNvSpPr/>
+            <p:nvPr/>
+          </p:nvSpPr>
+          <p:spPr>
+            <a:xfrm>
+              <a:off x="0" y="1524483"/>
+              <a:ext cx="6266011" cy="874575"/>
+            </a:xfrm>
+            <a:prstGeom prst="roundRect">
+              <a:avLst/>
+            </a:prstGeom>
+          </p:spPr>
+          <p:style>
+            <a:lnRef idx="0">
+              <a:schemeClr val="lt1">
+                <a:hueOff val="0"/>
+                <a:satOff val="0"/>
+                <a:lumOff val="0"/>
+                <a:alphaOff val="0"/>
+              </a:schemeClr>
+            </a:lnRef>
+            <a:fillRef idx="3">
+              <a:schemeClr val="accent2">
+                <a:hueOff val="10056566"/>
+                <a:satOff val="-328"/>
+                <a:lumOff val="3529"/>
+                <a:alphaOff val="0"/>
+              </a:schemeClr>
+            </a:fillRef>
+            <a:effectRef idx="2">
+              <a:schemeClr val="accent2">
+                <a:hueOff val="10056566"/>
+                <a:satOff val="-328"/>
+                <a:lumOff val="3529"/>
+                <a:alphaOff val="0"/>
+              </a:schemeClr>
+            </a:effectRef>
+            <a:fontRef idx="minor">
+              <a:schemeClr val="lt1"/>
+            </a:fontRef>
+          </p:style>
+        </p:sp>
+        <p:sp>
+          <p:nvSpPr>
+            <p:cNvPr id="4" name="Obdĺžnik: zaoblené rohy 4">
+              <a:extLst>
+                <a:ext uri="{FF2B5EF4-FFF2-40B4-BE49-F238E27FC236}">
+                  <a16:creationId xmlns:a16="http://schemas.microsoft.com/office/drawing/2014/main" id="{2AC861CC-5DEF-49AF-BB6E-29FAB1A3B61E}"/>
+                </a:ext>
+              </a:extLst>
+            </p:cNvPr>
+            <p:cNvSpPr txBox="1"/>
+            <p:nvPr/>
+          </p:nvSpPr>
+          <p:spPr>
+            <a:xfrm>
+              <a:off x="-63839" y="1565418"/>
+              <a:ext cx="6180625" cy="789189"/>
+            </a:xfrm>
+            <a:prstGeom prst="rect">
+              <a:avLst/>
+            </a:prstGeom>
+          </p:spPr>
+          <p:style>
+            <a:lnRef idx="0">
+              <a:scrgbClr r="0" g="0" b="0"/>
+            </a:lnRef>
+            <a:fillRef idx="0">
+              <a:scrgbClr r="0" g="0" b="0"/>
+            </a:fillRef>
+            <a:effectRef idx="0">
+              <a:scrgbClr r="0" g="0" b="0"/>
+            </a:effectRef>
+            <a:fontRef idx="minor">
+              <a:schemeClr val="lt1"/>
+            </a:fontRef>
+          </p:style>
+          <p:txBody>
+            <a:bodyPr spcFirstLastPara="0" vert="horz" wrap="square" lIns="87630" tIns="87630" rIns="87630" bIns="87630" numCol="1" spcCol="1270" anchor="ctr" anchorCtr="0">
+              <a:noAutofit/>
+            </a:bodyPr>
+            <a:lstStyle/>
+            <a:p>
+              <a:pPr marL="0" lvl="0" indent="0" algn="ctr" defTabSz="1022350">
+                <a:lnSpc>
+                  <a:spcPct val="90000"/>
+                </a:lnSpc>
+                <a:spcBef>
+                  <a:spcPct val="0"/>
+                </a:spcBef>
+                <a:spcAft>
+                  <a:spcPct val="35000"/>
+                </a:spcAft>
+                <a:buNone/>
+              </a:pPr>
+              <a:r>
+                <a:rPr lang="sk-SK" sz="2300" kern="1200" dirty="0"/>
+                <a:t>2.1  Jazykové blogy</a:t>
+              </a:r>
+              <a:endParaRPr lang="en-US" sz="2300" kern="1200" dirty="0"/>
+            </a:p>
+          </p:txBody>
+        </p:sp>
+      </p:grpSp>
+    </p:spTree>
+    <p:extLst>
+      <p:ext uri="{BB962C8B-B14F-4D97-AF65-F5344CB8AC3E}">
+        <p14:creationId xmlns:p14="http://schemas.microsoft.com/office/powerpoint/2010/main" val="1306557675"/>
+      </p:ext>
+    </p:extLst>
+  </p:cSld>
+  <p:clrMapOvr>
+    <a:masterClrMapping/>
+  </p:clrMapOvr>
+</p:sld>
+</file>
+
+<file path=ppt/slides/slide11.xml><?xml version="1.0" encoding="utf-8"?>
+<p:sld xmlns:a="http://schemas.openxmlformats.org/drawingml/2006/main" xmlns:r="http://schemas.openxmlformats.org/officeDocument/2006/relationships" xmlns:p="http://schemas.openxmlformats.org/presentationml/2006/main">
+  <p:cSld>
+    <p:spTree>
+      <p:nvGrpSpPr>
+        <p:cNvPr id="1" name=""/>
+        <p:cNvGrpSpPr/>
+        <p:nvPr/>
+      </p:nvGrpSpPr>
+      <p:grpSpPr>
+        <a:xfrm>
+          <a:off x="0" y="0"/>
+          <a:ext cx="0" cy="0"/>
+          <a:chOff x="0" y="0"/>
+          <a:chExt cx="0" cy="0"/>
+        </a:xfrm>
+      </p:grpSpPr>
+      <p:grpSp>
+        <p:nvGrpSpPr>
+          <p:cNvPr id="2" name="Skupina 1">
+            <a:extLst>
+              <a:ext uri="{FF2B5EF4-FFF2-40B4-BE49-F238E27FC236}">
+                <a16:creationId xmlns:a16="http://schemas.microsoft.com/office/drawing/2014/main" id="{49A305EF-83C8-41C9-ABF4-938FD7027393}"/>
+              </a:ext>
+            </a:extLst>
+          </p:cNvPr>
+          <p:cNvGrpSpPr/>
+          <p:nvPr/>
+        </p:nvGrpSpPr>
+        <p:grpSpPr>
+          <a:xfrm>
+            <a:off x="2962994" y="248513"/>
+            <a:ext cx="6266011" cy="874575"/>
+            <a:chOff x="0" y="3589308"/>
+            <a:chExt cx="6266011" cy="874575"/>
+          </a:xfrm>
+        </p:grpSpPr>
+        <p:sp>
+          <p:nvSpPr>
+            <p:cNvPr id="3" name="Obdĺžnik: zaoblené rohy 2">
+              <a:extLst>
+                <a:ext uri="{FF2B5EF4-FFF2-40B4-BE49-F238E27FC236}">
+                  <a16:creationId xmlns:a16="http://schemas.microsoft.com/office/drawing/2014/main" id="{15323F20-BEBC-4CDD-9A6C-4FCB1D59C820}"/>
+                </a:ext>
+              </a:extLst>
+            </p:cNvPr>
+            <p:cNvSpPr/>
+            <p:nvPr/>
+          </p:nvSpPr>
+          <p:spPr>
+            <a:xfrm>
+              <a:off x="0" y="3589308"/>
+              <a:ext cx="6266011" cy="874575"/>
+            </a:xfrm>
+            <a:prstGeom prst="roundRect">
+              <a:avLst/>
+            </a:prstGeom>
+          </p:spPr>
+          <p:style>
+            <a:lnRef idx="0">
+              <a:schemeClr val="lt1">
+                <a:hueOff val="0"/>
+                <a:satOff val="0"/>
+                <a:lumOff val="0"/>
+                <a:alphaOff val="0"/>
+              </a:schemeClr>
+            </a:lnRef>
+            <a:fillRef idx="3">
+              <a:schemeClr val="accent2">
+                <a:hueOff val="20113132"/>
+                <a:satOff val="-656"/>
+                <a:lumOff val="7059"/>
+                <a:alphaOff val="0"/>
+              </a:schemeClr>
+            </a:fillRef>
+            <a:effectRef idx="2">
+              <a:schemeClr val="accent2">
+                <a:hueOff val="20113132"/>
+                <a:satOff val="-656"/>
+                <a:lumOff val="7059"/>
+                <a:alphaOff val="0"/>
+              </a:schemeClr>
+            </a:effectRef>
+            <a:fontRef idx="minor">
+              <a:schemeClr val="lt1"/>
+            </a:fontRef>
+          </p:style>
+        </p:sp>
+        <p:sp>
+          <p:nvSpPr>
+            <p:cNvPr id="4" name="Obdĺžnik: zaoblené rohy 4">
+              <a:extLst>
+                <a:ext uri="{FF2B5EF4-FFF2-40B4-BE49-F238E27FC236}">
+                  <a16:creationId xmlns:a16="http://schemas.microsoft.com/office/drawing/2014/main" id="{6B5DF0C8-C835-4615-9170-2C8E479FC95A}"/>
+                </a:ext>
+              </a:extLst>
+            </p:cNvPr>
+            <p:cNvSpPr txBox="1"/>
+            <p:nvPr/>
+          </p:nvSpPr>
+          <p:spPr>
+            <a:xfrm>
+              <a:off x="42693" y="3632001"/>
+              <a:ext cx="6180625" cy="789189"/>
+            </a:xfrm>
+            <a:prstGeom prst="rect">
+              <a:avLst/>
+            </a:prstGeom>
+          </p:spPr>
+          <p:style>
+            <a:lnRef idx="0">
+              <a:scrgbClr r="0" g="0" b="0"/>
+            </a:lnRef>
+            <a:fillRef idx="0">
+              <a:scrgbClr r="0" g="0" b="0"/>
+            </a:fillRef>
+            <a:effectRef idx="0">
+              <a:scrgbClr r="0" g="0" b="0"/>
+            </a:effectRef>
+            <a:fontRef idx="minor">
+              <a:schemeClr val="lt1"/>
+            </a:fontRef>
+          </p:style>
+          <p:txBody>
+            <a:bodyPr spcFirstLastPara="0" vert="horz" wrap="square" lIns="87630" tIns="87630" rIns="87630" bIns="87630" numCol="1" spcCol="1270" anchor="ctr" anchorCtr="0">
+              <a:noAutofit/>
+            </a:bodyPr>
+            <a:lstStyle/>
+            <a:p>
+              <a:pPr marL="0" lvl="0" indent="0" algn="l" defTabSz="1022350">
+                <a:lnSpc>
+                  <a:spcPct val="90000"/>
+                </a:lnSpc>
+                <a:spcBef>
+                  <a:spcPct val="0"/>
+                </a:spcBef>
+                <a:spcAft>
+                  <a:spcPct val="35000"/>
+                </a:spcAft>
+                <a:buNone/>
+              </a:pPr>
+              <a:r>
+                <a:rPr lang="sk-SK" sz="2300" kern="1200" dirty="0"/>
+                <a:t>3 Efektívnosť e-learningu pri jazykovom vzdelávaní </a:t>
+              </a:r>
+              <a:endParaRPr lang="en-US" sz="2300" kern="1200" dirty="0"/>
+            </a:p>
+          </p:txBody>
+        </p:sp>
+      </p:grpSp>
+    </p:spTree>
+    <p:extLst>
+      <p:ext uri="{BB962C8B-B14F-4D97-AF65-F5344CB8AC3E}">
+        <p14:creationId xmlns:p14="http://schemas.microsoft.com/office/powerpoint/2010/main" val="2749543216"/>
+      </p:ext>
+    </p:extLst>
+  </p:cSld>
+  <p:clrMapOvr>
+    <a:masterClrMapping/>
+  </p:clrMapOvr>
+</p:sld>
+</file>
+
 <file path=ppt/slides/slide2.xml><?xml version="1.0" encoding="utf-8"?>
 <p:sld xmlns:a="http://schemas.openxmlformats.org/drawingml/2006/main" xmlns:r="http://schemas.openxmlformats.org/officeDocument/2006/relationships" xmlns:p="http://schemas.openxmlformats.org/presentationml/2006/main">
   <p:cSld>
@@ -14410,42 +14745,66 @@
           </a:p>
         </p:txBody>
       </p:sp>
-      <p:sp>
-        <p:nvSpPr>
-          <p:cNvPr id="6" name="BlokTextu 5">
+      <p:pic>
+        <p:nvPicPr>
+          <p:cNvPr id="10" name="Obrázok 9">
             <a:extLst>
               <a:ext uri="{FF2B5EF4-FFF2-40B4-BE49-F238E27FC236}">
-                <a16:creationId xmlns:a16="http://schemas.microsoft.com/office/drawing/2014/main" id="{19597020-98E1-45F1-8939-036086EA8588}"/>
+                <a16:creationId xmlns:a16="http://schemas.microsoft.com/office/drawing/2014/main" id="{144906AB-A981-4009-B7B0-699815154DCC}"/>
               </a:ext>
             </a:extLst>
           </p:cNvPr>
-          <p:cNvSpPr txBox="1"/>
+          <p:cNvPicPr>
+            <a:picLocks noChangeAspect="1"/>
+          </p:cNvPicPr>
           <p:nvPr/>
-        </p:nvSpPr>
+        </p:nvPicPr>
+        <p:blipFill>
+          <a:blip r:embed="rId2">
+            <a:extLst>
+              <a:ext uri="{28A0092B-C50C-407E-A947-70E740481C1C}">
+                <a14:useLocalDpi xmlns:a14="http://schemas.microsoft.com/office/drawing/2010/main" val="0"/>
+              </a:ext>
+            </a:extLst>
+          </a:blip>
+          <a:stretch>
+            <a:fillRect/>
+          </a:stretch>
+        </p:blipFill>
         <p:spPr>
           <a:xfrm>
-            <a:off x="4190260" y="4643021"/>
-            <a:ext cx="2246051" cy="369332"/>
+            <a:off x="3385443" y="2944519"/>
+            <a:ext cx="5048250" cy="2762250"/>
           </a:xfrm>
-          <a:prstGeom prst="rect">
-            <a:avLst/>
+          <a:prstGeom prst="roundRect">
+            <a:avLst>
+              <a:gd name="adj" fmla="val 16667"/>
+            </a:avLst>
           </a:prstGeom>
-          <a:noFill/>
+          <a:ln>
+            <a:noFill/>
+          </a:ln>
+          <a:effectLst>
+            <a:outerShdw blurRad="76200" dist="38100" dir="7800000" algn="tl" rotWithShape="0">
+              <a:srgbClr val="000000">
+                <a:alpha val="40000"/>
+              </a:srgbClr>
+            </a:outerShdw>
+          </a:effectLst>
+          <a:scene3d>
+            <a:camera prst="orthographicFront"/>
+            <a:lightRig rig="contrasting" dir="t">
+              <a:rot lat="0" lon="0" rev="4200000"/>
+            </a:lightRig>
+          </a:scene3d>
+          <a:sp3d prstMaterial="plastic">
+            <a:bevelT w="381000" h="114300" prst="relaxedInset"/>
+            <a:contourClr>
+              <a:srgbClr val="969696"/>
+            </a:contourClr>
+          </a:sp3d>
         </p:spPr>
-        <p:txBody>
-          <a:bodyPr wrap="square" rtlCol="0">
-            <a:spAutoFit/>
-          </a:bodyPr>
-          <a:lstStyle/>
-          <a:p>
-            <a:r>
-              <a:rPr lang="sk-SK" dirty="0" err="1"/>
-              <a:t>umletgraf</a:t>
-            </a:r>
-            <a:endParaRPr lang="sk-SK" dirty="0"/>
-          </a:p>
-        </p:txBody>
-      </p:sp>
+      </p:pic>
     </p:spTree>
     <p:extLst>
       <p:ext uri="{BB962C8B-B14F-4D97-AF65-F5344CB8AC3E}">
@@ -14647,10 +15006,1010 @@
           </a:graphicData>
         </a:graphic>
       </p:graphicFrame>
+      <p:sp>
+        <p:nvSpPr>
+          <p:cNvPr id="2" name="BlokTextu 1">
+            <a:extLst>
+              <a:ext uri="{FF2B5EF4-FFF2-40B4-BE49-F238E27FC236}">
+                <a16:creationId xmlns:a16="http://schemas.microsoft.com/office/drawing/2014/main" id="{DEA743F6-5DCD-4620-9F1C-F53E430A8BEB}"/>
+              </a:ext>
+            </a:extLst>
+          </p:cNvPr>
+          <p:cNvSpPr txBox="1"/>
+          <p:nvPr/>
+        </p:nvSpPr>
+        <p:spPr>
+          <a:xfrm>
+            <a:off x="807869" y="1609013"/>
+            <a:ext cx="5415378" cy="2308324"/>
+          </a:xfrm>
+          <a:prstGeom prst="rect">
+            <a:avLst/>
+          </a:prstGeom>
+          <a:noFill/>
+        </p:spPr>
+        <p:txBody>
+          <a:bodyPr wrap="square" rtlCol="0">
+            <a:spAutoFit/>
+          </a:bodyPr>
+          <a:lstStyle/>
+          <a:p>
+            <a:pPr marL="285750" indent="-285750">
+              <a:buFont typeface="Arial" panose="020B0604020202020204" pitchFamily="34" charset="0"/>
+              <a:buChar char="•"/>
+            </a:pPr>
+            <a:r>
+              <a:rPr lang="sk-SK" dirty="0"/>
+              <a:t>36 kurzov pre Anglicky hovoriacich používateľov</a:t>
+            </a:r>
+          </a:p>
+          <a:p>
+            <a:pPr marL="285750" indent="-285750">
+              <a:buFont typeface="Arial" panose="020B0604020202020204" pitchFamily="34" charset="0"/>
+              <a:buChar char="•"/>
+            </a:pPr>
+            <a:endParaRPr lang="sk-SK" dirty="0"/>
+          </a:p>
+          <a:p>
+            <a:pPr marL="285750" indent="-285750">
+              <a:buFont typeface="Arial" panose="020B0604020202020204" pitchFamily="34" charset="0"/>
+              <a:buChar char="•"/>
+            </a:pPr>
+            <a:r>
+              <a:rPr lang="sk-SK" dirty="0"/>
+              <a:t>Nie je kurz pre Slovensky hovoriacich používateľov</a:t>
+            </a:r>
+          </a:p>
+          <a:p>
+            <a:r>
+              <a:rPr lang="sk-SK" dirty="0"/>
+              <a:t>	(Česky 1 kurz,  Nemecky 4 kurzy)</a:t>
+            </a:r>
+          </a:p>
+          <a:p>
+            <a:endParaRPr lang="sk-SK" dirty="0"/>
+          </a:p>
+          <a:p>
+            <a:pPr marL="285750" indent="-285750">
+              <a:buFont typeface="Arial" panose="020B0604020202020204" pitchFamily="34" charset="0"/>
+              <a:buChar char="•"/>
+            </a:pPr>
+            <a:r>
+              <a:rPr lang="sk-SK" dirty="0"/>
+              <a:t>Novinka </a:t>
+            </a:r>
+            <a:r>
+              <a:rPr lang="sk-SK" dirty="0" err="1"/>
+              <a:t>Duolingo</a:t>
+            </a:r>
+            <a:r>
+              <a:rPr lang="sk-SK" dirty="0"/>
+              <a:t> </a:t>
+            </a:r>
+            <a:r>
+              <a:rPr lang="sk-SK" dirty="0" err="1"/>
+              <a:t>stories</a:t>
+            </a:r>
+            <a:endParaRPr lang="sk-SK" dirty="0"/>
+          </a:p>
+          <a:p>
+            <a:endParaRPr lang="sk-SK" dirty="0"/>
+          </a:p>
+          <a:p>
+            <a:endParaRPr lang="sk-SK" dirty="0"/>
+          </a:p>
+        </p:txBody>
+      </p:sp>
+      <p:cxnSp>
+        <p:nvCxnSpPr>
+          <p:cNvPr id="8" name="Rovná spojovacia šípka 7">
+            <a:extLst>
+              <a:ext uri="{FF2B5EF4-FFF2-40B4-BE49-F238E27FC236}">
+                <a16:creationId xmlns:a16="http://schemas.microsoft.com/office/drawing/2014/main" id="{624353EE-77B7-4F71-9457-838B492CA523}"/>
+              </a:ext>
+            </a:extLst>
+          </p:cNvPr>
+          <p:cNvCxnSpPr>
+            <a:cxnSpLocks/>
+          </p:cNvCxnSpPr>
+          <p:nvPr/>
+        </p:nvCxnSpPr>
+        <p:spPr>
+          <a:xfrm flipV="1">
+            <a:off x="6578354" y="4927107"/>
+            <a:ext cx="710213" cy="1198485"/>
+          </a:xfrm>
+          <a:prstGeom prst="straightConnector1">
+            <a:avLst/>
+          </a:prstGeom>
+          <a:ln>
+            <a:tailEnd type="triangle"/>
+          </a:ln>
+        </p:spPr>
+        <p:style>
+          <a:lnRef idx="1">
+            <a:schemeClr val="accent6"/>
+          </a:lnRef>
+          <a:fillRef idx="0">
+            <a:schemeClr val="accent6"/>
+          </a:fillRef>
+          <a:effectRef idx="0">
+            <a:schemeClr val="accent6"/>
+          </a:effectRef>
+          <a:fontRef idx="minor">
+            <a:schemeClr val="tx1"/>
+          </a:fontRef>
+        </p:style>
+      </p:cxnSp>
+      <p:cxnSp>
+        <p:nvCxnSpPr>
+          <p:cNvPr id="9" name="Rovná spojovacia šípka 8">
+            <a:extLst>
+              <a:ext uri="{FF2B5EF4-FFF2-40B4-BE49-F238E27FC236}">
+                <a16:creationId xmlns:a16="http://schemas.microsoft.com/office/drawing/2014/main" id="{80DF4645-A4A6-4CA7-9A7B-49E1C89FAE06}"/>
+              </a:ext>
+            </a:extLst>
+          </p:cNvPr>
+          <p:cNvCxnSpPr>
+            <a:cxnSpLocks/>
+          </p:cNvCxnSpPr>
+          <p:nvPr/>
+        </p:nvCxnSpPr>
+        <p:spPr>
+          <a:xfrm flipV="1">
+            <a:off x="10619173" y="5060272"/>
+            <a:ext cx="584446" cy="1065320"/>
+          </a:xfrm>
+          <a:prstGeom prst="straightConnector1">
+            <a:avLst/>
+          </a:prstGeom>
+          <a:ln>
+            <a:tailEnd type="triangle"/>
+          </a:ln>
+        </p:spPr>
+        <p:style>
+          <a:lnRef idx="1">
+            <a:schemeClr val="accent6"/>
+          </a:lnRef>
+          <a:fillRef idx="0">
+            <a:schemeClr val="accent6"/>
+          </a:fillRef>
+          <a:effectRef idx="0">
+            <a:schemeClr val="accent6"/>
+          </a:effectRef>
+          <a:fontRef idx="minor">
+            <a:schemeClr val="tx1"/>
+          </a:fontRef>
+        </p:style>
+      </p:cxnSp>
+      <p:sp>
+        <p:nvSpPr>
+          <p:cNvPr id="10" name="BlokTextu 9">
+            <a:extLst>
+              <a:ext uri="{FF2B5EF4-FFF2-40B4-BE49-F238E27FC236}">
+                <a16:creationId xmlns:a16="http://schemas.microsoft.com/office/drawing/2014/main" id="{C5283C2C-3F96-4717-8222-3DFA80E18C74}"/>
+              </a:ext>
+            </a:extLst>
+          </p:cNvPr>
+          <p:cNvSpPr txBox="1"/>
+          <p:nvPr/>
+        </p:nvSpPr>
+        <p:spPr>
+          <a:xfrm>
+            <a:off x="6994125" y="4589573"/>
+            <a:ext cx="1046085" cy="369332"/>
+          </a:xfrm>
+          <a:prstGeom prst="rect">
+            <a:avLst/>
+          </a:prstGeom>
+          <a:noFill/>
+        </p:spPr>
+        <p:txBody>
+          <a:bodyPr wrap="square" rtlCol="0">
+            <a:spAutoFit/>
+          </a:bodyPr>
+          <a:lstStyle/>
+          <a:p>
+            <a:r>
+              <a:rPr lang="sk-SK" dirty="0"/>
+              <a:t>2012</a:t>
+            </a:r>
+          </a:p>
+        </p:txBody>
+      </p:sp>
+      <p:sp>
+        <p:nvSpPr>
+          <p:cNvPr id="12" name="BlokTextu 11">
+            <a:extLst>
+              <a:ext uri="{FF2B5EF4-FFF2-40B4-BE49-F238E27FC236}">
+                <a16:creationId xmlns:a16="http://schemas.microsoft.com/office/drawing/2014/main" id="{ACD4A8BF-D35B-4441-9B1E-D86FB15C05C9}"/>
+              </a:ext>
+            </a:extLst>
+          </p:cNvPr>
+          <p:cNvSpPr txBox="1"/>
+          <p:nvPr/>
+        </p:nvSpPr>
+        <p:spPr>
+          <a:xfrm>
+            <a:off x="10904737" y="4690940"/>
+            <a:ext cx="923278" cy="369332"/>
+          </a:xfrm>
+          <a:prstGeom prst="rect">
+            <a:avLst/>
+          </a:prstGeom>
+          <a:noFill/>
+        </p:spPr>
+        <p:txBody>
+          <a:bodyPr wrap="square" rtlCol="0">
+            <a:spAutoFit/>
+          </a:bodyPr>
+          <a:lstStyle/>
+          <a:p>
+            <a:r>
+              <a:rPr lang="sk-SK" dirty="0"/>
+              <a:t>2020</a:t>
+            </a:r>
+          </a:p>
+        </p:txBody>
+      </p:sp>
+      <p:sp>
+        <p:nvSpPr>
+          <p:cNvPr id="13" name="BlokTextu 12">
+            <a:extLst>
+              <a:ext uri="{FF2B5EF4-FFF2-40B4-BE49-F238E27FC236}">
+                <a16:creationId xmlns:a16="http://schemas.microsoft.com/office/drawing/2014/main" id="{600A0E92-EC6D-453E-99C5-60C346577119}"/>
+              </a:ext>
+            </a:extLst>
+          </p:cNvPr>
+          <p:cNvSpPr txBox="1"/>
+          <p:nvPr/>
+        </p:nvSpPr>
+        <p:spPr>
+          <a:xfrm>
+            <a:off x="6096000" y="6118540"/>
+            <a:ext cx="1944210" cy="369332"/>
+          </a:xfrm>
+          <a:prstGeom prst="rect">
+            <a:avLst/>
+          </a:prstGeom>
+          <a:noFill/>
+        </p:spPr>
+        <p:txBody>
+          <a:bodyPr wrap="square" rtlCol="0">
+            <a:spAutoFit/>
+          </a:bodyPr>
+          <a:lstStyle/>
+          <a:p>
+            <a:r>
+              <a:rPr lang="sk-SK" dirty="0"/>
+              <a:t>5 kurzov</a:t>
+            </a:r>
+          </a:p>
+        </p:txBody>
+      </p:sp>
+      <p:sp>
+        <p:nvSpPr>
+          <p:cNvPr id="14" name="BlokTextu 13">
+            <a:extLst>
+              <a:ext uri="{FF2B5EF4-FFF2-40B4-BE49-F238E27FC236}">
+                <a16:creationId xmlns:a16="http://schemas.microsoft.com/office/drawing/2014/main" id="{5342A3C4-D9DE-4DD4-A6E4-DD20792490EE}"/>
+              </a:ext>
+            </a:extLst>
+          </p:cNvPr>
+          <p:cNvSpPr txBox="1"/>
+          <p:nvPr/>
+        </p:nvSpPr>
+        <p:spPr>
+          <a:xfrm>
+            <a:off x="10031767" y="6184668"/>
+            <a:ext cx="1510683" cy="369332"/>
+          </a:xfrm>
+          <a:prstGeom prst="rect">
+            <a:avLst/>
+          </a:prstGeom>
+          <a:noFill/>
+        </p:spPr>
+        <p:txBody>
+          <a:bodyPr wrap="square" rtlCol="0">
+            <a:spAutoFit/>
+          </a:bodyPr>
+          <a:lstStyle/>
+          <a:p>
+            <a:r>
+              <a:rPr lang="sk-SK" dirty="0"/>
+              <a:t>95 kurzov</a:t>
+            </a:r>
+          </a:p>
+        </p:txBody>
+      </p:sp>
+      <p:sp>
+        <p:nvSpPr>
+          <p:cNvPr id="18" name="BlokTextu 17">
+            <a:extLst>
+              <a:ext uri="{FF2B5EF4-FFF2-40B4-BE49-F238E27FC236}">
+                <a16:creationId xmlns:a16="http://schemas.microsoft.com/office/drawing/2014/main" id="{A1E19D3E-1427-466A-B88C-30CBEE1C96CE}"/>
+              </a:ext>
+            </a:extLst>
+          </p:cNvPr>
+          <p:cNvSpPr txBox="1"/>
+          <p:nvPr/>
+        </p:nvSpPr>
+        <p:spPr>
+          <a:xfrm>
+            <a:off x="7074022" y="4191389"/>
+            <a:ext cx="4810217" cy="369332"/>
+          </a:xfrm>
+          <a:prstGeom prst="rect">
+            <a:avLst/>
+          </a:prstGeom>
+          <a:noFill/>
+        </p:spPr>
+        <p:txBody>
+          <a:bodyPr wrap="square">
+            <a:spAutoFit/>
+          </a:bodyPr>
+          <a:lstStyle/>
+          <a:p>
+            <a:r>
+              <a:rPr lang="pl-PL" dirty="0">
+                <a:hlinkClick r:id="rId3"/>
+              </a:rPr>
+              <a:t>www.businessofapps.com/data/duolingo-statistics </a:t>
+            </a:r>
+            <a:endParaRPr lang="sk-SK" dirty="0"/>
+          </a:p>
+        </p:txBody>
+      </p:sp>
     </p:spTree>
     <p:extLst>
       <p:ext uri="{BB962C8B-B14F-4D97-AF65-F5344CB8AC3E}">
         <p14:creationId xmlns:p14="http://schemas.microsoft.com/office/powerpoint/2010/main" val="3618149132"/>
+      </p:ext>
+    </p:extLst>
+  </p:cSld>
+  <p:clrMapOvr>
+    <a:masterClrMapping/>
+  </p:clrMapOvr>
+</p:sld>
+</file>
+
+<file path=ppt/slides/slide8.xml><?xml version="1.0" encoding="utf-8"?>
+<p:sld xmlns:a="http://schemas.openxmlformats.org/drawingml/2006/main" xmlns:r="http://schemas.openxmlformats.org/officeDocument/2006/relationships" xmlns:p="http://schemas.openxmlformats.org/presentationml/2006/main">
+  <p:cSld>
+    <p:spTree>
+      <p:nvGrpSpPr>
+        <p:cNvPr id="1" name=""/>
+        <p:cNvGrpSpPr/>
+        <p:nvPr/>
+      </p:nvGrpSpPr>
+      <p:grpSpPr>
+        <a:xfrm>
+          <a:off x="0" y="0"/>
+          <a:ext cx="0" cy="0"/>
+          <a:chOff x="0" y="0"/>
+          <a:chExt cx="0" cy="0"/>
+        </a:xfrm>
+      </p:grpSpPr>
+      <p:grpSp>
+        <p:nvGrpSpPr>
+          <p:cNvPr id="2" name="Skupina 1">
+            <a:extLst>
+              <a:ext uri="{FF2B5EF4-FFF2-40B4-BE49-F238E27FC236}">
+                <a16:creationId xmlns:a16="http://schemas.microsoft.com/office/drawing/2014/main" id="{A37563EF-FE31-442E-AD80-ADC1FD1707F5}"/>
+              </a:ext>
+            </a:extLst>
+          </p:cNvPr>
+          <p:cNvGrpSpPr/>
+          <p:nvPr/>
+        </p:nvGrpSpPr>
+        <p:grpSpPr>
+          <a:xfrm>
+            <a:off x="2677213" y="257389"/>
+            <a:ext cx="6329850" cy="874575"/>
+            <a:chOff x="-63839" y="1524483"/>
+            <a:chExt cx="6329850" cy="874575"/>
+          </a:xfrm>
+        </p:grpSpPr>
+        <p:sp>
+          <p:nvSpPr>
+            <p:cNvPr id="3" name="Obdĺžnik: zaoblené rohy 2">
+              <a:extLst>
+                <a:ext uri="{FF2B5EF4-FFF2-40B4-BE49-F238E27FC236}">
+                  <a16:creationId xmlns:a16="http://schemas.microsoft.com/office/drawing/2014/main" id="{61AE2604-D8DE-484E-B0A1-A314EC8732DB}"/>
+                </a:ext>
+              </a:extLst>
+            </p:cNvPr>
+            <p:cNvSpPr/>
+            <p:nvPr/>
+          </p:nvSpPr>
+          <p:spPr>
+            <a:xfrm>
+              <a:off x="0" y="1524483"/>
+              <a:ext cx="6266011" cy="874575"/>
+            </a:xfrm>
+            <a:prstGeom prst="roundRect">
+              <a:avLst/>
+            </a:prstGeom>
+          </p:spPr>
+          <p:style>
+            <a:lnRef idx="0">
+              <a:schemeClr val="lt1">
+                <a:hueOff val="0"/>
+                <a:satOff val="0"/>
+                <a:lumOff val="0"/>
+                <a:alphaOff val="0"/>
+              </a:schemeClr>
+            </a:lnRef>
+            <a:fillRef idx="3">
+              <a:schemeClr val="accent2">
+                <a:hueOff val="10056566"/>
+                <a:satOff val="-328"/>
+                <a:lumOff val="3529"/>
+                <a:alphaOff val="0"/>
+              </a:schemeClr>
+            </a:fillRef>
+            <a:effectRef idx="2">
+              <a:schemeClr val="accent2">
+                <a:hueOff val="10056566"/>
+                <a:satOff val="-328"/>
+                <a:lumOff val="3529"/>
+                <a:alphaOff val="0"/>
+              </a:schemeClr>
+            </a:effectRef>
+            <a:fontRef idx="minor">
+              <a:schemeClr val="lt1"/>
+            </a:fontRef>
+          </p:style>
+        </p:sp>
+        <p:sp>
+          <p:nvSpPr>
+            <p:cNvPr id="4" name="Obdĺžnik: zaoblené rohy 4">
+              <a:extLst>
+                <a:ext uri="{FF2B5EF4-FFF2-40B4-BE49-F238E27FC236}">
+                  <a16:creationId xmlns:a16="http://schemas.microsoft.com/office/drawing/2014/main" id="{6A288523-C6F9-48E8-9354-B94968E5E768}"/>
+                </a:ext>
+              </a:extLst>
+            </p:cNvPr>
+            <p:cNvSpPr txBox="1"/>
+            <p:nvPr/>
+          </p:nvSpPr>
+          <p:spPr>
+            <a:xfrm>
+              <a:off x="-63839" y="1565418"/>
+              <a:ext cx="6180625" cy="789189"/>
+            </a:xfrm>
+            <a:prstGeom prst="rect">
+              <a:avLst/>
+            </a:prstGeom>
+          </p:spPr>
+          <p:style>
+            <a:lnRef idx="0">
+              <a:scrgbClr r="0" g="0" b="0"/>
+            </a:lnRef>
+            <a:fillRef idx="0">
+              <a:scrgbClr r="0" g="0" b="0"/>
+            </a:fillRef>
+            <a:effectRef idx="0">
+              <a:scrgbClr r="0" g="0" b="0"/>
+            </a:effectRef>
+            <a:fontRef idx="minor">
+              <a:schemeClr val="lt1"/>
+            </a:fontRef>
+          </p:style>
+          <p:txBody>
+            <a:bodyPr spcFirstLastPara="0" vert="horz" wrap="square" lIns="87630" tIns="87630" rIns="87630" bIns="87630" numCol="1" spcCol="1270" anchor="ctr" anchorCtr="0">
+              <a:noAutofit/>
+            </a:bodyPr>
+            <a:lstStyle/>
+            <a:p>
+              <a:pPr marL="0" lvl="0" indent="0" algn="ctr" defTabSz="1022350">
+                <a:lnSpc>
+                  <a:spcPct val="90000"/>
+                </a:lnSpc>
+                <a:spcBef>
+                  <a:spcPct val="0"/>
+                </a:spcBef>
+                <a:spcAft>
+                  <a:spcPct val="35000"/>
+                </a:spcAft>
+                <a:buNone/>
+              </a:pPr>
+              <a:r>
+                <a:rPr lang="sk-SK" sz="2300" kern="1200" dirty="0"/>
+                <a:t>2.2  </a:t>
+              </a:r>
+              <a:r>
+                <a:rPr lang="sk-SK" sz="2300" dirty="0"/>
+                <a:t>Aplikácia </a:t>
+              </a:r>
+              <a:r>
+                <a:rPr lang="sk-SK" sz="2300" dirty="0" err="1"/>
+                <a:t>HelloTalk</a:t>
+              </a:r>
+              <a:endParaRPr lang="en-US" sz="2300" kern="1200" dirty="0"/>
+            </a:p>
+          </p:txBody>
+        </p:sp>
+      </p:grpSp>
+      <p:sp>
+        <p:nvSpPr>
+          <p:cNvPr id="6" name="BlokTextu 5">
+            <a:extLst>
+              <a:ext uri="{FF2B5EF4-FFF2-40B4-BE49-F238E27FC236}">
+                <a16:creationId xmlns:a16="http://schemas.microsoft.com/office/drawing/2014/main" id="{67E27020-FAB7-4F56-B0F2-9447050819C9}"/>
+              </a:ext>
+            </a:extLst>
+          </p:cNvPr>
+          <p:cNvSpPr txBox="1"/>
+          <p:nvPr/>
+        </p:nvSpPr>
+        <p:spPr>
+          <a:xfrm>
+            <a:off x="1065321" y="1296140"/>
+            <a:ext cx="5353235" cy="1200329"/>
+          </a:xfrm>
+          <a:prstGeom prst="rect">
+            <a:avLst/>
+          </a:prstGeom>
+          <a:noFill/>
+        </p:spPr>
+        <p:txBody>
+          <a:bodyPr wrap="square" rtlCol="0">
+            <a:spAutoFit/>
+          </a:bodyPr>
+          <a:lstStyle/>
+          <a:p>
+            <a:pPr marL="285750" indent="-285750">
+              <a:buFont typeface="Arial" panose="020B0604020202020204" pitchFamily="34" charset="0"/>
+              <a:buChar char="•"/>
+            </a:pPr>
+            <a:r>
+              <a:rPr lang="sk-SK" dirty="0"/>
+              <a:t>Prepojenie užívateľa s osobou, ktorej je daný jazyk materinský </a:t>
+            </a:r>
+          </a:p>
+          <a:p>
+            <a:pPr marL="285750" indent="-285750">
+              <a:buFont typeface="Arial" panose="020B0604020202020204" pitchFamily="34" charset="0"/>
+              <a:buChar char="•"/>
+            </a:pPr>
+            <a:endParaRPr lang="sk-SK" dirty="0"/>
+          </a:p>
+          <a:p>
+            <a:pPr marL="285750" indent="-285750">
+              <a:buFont typeface="Arial" panose="020B0604020202020204" pitchFamily="34" charset="0"/>
+              <a:buChar char="•"/>
+            </a:pPr>
+            <a:r>
+              <a:rPr lang="sk-SK" dirty="0"/>
+              <a:t> množstvo funkcií (GPS, preklad, rozoznanie hlasu,...)</a:t>
+            </a:r>
+          </a:p>
+        </p:txBody>
+      </p:sp>
+      <p:sp>
+        <p:nvSpPr>
+          <p:cNvPr id="8" name="BlokTextu 7">
+            <a:extLst>
+              <a:ext uri="{FF2B5EF4-FFF2-40B4-BE49-F238E27FC236}">
+                <a16:creationId xmlns:a16="http://schemas.microsoft.com/office/drawing/2014/main" id="{8E2A1124-42C5-4A86-8BD4-098A61464224}"/>
+              </a:ext>
+            </a:extLst>
+          </p:cNvPr>
+          <p:cNvSpPr txBox="1"/>
+          <p:nvPr/>
+        </p:nvSpPr>
+        <p:spPr>
+          <a:xfrm>
+            <a:off x="334391" y="3610619"/>
+            <a:ext cx="5433134" cy="2585323"/>
+          </a:xfrm>
+          <a:prstGeom prst="rect">
+            <a:avLst/>
+          </a:prstGeom>
+          <a:noFill/>
+          <a:ln>
+            <a:solidFill>
+              <a:srgbClr val="00B050"/>
+            </a:solidFill>
+          </a:ln>
+        </p:spPr>
+        <p:txBody>
+          <a:bodyPr wrap="square">
+            <a:spAutoFit/>
+          </a:bodyPr>
+          <a:lstStyle/>
+          <a:p>
+            <a:pPr marL="285750" indent="-285750">
+              <a:buFont typeface="Arial" panose="020B0604020202020204" pitchFamily="34" charset="0"/>
+              <a:buChar char="•"/>
+            </a:pPr>
+            <a:r>
+              <a:rPr lang="sk-SK" dirty="0"/>
+              <a:t>Možnosť bezplatného hovoru,</a:t>
+            </a:r>
+          </a:p>
+          <a:p>
+            <a:pPr marL="285750" indent="-285750">
+              <a:buFont typeface="Arial" panose="020B0604020202020204" pitchFamily="34" charset="0"/>
+              <a:buChar char="•"/>
+            </a:pPr>
+            <a:endParaRPr lang="sk-SK" dirty="0"/>
+          </a:p>
+          <a:p>
+            <a:pPr marL="285750" indent="-285750">
+              <a:buFont typeface="Arial" panose="020B0604020202020204" pitchFamily="34" charset="0"/>
+              <a:buChar char="•"/>
+            </a:pPr>
+            <a:r>
+              <a:rPr lang="sk-SK" dirty="0"/>
+              <a:t> automatické prekladanie konverzácie, čo zabezpečuje plynulosť  konverzácie,</a:t>
+            </a:r>
+          </a:p>
+          <a:p>
+            <a:pPr marL="285750" indent="-285750">
+              <a:buFont typeface="Arial" panose="020B0604020202020204" pitchFamily="34" charset="0"/>
+              <a:buChar char="•"/>
+            </a:pPr>
+            <a:endParaRPr lang="sk-SK" dirty="0"/>
+          </a:p>
+          <a:p>
+            <a:pPr marL="285750" indent="-285750">
+              <a:buFont typeface="Arial" panose="020B0604020202020204" pitchFamily="34" charset="0"/>
+              <a:buChar char="•"/>
+            </a:pPr>
+            <a:r>
+              <a:rPr lang="sk-SK" dirty="0"/>
+              <a:t> omoc pri výslovnosti pri jazykoch, ktoré nepoužívajú latinskú abecedu.</a:t>
+            </a:r>
+          </a:p>
+          <a:p>
+            <a:pPr marL="285750" indent="-285750">
+              <a:buFont typeface="Arial" panose="020B0604020202020204" pitchFamily="34" charset="0"/>
+              <a:buChar char="•"/>
+            </a:pPr>
+            <a:endParaRPr lang="sk-SK" dirty="0"/>
+          </a:p>
+          <a:p>
+            <a:pPr marL="285750" indent="-285750">
+              <a:buFont typeface="Arial" panose="020B0604020202020204" pitchFamily="34" charset="0"/>
+              <a:buChar char="•"/>
+            </a:pPr>
+            <a:r>
+              <a:rPr lang="pl-PL" dirty="0"/>
+              <a:t>informovanie o čase v krajine osoby, ktorej píšem</a:t>
+            </a:r>
+            <a:endParaRPr lang="sk-SK" dirty="0"/>
+          </a:p>
+        </p:txBody>
+      </p:sp>
+      <p:sp>
+        <p:nvSpPr>
+          <p:cNvPr id="9" name="BlokTextu 8">
+            <a:extLst>
+              <a:ext uri="{FF2B5EF4-FFF2-40B4-BE49-F238E27FC236}">
+                <a16:creationId xmlns:a16="http://schemas.microsoft.com/office/drawing/2014/main" id="{F7149F4B-E5F7-4F50-AAB6-60122BD0EC44}"/>
+              </a:ext>
+            </a:extLst>
+          </p:cNvPr>
+          <p:cNvSpPr txBox="1"/>
+          <p:nvPr/>
+        </p:nvSpPr>
+        <p:spPr>
+          <a:xfrm>
+            <a:off x="6640498" y="3610619"/>
+            <a:ext cx="5131294" cy="2031325"/>
+          </a:xfrm>
+          <a:prstGeom prst="rect">
+            <a:avLst/>
+          </a:prstGeom>
+          <a:noFill/>
+          <a:ln>
+            <a:solidFill>
+              <a:srgbClr val="FF0000"/>
+            </a:solidFill>
+          </a:ln>
+        </p:spPr>
+        <p:txBody>
+          <a:bodyPr wrap="square" rtlCol="0">
+            <a:spAutoFit/>
+          </a:bodyPr>
+          <a:lstStyle/>
+          <a:p>
+            <a:pPr marL="285750" indent="-285750">
+              <a:buFont typeface="Arial" panose="020B0604020202020204" pitchFamily="34" charset="0"/>
+              <a:buChar char="•"/>
+            </a:pPr>
+            <a:r>
+              <a:rPr lang="sk-SK" dirty="0"/>
+              <a:t>nedostatočný systém na motivovanie užívateľa,</a:t>
+            </a:r>
+          </a:p>
+          <a:p>
+            <a:pPr marL="285750" indent="-285750">
+              <a:buFont typeface="Arial" panose="020B0604020202020204" pitchFamily="34" charset="0"/>
+              <a:buChar char="•"/>
+            </a:pPr>
+            <a:endParaRPr lang="sk-SK" dirty="0"/>
+          </a:p>
+          <a:p>
+            <a:pPr marL="285750" indent="-285750">
+              <a:buFont typeface="Arial" panose="020B0604020202020204" pitchFamily="34" charset="0"/>
+              <a:buChar char="•"/>
+            </a:pPr>
+            <a:r>
+              <a:rPr lang="pl-PL" dirty="0"/>
+              <a:t>nie všetky funkcie su dostupné bez prémium verzie</a:t>
+            </a:r>
+          </a:p>
+          <a:p>
+            <a:pPr marL="285750" indent="-285750">
+              <a:buFont typeface="Arial" panose="020B0604020202020204" pitchFamily="34" charset="0"/>
+              <a:buChar char="•"/>
+            </a:pPr>
+            <a:endParaRPr lang="pl-PL" dirty="0"/>
+          </a:p>
+          <a:p>
+            <a:pPr marL="285750" indent="-285750">
+              <a:buFont typeface="Arial" panose="020B0604020202020204" pitchFamily="34" charset="0"/>
+              <a:buChar char="•"/>
+            </a:pPr>
+            <a:r>
+              <a:rPr lang="sk-SK" dirty="0"/>
+              <a:t>žiadna spätná väzba pre užívateľov o ich progrese v učení</a:t>
+            </a:r>
+          </a:p>
+        </p:txBody>
+      </p:sp>
+      <p:sp>
+        <p:nvSpPr>
+          <p:cNvPr id="10" name="BlokTextu 9">
+            <a:extLst>
+              <a:ext uri="{FF2B5EF4-FFF2-40B4-BE49-F238E27FC236}">
+                <a16:creationId xmlns:a16="http://schemas.microsoft.com/office/drawing/2014/main" id="{A500D10D-4E21-44CF-A57B-6BFE464A4A08}"/>
+              </a:ext>
+            </a:extLst>
+          </p:cNvPr>
+          <p:cNvSpPr txBox="1"/>
+          <p:nvPr/>
+        </p:nvSpPr>
+        <p:spPr>
+          <a:xfrm>
+            <a:off x="2414726" y="3216000"/>
+            <a:ext cx="1518082" cy="369332"/>
+          </a:xfrm>
+          <a:prstGeom prst="rect">
+            <a:avLst/>
+          </a:prstGeom>
+          <a:noFill/>
+        </p:spPr>
+        <p:txBody>
+          <a:bodyPr wrap="square" rtlCol="0">
+            <a:spAutoFit/>
+          </a:bodyPr>
+          <a:lstStyle/>
+          <a:p>
+            <a:r>
+              <a:rPr lang="sk-SK" dirty="0">
+                <a:solidFill>
+                  <a:srgbClr val="00B050"/>
+                </a:solidFill>
+              </a:rPr>
+              <a:t>Výhody</a:t>
+            </a:r>
+          </a:p>
+        </p:txBody>
+      </p:sp>
+      <p:sp>
+        <p:nvSpPr>
+          <p:cNvPr id="11" name="BlokTextu 10">
+            <a:extLst>
+              <a:ext uri="{FF2B5EF4-FFF2-40B4-BE49-F238E27FC236}">
+                <a16:creationId xmlns:a16="http://schemas.microsoft.com/office/drawing/2014/main" id="{1B130407-CFDA-42B1-94CB-232DA7718A71}"/>
+              </a:ext>
+            </a:extLst>
+          </p:cNvPr>
+          <p:cNvSpPr txBox="1"/>
+          <p:nvPr/>
+        </p:nvSpPr>
+        <p:spPr>
+          <a:xfrm>
+            <a:off x="8745984" y="3196836"/>
+            <a:ext cx="1518082" cy="369332"/>
+          </a:xfrm>
+          <a:prstGeom prst="rect">
+            <a:avLst/>
+          </a:prstGeom>
+          <a:noFill/>
+        </p:spPr>
+        <p:txBody>
+          <a:bodyPr wrap="square" rtlCol="0">
+            <a:spAutoFit/>
+          </a:bodyPr>
+          <a:lstStyle/>
+          <a:p>
+            <a:r>
+              <a:rPr lang="sk-SK" dirty="0">
+                <a:solidFill>
+                  <a:srgbClr val="FF0000"/>
+                </a:solidFill>
+              </a:rPr>
+              <a:t>Nevýhody</a:t>
+            </a:r>
+          </a:p>
+        </p:txBody>
+      </p:sp>
+    </p:spTree>
+    <p:extLst>
+      <p:ext uri="{BB962C8B-B14F-4D97-AF65-F5344CB8AC3E}">
+        <p14:creationId xmlns:p14="http://schemas.microsoft.com/office/powerpoint/2010/main" val="1774230858"/>
+      </p:ext>
+    </p:extLst>
+  </p:cSld>
+  <p:clrMapOvr>
+    <a:masterClrMapping/>
+  </p:clrMapOvr>
+</p:sld>
+</file>
+
+<file path=ppt/slides/slide9.xml><?xml version="1.0" encoding="utf-8"?>
+<p:sld xmlns:a="http://schemas.openxmlformats.org/drawingml/2006/main" xmlns:r="http://schemas.openxmlformats.org/officeDocument/2006/relationships" xmlns:p="http://schemas.openxmlformats.org/presentationml/2006/main">
+  <p:cSld>
+    <p:spTree>
+      <p:nvGrpSpPr>
+        <p:cNvPr id="1" name=""/>
+        <p:cNvGrpSpPr/>
+        <p:nvPr/>
+      </p:nvGrpSpPr>
+      <p:grpSpPr>
+        <a:xfrm>
+          <a:off x="0" y="0"/>
+          <a:ext cx="0" cy="0"/>
+          <a:chOff x="0" y="0"/>
+          <a:chExt cx="0" cy="0"/>
+        </a:xfrm>
+      </p:grpSpPr>
+      <p:grpSp>
+        <p:nvGrpSpPr>
+          <p:cNvPr id="2" name="Skupina 1">
+            <a:extLst>
+              <a:ext uri="{FF2B5EF4-FFF2-40B4-BE49-F238E27FC236}">
+                <a16:creationId xmlns:a16="http://schemas.microsoft.com/office/drawing/2014/main" id="{E36B6A89-B685-4AD7-A76B-C4C435DF7FF2}"/>
+              </a:ext>
+            </a:extLst>
+          </p:cNvPr>
+          <p:cNvGrpSpPr/>
+          <p:nvPr/>
+        </p:nvGrpSpPr>
+        <p:grpSpPr>
+          <a:xfrm>
+            <a:off x="2677213" y="257389"/>
+            <a:ext cx="6329850" cy="874575"/>
+            <a:chOff x="-63839" y="1524483"/>
+            <a:chExt cx="6329850" cy="874575"/>
+          </a:xfrm>
+        </p:grpSpPr>
+        <p:sp>
+          <p:nvSpPr>
+            <p:cNvPr id="3" name="Obdĺžnik: zaoblené rohy 2">
+              <a:extLst>
+                <a:ext uri="{FF2B5EF4-FFF2-40B4-BE49-F238E27FC236}">
+                  <a16:creationId xmlns:a16="http://schemas.microsoft.com/office/drawing/2014/main" id="{5F35D429-90F3-461F-8FE5-E338C61E9195}"/>
+                </a:ext>
+              </a:extLst>
+            </p:cNvPr>
+            <p:cNvSpPr/>
+            <p:nvPr/>
+          </p:nvSpPr>
+          <p:spPr>
+            <a:xfrm>
+              <a:off x="0" y="1524483"/>
+              <a:ext cx="6266011" cy="874575"/>
+            </a:xfrm>
+            <a:prstGeom prst="roundRect">
+              <a:avLst/>
+            </a:prstGeom>
+          </p:spPr>
+          <p:style>
+            <a:lnRef idx="0">
+              <a:schemeClr val="lt1">
+                <a:hueOff val="0"/>
+                <a:satOff val="0"/>
+                <a:lumOff val="0"/>
+                <a:alphaOff val="0"/>
+              </a:schemeClr>
+            </a:lnRef>
+            <a:fillRef idx="3">
+              <a:schemeClr val="accent2">
+                <a:hueOff val="10056566"/>
+                <a:satOff val="-328"/>
+                <a:lumOff val="3529"/>
+                <a:alphaOff val="0"/>
+              </a:schemeClr>
+            </a:fillRef>
+            <a:effectRef idx="2">
+              <a:schemeClr val="accent2">
+                <a:hueOff val="10056566"/>
+                <a:satOff val="-328"/>
+                <a:lumOff val="3529"/>
+                <a:alphaOff val="0"/>
+              </a:schemeClr>
+            </a:effectRef>
+            <a:fontRef idx="minor">
+              <a:schemeClr val="lt1"/>
+            </a:fontRef>
+          </p:style>
+        </p:sp>
+        <p:sp>
+          <p:nvSpPr>
+            <p:cNvPr id="4" name="Obdĺžnik: zaoblené rohy 4">
+              <a:extLst>
+                <a:ext uri="{FF2B5EF4-FFF2-40B4-BE49-F238E27FC236}">
+                  <a16:creationId xmlns:a16="http://schemas.microsoft.com/office/drawing/2014/main" id="{C1E27821-5F3E-419A-A721-3E29C63E1AFA}"/>
+                </a:ext>
+              </a:extLst>
+            </p:cNvPr>
+            <p:cNvSpPr txBox="1"/>
+            <p:nvPr/>
+          </p:nvSpPr>
+          <p:spPr>
+            <a:xfrm>
+              <a:off x="-63839" y="1565418"/>
+              <a:ext cx="6180625" cy="789189"/>
+            </a:xfrm>
+            <a:prstGeom prst="rect">
+              <a:avLst/>
+            </a:prstGeom>
+          </p:spPr>
+          <p:style>
+            <a:lnRef idx="0">
+              <a:scrgbClr r="0" g="0" b="0"/>
+            </a:lnRef>
+            <a:fillRef idx="0">
+              <a:scrgbClr r="0" g="0" b="0"/>
+            </a:fillRef>
+            <a:effectRef idx="0">
+              <a:scrgbClr r="0" g="0" b="0"/>
+            </a:effectRef>
+            <a:fontRef idx="minor">
+              <a:schemeClr val="lt1"/>
+            </a:fontRef>
+          </p:style>
+          <p:txBody>
+            <a:bodyPr spcFirstLastPara="0" vert="horz" wrap="square" lIns="87630" tIns="87630" rIns="87630" bIns="87630" numCol="1" spcCol="1270" anchor="ctr" anchorCtr="0">
+              <a:noAutofit/>
+            </a:bodyPr>
+            <a:lstStyle/>
+            <a:p>
+              <a:pPr marL="0" lvl="0" indent="0" algn="ctr" defTabSz="1022350">
+                <a:lnSpc>
+                  <a:spcPct val="90000"/>
+                </a:lnSpc>
+                <a:spcBef>
+                  <a:spcPct val="0"/>
+                </a:spcBef>
+                <a:spcAft>
+                  <a:spcPct val="35000"/>
+                </a:spcAft>
+                <a:buNone/>
+              </a:pPr>
+              <a:r>
+                <a:rPr lang="sk-SK" sz="2300" kern="1200" dirty="0"/>
+                <a:t>2.3  </a:t>
+              </a:r>
+              <a:r>
+                <a:rPr lang="sk-SK" sz="2300" dirty="0"/>
+                <a:t>Aplikácia Tandem</a:t>
+              </a:r>
+              <a:endParaRPr lang="en-US" sz="2300" kern="1200" dirty="0"/>
+            </a:p>
+          </p:txBody>
+        </p:sp>
+      </p:grpSp>
+    </p:spTree>
+    <p:extLst>
+      <p:ext uri="{BB962C8B-B14F-4D97-AF65-F5344CB8AC3E}">
+        <p14:creationId xmlns:p14="http://schemas.microsoft.com/office/powerpoint/2010/main" val="1869504148"/>
       </p:ext>
     </p:extLst>
   </p:cSld>

</xml_diff>

<commit_message>
dorabanie prezentacie hello talk, tandem,blogy
</commit_message>
<xml_diff>
--- a/Prezentacia_clanok.pptx
+++ b/Prezentacia_clanok.pptx
@@ -16,6 +16,7 @@
     <p:sldId id="264" r:id="rId10"/>
     <p:sldId id="265" r:id="rId11"/>
     <p:sldId id="266" r:id="rId12"/>
+    <p:sldId id="267" r:id="rId13"/>
   </p:sldIdLst>
   <p:sldSz cx="12192000" cy="6858000"/>
   <p:notesSz cx="6858000" cy="9144000"/>
@@ -4196,7 +4197,7 @@
           <a:p>
             <a:fld id="{88D38747-4367-4BD2-8D51-C97E202738E2}" type="datetime1">
               <a:rPr lang="en-US" smtClean="0"/>
-              <a:t>11/20/2020</a:t>
+              <a:t>11/21/2020</a:t>
             </a:fld>
             <a:endParaRPr lang="en-US" dirty="0"/>
           </a:p>
@@ -4501,7 +4502,7 @@
           <a:p>
             <a:fld id="{11F1B079-7EF0-44EE-B798-BCC497C9F3B2}" type="datetime1">
               <a:rPr lang="en-US" smtClean="0"/>
-              <a:t>11/20/2020</a:t>
+              <a:t>11/21/2020</a:t>
             </a:fld>
             <a:endParaRPr lang="en-US" dirty="0"/>
           </a:p>
@@ -4695,7 +4696,7 @@
           <a:p>
             <a:fld id="{28FF70A8-1D13-4657-95F0-A9EA54967B8D}" type="datetime1">
               <a:rPr lang="en-US" smtClean="0"/>
-              <a:t>11/20/2020</a:t>
+              <a:t>11/21/2020</a:t>
             </a:fld>
             <a:endParaRPr lang="en-US" dirty="0"/>
           </a:p>
@@ -4958,7 +4959,7 @@
           <a:p>
             <a:fld id="{21EB90AC-71BD-4C7F-8ACA-7B3F18292E63}" type="datetime1">
               <a:rPr lang="en-US" smtClean="0"/>
-              <a:t>11/20/2020</a:t>
+              <a:t>11/21/2020</a:t>
             </a:fld>
             <a:endParaRPr lang="en-US" dirty="0"/>
           </a:p>
@@ -5394,7 +5395,7 @@
           <a:p>
             <a:fld id="{4E6EFC2C-8905-46F0-B443-CE905B76BA01}" type="datetime1">
               <a:rPr lang="en-US" smtClean="0"/>
-              <a:t>11/20/2020</a:t>
+              <a:t>11/21/2020</a:t>
             </a:fld>
             <a:endParaRPr lang="en-US" dirty="0"/>
           </a:p>
@@ -5931,7 +5932,7 @@
           <a:p>
             <a:fld id="{D9079DC3-C9B5-499E-9140-0DC28B7074E2}" type="datetime1">
               <a:rPr lang="en-US" smtClean="0"/>
-              <a:t>11/20/2020</a:t>
+              <a:t>11/21/2020</a:t>
             </a:fld>
             <a:endParaRPr lang="en-US" dirty="0"/>
           </a:p>
@@ -6813,7 +6814,7 @@
           <a:p>
             <a:fld id="{30BB33EA-E472-4D22-9C03-A9C14AA21CED}" type="datetime1">
               <a:rPr lang="en-US" smtClean="0"/>
-              <a:t>11/20/2020</a:t>
+              <a:t>11/21/2020</a:t>
             </a:fld>
             <a:endParaRPr lang="en-US" dirty="0"/>
           </a:p>
@@ -6983,7 +6984,7 @@
           <a:p>
             <a:fld id="{217E833E-1B6D-415F-AD29-75AE8C43BD0D}" type="datetime1">
               <a:rPr lang="en-US" smtClean="0"/>
-              <a:t>11/20/2020</a:t>
+              <a:t>11/21/2020</a:t>
             </a:fld>
             <a:endParaRPr lang="en-US" dirty="0"/>
           </a:p>
@@ -7167,7 +7168,7 @@
           <a:p>
             <a:fld id="{8452596F-08A7-4B70-989A-F2B1CF31E66B}" type="datetime1">
               <a:rPr lang="en-US" smtClean="0"/>
-              <a:t>11/20/2020</a:t>
+              <a:t>11/21/2020</a:t>
             </a:fld>
             <a:endParaRPr lang="en-US" dirty="0"/>
           </a:p>
@@ -7337,7 +7338,7 @@
           <a:p>
             <a:fld id="{73C55A3C-5767-4844-A0A3-83778C2E5409}" type="datetime1">
               <a:rPr lang="en-US" smtClean="0"/>
-              <a:t>11/20/2020</a:t>
+              <a:t>11/21/2020</a:t>
             </a:fld>
             <a:endParaRPr lang="en-US" dirty="0"/>
           </a:p>
@@ -7581,7 +7582,7 @@
           <a:p>
             <a:fld id="{CAE507A8-A5CF-4D38-AB86-7EDDA87A85D4}" type="datetime1">
               <a:rPr lang="en-US" smtClean="0"/>
-              <a:t>11/20/2020</a:t>
+              <a:t>11/21/2020</a:t>
             </a:fld>
             <a:endParaRPr lang="en-US" dirty="0"/>
           </a:p>
@@ -7823,7 +7824,7 @@
           <a:p>
             <a:fld id="{BDFCD27C-8599-43EF-BA1D-14DDC1946E06}" type="datetime1">
               <a:rPr lang="en-US" smtClean="0"/>
-              <a:t>11/20/2020</a:t>
+              <a:t>11/21/2020</a:t>
             </a:fld>
             <a:endParaRPr lang="en-US" dirty="0"/>
           </a:p>
@@ -8304,7 +8305,7 @@
           <a:p>
             <a:fld id="{49343D99-809A-49C0-96E5-4250D0B498EE}" type="datetime1">
               <a:rPr lang="en-US" smtClean="0"/>
-              <a:t>11/20/2020</a:t>
+              <a:t>11/21/2020</a:t>
             </a:fld>
             <a:endParaRPr lang="en-US" dirty="0"/>
           </a:p>
@@ -8422,7 +8423,7 @@
           <a:p>
             <a:fld id="{A143DE9B-B678-4EFB-BB7D-A4370204A0B0}" type="datetime1">
               <a:rPr lang="en-US" smtClean="0"/>
-              <a:t>11/20/2020</a:t>
+              <a:t>11/21/2020</a:t>
             </a:fld>
             <a:endParaRPr lang="en-US" dirty="0"/>
           </a:p>
@@ -8517,7 +8518,7 @@
           <a:p>
             <a:fld id="{E68812DA-F765-4142-A6A3-A8ED7235E082}" type="datetime1">
               <a:rPr lang="en-US" smtClean="0"/>
-              <a:t>11/20/2020</a:t>
+              <a:t>11/21/2020</a:t>
             </a:fld>
             <a:endParaRPr lang="en-US" dirty="0"/>
           </a:p>
@@ -8772,7 +8773,7 @@
           <a:p>
             <a:fld id="{3E0277FD-7DE6-41D4-930D-AC99F5AFE54E}" type="datetime1">
               <a:rPr lang="en-US" smtClean="0"/>
-              <a:t>11/20/2020</a:t>
+              <a:t>11/21/2020</a:t>
             </a:fld>
             <a:endParaRPr lang="en-US" dirty="0"/>
           </a:p>
@@ -9079,7 +9080,7 @@
           <a:p>
             <a:fld id="{9EA15526-7079-4B7B-987C-1B5FAE11A0FF}" type="datetime1">
               <a:rPr lang="en-US" smtClean="0"/>
-              <a:t>11/20/2020</a:t>
+              <a:t>11/21/2020</a:t>
             </a:fld>
             <a:endParaRPr lang="en-US" dirty="0"/>
           </a:p>
@@ -9314,7 +9315,7 @@
           <a:p>
             <a:fld id="{073ED0CC-082F-4160-86E5-0D6041F12778}" type="datetime1">
               <a:rPr lang="en-US" smtClean="0"/>
-              <a:t>11/20/2020</a:t>
+              <a:t>11/21/2020</a:t>
             </a:fld>
             <a:endParaRPr lang="en-US" dirty="0"/>
           </a:p>
@@ -10354,13 +10355,393 @@
               </a:pPr>
               <a:r>
                 <a:rPr lang="sk-SK" sz="2300" kern="1200" dirty="0"/>
-                <a:t>2.1  Jazykové blogy</a:t>
+                <a:t>2.4  Jazykové blogy</a:t>
               </a:r>
               <a:endParaRPr lang="en-US" sz="2300" kern="1200" dirty="0"/>
             </a:p>
           </p:txBody>
         </p:sp>
       </p:grpSp>
+      <p:pic>
+        <p:nvPicPr>
+          <p:cNvPr id="1026" name="Picture 2" descr="Why Should You as An Employer be Concerned About Blogs? - Shavi Tech">
+            <a:extLst>
+              <a:ext uri="{FF2B5EF4-FFF2-40B4-BE49-F238E27FC236}">
+                <a16:creationId xmlns:a16="http://schemas.microsoft.com/office/drawing/2014/main" id="{0EC62A2C-4BF7-4E9F-BD5E-47B5A37ABDDD}"/>
+              </a:ext>
+            </a:extLst>
+          </p:cNvPr>
+          <p:cNvPicPr>
+            <a:picLocks noChangeAspect="1" noChangeArrowheads="1"/>
+          </p:cNvPicPr>
+          <p:nvPr/>
+        </p:nvPicPr>
+        <p:blipFill>
+          <a:blip r:embed="rId2">
+            <a:extLst>
+              <a:ext uri="{28A0092B-C50C-407E-A947-70E740481C1C}">
+                <a14:useLocalDpi xmlns:a14="http://schemas.microsoft.com/office/drawing/2010/main" val="0"/>
+              </a:ext>
+            </a:extLst>
+          </a:blip>
+          <a:srcRect/>
+          <a:stretch>
+            <a:fillRect/>
+          </a:stretch>
+        </p:blipFill>
+        <p:spPr bwMode="auto">
+          <a:xfrm>
+            <a:off x="7617041" y="1378814"/>
+            <a:ext cx="3838111" cy="2158938"/>
+          </a:xfrm>
+          <a:prstGeom prst="rect">
+            <a:avLst/>
+          </a:prstGeom>
+          <a:ln>
+            <a:noFill/>
+          </a:ln>
+          <a:effectLst>
+            <a:softEdge rad="112500"/>
+          </a:effectLst>
+          <a:extLst>
+            <a:ext uri="{909E8E84-426E-40DD-AFC4-6F175D3DCCD1}">
+              <a14:hiddenFill xmlns:a14="http://schemas.microsoft.com/office/drawing/2010/main">
+                <a:solidFill>
+                  <a:srgbClr val="FFFFFF"/>
+                </a:solidFill>
+              </a14:hiddenFill>
+            </a:ext>
+          </a:extLst>
+        </p:spPr>
+      </p:pic>
+      <p:sp>
+        <p:nvSpPr>
+          <p:cNvPr id="5" name="BlokTextu 4">
+            <a:extLst>
+              <a:ext uri="{FF2B5EF4-FFF2-40B4-BE49-F238E27FC236}">
+                <a16:creationId xmlns:a16="http://schemas.microsoft.com/office/drawing/2014/main" id="{1F62FE37-5755-43EB-AC97-0B7E46D0E1D0}"/>
+              </a:ext>
+            </a:extLst>
+          </p:cNvPr>
+          <p:cNvSpPr txBox="1"/>
+          <p:nvPr/>
+        </p:nvSpPr>
+        <p:spPr>
+          <a:xfrm>
+            <a:off x="1145219" y="1534953"/>
+            <a:ext cx="5157926" cy="923330"/>
+          </a:xfrm>
+          <a:prstGeom prst="rect">
+            <a:avLst/>
+          </a:prstGeom>
+          <a:noFill/>
+        </p:spPr>
+        <p:txBody>
+          <a:bodyPr wrap="square" rtlCol="0">
+            <a:spAutoFit/>
+          </a:bodyPr>
+          <a:lstStyle/>
+          <a:p>
+            <a:pPr marL="285750" indent="-285750">
+              <a:buFont typeface="Wingdings" panose="05000000000000000000" pitchFamily="2" charset="2"/>
+              <a:buChar char="q"/>
+            </a:pPr>
+            <a:r>
+              <a:rPr lang="sk-SK" dirty="0"/>
+              <a:t>Online denníky</a:t>
+            </a:r>
+          </a:p>
+          <a:p>
+            <a:pPr marL="285750" indent="-285750">
+              <a:buFont typeface="Wingdings" panose="05000000000000000000" pitchFamily="2" charset="2"/>
+              <a:buChar char="q"/>
+            </a:pPr>
+            <a:endParaRPr lang="sk-SK" dirty="0"/>
+          </a:p>
+          <a:p>
+            <a:pPr marL="285750" indent="-285750">
+              <a:buFont typeface="Wingdings" panose="05000000000000000000" pitchFamily="2" charset="2"/>
+              <a:buChar char="q"/>
+            </a:pPr>
+            <a:r>
+              <a:rPr lang="sk-SK" dirty="0"/>
+              <a:t>Komentovanie a písanie príspevkov</a:t>
+            </a:r>
+          </a:p>
+        </p:txBody>
+      </p:sp>
+      <p:sp>
+        <p:nvSpPr>
+          <p:cNvPr id="7" name="BlokTextu 6">
+            <a:extLst>
+              <a:ext uri="{FF2B5EF4-FFF2-40B4-BE49-F238E27FC236}">
+                <a16:creationId xmlns:a16="http://schemas.microsoft.com/office/drawing/2014/main" id="{80F2367B-AAC1-4C45-BA63-F38A254F29E6}"/>
+              </a:ext>
+            </a:extLst>
+          </p:cNvPr>
+          <p:cNvSpPr txBox="1"/>
+          <p:nvPr/>
+        </p:nvSpPr>
+        <p:spPr>
+          <a:xfrm>
+            <a:off x="334391" y="4307384"/>
+            <a:ext cx="5433134" cy="2031325"/>
+          </a:xfrm>
+          <a:prstGeom prst="rect">
+            <a:avLst/>
+          </a:prstGeom>
+          <a:noFill/>
+          <a:ln>
+            <a:solidFill>
+              <a:srgbClr val="00B050"/>
+            </a:solidFill>
+          </a:ln>
+        </p:spPr>
+        <p:txBody>
+          <a:bodyPr wrap="square">
+            <a:spAutoFit/>
+          </a:bodyPr>
+          <a:lstStyle/>
+          <a:p>
+            <a:pPr marL="285750" indent="-285750">
+              <a:buFont typeface="Arial" panose="020B0604020202020204" pitchFamily="34" charset="0"/>
+              <a:buChar char="•"/>
+            </a:pPr>
+            <a:r>
+              <a:rPr lang="sk-SK" dirty="0"/>
+              <a:t>Zlepšenie písacích schopností</a:t>
+            </a:r>
+          </a:p>
+          <a:p>
+            <a:pPr marL="285750" indent="-285750">
+              <a:buFont typeface="Arial" panose="020B0604020202020204" pitchFamily="34" charset="0"/>
+              <a:buChar char="•"/>
+            </a:pPr>
+            <a:endParaRPr lang="sk-SK" dirty="0"/>
+          </a:p>
+          <a:p>
+            <a:pPr marL="285750" indent="-285750">
+              <a:buFont typeface="Arial" panose="020B0604020202020204" pitchFamily="34" charset="0"/>
+              <a:buChar char="•"/>
+            </a:pPr>
+            <a:r>
+              <a:rPr lang="sk-SK" dirty="0"/>
+              <a:t> Používanie blogov núti užívateľa čítať v danom jazyku</a:t>
+            </a:r>
+          </a:p>
+          <a:p>
+            <a:pPr marL="285750" indent="-285750">
+              <a:buFont typeface="Arial" panose="020B0604020202020204" pitchFamily="34" charset="0"/>
+              <a:buChar char="•"/>
+            </a:pPr>
+            <a:endParaRPr lang="sk-SK" dirty="0"/>
+          </a:p>
+          <a:p>
+            <a:pPr marL="285750" indent="-285750">
+              <a:buFont typeface="Arial" panose="020B0604020202020204" pitchFamily="34" charset="0"/>
+              <a:buChar char="•"/>
+            </a:pPr>
+            <a:r>
+              <a:rPr lang="sk-SK" dirty="0"/>
+              <a:t> Dobré médium na interakciu s ľuďmi v danom jazyku</a:t>
+            </a:r>
+          </a:p>
+        </p:txBody>
+      </p:sp>
+      <p:sp>
+        <p:nvSpPr>
+          <p:cNvPr id="8" name="BlokTextu 7">
+            <a:extLst>
+              <a:ext uri="{FF2B5EF4-FFF2-40B4-BE49-F238E27FC236}">
+                <a16:creationId xmlns:a16="http://schemas.microsoft.com/office/drawing/2014/main" id="{59D7A860-1FCC-4677-BF94-96103B9F908D}"/>
+              </a:ext>
+            </a:extLst>
+          </p:cNvPr>
+          <p:cNvSpPr txBox="1"/>
+          <p:nvPr/>
+        </p:nvSpPr>
+        <p:spPr>
+          <a:xfrm>
+            <a:off x="6514133" y="4602023"/>
+            <a:ext cx="5131294" cy="1754326"/>
+          </a:xfrm>
+          <a:prstGeom prst="rect">
+            <a:avLst/>
+          </a:prstGeom>
+          <a:noFill/>
+          <a:ln>
+            <a:solidFill>
+              <a:srgbClr val="FF0000"/>
+            </a:solidFill>
+          </a:ln>
+        </p:spPr>
+        <p:txBody>
+          <a:bodyPr wrap="square" rtlCol="0">
+            <a:spAutoFit/>
+          </a:bodyPr>
+          <a:lstStyle/>
+          <a:p>
+            <a:pPr marL="285750" indent="-285750">
+              <a:buFont typeface="Arial" panose="020B0604020202020204" pitchFamily="34" charset="0"/>
+              <a:buChar char="•"/>
+            </a:pPr>
+            <a:r>
+              <a:rPr lang="sk-SK" dirty="0"/>
+              <a:t>Absencia prvku na motivovanie</a:t>
+            </a:r>
+          </a:p>
+          <a:p>
+            <a:pPr marL="285750" indent="-285750">
+              <a:buFont typeface="Arial" panose="020B0604020202020204" pitchFamily="34" charset="0"/>
+              <a:buChar char="•"/>
+            </a:pPr>
+            <a:endParaRPr lang="sk-SK" dirty="0"/>
+          </a:p>
+          <a:p>
+            <a:pPr marL="285750" indent="-285750">
+              <a:buFont typeface="Arial" panose="020B0604020202020204" pitchFamily="34" charset="0"/>
+              <a:buChar char="•"/>
+            </a:pPr>
+            <a:r>
+              <a:rPr lang="pl-PL" dirty="0"/>
+              <a:t>Užívateľom niekedy chýba sebaistota na zdielanie ich prác</a:t>
+            </a:r>
+          </a:p>
+          <a:p>
+            <a:pPr marL="285750" indent="-285750">
+              <a:buFont typeface="Arial" panose="020B0604020202020204" pitchFamily="34" charset="0"/>
+              <a:buChar char="•"/>
+            </a:pPr>
+            <a:endParaRPr lang="pl-PL" dirty="0"/>
+          </a:p>
+          <a:p>
+            <a:pPr marL="285750" indent="-285750">
+              <a:buFont typeface="Arial" panose="020B0604020202020204" pitchFamily="34" charset="0"/>
+              <a:buChar char="•"/>
+            </a:pPr>
+            <a:r>
+              <a:rPr lang="sk-SK" dirty="0"/>
+              <a:t>Porozumenie inštrukciám </a:t>
+            </a:r>
+          </a:p>
+        </p:txBody>
+      </p:sp>
+      <p:sp>
+        <p:nvSpPr>
+          <p:cNvPr id="9" name="BlokTextu 8">
+            <a:extLst>
+              <a:ext uri="{FF2B5EF4-FFF2-40B4-BE49-F238E27FC236}">
+                <a16:creationId xmlns:a16="http://schemas.microsoft.com/office/drawing/2014/main" id="{5618139D-7ADE-492D-AF4D-AA6F404CA06D}"/>
+              </a:ext>
+            </a:extLst>
+          </p:cNvPr>
+          <p:cNvSpPr txBox="1"/>
+          <p:nvPr/>
+        </p:nvSpPr>
+        <p:spPr>
+          <a:xfrm>
+            <a:off x="2291917" y="3860878"/>
+            <a:ext cx="1518082" cy="369332"/>
+          </a:xfrm>
+          <a:prstGeom prst="rect">
+            <a:avLst/>
+          </a:prstGeom>
+          <a:noFill/>
+        </p:spPr>
+        <p:txBody>
+          <a:bodyPr wrap="square" rtlCol="0">
+            <a:spAutoFit/>
+          </a:bodyPr>
+          <a:lstStyle/>
+          <a:p>
+            <a:r>
+              <a:rPr lang="sk-SK" dirty="0">
+                <a:solidFill>
+                  <a:srgbClr val="00B050"/>
+                </a:solidFill>
+              </a:rPr>
+              <a:t>Výhody</a:t>
+            </a:r>
+          </a:p>
+        </p:txBody>
+      </p:sp>
+      <p:sp>
+        <p:nvSpPr>
+          <p:cNvPr id="10" name="BlokTextu 9">
+            <a:extLst>
+              <a:ext uri="{FF2B5EF4-FFF2-40B4-BE49-F238E27FC236}">
+                <a16:creationId xmlns:a16="http://schemas.microsoft.com/office/drawing/2014/main" id="{A2F5B5F9-ECC7-4CF0-AC57-9AAE2E0D9A22}"/>
+              </a:ext>
+            </a:extLst>
+          </p:cNvPr>
+          <p:cNvSpPr txBox="1"/>
+          <p:nvPr/>
+        </p:nvSpPr>
+        <p:spPr>
+          <a:xfrm>
+            <a:off x="8448875" y="4185324"/>
+            <a:ext cx="1518082" cy="369332"/>
+          </a:xfrm>
+          <a:prstGeom prst="rect">
+            <a:avLst/>
+          </a:prstGeom>
+          <a:noFill/>
+        </p:spPr>
+        <p:txBody>
+          <a:bodyPr wrap="square" rtlCol="0">
+            <a:spAutoFit/>
+          </a:bodyPr>
+          <a:lstStyle/>
+          <a:p>
+            <a:r>
+              <a:rPr lang="sk-SK" dirty="0">
+                <a:solidFill>
+                  <a:srgbClr val="FF0000"/>
+                </a:solidFill>
+              </a:rPr>
+              <a:t>Nevýhody</a:t>
+            </a:r>
+          </a:p>
+        </p:txBody>
+      </p:sp>
+      <p:sp>
+        <p:nvSpPr>
+          <p:cNvPr id="6" name="BlokTextu 5">
+            <a:extLst>
+              <a:ext uri="{FF2B5EF4-FFF2-40B4-BE49-F238E27FC236}">
+                <a16:creationId xmlns:a16="http://schemas.microsoft.com/office/drawing/2014/main" id="{A3D5CACF-6711-439E-8E35-DA79A5EF47AC}"/>
+              </a:ext>
+            </a:extLst>
+          </p:cNvPr>
+          <p:cNvSpPr txBox="1"/>
+          <p:nvPr/>
+        </p:nvSpPr>
+        <p:spPr>
+          <a:xfrm>
+            <a:off x="8857838" y="3514689"/>
+            <a:ext cx="2452904" cy="276999"/>
+          </a:xfrm>
+          <a:prstGeom prst="rect">
+            <a:avLst/>
+          </a:prstGeom>
+          <a:noFill/>
+        </p:spPr>
+        <p:txBody>
+          <a:bodyPr wrap="square" rtlCol="0">
+            <a:spAutoFit/>
+          </a:bodyPr>
+          <a:lstStyle/>
+          <a:p>
+            <a:r>
+              <a:rPr lang="sk-SK" sz="1200" dirty="0">
+                <a:hlinkClick r:id="rId3"/>
+              </a:rPr>
+              <a:t>Zdroj obrázka</a:t>
+            </a:r>
+            <a:endParaRPr lang="sk-SK" sz="1200" dirty="0"/>
+          </a:p>
+        </p:txBody>
+      </p:sp>
     </p:spTree>
     <p:extLst>
       <p:ext uri="{BB962C8B-B14F-4D97-AF65-F5344CB8AC3E}">
@@ -10405,7 +10786,7 @@
         </p:nvGrpSpPr>
         <p:grpSpPr>
           <a:xfrm>
-            <a:off x="2962994" y="248513"/>
+            <a:off x="2962994" y="213002"/>
             <a:ext cx="6266011" cy="874575"/>
             <a:chOff x="0" y="3589308"/>
             <a:chExt cx="6266011" cy="874575"/>
@@ -10524,10 +10905,152 @@
           </p:txBody>
         </p:sp>
       </p:grpSp>
+      <p:sp>
+        <p:nvSpPr>
+          <p:cNvPr id="6" name="BlokTextu 5">
+            <a:extLst>
+              <a:ext uri="{FF2B5EF4-FFF2-40B4-BE49-F238E27FC236}">
+                <a16:creationId xmlns:a16="http://schemas.microsoft.com/office/drawing/2014/main" id="{3ACCBD7B-DD6E-459A-A7FD-E4D134230387}"/>
+              </a:ext>
+            </a:extLst>
+          </p:cNvPr>
+          <p:cNvSpPr txBox="1"/>
+          <p:nvPr/>
+        </p:nvSpPr>
+        <p:spPr>
+          <a:xfrm>
+            <a:off x="2962994" y="1762985"/>
+            <a:ext cx="6094520" cy="646331"/>
+          </a:xfrm>
+          <a:prstGeom prst="rect">
+            <a:avLst/>
+          </a:prstGeom>
+          <a:noFill/>
+        </p:spPr>
+        <p:txBody>
+          <a:bodyPr wrap="square">
+            <a:spAutoFit/>
+          </a:bodyPr>
+          <a:lstStyle/>
+          <a:p>
+            <a:pPr algn="ctr"/>
+            <a:r>
+              <a:rPr lang="sk-SK" dirty="0"/>
+              <a:t>Budeme sa venovať štúdii uskutočnenej na Katedre Anglického vzdelávania Univerzity Borneo v </a:t>
+            </a:r>
+            <a:r>
+              <a:rPr lang="sk-SK" dirty="0" err="1"/>
+              <a:t>Tarakane</a:t>
+            </a:r>
+            <a:r>
+              <a:rPr lang="sk-SK" dirty="0"/>
+              <a:t>. </a:t>
+            </a:r>
+          </a:p>
+        </p:txBody>
+      </p:sp>
+      <p:pic>
+        <p:nvPicPr>
+          <p:cNvPr id="7" name="Obrázok 6">
+            <a:extLst>
+              <a:ext uri="{FF2B5EF4-FFF2-40B4-BE49-F238E27FC236}">
+                <a16:creationId xmlns:a16="http://schemas.microsoft.com/office/drawing/2014/main" id="{DFB87376-B4D5-45AC-81F7-50A224815F0C}"/>
+              </a:ext>
+            </a:extLst>
+          </p:cNvPr>
+          <p:cNvPicPr>
+            <a:picLocks noChangeAspect="1"/>
+          </p:cNvPicPr>
+          <p:nvPr/>
+        </p:nvPicPr>
+        <p:blipFill>
+          <a:blip r:embed="rId2"/>
+          <a:stretch>
+            <a:fillRect/>
+          </a:stretch>
+        </p:blipFill>
+        <p:spPr>
+          <a:xfrm>
+            <a:off x="4915726" y="3338004"/>
+            <a:ext cx="2181225" cy="1857375"/>
+          </a:xfrm>
+          <a:prstGeom prst="rect">
+            <a:avLst/>
+          </a:prstGeom>
+        </p:spPr>
+      </p:pic>
+      <p:sp>
+        <p:nvSpPr>
+          <p:cNvPr id="8" name="BlokTextu 7">
+            <a:extLst>
+              <a:ext uri="{FF2B5EF4-FFF2-40B4-BE49-F238E27FC236}">
+                <a16:creationId xmlns:a16="http://schemas.microsoft.com/office/drawing/2014/main" id="{167D753E-ECAF-43D3-8BF0-F88382F364A7}"/>
+              </a:ext>
+            </a:extLst>
+          </p:cNvPr>
+          <p:cNvSpPr txBox="1"/>
+          <p:nvPr/>
+        </p:nvSpPr>
+        <p:spPr>
+          <a:xfrm>
+            <a:off x="5003313" y="5195379"/>
+            <a:ext cx="2320765" cy="369332"/>
+          </a:xfrm>
+          <a:prstGeom prst="rect">
+            <a:avLst/>
+          </a:prstGeom>
+          <a:noFill/>
+        </p:spPr>
+        <p:txBody>
+          <a:bodyPr wrap="square" rtlCol="0">
+            <a:spAutoFit/>
+          </a:bodyPr>
+          <a:lstStyle/>
+          <a:p>
+            <a:r>
+              <a:rPr lang="sk-SK" dirty="0">
+                <a:hlinkClick r:id="rId3"/>
+              </a:rPr>
+              <a:t>www.duolingo.com</a:t>
+            </a:r>
+            <a:endParaRPr lang="sk-SK" dirty="0"/>
+          </a:p>
+        </p:txBody>
+      </p:sp>
     </p:spTree>
     <p:extLst>
       <p:ext uri="{BB962C8B-B14F-4D97-AF65-F5344CB8AC3E}">
         <p14:creationId xmlns:p14="http://schemas.microsoft.com/office/powerpoint/2010/main" val="2749543216"/>
+      </p:ext>
+    </p:extLst>
+  </p:cSld>
+  <p:clrMapOvr>
+    <a:masterClrMapping/>
+  </p:clrMapOvr>
+</p:sld>
+</file>
+
+<file path=ppt/slides/slide12.xml><?xml version="1.0" encoding="utf-8"?>
+<p:sld xmlns:a="http://schemas.openxmlformats.org/drawingml/2006/main" xmlns:r="http://schemas.openxmlformats.org/officeDocument/2006/relationships" xmlns:p="http://schemas.openxmlformats.org/presentationml/2006/main">
+  <p:cSld>
+    <p:spTree>
+      <p:nvGrpSpPr>
+        <p:cNvPr id="1" name=""/>
+        <p:cNvGrpSpPr/>
+        <p:nvPr/>
+      </p:nvGrpSpPr>
+      <p:grpSpPr>
+        <a:xfrm>
+          <a:off x="0" y="0"/>
+          <a:ext cx="0" cy="0"/>
+          <a:chOff x="0" y="0"/>
+          <a:chExt cx="0" cy="0"/>
+        </a:xfrm>
+      </p:grpSpPr>
+    </p:spTree>
+    <p:extLst>
+      <p:ext uri="{BB962C8B-B14F-4D97-AF65-F5344CB8AC3E}">
+        <p14:creationId xmlns:p14="http://schemas.microsoft.com/office/powerpoint/2010/main" val="1251570293"/>
       </p:ext>
     </p:extLst>
   </p:cSld>
@@ -11966,11 +12489,11 @@
                 <a:schemeClr val="tx2"/>
               </a:buClr>
               <a:buSzPct val="70000"/>
-              <a:buFont typeface="Wingdings 2" charset="2"/>
-              <a:buChar char="•"/>
+              <a:buFont typeface="Wingdings" panose="05000000000000000000" pitchFamily="2" charset="2"/>
+              <a:buChar char="q"/>
             </a:pPr>
             <a:r>
-              <a:rPr lang="en-US" sz="1500">
+              <a:rPr lang="en-US" sz="1500" dirty="0">
                 <a:ln>
                   <a:solidFill>
                     <a:schemeClr val="bg1">
@@ -11991,8 +12514,1803 @@
                   </a:outerShdw>
                 </a:effectLst>
               </a:rPr>
-              <a:t>e-learning je rýchly, dynamický a znižuje výdavky (ako napríklad cestovanie)</a:t>
-            </a:r>
+              <a:t>e-learning je </a:t>
+            </a:r>
+            <a:r>
+              <a:rPr lang="en-US" sz="1500" dirty="0" err="1">
+                <a:ln>
+                  <a:solidFill>
+                    <a:schemeClr val="bg1">
+                      <a:lumMod val="75000"/>
+                      <a:lumOff val="25000"/>
+                      <a:alpha val="10000"/>
+                    </a:schemeClr>
+                  </a:solidFill>
+                </a:ln>
+                <a:solidFill>
+                  <a:schemeClr val="tx2"/>
+                </a:solidFill>
+                <a:effectLst>
+                  <a:outerShdw blurRad="9525" dist="25400" dir="14640000" algn="tl" rotWithShape="0">
+                    <a:schemeClr val="bg1">
+                      <a:alpha val="30000"/>
+                    </a:schemeClr>
+                  </a:outerShdw>
+                </a:effectLst>
+              </a:rPr>
+              <a:t>rýchly</a:t>
+            </a:r>
+            <a:r>
+              <a:rPr lang="en-US" sz="1500" dirty="0">
+                <a:ln>
+                  <a:solidFill>
+                    <a:schemeClr val="bg1">
+                      <a:lumMod val="75000"/>
+                      <a:lumOff val="25000"/>
+                      <a:alpha val="10000"/>
+                    </a:schemeClr>
+                  </a:solidFill>
+                </a:ln>
+                <a:solidFill>
+                  <a:schemeClr val="tx2"/>
+                </a:solidFill>
+                <a:effectLst>
+                  <a:outerShdw blurRad="9525" dist="25400" dir="14640000" algn="tl" rotWithShape="0">
+                    <a:schemeClr val="bg1">
+                      <a:alpha val="30000"/>
+                    </a:schemeClr>
+                  </a:outerShdw>
+                </a:effectLst>
+              </a:rPr>
+              <a:t>, </a:t>
+            </a:r>
+            <a:r>
+              <a:rPr lang="en-US" sz="1500" dirty="0" err="1">
+                <a:ln>
+                  <a:solidFill>
+                    <a:schemeClr val="bg1">
+                      <a:lumMod val="75000"/>
+                      <a:lumOff val="25000"/>
+                      <a:alpha val="10000"/>
+                    </a:schemeClr>
+                  </a:solidFill>
+                </a:ln>
+                <a:solidFill>
+                  <a:schemeClr val="tx2"/>
+                </a:solidFill>
+                <a:effectLst>
+                  <a:outerShdw blurRad="9525" dist="25400" dir="14640000" algn="tl" rotWithShape="0">
+                    <a:schemeClr val="bg1">
+                      <a:alpha val="30000"/>
+                    </a:schemeClr>
+                  </a:outerShdw>
+                </a:effectLst>
+              </a:rPr>
+              <a:t>dynamický</a:t>
+            </a:r>
+            <a:r>
+              <a:rPr lang="en-US" sz="1500" dirty="0">
+                <a:ln>
+                  <a:solidFill>
+                    <a:schemeClr val="bg1">
+                      <a:lumMod val="75000"/>
+                      <a:lumOff val="25000"/>
+                      <a:alpha val="10000"/>
+                    </a:schemeClr>
+                  </a:solidFill>
+                </a:ln>
+                <a:solidFill>
+                  <a:schemeClr val="tx2"/>
+                </a:solidFill>
+                <a:effectLst>
+                  <a:outerShdw blurRad="9525" dist="25400" dir="14640000" algn="tl" rotWithShape="0">
+                    <a:schemeClr val="bg1">
+                      <a:alpha val="30000"/>
+                    </a:schemeClr>
+                  </a:outerShdw>
+                </a:effectLst>
+              </a:rPr>
+              <a:t> a </a:t>
+            </a:r>
+            <a:r>
+              <a:rPr lang="en-US" sz="1500" dirty="0" err="1">
+                <a:ln>
+                  <a:solidFill>
+                    <a:schemeClr val="bg1">
+                      <a:lumMod val="75000"/>
+                      <a:lumOff val="25000"/>
+                      <a:alpha val="10000"/>
+                    </a:schemeClr>
+                  </a:solidFill>
+                </a:ln>
+                <a:solidFill>
+                  <a:schemeClr val="tx2"/>
+                </a:solidFill>
+                <a:effectLst>
+                  <a:outerShdw blurRad="9525" dist="25400" dir="14640000" algn="tl" rotWithShape="0">
+                    <a:schemeClr val="bg1">
+                      <a:alpha val="30000"/>
+                    </a:schemeClr>
+                  </a:outerShdw>
+                </a:effectLst>
+              </a:rPr>
+              <a:t>znižuje</a:t>
+            </a:r>
+            <a:r>
+              <a:rPr lang="en-US" sz="1500" dirty="0">
+                <a:ln>
+                  <a:solidFill>
+                    <a:schemeClr val="bg1">
+                      <a:lumMod val="75000"/>
+                      <a:lumOff val="25000"/>
+                      <a:alpha val="10000"/>
+                    </a:schemeClr>
+                  </a:solidFill>
+                </a:ln>
+                <a:solidFill>
+                  <a:schemeClr val="tx2"/>
+                </a:solidFill>
+                <a:effectLst>
+                  <a:outerShdw blurRad="9525" dist="25400" dir="14640000" algn="tl" rotWithShape="0">
+                    <a:schemeClr val="bg1">
+                      <a:alpha val="30000"/>
+                    </a:schemeClr>
+                  </a:outerShdw>
+                </a:effectLst>
+              </a:rPr>
+              <a:t> </a:t>
+            </a:r>
+            <a:r>
+              <a:rPr lang="en-US" sz="1500" dirty="0" err="1">
+                <a:ln>
+                  <a:solidFill>
+                    <a:schemeClr val="bg1">
+                      <a:lumMod val="75000"/>
+                      <a:lumOff val="25000"/>
+                      <a:alpha val="10000"/>
+                    </a:schemeClr>
+                  </a:solidFill>
+                </a:ln>
+                <a:solidFill>
+                  <a:schemeClr val="tx2"/>
+                </a:solidFill>
+                <a:effectLst>
+                  <a:outerShdw blurRad="9525" dist="25400" dir="14640000" algn="tl" rotWithShape="0">
+                    <a:schemeClr val="bg1">
+                      <a:alpha val="30000"/>
+                    </a:schemeClr>
+                  </a:outerShdw>
+                </a:effectLst>
+              </a:rPr>
+              <a:t>výdavky</a:t>
+            </a:r>
+            <a:r>
+              <a:rPr lang="en-US" sz="1500" dirty="0">
+                <a:ln>
+                  <a:solidFill>
+                    <a:schemeClr val="bg1">
+                      <a:lumMod val="75000"/>
+                      <a:lumOff val="25000"/>
+                      <a:alpha val="10000"/>
+                    </a:schemeClr>
+                  </a:solidFill>
+                </a:ln>
+                <a:solidFill>
+                  <a:schemeClr val="tx2"/>
+                </a:solidFill>
+                <a:effectLst>
+                  <a:outerShdw blurRad="9525" dist="25400" dir="14640000" algn="tl" rotWithShape="0">
+                    <a:schemeClr val="bg1">
+                      <a:alpha val="30000"/>
+                    </a:schemeClr>
+                  </a:outerShdw>
+                </a:effectLst>
+              </a:rPr>
+              <a:t> (</a:t>
+            </a:r>
+            <a:r>
+              <a:rPr lang="en-US" sz="1500" dirty="0" err="1">
+                <a:ln>
+                  <a:solidFill>
+                    <a:schemeClr val="bg1">
+                      <a:lumMod val="75000"/>
+                      <a:lumOff val="25000"/>
+                      <a:alpha val="10000"/>
+                    </a:schemeClr>
+                  </a:solidFill>
+                </a:ln>
+                <a:solidFill>
+                  <a:schemeClr val="tx2"/>
+                </a:solidFill>
+                <a:effectLst>
+                  <a:outerShdw blurRad="9525" dist="25400" dir="14640000" algn="tl" rotWithShape="0">
+                    <a:schemeClr val="bg1">
+                      <a:alpha val="30000"/>
+                    </a:schemeClr>
+                  </a:outerShdw>
+                </a:effectLst>
+              </a:rPr>
+              <a:t>ako</a:t>
+            </a:r>
+            <a:r>
+              <a:rPr lang="en-US" sz="1500" dirty="0">
+                <a:ln>
+                  <a:solidFill>
+                    <a:schemeClr val="bg1">
+                      <a:lumMod val="75000"/>
+                      <a:lumOff val="25000"/>
+                      <a:alpha val="10000"/>
+                    </a:schemeClr>
+                  </a:solidFill>
+                </a:ln>
+                <a:solidFill>
+                  <a:schemeClr val="tx2"/>
+                </a:solidFill>
+                <a:effectLst>
+                  <a:outerShdw blurRad="9525" dist="25400" dir="14640000" algn="tl" rotWithShape="0">
+                    <a:schemeClr val="bg1">
+                      <a:alpha val="30000"/>
+                    </a:schemeClr>
+                  </a:outerShdw>
+                </a:effectLst>
+              </a:rPr>
+              <a:t> </a:t>
+            </a:r>
+            <a:r>
+              <a:rPr lang="en-US" sz="1500" dirty="0" err="1">
+                <a:ln>
+                  <a:solidFill>
+                    <a:schemeClr val="bg1">
+                      <a:lumMod val="75000"/>
+                      <a:lumOff val="25000"/>
+                      <a:alpha val="10000"/>
+                    </a:schemeClr>
+                  </a:solidFill>
+                </a:ln>
+                <a:solidFill>
+                  <a:schemeClr val="tx2"/>
+                </a:solidFill>
+                <a:effectLst>
+                  <a:outerShdw blurRad="9525" dist="25400" dir="14640000" algn="tl" rotWithShape="0">
+                    <a:schemeClr val="bg1">
+                      <a:alpha val="30000"/>
+                    </a:schemeClr>
+                  </a:outerShdw>
+                </a:effectLst>
+              </a:rPr>
+              <a:t>napríklad</a:t>
+            </a:r>
+            <a:r>
+              <a:rPr lang="en-US" sz="1500" dirty="0">
+                <a:ln>
+                  <a:solidFill>
+                    <a:schemeClr val="bg1">
+                      <a:lumMod val="75000"/>
+                      <a:lumOff val="25000"/>
+                      <a:alpha val="10000"/>
+                    </a:schemeClr>
+                  </a:solidFill>
+                </a:ln>
+                <a:solidFill>
+                  <a:schemeClr val="tx2"/>
+                </a:solidFill>
+                <a:effectLst>
+                  <a:outerShdw blurRad="9525" dist="25400" dir="14640000" algn="tl" rotWithShape="0">
+                    <a:schemeClr val="bg1">
+                      <a:alpha val="30000"/>
+                    </a:schemeClr>
+                  </a:outerShdw>
+                </a:effectLst>
+              </a:rPr>
+              <a:t> </a:t>
+            </a:r>
+            <a:r>
+              <a:rPr lang="en-US" sz="1500" dirty="0" err="1">
+                <a:ln>
+                  <a:solidFill>
+                    <a:schemeClr val="bg1">
+                      <a:lumMod val="75000"/>
+                      <a:lumOff val="25000"/>
+                      <a:alpha val="10000"/>
+                    </a:schemeClr>
+                  </a:solidFill>
+                </a:ln>
+                <a:solidFill>
+                  <a:schemeClr val="tx2"/>
+                </a:solidFill>
+                <a:effectLst>
+                  <a:outerShdw blurRad="9525" dist="25400" dir="14640000" algn="tl" rotWithShape="0">
+                    <a:schemeClr val="bg1">
+                      <a:alpha val="30000"/>
+                    </a:schemeClr>
+                  </a:outerShdw>
+                </a:effectLst>
+              </a:rPr>
+              <a:t>cestovanie</a:t>
+            </a:r>
+            <a:r>
+              <a:rPr lang="en-US" sz="1500" dirty="0">
+                <a:ln>
+                  <a:solidFill>
+                    <a:schemeClr val="bg1">
+                      <a:lumMod val="75000"/>
+                      <a:lumOff val="25000"/>
+                      <a:alpha val="10000"/>
+                    </a:schemeClr>
+                  </a:solidFill>
+                </a:ln>
+                <a:solidFill>
+                  <a:schemeClr val="tx2"/>
+                </a:solidFill>
+                <a:effectLst>
+                  <a:outerShdw blurRad="9525" dist="25400" dir="14640000" algn="tl" rotWithShape="0">
+                    <a:schemeClr val="bg1">
+                      <a:alpha val="30000"/>
+                    </a:schemeClr>
+                  </a:outerShdw>
+                </a:effectLst>
+              </a:rPr>
+              <a:t>)</a:t>
+            </a:r>
+          </a:p>
+          <a:p>
+            <a:pPr marL="285750" indent="-285750" defTabSz="457200">
+              <a:lnSpc>
+                <a:spcPct val="90000"/>
+              </a:lnSpc>
+              <a:spcBef>
+                <a:spcPct val="20000"/>
+              </a:spcBef>
+              <a:spcAft>
+                <a:spcPts val="600"/>
+              </a:spcAft>
+              <a:buClr>
+                <a:schemeClr val="tx2"/>
+              </a:buClr>
+              <a:buSzPct val="70000"/>
+              <a:buFont typeface="Wingdings" panose="05000000000000000000" pitchFamily="2" charset="2"/>
+              <a:buChar char="q"/>
+            </a:pPr>
+            <a:endParaRPr lang="en-US" sz="1500" dirty="0">
+              <a:ln>
+                <a:solidFill>
+                  <a:schemeClr val="bg1">
+                    <a:lumMod val="75000"/>
+                    <a:lumOff val="25000"/>
+                    <a:alpha val="10000"/>
+                  </a:schemeClr>
+                </a:solidFill>
+              </a:ln>
+              <a:solidFill>
+                <a:schemeClr val="tx2"/>
+              </a:solidFill>
+              <a:effectLst>
+                <a:outerShdw blurRad="9525" dist="25400" dir="14640000" algn="tl" rotWithShape="0">
+                  <a:schemeClr val="bg1">
+                    <a:alpha val="30000"/>
+                  </a:schemeClr>
+                </a:outerShdw>
+              </a:effectLst>
+            </a:endParaRPr>
+          </a:p>
+          <a:p>
+            <a:pPr marL="285750" indent="-285750" defTabSz="457200">
+              <a:lnSpc>
+                <a:spcPct val="90000"/>
+              </a:lnSpc>
+              <a:spcBef>
+                <a:spcPct val="20000"/>
+              </a:spcBef>
+              <a:spcAft>
+                <a:spcPts val="600"/>
+              </a:spcAft>
+              <a:buClr>
+                <a:schemeClr val="tx2"/>
+              </a:buClr>
+              <a:buSzPct val="70000"/>
+              <a:buFont typeface="Wingdings" panose="05000000000000000000" pitchFamily="2" charset="2"/>
+              <a:buChar char="q"/>
+            </a:pPr>
+            <a:r>
+              <a:rPr lang="en-US" sz="1500" dirty="0" err="1">
+                <a:ln>
+                  <a:solidFill>
+                    <a:schemeClr val="bg1">
+                      <a:lumMod val="75000"/>
+                      <a:lumOff val="25000"/>
+                      <a:alpha val="10000"/>
+                    </a:schemeClr>
+                  </a:solidFill>
+                </a:ln>
+                <a:solidFill>
+                  <a:schemeClr val="tx2"/>
+                </a:solidFill>
+                <a:effectLst>
+                  <a:outerShdw blurRad="9525" dist="25400" dir="14640000" algn="tl" rotWithShape="0">
+                    <a:schemeClr val="bg1">
+                      <a:alpha val="30000"/>
+                    </a:schemeClr>
+                  </a:outerShdw>
+                </a:effectLst>
+              </a:rPr>
+              <a:t>lekcie</a:t>
+            </a:r>
+            <a:r>
+              <a:rPr lang="en-US" sz="1500" dirty="0">
+                <a:ln>
+                  <a:solidFill>
+                    <a:schemeClr val="bg1">
+                      <a:lumMod val="75000"/>
+                      <a:lumOff val="25000"/>
+                      <a:alpha val="10000"/>
+                    </a:schemeClr>
+                  </a:solidFill>
+                </a:ln>
+                <a:solidFill>
+                  <a:schemeClr val="tx2"/>
+                </a:solidFill>
+                <a:effectLst>
+                  <a:outerShdw blurRad="9525" dist="25400" dir="14640000" algn="tl" rotWithShape="0">
+                    <a:schemeClr val="bg1">
+                      <a:alpha val="30000"/>
+                    </a:schemeClr>
+                  </a:outerShdw>
+                </a:effectLst>
+              </a:rPr>
+              <a:t> </a:t>
+            </a:r>
+            <a:r>
+              <a:rPr lang="en-US" sz="1500" dirty="0" err="1">
+                <a:ln>
+                  <a:solidFill>
+                    <a:schemeClr val="bg1">
+                      <a:lumMod val="75000"/>
+                      <a:lumOff val="25000"/>
+                      <a:alpha val="10000"/>
+                    </a:schemeClr>
+                  </a:solidFill>
+                </a:ln>
+                <a:solidFill>
+                  <a:schemeClr val="tx2"/>
+                </a:solidFill>
+                <a:effectLst>
+                  <a:outerShdw blurRad="9525" dist="25400" dir="14640000" algn="tl" rotWithShape="0">
+                    <a:schemeClr val="bg1">
+                      <a:alpha val="30000"/>
+                    </a:schemeClr>
+                  </a:outerShdw>
+                </a:effectLst>
+              </a:rPr>
+              <a:t>sú</a:t>
+            </a:r>
+            <a:r>
+              <a:rPr lang="en-US" sz="1500" dirty="0">
+                <a:ln>
+                  <a:solidFill>
+                    <a:schemeClr val="bg1">
+                      <a:lumMod val="75000"/>
+                      <a:lumOff val="25000"/>
+                      <a:alpha val="10000"/>
+                    </a:schemeClr>
+                  </a:solidFill>
+                </a:ln>
+                <a:solidFill>
+                  <a:schemeClr val="tx2"/>
+                </a:solidFill>
+                <a:effectLst>
+                  <a:outerShdw blurRad="9525" dist="25400" dir="14640000" algn="tl" rotWithShape="0">
+                    <a:schemeClr val="bg1">
+                      <a:alpha val="30000"/>
+                    </a:schemeClr>
+                  </a:outerShdw>
+                </a:effectLst>
+              </a:rPr>
+              <a:t> </a:t>
+            </a:r>
+            <a:r>
+              <a:rPr lang="en-US" sz="1500" dirty="0" err="1">
+                <a:ln>
+                  <a:solidFill>
+                    <a:schemeClr val="bg1">
+                      <a:lumMod val="75000"/>
+                      <a:lumOff val="25000"/>
+                      <a:alpha val="10000"/>
+                    </a:schemeClr>
+                  </a:solidFill>
+                </a:ln>
+                <a:solidFill>
+                  <a:schemeClr val="tx2"/>
+                </a:solidFill>
+                <a:effectLst>
+                  <a:outerShdw blurRad="9525" dist="25400" dir="14640000" algn="tl" rotWithShape="0">
+                    <a:schemeClr val="bg1">
+                      <a:alpha val="30000"/>
+                    </a:schemeClr>
+                  </a:outerShdw>
+                </a:effectLst>
+              </a:rPr>
+              <a:t>pripravované</a:t>
+            </a:r>
+            <a:r>
+              <a:rPr lang="en-US" sz="1500" dirty="0">
+                <a:ln>
+                  <a:solidFill>
+                    <a:schemeClr val="bg1">
+                      <a:lumMod val="75000"/>
+                      <a:lumOff val="25000"/>
+                      <a:alpha val="10000"/>
+                    </a:schemeClr>
+                  </a:solidFill>
+                </a:ln>
+                <a:solidFill>
+                  <a:schemeClr val="tx2"/>
+                </a:solidFill>
+                <a:effectLst>
+                  <a:outerShdw blurRad="9525" dist="25400" dir="14640000" algn="tl" rotWithShape="0">
+                    <a:schemeClr val="bg1">
+                      <a:alpha val="30000"/>
+                    </a:schemeClr>
+                  </a:outerShdw>
+                </a:effectLst>
+              </a:rPr>
+              <a:t> </a:t>
+            </a:r>
+            <a:r>
+              <a:rPr lang="en-US" sz="1500" dirty="0" err="1">
+                <a:ln>
+                  <a:solidFill>
+                    <a:schemeClr val="bg1">
+                      <a:lumMod val="75000"/>
+                      <a:lumOff val="25000"/>
+                      <a:alpha val="10000"/>
+                    </a:schemeClr>
+                  </a:solidFill>
+                </a:ln>
+                <a:solidFill>
+                  <a:schemeClr val="tx2"/>
+                </a:solidFill>
+                <a:effectLst>
+                  <a:outerShdw blurRad="9525" dist="25400" dir="14640000" algn="tl" rotWithShape="0">
+                    <a:schemeClr val="bg1">
+                      <a:alpha val="30000"/>
+                    </a:schemeClr>
+                  </a:outerShdw>
+                </a:effectLst>
+              </a:rPr>
+              <a:t>rôznymi</a:t>
+            </a:r>
+            <a:r>
+              <a:rPr lang="en-US" sz="1500" dirty="0">
+                <a:ln>
+                  <a:solidFill>
+                    <a:schemeClr val="bg1">
+                      <a:lumMod val="75000"/>
+                      <a:lumOff val="25000"/>
+                      <a:alpha val="10000"/>
+                    </a:schemeClr>
+                  </a:solidFill>
+                </a:ln>
+                <a:solidFill>
+                  <a:schemeClr val="tx2"/>
+                </a:solidFill>
+                <a:effectLst>
+                  <a:outerShdw blurRad="9525" dist="25400" dir="14640000" algn="tl" rotWithShape="0">
+                    <a:schemeClr val="bg1">
+                      <a:alpha val="30000"/>
+                    </a:schemeClr>
+                  </a:outerShdw>
+                </a:effectLst>
+              </a:rPr>
+              <a:t> </a:t>
+            </a:r>
+            <a:r>
+              <a:rPr lang="en-US" sz="1500" dirty="0" err="1">
+                <a:ln>
+                  <a:solidFill>
+                    <a:schemeClr val="bg1">
+                      <a:lumMod val="75000"/>
+                      <a:lumOff val="25000"/>
+                      <a:alpha val="10000"/>
+                    </a:schemeClr>
+                  </a:solidFill>
+                </a:ln>
+                <a:solidFill>
+                  <a:schemeClr val="tx2"/>
+                </a:solidFill>
+                <a:effectLst>
+                  <a:outerShdw blurRad="9525" dist="25400" dir="14640000" algn="tl" rotWithShape="0">
+                    <a:schemeClr val="bg1">
+                      <a:alpha val="30000"/>
+                    </a:schemeClr>
+                  </a:outerShdw>
+                </a:effectLst>
+              </a:rPr>
+              <a:t>učiteľmi</a:t>
+            </a:r>
+            <a:endParaRPr lang="en-US" sz="1500" dirty="0">
+              <a:ln>
+                <a:solidFill>
+                  <a:schemeClr val="bg1">
+                    <a:lumMod val="75000"/>
+                    <a:lumOff val="25000"/>
+                    <a:alpha val="10000"/>
+                  </a:schemeClr>
+                </a:solidFill>
+              </a:ln>
+              <a:solidFill>
+                <a:schemeClr val="tx2"/>
+              </a:solidFill>
+              <a:effectLst>
+                <a:outerShdw blurRad="9525" dist="25400" dir="14640000" algn="tl" rotWithShape="0">
+                  <a:schemeClr val="bg1">
+                    <a:alpha val="30000"/>
+                  </a:schemeClr>
+                </a:outerShdw>
+              </a:effectLst>
+            </a:endParaRPr>
+          </a:p>
+          <a:p>
+            <a:pPr marL="285750" indent="-285750" defTabSz="457200">
+              <a:lnSpc>
+                <a:spcPct val="90000"/>
+              </a:lnSpc>
+              <a:spcBef>
+                <a:spcPct val="20000"/>
+              </a:spcBef>
+              <a:spcAft>
+                <a:spcPts val="600"/>
+              </a:spcAft>
+              <a:buClr>
+                <a:schemeClr val="tx2"/>
+              </a:buClr>
+              <a:buSzPct val="70000"/>
+              <a:buFont typeface="Wingdings" panose="05000000000000000000" pitchFamily="2" charset="2"/>
+              <a:buChar char="q"/>
+            </a:pPr>
+            <a:endParaRPr lang="en-US" sz="1500" dirty="0">
+              <a:ln>
+                <a:solidFill>
+                  <a:schemeClr val="bg1">
+                    <a:lumMod val="75000"/>
+                    <a:lumOff val="25000"/>
+                    <a:alpha val="10000"/>
+                  </a:schemeClr>
+                </a:solidFill>
+              </a:ln>
+              <a:solidFill>
+                <a:schemeClr val="tx2"/>
+              </a:solidFill>
+              <a:effectLst>
+                <a:outerShdw blurRad="9525" dist="25400" dir="14640000" algn="tl" rotWithShape="0">
+                  <a:schemeClr val="bg1">
+                    <a:alpha val="30000"/>
+                  </a:schemeClr>
+                </a:outerShdw>
+              </a:effectLst>
+            </a:endParaRPr>
+          </a:p>
+          <a:p>
+            <a:pPr marL="285750" indent="-285750" defTabSz="457200">
+              <a:lnSpc>
+                <a:spcPct val="90000"/>
+              </a:lnSpc>
+              <a:spcBef>
+                <a:spcPct val="20000"/>
+              </a:spcBef>
+              <a:spcAft>
+                <a:spcPts val="600"/>
+              </a:spcAft>
+              <a:buClr>
+                <a:schemeClr val="tx2"/>
+              </a:buClr>
+              <a:buSzPct val="70000"/>
+              <a:buFont typeface="Wingdings" panose="05000000000000000000" pitchFamily="2" charset="2"/>
+              <a:buChar char="q"/>
+            </a:pPr>
+            <a:r>
+              <a:rPr lang="en-US" sz="1500" dirty="0" err="1">
+                <a:ln>
+                  <a:solidFill>
+                    <a:schemeClr val="bg1">
+                      <a:lumMod val="75000"/>
+                      <a:lumOff val="25000"/>
+                      <a:alpha val="10000"/>
+                    </a:schemeClr>
+                  </a:solidFill>
+                </a:ln>
+                <a:solidFill>
+                  <a:schemeClr val="tx2"/>
+                </a:solidFill>
+                <a:effectLst>
+                  <a:outerShdw blurRad="9525" dist="25400" dir="14640000" algn="tl" rotWithShape="0">
+                    <a:schemeClr val="bg1">
+                      <a:alpha val="30000"/>
+                    </a:schemeClr>
+                  </a:outerShdw>
+                </a:effectLst>
+              </a:rPr>
+              <a:t>interaktívne</a:t>
+            </a:r>
+            <a:r>
+              <a:rPr lang="en-US" sz="1500" dirty="0">
+                <a:ln>
+                  <a:solidFill>
+                    <a:schemeClr val="bg1">
+                      <a:lumMod val="75000"/>
+                      <a:lumOff val="25000"/>
+                      <a:alpha val="10000"/>
+                    </a:schemeClr>
+                  </a:solidFill>
+                </a:ln>
+                <a:solidFill>
+                  <a:schemeClr val="tx2"/>
+                </a:solidFill>
+                <a:effectLst>
+                  <a:outerShdw blurRad="9525" dist="25400" dir="14640000" algn="tl" rotWithShape="0">
+                    <a:schemeClr val="bg1">
+                      <a:alpha val="30000"/>
+                    </a:schemeClr>
+                  </a:outerShdw>
+                </a:effectLst>
+              </a:rPr>
+              <a:t> </a:t>
+            </a:r>
+            <a:r>
+              <a:rPr lang="en-US" sz="1500" dirty="0" err="1">
+                <a:ln>
+                  <a:solidFill>
+                    <a:schemeClr val="bg1">
+                      <a:lumMod val="75000"/>
+                      <a:lumOff val="25000"/>
+                      <a:alpha val="10000"/>
+                    </a:schemeClr>
+                  </a:solidFill>
+                </a:ln>
+                <a:solidFill>
+                  <a:schemeClr val="tx2"/>
+                </a:solidFill>
+                <a:effectLst>
+                  <a:outerShdw blurRad="9525" dist="25400" dir="14640000" algn="tl" rotWithShape="0">
+                    <a:schemeClr val="bg1">
+                      <a:alpha val="30000"/>
+                    </a:schemeClr>
+                  </a:outerShdw>
+                </a:effectLst>
+              </a:rPr>
+              <a:t>cvičenia</a:t>
+            </a:r>
+            <a:r>
+              <a:rPr lang="en-US" sz="1500" dirty="0">
+                <a:ln>
+                  <a:solidFill>
+                    <a:schemeClr val="bg1">
+                      <a:lumMod val="75000"/>
+                      <a:lumOff val="25000"/>
+                      <a:alpha val="10000"/>
+                    </a:schemeClr>
+                  </a:solidFill>
+                </a:ln>
+                <a:solidFill>
+                  <a:schemeClr val="tx2"/>
+                </a:solidFill>
+                <a:effectLst>
+                  <a:outerShdw blurRad="9525" dist="25400" dir="14640000" algn="tl" rotWithShape="0">
+                    <a:schemeClr val="bg1">
+                      <a:alpha val="30000"/>
+                    </a:schemeClr>
+                  </a:outerShdw>
+                </a:effectLst>
+              </a:rPr>
+              <a:t> </a:t>
+            </a:r>
+            <a:r>
+              <a:rPr lang="en-US" sz="1500" dirty="0" err="1">
+                <a:ln>
+                  <a:solidFill>
+                    <a:schemeClr val="bg1">
+                      <a:lumMod val="75000"/>
+                      <a:lumOff val="25000"/>
+                      <a:alpha val="10000"/>
+                    </a:schemeClr>
+                  </a:solidFill>
+                </a:ln>
+                <a:solidFill>
+                  <a:schemeClr val="tx2"/>
+                </a:solidFill>
+                <a:effectLst>
+                  <a:outerShdw blurRad="9525" dist="25400" dir="14640000" algn="tl" rotWithShape="0">
+                    <a:schemeClr val="bg1">
+                      <a:alpha val="30000"/>
+                    </a:schemeClr>
+                  </a:outerShdw>
+                </a:effectLst>
+              </a:rPr>
+              <a:t>zvyšujú</a:t>
+            </a:r>
+            <a:r>
+              <a:rPr lang="en-US" sz="1500" dirty="0">
+                <a:ln>
+                  <a:solidFill>
+                    <a:schemeClr val="bg1">
+                      <a:lumMod val="75000"/>
+                      <a:lumOff val="25000"/>
+                      <a:alpha val="10000"/>
+                    </a:schemeClr>
+                  </a:solidFill>
+                </a:ln>
+                <a:solidFill>
+                  <a:schemeClr val="tx2"/>
+                </a:solidFill>
+                <a:effectLst>
+                  <a:outerShdw blurRad="9525" dist="25400" dir="14640000" algn="tl" rotWithShape="0">
+                    <a:schemeClr val="bg1">
+                      <a:alpha val="30000"/>
+                    </a:schemeClr>
+                  </a:outerShdw>
+                </a:effectLst>
+              </a:rPr>
+              <a:t> </a:t>
+            </a:r>
+            <a:r>
+              <a:rPr lang="en-US" sz="1500" dirty="0" err="1">
+                <a:ln>
+                  <a:solidFill>
+                    <a:schemeClr val="bg1">
+                      <a:lumMod val="75000"/>
+                      <a:lumOff val="25000"/>
+                      <a:alpha val="10000"/>
+                    </a:schemeClr>
+                  </a:solidFill>
+                </a:ln>
+                <a:solidFill>
+                  <a:schemeClr val="tx2"/>
+                </a:solidFill>
+                <a:effectLst>
+                  <a:outerShdw blurRad="9525" dist="25400" dir="14640000" algn="tl" rotWithShape="0">
+                    <a:schemeClr val="bg1">
+                      <a:alpha val="30000"/>
+                    </a:schemeClr>
+                  </a:outerShdw>
+                </a:effectLst>
+              </a:rPr>
+              <a:t>motiváciu</a:t>
+            </a:r>
+            <a:r>
+              <a:rPr lang="en-US" sz="1500" dirty="0">
+                <a:ln>
+                  <a:solidFill>
+                    <a:schemeClr val="bg1">
+                      <a:lumMod val="75000"/>
+                      <a:lumOff val="25000"/>
+                      <a:alpha val="10000"/>
+                    </a:schemeClr>
+                  </a:solidFill>
+                </a:ln>
+                <a:solidFill>
+                  <a:schemeClr val="tx2"/>
+                </a:solidFill>
+                <a:effectLst>
+                  <a:outerShdw blurRad="9525" dist="25400" dir="14640000" algn="tl" rotWithShape="0">
+                    <a:schemeClr val="bg1">
+                      <a:alpha val="30000"/>
+                    </a:schemeClr>
+                  </a:outerShdw>
+                </a:effectLst>
+              </a:rPr>
+              <a:t> </a:t>
+            </a:r>
+            <a:r>
+              <a:rPr lang="en-US" sz="1500" dirty="0" err="1">
+                <a:ln>
+                  <a:solidFill>
+                    <a:schemeClr val="bg1">
+                      <a:lumMod val="75000"/>
+                      <a:lumOff val="25000"/>
+                      <a:alpha val="10000"/>
+                    </a:schemeClr>
+                  </a:solidFill>
+                </a:ln>
+                <a:solidFill>
+                  <a:schemeClr val="tx2"/>
+                </a:solidFill>
+                <a:effectLst>
+                  <a:outerShdw blurRad="9525" dist="25400" dir="14640000" algn="tl" rotWithShape="0">
+                    <a:schemeClr val="bg1">
+                      <a:alpha val="30000"/>
+                    </a:schemeClr>
+                  </a:outerShdw>
+                </a:effectLst>
+              </a:rPr>
+              <a:t>študentov</a:t>
+            </a:r>
+            <a:endParaRPr lang="en-US" sz="1500" dirty="0">
+              <a:ln>
+                <a:solidFill>
+                  <a:schemeClr val="bg1">
+                    <a:lumMod val="75000"/>
+                    <a:lumOff val="25000"/>
+                    <a:alpha val="10000"/>
+                  </a:schemeClr>
+                </a:solidFill>
+              </a:ln>
+              <a:solidFill>
+                <a:schemeClr val="tx2"/>
+              </a:solidFill>
+              <a:effectLst>
+                <a:outerShdw blurRad="9525" dist="25400" dir="14640000" algn="tl" rotWithShape="0">
+                  <a:schemeClr val="bg1">
+                    <a:alpha val="30000"/>
+                  </a:schemeClr>
+                </a:outerShdw>
+              </a:effectLst>
+            </a:endParaRPr>
+          </a:p>
+          <a:p>
+            <a:pPr marL="285750" indent="-285750" defTabSz="457200">
+              <a:lnSpc>
+                <a:spcPct val="90000"/>
+              </a:lnSpc>
+              <a:spcBef>
+                <a:spcPct val="20000"/>
+              </a:spcBef>
+              <a:spcAft>
+                <a:spcPts val="600"/>
+              </a:spcAft>
+              <a:buClr>
+                <a:schemeClr val="tx2"/>
+              </a:buClr>
+              <a:buSzPct val="70000"/>
+              <a:buFont typeface="Wingdings" panose="05000000000000000000" pitchFamily="2" charset="2"/>
+              <a:buChar char="q"/>
+            </a:pPr>
+            <a:r>
+              <a:rPr lang="en-US" sz="1500" dirty="0" err="1">
+                <a:ln>
+                  <a:solidFill>
+                    <a:schemeClr val="bg1">
+                      <a:lumMod val="75000"/>
+                      <a:lumOff val="25000"/>
+                      <a:alpha val="10000"/>
+                    </a:schemeClr>
+                  </a:solidFill>
+                </a:ln>
+                <a:solidFill>
+                  <a:schemeClr val="tx2"/>
+                </a:solidFill>
+                <a:effectLst>
+                  <a:outerShdw blurRad="9525" dist="25400" dir="14640000" algn="tl" rotWithShape="0">
+                    <a:schemeClr val="bg1">
+                      <a:alpha val="30000"/>
+                    </a:schemeClr>
+                  </a:outerShdw>
+                </a:effectLst>
+              </a:rPr>
+              <a:t>aktivity</a:t>
+            </a:r>
+            <a:r>
+              <a:rPr lang="en-US" sz="1500" dirty="0">
+                <a:ln>
+                  <a:solidFill>
+                    <a:schemeClr val="bg1">
+                      <a:lumMod val="75000"/>
+                      <a:lumOff val="25000"/>
+                      <a:alpha val="10000"/>
+                    </a:schemeClr>
+                  </a:solidFill>
+                </a:ln>
+                <a:solidFill>
+                  <a:schemeClr val="tx2"/>
+                </a:solidFill>
+                <a:effectLst>
+                  <a:outerShdw blurRad="9525" dist="25400" dir="14640000" algn="tl" rotWithShape="0">
+                    <a:schemeClr val="bg1">
+                      <a:alpha val="30000"/>
+                    </a:schemeClr>
+                  </a:outerShdw>
+                </a:effectLst>
+              </a:rPr>
+              <a:t> e-</a:t>
+            </a:r>
+            <a:r>
+              <a:rPr lang="en-US" sz="1500" dirty="0" err="1">
+                <a:ln>
+                  <a:solidFill>
+                    <a:schemeClr val="bg1">
+                      <a:lumMod val="75000"/>
+                      <a:lumOff val="25000"/>
+                      <a:alpha val="10000"/>
+                    </a:schemeClr>
+                  </a:solidFill>
+                </a:ln>
+                <a:solidFill>
+                  <a:schemeClr val="tx2"/>
+                </a:solidFill>
+                <a:effectLst>
+                  <a:outerShdw blurRad="9525" dist="25400" dir="14640000" algn="tl" rotWithShape="0">
+                    <a:schemeClr val="bg1">
+                      <a:alpha val="30000"/>
+                    </a:schemeClr>
+                  </a:outerShdw>
+                </a:effectLst>
+              </a:rPr>
+              <a:t>learningu</a:t>
+            </a:r>
+            <a:r>
+              <a:rPr lang="en-US" sz="1500" dirty="0">
+                <a:ln>
+                  <a:solidFill>
+                    <a:schemeClr val="bg1">
+                      <a:lumMod val="75000"/>
+                      <a:lumOff val="25000"/>
+                      <a:alpha val="10000"/>
+                    </a:schemeClr>
+                  </a:solidFill>
+                </a:ln>
+                <a:solidFill>
+                  <a:schemeClr val="tx2"/>
+                </a:solidFill>
+                <a:effectLst>
+                  <a:outerShdw blurRad="9525" dist="25400" dir="14640000" algn="tl" rotWithShape="0">
+                    <a:schemeClr val="bg1">
+                      <a:alpha val="30000"/>
+                    </a:schemeClr>
+                  </a:outerShdw>
+                </a:effectLst>
+              </a:rPr>
+              <a:t> </a:t>
+            </a:r>
+            <a:r>
+              <a:rPr lang="en-US" sz="1500" dirty="0" err="1">
+                <a:ln>
+                  <a:solidFill>
+                    <a:schemeClr val="bg1">
+                      <a:lumMod val="75000"/>
+                      <a:lumOff val="25000"/>
+                      <a:alpha val="10000"/>
+                    </a:schemeClr>
+                  </a:solidFill>
+                </a:ln>
+                <a:solidFill>
+                  <a:schemeClr val="tx2"/>
+                </a:solidFill>
+                <a:effectLst>
+                  <a:outerShdw blurRad="9525" dist="25400" dir="14640000" algn="tl" rotWithShape="0">
+                    <a:schemeClr val="bg1">
+                      <a:alpha val="30000"/>
+                    </a:schemeClr>
+                  </a:outerShdw>
+                </a:effectLst>
+              </a:rPr>
+              <a:t>prinášajú</a:t>
+            </a:r>
+            <a:r>
+              <a:rPr lang="en-US" sz="1500" dirty="0">
+                <a:ln>
+                  <a:solidFill>
+                    <a:schemeClr val="bg1">
+                      <a:lumMod val="75000"/>
+                      <a:lumOff val="25000"/>
+                      <a:alpha val="10000"/>
+                    </a:schemeClr>
+                  </a:solidFill>
+                </a:ln>
+                <a:solidFill>
+                  <a:schemeClr val="tx2"/>
+                </a:solidFill>
+                <a:effectLst>
+                  <a:outerShdw blurRad="9525" dist="25400" dir="14640000" algn="tl" rotWithShape="0">
+                    <a:schemeClr val="bg1">
+                      <a:alpha val="30000"/>
+                    </a:schemeClr>
+                  </a:outerShdw>
+                </a:effectLst>
+              </a:rPr>
+              <a:t> </a:t>
+            </a:r>
+            <a:r>
+              <a:rPr lang="en-US" sz="1500" dirty="0" err="1">
+                <a:ln>
+                  <a:solidFill>
+                    <a:schemeClr val="bg1">
+                      <a:lumMod val="75000"/>
+                      <a:lumOff val="25000"/>
+                      <a:alpha val="10000"/>
+                    </a:schemeClr>
+                  </a:solidFill>
+                </a:ln>
+                <a:solidFill>
+                  <a:schemeClr val="tx2"/>
+                </a:solidFill>
+                <a:effectLst>
+                  <a:outerShdw blurRad="9525" dist="25400" dir="14640000" algn="tl" rotWithShape="0">
+                    <a:schemeClr val="bg1">
+                      <a:alpha val="30000"/>
+                    </a:schemeClr>
+                  </a:outerShdw>
+                </a:effectLst>
+              </a:rPr>
+              <a:t>rozličné</a:t>
+            </a:r>
+            <a:r>
+              <a:rPr lang="en-US" sz="1500" dirty="0">
+                <a:ln>
+                  <a:solidFill>
+                    <a:schemeClr val="bg1">
+                      <a:lumMod val="75000"/>
+                      <a:lumOff val="25000"/>
+                      <a:alpha val="10000"/>
+                    </a:schemeClr>
+                  </a:solidFill>
+                </a:ln>
+                <a:solidFill>
+                  <a:schemeClr val="tx2"/>
+                </a:solidFill>
+                <a:effectLst>
+                  <a:outerShdw blurRad="9525" dist="25400" dir="14640000" algn="tl" rotWithShape="0">
+                    <a:schemeClr val="bg1">
+                      <a:alpha val="30000"/>
+                    </a:schemeClr>
+                  </a:outerShdw>
+                </a:effectLst>
+              </a:rPr>
+              <a:t> </a:t>
+            </a:r>
+            <a:r>
+              <a:rPr lang="en-US" sz="1500" dirty="0" err="1">
+                <a:ln>
+                  <a:solidFill>
+                    <a:schemeClr val="bg1">
+                      <a:lumMod val="75000"/>
+                      <a:lumOff val="25000"/>
+                      <a:alpha val="10000"/>
+                    </a:schemeClr>
+                  </a:solidFill>
+                </a:ln>
+                <a:solidFill>
+                  <a:schemeClr val="tx2"/>
+                </a:solidFill>
+                <a:effectLst>
+                  <a:outerShdw blurRad="9525" dist="25400" dir="14640000" algn="tl" rotWithShape="0">
+                    <a:schemeClr val="bg1">
+                      <a:alpha val="30000"/>
+                    </a:schemeClr>
+                  </a:outerShdw>
+                </a:effectLst>
+              </a:rPr>
+              <a:t>skúsenosti</a:t>
+            </a:r>
+            <a:r>
+              <a:rPr lang="en-US" sz="1500" dirty="0">
+                <a:ln>
+                  <a:solidFill>
+                    <a:schemeClr val="bg1">
+                      <a:lumMod val="75000"/>
+                      <a:lumOff val="25000"/>
+                      <a:alpha val="10000"/>
+                    </a:schemeClr>
+                  </a:solidFill>
+                </a:ln>
+                <a:solidFill>
+                  <a:schemeClr val="tx2"/>
+                </a:solidFill>
+                <a:effectLst>
+                  <a:outerShdw blurRad="9525" dist="25400" dir="14640000" algn="tl" rotWithShape="0">
+                    <a:schemeClr val="bg1">
+                      <a:alpha val="30000"/>
+                    </a:schemeClr>
+                  </a:outerShdw>
+                </a:effectLst>
+              </a:rPr>
+              <a:t> </a:t>
+            </a:r>
+            <a:r>
+              <a:rPr lang="en-US" sz="1500" dirty="0" err="1">
+                <a:ln>
+                  <a:solidFill>
+                    <a:schemeClr val="bg1">
+                      <a:lumMod val="75000"/>
+                      <a:lumOff val="25000"/>
+                      <a:alpha val="10000"/>
+                    </a:schemeClr>
+                  </a:solidFill>
+                </a:ln>
+                <a:solidFill>
+                  <a:schemeClr val="tx2"/>
+                </a:solidFill>
+                <a:effectLst>
+                  <a:outerShdw blurRad="9525" dist="25400" dir="14640000" algn="tl" rotWithShape="0">
+                    <a:schemeClr val="bg1">
+                      <a:alpha val="30000"/>
+                    </a:schemeClr>
+                  </a:outerShdw>
+                </a:effectLst>
+              </a:rPr>
+              <a:t>rôznym</a:t>
+            </a:r>
+            <a:r>
+              <a:rPr lang="en-US" sz="1500" dirty="0">
+                <a:ln>
+                  <a:solidFill>
+                    <a:schemeClr val="bg1">
+                      <a:lumMod val="75000"/>
+                      <a:lumOff val="25000"/>
+                      <a:alpha val="10000"/>
+                    </a:schemeClr>
+                  </a:solidFill>
+                </a:ln>
+                <a:solidFill>
+                  <a:schemeClr val="tx2"/>
+                </a:solidFill>
+                <a:effectLst>
+                  <a:outerShdw blurRad="9525" dist="25400" dir="14640000" algn="tl" rotWithShape="0">
+                    <a:schemeClr val="bg1">
+                      <a:alpha val="30000"/>
+                    </a:schemeClr>
+                  </a:outerShdw>
+                </a:effectLst>
+              </a:rPr>
+              <a:t> </a:t>
+            </a:r>
+            <a:r>
+              <a:rPr lang="en-US" sz="1500" dirty="0" err="1">
+                <a:ln>
+                  <a:solidFill>
+                    <a:schemeClr val="bg1">
+                      <a:lumMod val="75000"/>
+                      <a:lumOff val="25000"/>
+                      <a:alpha val="10000"/>
+                    </a:schemeClr>
+                  </a:solidFill>
+                </a:ln>
+                <a:solidFill>
+                  <a:schemeClr val="tx2"/>
+                </a:solidFill>
+                <a:effectLst>
+                  <a:outerShdw blurRad="9525" dist="25400" dir="14640000" algn="tl" rotWithShape="0">
+                    <a:schemeClr val="bg1">
+                      <a:alpha val="30000"/>
+                    </a:schemeClr>
+                  </a:outerShdw>
+                </a:effectLst>
+              </a:rPr>
+              <a:t>ľuďom</a:t>
+            </a:r>
+            <a:r>
+              <a:rPr lang="en-US" sz="1500" dirty="0">
+                <a:ln>
+                  <a:solidFill>
+                    <a:schemeClr val="bg1">
+                      <a:lumMod val="75000"/>
+                      <a:lumOff val="25000"/>
+                      <a:alpha val="10000"/>
+                    </a:schemeClr>
+                  </a:solidFill>
+                </a:ln>
+                <a:solidFill>
+                  <a:schemeClr val="tx2"/>
+                </a:solidFill>
+                <a:effectLst>
+                  <a:outerShdw blurRad="9525" dist="25400" dir="14640000" algn="tl" rotWithShape="0">
+                    <a:schemeClr val="bg1">
+                      <a:alpha val="30000"/>
+                    </a:schemeClr>
+                  </a:outerShdw>
+                </a:effectLst>
+              </a:rPr>
+              <a:t> a </a:t>
+            </a:r>
+            <a:r>
+              <a:rPr lang="en-US" sz="1500" dirty="0" err="1">
+                <a:ln>
+                  <a:solidFill>
+                    <a:schemeClr val="bg1">
+                      <a:lumMod val="75000"/>
+                      <a:lumOff val="25000"/>
+                      <a:alpha val="10000"/>
+                    </a:schemeClr>
+                  </a:solidFill>
+                </a:ln>
+                <a:solidFill>
+                  <a:schemeClr val="tx2"/>
+                </a:solidFill>
+                <a:effectLst>
+                  <a:outerShdw blurRad="9525" dist="25400" dir="14640000" algn="tl" rotWithShape="0">
+                    <a:schemeClr val="bg1">
+                      <a:alpha val="30000"/>
+                    </a:schemeClr>
+                  </a:outerShdw>
+                </a:effectLst>
+              </a:rPr>
+              <a:t>takéto</a:t>
+            </a:r>
+            <a:r>
+              <a:rPr lang="en-US" sz="1500" dirty="0">
+                <a:ln>
+                  <a:solidFill>
+                    <a:schemeClr val="bg1">
+                      <a:lumMod val="75000"/>
+                      <a:lumOff val="25000"/>
+                      <a:alpha val="10000"/>
+                    </a:schemeClr>
+                  </a:solidFill>
+                </a:ln>
+                <a:solidFill>
+                  <a:schemeClr val="tx2"/>
+                </a:solidFill>
+                <a:effectLst>
+                  <a:outerShdw blurRad="9525" dist="25400" dir="14640000" algn="tl" rotWithShape="0">
+                    <a:schemeClr val="bg1">
+                      <a:alpha val="30000"/>
+                    </a:schemeClr>
+                  </a:outerShdw>
+                </a:effectLst>
+              </a:rPr>
+              <a:t> </a:t>
+            </a:r>
+            <a:r>
+              <a:rPr lang="en-US" sz="1500" dirty="0" err="1">
+                <a:ln>
+                  <a:solidFill>
+                    <a:schemeClr val="bg1">
+                      <a:lumMod val="75000"/>
+                      <a:lumOff val="25000"/>
+                      <a:alpha val="10000"/>
+                    </a:schemeClr>
+                  </a:solidFill>
+                </a:ln>
+                <a:solidFill>
+                  <a:schemeClr val="tx2"/>
+                </a:solidFill>
+                <a:effectLst>
+                  <a:outerShdw blurRad="9525" dist="25400" dir="14640000" algn="tl" rotWithShape="0">
+                    <a:schemeClr val="bg1">
+                      <a:alpha val="30000"/>
+                    </a:schemeClr>
+                  </a:outerShdw>
+                </a:effectLst>
+              </a:rPr>
+              <a:t>aktivity</a:t>
+            </a:r>
+            <a:r>
+              <a:rPr lang="en-US" sz="1500" dirty="0">
+                <a:ln>
+                  <a:solidFill>
+                    <a:schemeClr val="bg1">
+                      <a:lumMod val="75000"/>
+                      <a:lumOff val="25000"/>
+                      <a:alpha val="10000"/>
+                    </a:schemeClr>
+                  </a:solidFill>
+                </a:ln>
+                <a:solidFill>
+                  <a:schemeClr val="tx2"/>
+                </a:solidFill>
+                <a:effectLst>
+                  <a:outerShdw blurRad="9525" dist="25400" dir="14640000" algn="tl" rotWithShape="0">
+                    <a:schemeClr val="bg1">
+                      <a:alpha val="30000"/>
+                    </a:schemeClr>
+                  </a:outerShdw>
+                </a:effectLst>
+              </a:rPr>
+              <a:t> </a:t>
+            </a:r>
+            <a:r>
+              <a:rPr lang="en-US" sz="1500" dirty="0" err="1">
+                <a:ln>
+                  <a:solidFill>
+                    <a:schemeClr val="bg1">
+                      <a:lumMod val="75000"/>
+                      <a:lumOff val="25000"/>
+                      <a:alpha val="10000"/>
+                    </a:schemeClr>
+                  </a:solidFill>
+                </a:ln>
+                <a:solidFill>
+                  <a:schemeClr val="tx2"/>
+                </a:solidFill>
+                <a:effectLst>
+                  <a:outerShdw blurRad="9525" dist="25400" dir="14640000" algn="tl" rotWithShape="0">
+                    <a:schemeClr val="bg1">
+                      <a:alpha val="30000"/>
+                    </a:schemeClr>
+                  </a:outerShdw>
+                </a:effectLst>
+              </a:rPr>
+              <a:t>pomáhajú</a:t>
+            </a:r>
+            <a:r>
+              <a:rPr lang="en-US" sz="1500" dirty="0">
+                <a:ln>
+                  <a:solidFill>
+                    <a:schemeClr val="bg1">
+                      <a:lumMod val="75000"/>
+                      <a:lumOff val="25000"/>
+                      <a:alpha val="10000"/>
+                    </a:schemeClr>
+                  </a:solidFill>
+                </a:ln>
+                <a:solidFill>
+                  <a:schemeClr val="tx2"/>
+                </a:solidFill>
+                <a:effectLst>
+                  <a:outerShdw blurRad="9525" dist="25400" dir="14640000" algn="tl" rotWithShape="0">
+                    <a:schemeClr val="bg1">
+                      <a:alpha val="30000"/>
+                    </a:schemeClr>
+                  </a:outerShdw>
+                </a:effectLst>
+              </a:rPr>
+              <a:t> </a:t>
+            </a:r>
+            <a:r>
+              <a:rPr lang="en-US" sz="1500" dirty="0" err="1">
+                <a:ln>
+                  <a:solidFill>
+                    <a:schemeClr val="bg1">
+                      <a:lumMod val="75000"/>
+                      <a:lumOff val="25000"/>
+                      <a:alpha val="10000"/>
+                    </a:schemeClr>
+                  </a:solidFill>
+                </a:ln>
+                <a:solidFill>
+                  <a:schemeClr val="tx2"/>
+                </a:solidFill>
+                <a:effectLst>
+                  <a:outerShdw blurRad="9525" dist="25400" dir="14640000" algn="tl" rotWithShape="0">
+                    <a:schemeClr val="bg1">
+                      <a:alpha val="30000"/>
+                    </a:schemeClr>
+                  </a:outerShdw>
+                </a:effectLst>
+              </a:rPr>
+              <a:t>tiež</a:t>
+            </a:r>
+            <a:r>
+              <a:rPr lang="en-US" sz="1500" dirty="0">
+                <a:ln>
+                  <a:solidFill>
+                    <a:schemeClr val="bg1">
+                      <a:lumMod val="75000"/>
+                      <a:lumOff val="25000"/>
+                      <a:alpha val="10000"/>
+                    </a:schemeClr>
+                  </a:solidFill>
+                </a:ln>
+                <a:solidFill>
+                  <a:schemeClr val="tx2"/>
+                </a:solidFill>
+                <a:effectLst>
+                  <a:outerShdw blurRad="9525" dist="25400" dir="14640000" algn="tl" rotWithShape="0">
+                    <a:schemeClr val="bg1">
+                      <a:alpha val="30000"/>
+                    </a:schemeClr>
+                  </a:outerShdw>
+                </a:effectLst>
+              </a:rPr>
+              <a:t> </a:t>
+            </a:r>
+            <a:r>
+              <a:rPr lang="en-US" sz="1500" dirty="0" err="1">
+                <a:ln>
+                  <a:solidFill>
+                    <a:schemeClr val="bg1">
+                      <a:lumMod val="75000"/>
+                      <a:lumOff val="25000"/>
+                      <a:alpha val="10000"/>
+                    </a:schemeClr>
+                  </a:solidFill>
+                </a:ln>
+                <a:solidFill>
+                  <a:schemeClr val="tx2"/>
+                </a:solidFill>
+                <a:effectLst>
+                  <a:outerShdw blurRad="9525" dist="25400" dir="14640000" algn="tl" rotWithShape="0">
+                    <a:schemeClr val="bg1">
+                      <a:alpha val="30000"/>
+                    </a:schemeClr>
+                  </a:outerShdw>
+                </a:effectLst>
+              </a:rPr>
+              <a:t>ľahšiemu</a:t>
+            </a:r>
+            <a:r>
+              <a:rPr lang="en-US" sz="1500" dirty="0">
+                <a:ln>
+                  <a:solidFill>
+                    <a:schemeClr val="bg1">
+                      <a:lumMod val="75000"/>
+                      <a:lumOff val="25000"/>
+                      <a:alpha val="10000"/>
+                    </a:schemeClr>
+                  </a:solidFill>
+                </a:ln>
+                <a:solidFill>
+                  <a:schemeClr val="tx2"/>
+                </a:solidFill>
+                <a:effectLst>
+                  <a:outerShdw blurRad="9525" dist="25400" dir="14640000" algn="tl" rotWithShape="0">
+                    <a:schemeClr val="bg1">
+                      <a:alpha val="30000"/>
+                    </a:schemeClr>
+                  </a:outerShdw>
+                </a:effectLst>
+              </a:rPr>
+              <a:t> </a:t>
+            </a:r>
+            <a:r>
+              <a:rPr lang="en-US" sz="1500" dirty="0" err="1">
+                <a:ln>
+                  <a:solidFill>
+                    <a:schemeClr val="bg1">
+                      <a:lumMod val="75000"/>
+                      <a:lumOff val="25000"/>
+                      <a:alpha val="10000"/>
+                    </a:schemeClr>
+                  </a:solidFill>
+                </a:ln>
+                <a:solidFill>
+                  <a:schemeClr val="tx2"/>
+                </a:solidFill>
+                <a:effectLst>
+                  <a:outerShdw blurRad="9525" dist="25400" dir="14640000" algn="tl" rotWithShape="0">
+                    <a:schemeClr val="bg1">
+                      <a:alpha val="30000"/>
+                    </a:schemeClr>
+                  </a:outerShdw>
+                </a:effectLst>
+              </a:rPr>
+              <a:t>učeniu</a:t>
+            </a:r>
+            <a:r>
+              <a:rPr lang="en-US" sz="1500" dirty="0">
+                <a:ln>
+                  <a:solidFill>
+                    <a:schemeClr val="bg1">
+                      <a:lumMod val="75000"/>
+                      <a:lumOff val="25000"/>
+                      <a:alpha val="10000"/>
+                    </a:schemeClr>
+                  </a:solidFill>
+                </a:ln>
+                <a:solidFill>
+                  <a:schemeClr val="tx2"/>
+                </a:solidFill>
+                <a:effectLst>
+                  <a:outerShdw blurRad="9525" dist="25400" dir="14640000" algn="tl" rotWithShape="0">
+                    <a:schemeClr val="bg1">
+                      <a:alpha val="30000"/>
+                    </a:schemeClr>
+                  </a:outerShdw>
+                </a:effectLst>
+              </a:rPr>
+              <a:t>,</a:t>
+            </a:r>
+          </a:p>
+          <a:p>
+            <a:pPr marL="285750" indent="-285750" defTabSz="457200">
+              <a:lnSpc>
+                <a:spcPct val="90000"/>
+              </a:lnSpc>
+              <a:spcBef>
+                <a:spcPct val="20000"/>
+              </a:spcBef>
+              <a:spcAft>
+                <a:spcPts val="600"/>
+              </a:spcAft>
+              <a:buClr>
+                <a:schemeClr val="tx2"/>
+              </a:buClr>
+              <a:buSzPct val="70000"/>
+              <a:buFont typeface="Wingdings" panose="05000000000000000000" pitchFamily="2" charset="2"/>
+              <a:buChar char="q"/>
+            </a:pPr>
+            <a:endParaRPr lang="en-US" sz="1500" dirty="0">
+              <a:ln>
+                <a:solidFill>
+                  <a:schemeClr val="bg1">
+                    <a:lumMod val="75000"/>
+                    <a:lumOff val="25000"/>
+                    <a:alpha val="10000"/>
+                  </a:schemeClr>
+                </a:solidFill>
+              </a:ln>
+              <a:solidFill>
+                <a:schemeClr val="tx2"/>
+              </a:solidFill>
+              <a:effectLst>
+                <a:outerShdw blurRad="9525" dist="25400" dir="14640000" algn="tl" rotWithShape="0">
+                  <a:schemeClr val="bg1">
+                    <a:alpha val="30000"/>
+                  </a:schemeClr>
+                </a:outerShdw>
+              </a:effectLst>
+            </a:endParaRPr>
+          </a:p>
+          <a:p>
+            <a:pPr marL="285750" indent="-285750" defTabSz="457200">
+              <a:lnSpc>
+                <a:spcPct val="90000"/>
+              </a:lnSpc>
+              <a:spcBef>
+                <a:spcPct val="20000"/>
+              </a:spcBef>
+              <a:spcAft>
+                <a:spcPts val="600"/>
+              </a:spcAft>
+              <a:buClr>
+                <a:schemeClr val="tx2"/>
+              </a:buClr>
+              <a:buSzPct val="70000"/>
+              <a:buFont typeface="Wingdings" panose="05000000000000000000" pitchFamily="2" charset="2"/>
+              <a:buChar char="q"/>
+            </a:pPr>
+            <a:r>
+              <a:rPr lang="en-US" sz="1500" dirty="0">
+                <a:ln>
+                  <a:solidFill>
+                    <a:schemeClr val="bg1">
+                      <a:lumMod val="75000"/>
+                      <a:lumOff val="25000"/>
+                      <a:alpha val="10000"/>
+                    </a:schemeClr>
+                  </a:solidFill>
+                </a:ln>
+                <a:solidFill>
+                  <a:schemeClr val="tx2"/>
+                </a:solidFill>
+                <a:effectLst>
+                  <a:outerShdw blurRad="9525" dist="25400" dir="14640000" algn="tl" rotWithShape="0">
+                    <a:schemeClr val="bg1">
+                      <a:alpha val="30000"/>
+                    </a:schemeClr>
+                  </a:outerShdw>
+                </a:effectLst>
+              </a:rPr>
+              <a:t>je to </a:t>
+            </a:r>
+            <a:r>
+              <a:rPr lang="en-US" sz="1500" dirty="0" err="1">
+                <a:ln>
+                  <a:solidFill>
+                    <a:schemeClr val="bg1">
+                      <a:lumMod val="75000"/>
+                      <a:lumOff val="25000"/>
+                      <a:alpha val="10000"/>
+                    </a:schemeClr>
+                  </a:solidFill>
+                </a:ln>
+                <a:solidFill>
+                  <a:schemeClr val="tx2"/>
+                </a:solidFill>
+                <a:effectLst>
+                  <a:outerShdw blurRad="9525" dist="25400" dir="14640000" algn="tl" rotWithShape="0">
+                    <a:schemeClr val="bg1">
+                      <a:alpha val="30000"/>
+                    </a:schemeClr>
+                  </a:outerShdw>
+                </a:effectLst>
+              </a:rPr>
+              <a:t>druh</a:t>
+            </a:r>
+            <a:r>
+              <a:rPr lang="en-US" sz="1500" dirty="0">
+                <a:ln>
+                  <a:solidFill>
+                    <a:schemeClr val="bg1">
+                      <a:lumMod val="75000"/>
+                      <a:lumOff val="25000"/>
+                      <a:alpha val="10000"/>
+                    </a:schemeClr>
+                  </a:solidFill>
+                </a:ln>
+                <a:solidFill>
+                  <a:schemeClr val="tx2"/>
+                </a:solidFill>
+                <a:effectLst>
+                  <a:outerShdw blurRad="9525" dist="25400" dir="14640000" algn="tl" rotWithShape="0">
+                    <a:schemeClr val="bg1">
+                      <a:alpha val="30000"/>
+                    </a:schemeClr>
+                  </a:outerShdw>
+                </a:effectLst>
+              </a:rPr>
+              <a:t> </a:t>
+            </a:r>
+            <a:r>
+              <a:rPr lang="en-US" sz="1500" dirty="0" err="1">
+                <a:ln>
+                  <a:solidFill>
+                    <a:schemeClr val="bg1">
+                      <a:lumMod val="75000"/>
+                      <a:lumOff val="25000"/>
+                      <a:alpha val="10000"/>
+                    </a:schemeClr>
+                  </a:solidFill>
+                </a:ln>
+                <a:solidFill>
+                  <a:schemeClr val="tx2"/>
+                </a:solidFill>
+                <a:effectLst>
+                  <a:outerShdw blurRad="9525" dist="25400" dir="14640000" algn="tl" rotWithShape="0">
+                    <a:schemeClr val="bg1">
+                      <a:alpha val="30000"/>
+                    </a:schemeClr>
+                  </a:outerShdw>
+                </a:effectLst>
+              </a:rPr>
+              <a:t>kooperatívneho</a:t>
+            </a:r>
+            <a:r>
+              <a:rPr lang="en-US" sz="1500" dirty="0">
+                <a:ln>
+                  <a:solidFill>
+                    <a:schemeClr val="bg1">
+                      <a:lumMod val="75000"/>
+                      <a:lumOff val="25000"/>
+                      <a:alpha val="10000"/>
+                    </a:schemeClr>
+                  </a:solidFill>
+                </a:ln>
+                <a:solidFill>
+                  <a:schemeClr val="tx2"/>
+                </a:solidFill>
+                <a:effectLst>
+                  <a:outerShdw blurRad="9525" dist="25400" dir="14640000" algn="tl" rotWithShape="0">
+                    <a:schemeClr val="bg1">
+                      <a:alpha val="30000"/>
+                    </a:schemeClr>
+                  </a:outerShdw>
+                </a:effectLst>
+              </a:rPr>
+              <a:t> </a:t>
+            </a:r>
+            <a:r>
+              <a:rPr lang="en-US" sz="1500" dirty="0" err="1">
+                <a:ln>
+                  <a:solidFill>
+                    <a:schemeClr val="bg1">
+                      <a:lumMod val="75000"/>
+                      <a:lumOff val="25000"/>
+                      <a:alpha val="10000"/>
+                    </a:schemeClr>
+                  </a:solidFill>
+                </a:ln>
+                <a:solidFill>
+                  <a:schemeClr val="tx2"/>
+                </a:solidFill>
+                <a:effectLst>
+                  <a:outerShdw blurRad="9525" dist="25400" dir="14640000" algn="tl" rotWithShape="0">
+                    <a:schemeClr val="bg1">
+                      <a:alpha val="30000"/>
+                    </a:schemeClr>
+                  </a:outerShdw>
+                </a:effectLst>
+              </a:rPr>
+              <a:t>vzdelávania</a:t>
+            </a:r>
+            <a:endParaRPr lang="en-US" sz="1500" dirty="0">
+              <a:ln>
+                <a:solidFill>
+                  <a:schemeClr val="bg1">
+                    <a:lumMod val="75000"/>
+                    <a:lumOff val="25000"/>
+                    <a:alpha val="10000"/>
+                  </a:schemeClr>
+                </a:solidFill>
+              </a:ln>
+              <a:solidFill>
+                <a:schemeClr val="tx2"/>
+              </a:solidFill>
+              <a:effectLst>
+                <a:outerShdw blurRad="9525" dist="25400" dir="14640000" algn="tl" rotWithShape="0">
+                  <a:schemeClr val="bg1">
+                    <a:alpha val="30000"/>
+                  </a:schemeClr>
+                </a:outerShdw>
+              </a:effectLst>
+            </a:endParaRPr>
           </a:p>
           <a:p>
             <a:pPr marL="285750" indent="-285750" defTabSz="457200">
@@ -12012,299 +14330,7 @@
               <a:buFont typeface="Wingdings 2" charset="2"/>
               <a:buChar char="•"/>
             </a:pPr>
-            <a:endParaRPr lang="en-US" sz="1500">
-              <a:ln>
-                <a:solidFill>
-                  <a:schemeClr val="bg1">
-                    <a:lumMod val="75000"/>
-                    <a:lumOff val="25000"/>
-                    <a:alpha val="10000"/>
-                  </a:schemeClr>
-                </a:solidFill>
-              </a:ln>
-              <a:solidFill>
-                <a:schemeClr val="tx2"/>
-              </a:solidFill>
-              <a:effectLst>
-                <a:outerShdw blurRad="9525" dist="25400" dir="14640000" algn="tl" rotWithShape="0">
-                  <a:schemeClr val="bg1">
-                    <a:alpha val="30000"/>
-                  </a:schemeClr>
-                </a:outerShdw>
-              </a:effectLst>
-            </a:endParaRPr>
-          </a:p>
-          <a:p>
-            <a:pPr marL="285750" indent="-285750" defTabSz="457200">
-              <a:lnSpc>
-                <a:spcPct val="90000"/>
-              </a:lnSpc>
-              <a:spcBef>
-                <a:spcPct val="20000"/>
-              </a:spcBef>
-              <a:spcAft>
-                <a:spcPts val="600"/>
-              </a:spcAft>
-              <a:buClr>
-                <a:schemeClr val="tx2"/>
-              </a:buClr>
-              <a:buSzPct val="70000"/>
-              <a:buFont typeface="Wingdings 2" charset="2"/>
-              <a:buChar char="•"/>
-            </a:pPr>
-            <a:r>
-              <a:rPr lang="en-US" sz="1500">
-                <a:ln>
-                  <a:solidFill>
-                    <a:schemeClr val="bg1">
-                      <a:lumMod val="75000"/>
-                      <a:lumOff val="25000"/>
-                      <a:alpha val="10000"/>
-                    </a:schemeClr>
-                  </a:solidFill>
-                </a:ln>
-                <a:solidFill>
-                  <a:schemeClr val="tx2"/>
-                </a:solidFill>
-                <a:effectLst>
-                  <a:outerShdw blurRad="9525" dist="25400" dir="14640000" algn="tl" rotWithShape="0">
-                    <a:schemeClr val="bg1">
-                      <a:alpha val="30000"/>
-                    </a:schemeClr>
-                  </a:outerShdw>
-                </a:effectLst>
-              </a:rPr>
-              <a:t>lekcie sú pripravované rôznymi učiteľmi</a:t>
-            </a:r>
-          </a:p>
-          <a:p>
-            <a:pPr marL="285750" indent="-285750" defTabSz="457200">
-              <a:lnSpc>
-                <a:spcPct val="90000"/>
-              </a:lnSpc>
-              <a:spcBef>
-                <a:spcPct val="20000"/>
-              </a:spcBef>
-              <a:spcAft>
-                <a:spcPts val="600"/>
-              </a:spcAft>
-              <a:buClr>
-                <a:schemeClr val="tx2"/>
-              </a:buClr>
-              <a:buSzPct val="70000"/>
-              <a:buFont typeface="Wingdings 2" charset="2"/>
-              <a:buChar char="•"/>
-            </a:pPr>
-            <a:endParaRPr lang="en-US" sz="1500">
-              <a:ln>
-                <a:solidFill>
-                  <a:schemeClr val="bg1">
-                    <a:lumMod val="75000"/>
-                    <a:lumOff val="25000"/>
-                    <a:alpha val="10000"/>
-                  </a:schemeClr>
-                </a:solidFill>
-              </a:ln>
-              <a:solidFill>
-                <a:schemeClr val="tx2"/>
-              </a:solidFill>
-              <a:effectLst>
-                <a:outerShdw blurRad="9525" dist="25400" dir="14640000" algn="tl" rotWithShape="0">
-                  <a:schemeClr val="bg1">
-                    <a:alpha val="30000"/>
-                  </a:schemeClr>
-                </a:outerShdw>
-              </a:effectLst>
-            </a:endParaRPr>
-          </a:p>
-          <a:p>
-            <a:pPr marL="285750" indent="-285750" defTabSz="457200">
-              <a:lnSpc>
-                <a:spcPct val="90000"/>
-              </a:lnSpc>
-              <a:spcBef>
-                <a:spcPct val="20000"/>
-              </a:spcBef>
-              <a:spcAft>
-                <a:spcPts val="600"/>
-              </a:spcAft>
-              <a:buClr>
-                <a:schemeClr val="tx2"/>
-              </a:buClr>
-              <a:buSzPct val="70000"/>
-              <a:buFont typeface="Wingdings 2" charset="2"/>
-              <a:buChar char="•"/>
-            </a:pPr>
-            <a:r>
-              <a:rPr lang="en-US" sz="1500">
-                <a:ln>
-                  <a:solidFill>
-                    <a:schemeClr val="bg1">
-                      <a:lumMod val="75000"/>
-                      <a:lumOff val="25000"/>
-                      <a:alpha val="10000"/>
-                    </a:schemeClr>
-                  </a:solidFill>
-                </a:ln>
-                <a:solidFill>
-                  <a:schemeClr val="tx2"/>
-                </a:solidFill>
-                <a:effectLst>
-                  <a:outerShdw blurRad="9525" dist="25400" dir="14640000" algn="tl" rotWithShape="0">
-                    <a:schemeClr val="bg1">
-                      <a:alpha val="30000"/>
-                    </a:schemeClr>
-                  </a:outerShdw>
-                </a:effectLst>
-              </a:rPr>
-              <a:t>interaktívne cvičenia zvyšujú motiváciu študentov</a:t>
-            </a:r>
-          </a:p>
-          <a:p>
-            <a:pPr marL="285750" indent="-285750" defTabSz="457200">
-              <a:lnSpc>
-                <a:spcPct val="90000"/>
-              </a:lnSpc>
-              <a:spcBef>
-                <a:spcPct val="20000"/>
-              </a:spcBef>
-              <a:spcAft>
-                <a:spcPts val="600"/>
-              </a:spcAft>
-              <a:buClr>
-                <a:schemeClr val="tx2"/>
-              </a:buClr>
-              <a:buSzPct val="70000"/>
-              <a:buFont typeface="Wingdings 2" charset="2"/>
-              <a:buChar char="•"/>
-            </a:pPr>
-            <a:r>
-              <a:rPr lang="en-US" sz="1500">
-                <a:ln>
-                  <a:solidFill>
-                    <a:schemeClr val="bg1">
-                      <a:lumMod val="75000"/>
-                      <a:lumOff val="25000"/>
-                      <a:alpha val="10000"/>
-                    </a:schemeClr>
-                  </a:solidFill>
-                </a:ln>
-                <a:solidFill>
-                  <a:schemeClr val="tx2"/>
-                </a:solidFill>
-                <a:effectLst>
-                  <a:outerShdw blurRad="9525" dist="25400" dir="14640000" algn="tl" rotWithShape="0">
-                    <a:schemeClr val="bg1">
-                      <a:alpha val="30000"/>
-                    </a:schemeClr>
-                  </a:outerShdw>
-                </a:effectLst>
-              </a:rPr>
-              <a:t>aktivity e-learningu prinášajú rozličné skúsenosti rôznym ľuďom a takéto aktivity pomáhajú tiež ľahšiemu učeniu,</a:t>
-            </a:r>
-          </a:p>
-          <a:p>
-            <a:pPr marL="285750" indent="-285750" defTabSz="457200">
-              <a:lnSpc>
-                <a:spcPct val="90000"/>
-              </a:lnSpc>
-              <a:spcBef>
-                <a:spcPct val="20000"/>
-              </a:spcBef>
-              <a:spcAft>
-                <a:spcPts val="600"/>
-              </a:spcAft>
-              <a:buClr>
-                <a:schemeClr val="tx2"/>
-              </a:buClr>
-              <a:buSzPct val="70000"/>
-              <a:buFont typeface="Wingdings 2" charset="2"/>
-              <a:buChar char="•"/>
-            </a:pPr>
-            <a:endParaRPr lang="en-US" sz="1500">
-              <a:ln>
-                <a:solidFill>
-                  <a:schemeClr val="bg1">
-                    <a:lumMod val="75000"/>
-                    <a:lumOff val="25000"/>
-                    <a:alpha val="10000"/>
-                  </a:schemeClr>
-                </a:solidFill>
-              </a:ln>
-              <a:solidFill>
-                <a:schemeClr val="tx2"/>
-              </a:solidFill>
-              <a:effectLst>
-                <a:outerShdw blurRad="9525" dist="25400" dir="14640000" algn="tl" rotWithShape="0">
-                  <a:schemeClr val="bg1">
-                    <a:alpha val="30000"/>
-                  </a:schemeClr>
-                </a:outerShdw>
-              </a:effectLst>
-            </a:endParaRPr>
-          </a:p>
-          <a:p>
-            <a:pPr marL="285750" indent="-285750" defTabSz="457200">
-              <a:lnSpc>
-                <a:spcPct val="90000"/>
-              </a:lnSpc>
-              <a:spcBef>
-                <a:spcPct val="20000"/>
-              </a:spcBef>
-              <a:spcAft>
-                <a:spcPts val="600"/>
-              </a:spcAft>
-              <a:buClr>
-                <a:schemeClr val="tx2"/>
-              </a:buClr>
-              <a:buSzPct val="70000"/>
-              <a:buFont typeface="Wingdings 2" charset="2"/>
-              <a:buChar char="•"/>
-            </a:pPr>
-            <a:r>
-              <a:rPr lang="en-US" sz="1500">
-                <a:ln>
-                  <a:solidFill>
-                    <a:schemeClr val="bg1">
-                      <a:lumMod val="75000"/>
-                      <a:lumOff val="25000"/>
-                      <a:alpha val="10000"/>
-                    </a:schemeClr>
-                  </a:solidFill>
-                </a:ln>
-                <a:solidFill>
-                  <a:schemeClr val="tx2"/>
-                </a:solidFill>
-                <a:effectLst>
-                  <a:outerShdw blurRad="9525" dist="25400" dir="14640000" algn="tl" rotWithShape="0">
-                    <a:schemeClr val="bg1">
-                      <a:alpha val="30000"/>
-                    </a:schemeClr>
-                  </a:outerShdw>
-                </a:effectLst>
-              </a:rPr>
-              <a:t>je to druh kooperatívneho vzdelávania</a:t>
-            </a:r>
-          </a:p>
-          <a:p>
-            <a:pPr marL="285750" indent="-285750" defTabSz="457200">
-              <a:lnSpc>
-                <a:spcPct val="90000"/>
-              </a:lnSpc>
-              <a:spcBef>
-                <a:spcPct val="20000"/>
-              </a:spcBef>
-              <a:spcAft>
-                <a:spcPts val="600"/>
-              </a:spcAft>
-              <a:buClr>
-                <a:schemeClr val="tx2"/>
-              </a:buClr>
-              <a:buSzPct val="70000"/>
-              <a:buFont typeface="Wingdings 2" charset="2"/>
-              <a:buChar char="•"/>
-            </a:pPr>
-            <a:endParaRPr lang="en-US" sz="1500">
+            <a:endParaRPr lang="en-US" sz="1500" dirty="0">
               <a:ln>
                 <a:solidFill>
                   <a:schemeClr val="bg1">
@@ -12531,8 +14557,8 @@
                 <a:schemeClr val="tx2"/>
               </a:buClr>
               <a:buSzPct val="70000"/>
-              <a:buFont typeface="Wingdings 2" charset="2"/>
-              <a:buChar char="•"/>
+              <a:buFont typeface="Wingdings" panose="05000000000000000000" pitchFamily="2" charset="2"/>
+              <a:buChar char="q"/>
             </a:pPr>
             <a:r>
               <a:rPr lang="en-US" sz="1500" dirty="0">
@@ -12910,8 +14936,8 @@
                 <a:schemeClr val="tx2"/>
               </a:buClr>
               <a:buSzPct val="70000"/>
-              <a:buFont typeface="Wingdings 2" charset="2"/>
-              <a:buChar char="•"/>
+              <a:buFont typeface="Wingdings" panose="05000000000000000000" pitchFamily="2" charset="2"/>
+              <a:buChar char="q"/>
             </a:pPr>
             <a:endParaRPr lang="en-US" sz="1500" dirty="0">
               <a:ln>
@@ -12950,8 +14976,8 @@
                 <a:schemeClr val="tx2"/>
               </a:buClr>
               <a:buSzPct val="70000"/>
-              <a:buFont typeface="Wingdings 2" charset="2"/>
-              <a:buChar char="•"/>
+              <a:buFont typeface="Wingdings" panose="05000000000000000000" pitchFamily="2" charset="2"/>
+              <a:buChar char="q"/>
             </a:pPr>
             <a:r>
               <a:rPr lang="en-US" sz="1500" dirty="0" err="1">
@@ -13206,8 +15232,8 @@
                 <a:schemeClr val="tx2"/>
               </a:buClr>
               <a:buSzPct val="70000"/>
-              <a:buFont typeface="Wingdings 2" charset="2"/>
-              <a:buChar char="•"/>
+              <a:buFont typeface="Wingdings" panose="05000000000000000000" pitchFamily="2" charset="2"/>
+              <a:buChar char="q"/>
             </a:pPr>
             <a:endParaRPr lang="en-US" sz="1500" dirty="0">
               <a:ln>
@@ -13246,8 +15272,8 @@
                 <a:schemeClr val="tx2"/>
               </a:buClr>
               <a:buSzPct val="70000"/>
-              <a:buFont typeface="Wingdings 2" charset="2"/>
-              <a:buChar char="•"/>
+              <a:buFont typeface="Wingdings" panose="05000000000000000000" pitchFamily="2" charset="2"/>
+              <a:buChar char="q"/>
             </a:pPr>
             <a:r>
               <a:rPr lang="en-US" sz="1500" dirty="0" err="1">
@@ -13502,8 +15528,8 @@
                 <a:schemeClr val="tx2"/>
               </a:buClr>
               <a:buSzPct val="70000"/>
-              <a:buFont typeface="Wingdings 2" charset="2"/>
-              <a:buChar char="•"/>
+              <a:buFont typeface="Wingdings" panose="05000000000000000000" pitchFamily="2" charset="2"/>
+              <a:buChar char="q"/>
             </a:pPr>
             <a:r>
               <a:rPr lang="en-US" sz="1500" dirty="0" err="1">
@@ -14145,8 +16171,8 @@
                 <a:schemeClr val="tx2"/>
               </a:buClr>
               <a:buSzPct val="70000"/>
-              <a:buFont typeface="Wingdings 2" charset="2"/>
-              <a:buChar char="•"/>
+              <a:buFont typeface="Wingdings" panose="05000000000000000000" pitchFamily="2" charset="2"/>
+              <a:buChar char="q"/>
             </a:pPr>
             <a:endParaRPr lang="en-US" sz="1500" dirty="0">
               <a:ln>
@@ -14185,8 +16211,8 @@
                 <a:schemeClr val="tx2"/>
               </a:buClr>
               <a:buSzPct val="70000"/>
-              <a:buFont typeface="Wingdings 2" charset="2"/>
-              <a:buChar char="•"/>
+              <a:buFont typeface="Wingdings" panose="05000000000000000000" pitchFamily="2" charset="2"/>
+              <a:buChar char="q"/>
             </a:pPr>
             <a:r>
               <a:rPr lang="en-US" sz="1500" dirty="0">
@@ -14710,8 +16736,8 @@
           <a:lstStyle/>
           <a:p>
             <a:pPr marL="285750" indent="-285750">
-              <a:buFont typeface="Arial" panose="020B0604020202020204" pitchFamily="34" charset="0"/>
-              <a:buChar char="•"/>
+              <a:buFont typeface="Wingdings" panose="05000000000000000000" pitchFamily="2" charset="2"/>
+              <a:buChar char="q"/>
             </a:pPr>
             <a:r>
               <a:rPr lang="sk-SK" dirty="0"/>
@@ -14720,15 +16746,15 @@
           </a:p>
           <a:p>
             <a:pPr marL="285750" indent="-285750">
-              <a:buFont typeface="Arial" panose="020B0604020202020204" pitchFamily="34" charset="0"/>
-              <a:buChar char="•"/>
+              <a:buFont typeface="Wingdings" panose="05000000000000000000" pitchFamily="2" charset="2"/>
+              <a:buChar char="q"/>
             </a:pPr>
             <a:endParaRPr lang="sk-SK" dirty="0"/>
           </a:p>
           <a:p>
             <a:pPr marL="285750" indent="-285750">
-              <a:buFont typeface="Arial" panose="020B0604020202020204" pitchFamily="34" charset="0"/>
-              <a:buChar char="•"/>
+              <a:buFont typeface="Wingdings" panose="05000000000000000000" pitchFamily="2" charset="2"/>
+              <a:buChar char="q"/>
             </a:pPr>
             <a:r>
               <a:rPr lang="sk-SK" dirty="0"/>
@@ -14745,66 +16771,637 @@
           </a:p>
         </p:txBody>
       </p:sp>
-      <p:pic>
-        <p:nvPicPr>
-          <p:cNvPr id="10" name="Obrázok 9">
+      <p:sp>
+        <p:nvSpPr>
+          <p:cNvPr id="6" name="Ovál 5">
             <a:extLst>
               <a:ext uri="{FF2B5EF4-FFF2-40B4-BE49-F238E27FC236}">
-                <a16:creationId xmlns:a16="http://schemas.microsoft.com/office/drawing/2014/main" id="{144906AB-A981-4009-B7B0-699815154DCC}"/>
+                <a16:creationId xmlns:a16="http://schemas.microsoft.com/office/drawing/2014/main" id="{56C98D2E-402F-4A2B-AE75-E4CA3312C0A5}"/>
               </a:ext>
             </a:extLst>
           </p:cNvPr>
-          <p:cNvPicPr>
-            <a:picLocks noChangeAspect="1"/>
-          </p:cNvPicPr>
+          <p:cNvSpPr/>
           <p:nvPr/>
-        </p:nvPicPr>
-        <p:blipFill>
-          <a:blip r:embed="rId2">
+        </p:nvSpPr>
+        <p:spPr>
+          <a:xfrm>
+            <a:off x="4418120" y="2865268"/>
+            <a:ext cx="3355759" cy="1127464"/>
+          </a:xfrm>
+          <a:prstGeom prst="ellipse">
+            <a:avLst/>
+          </a:prstGeom>
+          <a:solidFill>
+            <a:srgbClr val="00B0F0"/>
+          </a:solidFill>
+          <a:ln>
+            <a:solidFill>
+              <a:srgbClr val="002060"/>
+            </a:solidFill>
+          </a:ln>
+        </p:spPr>
+        <p:style>
+          <a:lnRef idx="2">
+            <a:schemeClr val="accent1">
+              <a:shade val="50000"/>
+            </a:schemeClr>
+          </a:lnRef>
+          <a:fillRef idx="1">
+            <a:schemeClr val="accent1"/>
+          </a:fillRef>
+          <a:effectRef idx="0">
+            <a:schemeClr val="accent1"/>
+          </a:effectRef>
+          <a:fontRef idx="minor">
+            <a:schemeClr val="lt1"/>
+          </a:fontRef>
+        </p:style>
+        <p:txBody>
+          <a:bodyPr rtlCol="0" anchor="ctr"/>
+          <a:lstStyle/>
+          <a:p>
+            <a:pPr algn="ctr"/>
+            <a:endParaRPr lang="sk-SK"/>
+          </a:p>
+        </p:txBody>
+      </p:sp>
+      <p:sp>
+        <p:nvSpPr>
+          <p:cNvPr id="8" name="Ovál 7">
             <a:extLst>
-              <a:ext uri="{28A0092B-C50C-407E-A947-70E740481C1C}">
-                <a14:useLocalDpi xmlns:a14="http://schemas.microsoft.com/office/drawing/2010/main" val="0"/>
+              <a:ext uri="{FF2B5EF4-FFF2-40B4-BE49-F238E27FC236}">
+                <a16:creationId xmlns:a16="http://schemas.microsoft.com/office/drawing/2014/main" id="{B1AD19C0-1EF0-4BA8-930D-FF1354347F0C}"/>
               </a:ext>
             </a:extLst>
-          </a:blip>
-          <a:stretch>
-            <a:fillRect/>
-          </a:stretch>
-        </p:blipFill>
+          </p:cNvPr>
+          <p:cNvSpPr/>
+          <p:nvPr/>
+        </p:nvSpPr>
         <p:spPr>
           <a:xfrm>
-            <a:off x="3385443" y="2944519"/>
-            <a:ext cx="5048250" cy="2762250"/>
+            <a:off x="1069020" y="5499724"/>
+            <a:ext cx="2173548" cy="874575"/>
           </a:xfrm>
-          <a:prstGeom prst="roundRect">
-            <a:avLst>
-              <a:gd name="adj" fmla="val 16667"/>
-            </a:avLst>
+          <a:prstGeom prst="ellipse">
+            <a:avLst/>
+          </a:prstGeom>
+          <a:solidFill>
+            <a:srgbClr val="00B0F0"/>
+          </a:solidFill>
+          <a:ln>
+            <a:solidFill>
+              <a:srgbClr val="002060"/>
+            </a:solidFill>
+          </a:ln>
+        </p:spPr>
+        <p:style>
+          <a:lnRef idx="2">
+            <a:schemeClr val="accent1">
+              <a:shade val="50000"/>
+            </a:schemeClr>
+          </a:lnRef>
+          <a:fillRef idx="1">
+            <a:schemeClr val="accent1"/>
+          </a:fillRef>
+          <a:effectRef idx="0">
+            <a:schemeClr val="accent1"/>
+          </a:effectRef>
+          <a:fontRef idx="minor">
+            <a:schemeClr val="lt1"/>
+          </a:fontRef>
+        </p:style>
+        <p:txBody>
+          <a:bodyPr rtlCol="0" anchor="ctr"/>
+          <a:lstStyle/>
+          <a:p>
+            <a:pPr algn="ctr"/>
+            <a:endParaRPr lang="sk-SK"/>
+          </a:p>
+        </p:txBody>
+      </p:sp>
+      <p:sp>
+        <p:nvSpPr>
+          <p:cNvPr id="9" name="Ovál 8">
+            <a:extLst>
+              <a:ext uri="{FF2B5EF4-FFF2-40B4-BE49-F238E27FC236}">
+                <a16:creationId xmlns:a16="http://schemas.microsoft.com/office/drawing/2014/main" id="{620B8B78-813B-46D3-B7F0-C8F1A2A11C82}"/>
+              </a:ext>
+            </a:extLst>
+          </p:cNvPr>
+          <p:cNvSpPr/>
+          <p:nvPr/>
+        </p:nvSpPr>
+        <p:spPr>
+          <a:xfrm>
+            <a:off x="3799643" y="5499725"/>
+            <a:ext cx="2173548" cy="874575"/>
+          </a:xfrm>
+          <a:prstGeom prst="ellipse">
+            <a:avLst/>
+          </a:prstGeom>
+          <a:solidFill>
+            <a:srgbClr val="00B0F0"/>
+          </a:solidFill>
+          <a:ln>
+            <a:solidFill>
+              <a:srgbClr val="002060"/>
+            </a:solidFill>
+          </a:ln>
+        </p:spPr>
+        <p:style>
+          <a:lnRef idx="2">
+            <a:schemeClr val="accent1">
+              <a:shade val="50000"/>
+            </a:schemeClr>
+          </a:lnRef>
+          <a:fillRef idx="1">
+            <a:schemeClr val="accent1"/>
+          </a:fillRef>
+          <a:effectRef idx="0">
+            <a:schemeClr val="accent1"/>
+          </a:effectRef>
+          <a:fontRef idx="minor">
+            <a:schemeClr val="lt1"/>
+          </a:fontRef>
+        </p:style>
+        <p:txBody>
+          <a:bodyPr rtlCol="0" anchor="ctr"/>
+          <a:lstStyle/>
+          <a:p>
+            <a:pPr algn="ctr"/>
+            <a:endParaRPr lang="sk-SK"/>
+          </a:p>
+        </p:txBody>
+      </p:sp>
+      <p:sp>
+        <p:nvSpPr>
+          <p:cNvPr id="11" name="Ovál 10">
+            <a:extLst>
+              <a:ext uri="{FF2B5EF4-FFF2-40B4-BE49-F238E27FC236}">
+                <a16:creationId xmlns:a16="http://schemas.microsoft.com/office/drawing/2014/main" id="{11CA083F-8FCD-4E33-A789-14564B8534B5}"/>
+              </a:ext>
+            </a:extLst>
+          </p:cNvPr>
+          <p:cNvSpPr/>
+          <p:nvPr/>
+        </p:nvSpPr>
+        <p:spPr>
+          <a:xfrm>
+            <a:off x="6530266" y="5499724"/>
+            <a:ext cx="2173548" cy="874575"/>
+          </a:xfrm>
+          <a:prstGeom prst="ellipse">
+            <a:avLst/>
+          </a:prstGeom>
+          <a:solidFill>
+            <a:srgbClr val="00B0F0"/>
+          </a:solidFill>
+          <a:ln>
+            <a:solidFill>
+              <a:srgbClr val="002060"/>
+            </a:solidFill>
+          </a:ln>
+        </p:spPr>
+        <p:style>
+          <a:lnRef idx="2">
+            <a:schemeClr val="accent1">
+              <a:shade val="50000"/>
+            </a:schemeClr>
+          </a:lnRef>
+          <a:fillRef idx="1">
+            <a:schemeClr val="accent1"/>
+          </a:fillRef>
+          <a:effectRef idx="0">
+            <a:schemeClr val="accent1"/>
+          </a:effectRef>
+          <a:fontRef idx="minor">
+            <a:schemeClr val="lt1"/>
+          </a:fontRef>
+        </p:style>
+        <p:txBody>
+          <a:bodyPr rtlCol="0" anchor="ctr"/>
+          <a:lstStyle/>
+          <a:p>
+            <a:pPr algn="ctr"/>
+            <a:endParaRPr lang="sk-SK"/>
+          </a:p>
+        </p:txBody>
+      </p:sp>
+      <p:sp>
+        <p:nvSpPr>
+          <p:cNvPr id="12" name="Ovál 11">
+            <a:extLst>
+              <a:ext uri="{FF2B5EF4-FFF2-40B4-BE49-F238E27FC236}">
+                <a16:creationId xmlns:a16="http://schemas.microsoft.com/office/drawing/2014/main" id="{25F79800-BFBA-46A9-87A8-266E7131235C}"/>
+              </a:ext>
+            </a:extLst>
+          </p:cNvPr>
+          <p:cNvSpPr/>
+          <p:nvPr/>
+        </p:nvSpPr>
+        <p:spPr>
+          <a:xfrm>
+            <a:off x="9260889" y="5499724"/>
+            <a:ext cx="2173548" cy="874575"/>
+          </a:xfrm>
+          <a:prstGeom prst="ellipse">
+            <a:avLst/>
+          </a:prstGeom>
+          <a:solidFill>
+            <a:srgbClr val="00B0F0"/>
+          </a:solidFill>
+          <a:ln>
+            <a:solidFill>
+              <a:srgbClr val="002060"/>
+            </a:solidFill>
+          </a:ln>
+        </p:spPr>
+        <p:style>
+          <a:lnRef idx="2">
+            <a:schemeClr val="accent1">
+              <a:shade val="50000"/>
+            </a:schemeClr>
+          </a:lnRef>
+          <a:fillRef idx="1">
+            <a:schemeClr val="accent1"/>
+          </a:fillRef>
+          <a:effectRef idx="0">
+            <a:schemeClr val="accent1"/>
+          </a:effectRef>
+          <a:fontRef idx="minor">
+            <a:schemeClr val="lt1"/>
+          </a:fontRef>
+        </p:style>
+        <p:txBody>
+          <a:bodyPr rtlCol="0" anchor="ctr"/>
+          <a:lstStyle/>
+          <a:p>
+            <a:pPr algn="ctr"/>
+            <a:endParaRPr lang="sk-SK"/>
+          </a:p>
+        </p:txBody>
+      </p:sp>
+      <p:cxnSp>
+        <p:nvCxnSpPr>
+          <p:cNvPr id="13" name="Rovná spojovacia šípka 12">
+            <a:extLst>
+              <a:ext uri="{FF2B5EF4-FFF2-40B4-BE49-F238E27FC236}">
+                <a16:creationId xmlns:a16="http://schemas.microsoft.com/office/drawing/2014/main" id="{D7F1CA8F-BBA9-4C5B-BDF3-63EE0F379208}"/>
+              </a:ext>
+            </a:extLst>
+          </p:cNvPr>
+          <p:cNvCxnSpPr>
+            <a:cxnSpLocks/>
+          </p:cNvCxnSpPr>
+          <p:nvPr/>
+        </p:nvCxnSpPr>
+        <p:spPr>
+          <a:xfrm flipH="1">
+            <a:off x="2645546" y="3714299"/>
+            <a:ext cx="1846555" cy="1785425"/>
+          </a:xfrm>
+          <a:prstGeom prst="straightConnector1">
+            <a:avLst/>
           </a:prstGeom>
           <a:ln>
-            <a:noFill/>
+            <a:solidFill>
+              <a:schemeClr val="accent6"/>
+            </a:solidFill>
+            <a:tailEnd type="triangle"/>
           </a:ln>
-          <a:effectLst>
-            <a:outerShdw blurRad="76200" dist="38100" dir="7800000" algn="tl" rotWithShape="0">
-              <a:srgbClr val="000000">
-                <a:alpha val="40000"/>
-              </a:srgbClr>
-            </a:outerShdw>
-          </a:effectLst>
-          <a:scene3d>
-            <a:camera prst="orthographicFront"/>
-            <a:lightRig rig="contrasting" dir="t">
-              <a:rot lat="0" lon="0" rev="4200000"/>
-            </a:lightRig>
-          </a:scene3d>
-          <a:sp3d prstMaterial="plastic">
-            <a:bevelT w="381000" h="114300" prst="relaxedInset"/>
-            <a:contourClr>
-              <a:srgbClr val="969696"/>
-            </a:contourClr>
-          </a:sp3d>
         </p:spPr>
-      </p:pic>
+        <p:style>
+          <a:lnRef idx="1">
+            <a:schemeClr val="accent1"/>
+          </a:lnRef>
+          <a:fillRef idx="0">
+            <a:schemeClr val="accent1"/>
+          </a:fillRef>
+          <a:effectRef idx="0">
+            <a:schemeClr val="accent1"/>
+          </a:effectRef>
+          <a:fontRef idx="minor">
+            <a:schemeClr val="tx1"/>
+          </a:fontRef>
+        </p:style>
+      </p:cxnSp>
+      <p:cxnSp>
+        <p:nvCxnSpPr>
+          <p:cNvPr id="15" name="Rovná spojovacia šípka 14">
+            <a:extLst>
+              <a:ext uri="{FF2B5EF4-FFF2-40B4-BE49-F238E27FC236}">
+                <a16:creationId xmlns:a16="http://schemas.microsoft.com/office/drawing/2014/main" id="{3FCEDD59-6CCE-422D-93BC-95CB9A577F6E}"/>
+              </a:ext>
+            </a:extLst>
+          </p:cNvPr>
+          <p:cNvCxnSpPr>
+            <a:cxnSpLocks/>
+          </p:cNvCxnSpPr>
+          <p:nvPr/>
+        </p:nvCxnSpPr>
+        <p:spPr>
+          <a:xfrm flipH="1">
+            <a:off x="4886417" y="3949050"/>
+            <a:ext cx="346230" cy="1424807"/>
+          </a:xfrm>
+          <a:prstGeom prst="straightConnector1">
+            <a:avLst/>
+          </a:prstGeom>
+          <a:ln>
+            <a:solidFill>
+              <a:schemeClr val="accent6"/>
+            </a:solidFill>
+            <a:tailEnd type="triangle"/>
+          </a:ln>
+        </p:spPr>
+        <p:style>
+          <a:lnRef idx="1">
+            <a:schemeClr val="accent1"/>
+          </a:lnRef>
+          <a:fillRef idx="0">
+            <a:schemeClr val="accent1"/>
+          </a:fillRef>
+          <a:effectRef idx="0">
+            <a:schemeClr val="accent1"/>
+          </a:effectRef>
+          <a:fontRef idx="minor">
+            <a:schemeClr val="tx1"/>
+          </a:fontRef>
+        </p:style>
+      </p:cxnSp>
+      <p:cxnSp>
+        <p:nvCxnSpPr>
+          <p:cNvPr id="17" name="Rovná spojovacia šípka 16">
+            <a:extLst>
+              <a:ext uri="{FF2B5EF4-FFF2-40B4-BE49-F238E27FC236}">
+                <a16:creationId xmlns:a16="http://schemas.microsoft.com/office/drawing/2014/main" id="{C4CE6B00-DD1B-413E-87A0-30F6746C1D7F}"/>
+              </a:ext>
+            </a:extLst>
+          </p:cNvPr>
+          <p:cNvCxnSpPr>
+            <a:cxnSpLocks/>
+          </p:cNvCxnSpPr>
+          <p:nvPr/>
+        </p:nvCxnSpPr>
+        <p:spPr>
+          <a:xfrm>
+            <a:off x="6862439" y="3949050"/>
+            <a:ext cx="479394" cy="1424807"/>
+          </a:xfrm>
+          <a:prstGeom prst="straightConnector1">
+            <a:avLst/>
+          </a:prstGeom>
+          <a:ln>
+            <a:solidFill>
+              <a:schemeClr val="accent6"/>
+            </a:solidFill>
+            <a:tailEnd type="triangle"/>
+          </a:ln>
+        </p:spPr>
+        <p:style>
+          <a:lnRef idx="1">
+            <a:schemeClr val="accent1"/>
+          </a:lnRef>
+          <a:fillRef idx="0">
+            <a:schemeClr val="accent1"/>
+          </a:fillRef>
+          <a:effectRef idx="0">
+            <a:schemeClr val="accent1"/>
+          </a:effectRef>
+          <a:fontRef idx="minor">
+            <a:schemeClr val="tx1"/>
+          </a:fontRef>
+        </p:style>
+      </p:cxnSp>
+      <p:cxnSp>
+        <p:nvCxnSpPr>
+          <p:cNvPr id="22" name="Rovná spojovacia šípka 21">
+            <a:extLst>
+              <a:ext uri="{FF2B5EF4-FFF2-40B4-BE49-F238E27FC236}">
+                <a16:creationId xmlns:a16="http://schemas.microsoft.com/office/drawing/2014/main" id="{F9E19C1C-2229-4822-82A7-52BDF1D0C198}"/>
+              </a:ext>
+            </a:extLst>
+          </p:cNvPr>
+          <p:cNvCxnSpPr>
+            <a:cxnSpLocks/>
+          </p:cNvCxnSpPr>
+          <p:nvPr/>
+        </p:nvCxnSpPr>
+        <p:spPr>
+          <a:xfrm>
+            <a:off x="7602983" y="3714298"/>
+            <a:ext cx="2112238" cy="1733858"/>
+          </a:xfrm>
+          <a:prstGeom prst="straightConnector1">
+            <a:avLst/>
+          </a:prstGeom>
+          <a:ln>
+            <a:solidFill>
+              <a:schemeClr val="accent6"/>
+            </a:solidFill>
+            <a:tailEnd type="triangle"/>
+          </a:ln>
+        </p:spPr>
+        <p:style>
+          <a:lnRef idx="1">
+            <a:schemeClr val="accent1"/>
+          </a:lnRef>
+          <a:fillRef idx="0">
+            <a:schemeClr val="accent1"/>
+          </a:fillRef>
+          <a:effectRef idx="0">
+            <a:schemeClr val="accent1"/>
+          </a:effectRef>
+          <a:fontRef idx="minor">
+            <a:schemeClr val="tx1"/>
+          </a:fontRef>
+        </p:style>
+      </p:cxnSp>
+      <p:sp>
+        <p:nvSpPr>
+          <p:cNvPr id="25" name="BlokTextu 24">
+            <a:extLst>
+              <a:ext uri="{FF2B5EF4-FFF2-40B4-BE49-F238E27FC236}">
+                <a16:creationId xmlns:a16="http://schemas.microsoft.com/office/drawing/2014/main" id="{0542070C-2266-4E64-8A10-3D9C9873DFCE}"/>
+              </a:ext>
+            </a:extLst>
+          </p:cNvPr>
+          <p:cNvSpPr txBox="1"/>
+          <p:nvPr/>
+        </p:nvSpPr>
+        <p:spPr>
+          <a:xfrm>
+            <a:off x="4539766" y="3232290"/>
+            <a:ext cx="3112466" cy="369332"/>
+          </a:xfrm>
+          <a:prstGeom prst="rect">
+            <a:avLst/>
+          </a:prstGeom>
+          <a:noFill/>
+        </p:spPr>
+        <p:txBody>
+          <a:bodyPr wrap="square" rtlCol="0">
+            <a:spAutoFit/>
+          </a:bodyPr>
+          <a:lstStyle/>
+          <a:p>
+            <a:r>
+              <a:rPr lang="sk-SK" dirty="0"/>
+              <a:t>Najznámejšie a najatraktívnejšie</a:t>
+            </a:r>
+          </a:p>
+        </p:txBody>
+      </p:sp>
+      <p:sp>
+        <p:nvSpPr>
+          <p:cNvPr id="26" name="BlokTextu 25">
+            <a:extLst>
+              <a:ext uri="{FF2B5EF4-FFF2-40B4-BE49-F238E27FC236}">
+                <a16:creationId xmlns:a16="http://schemas.microsoft.com/office/drawing/2014/main" id="{C2460868-7E43-4448-AB26-744C965DD964}"/>
+              </a:ext>
+            </a:extLst>
+          </p:cNvPr>
+          <p:cNvSpPr txBox="1"/>
+          <p:nvPr/>
+        </p:nvSpPr>
+        <p:spPr>
+          <a:xfrm>
+            <a:off x="1214922" y="5752345"/>
+            <a:ext cx="2353901" cy="369332"/>
+          </a:xfrm>
+          <a:prstGeom prst="rect">
+            <a:avLst/>
+          </a:prstGeom>
+          <a:noFill/>
+        </p:spPr>
+        <p:txBody>
+          <a:bodyPr wrap="square" rtlCol="0">
+            <a:spAutoFit/>
+          </a:bodyPr>
+          <a:lstStyle/>
+          <a:p>
+            <a:r>
+              <a:rPr lang="sk-SK" dirty="0"/>
+              <a:t>Aplikácia </a:t>
+            </a:r>
+            <a:r>
+              <a:rPr lang="sk-SK" dirty="0" err="1"/>
+              <a:t>Duolingo</a:t>
+            </a:r>
+            <a:endParaRPr lang="sk-SK" dirty="0"/>
+          </a:p>
+        </p:txBody>
+      </p:sp>
+      <p:sp>
+        <p:nvSpPr>
+          <p:cNvPr id="27" name="BlokTextu 26">
+            <a:extLst>
+              <a:ext uri="{FF2B5EF4-FFF2-40B4-BE49-F238E27FC236}">
+                <a16:creationId xmlns:a16="http://schemas.microsoft.com/office/drawing/2014/main" id="{5604ED71-FB42-444F-BF6D-AF81B80136B2}"/>
+              </a:ext>
+            </a:extLst>
+          </p:cNvPr>
+          <p:cNvSpPr txBox="1"/>
+          <p:nvPr/>
+        </p:nvSpPr>
+        <p:spPr>
+          <a:xfrm>
+            <a:off x="3907832" y="5752345"/>
+            <a:ext cx="2353901" cy="369332"/>
+          </a:xfrm>
+          <a:prstGeom prst="rect">
+            <a:avLst/>
+          </a:prstGeom>
+          <a:noFill/>
+        </p:spPr>
+        <p:txBody>
+          <a:bodyPr wrap="square" rtlCol="0">
+            <a:spAutoFit/>
+          </a:bodyPr>
+          <a:lstStyle/>
+          <a:p>
+            <a:r>
+              <a:rPr lang="sk-SK" dirty="0"/>
+              <a:t>Aplikácia </a:t>
+            </a:r>
+            <a:r>
+              <a:rPr lang="sk-SK" dirty="0" err="1"/>
+              <a:t>HelloTalk</a:t>
+            </a:r>
+            <a:endParaRPr lang="sk-SK" dirty="0"/>
+          </a:p>
+        </p:txBody>
+      </p:sp>
+      <p:sp>
+        <p:nvSpPr>
+          <p:cNvPr id="28" name="BlokTextu 27">
+            <a:extLst>
+              <a:ext uri="{FF2B5EF4-FFF2-40B4-BE49-F238E27FC236}">
+                <a16:creationId xmlns:a16="http://schemas.microsoft.com/office/drawing/2014/main" id="{DFEBAB5C-C7F4-4A84-9B9E-3A6CB45791BF}"/>
+              </a:ext>
+            </a:extLst>
+          </p:cNvPr>
+          <p:cNvSpPr txBox="1"/>
+          <p:nvPr/>
+        </p:nvSpPr>
+        <p:spPr>
+          <a:xfrm>
+            <a:off x="6688673" y="5752345"/>
+            <a:ext cx="2353901" cy="369332"/>
+          </a:xfrm>
+          <a:prstGeom prst="rect">
+            <a:avLst/>
+          </a:prstGeom>
+          <a:noFill/>
+        </p:spPr>
+        <p:txBody>
+          <a:bodyPr wrap="square" rtlCol="0">
+            <a:spAutoFit/>
+          </a:bodyPr>
+          <a:lstStyle/>
+          <a:p>
+            <a:r>
+              <a:rPr lang="sk-SK" dirty="0"/>
+              <a:t>Aplikácia Tandem</a:t>
+            </a:r>
+          </a:p>
+        </p:txBody>
+      </p:sp>
+      <p:sp>
+        <p:nvSpPr>
+          <p:cNvPr id="29" name="BlokTextu 28">
+            <a:extLst>
+              <a:ext uri="{FF2B5EF4-FFF2-40B4-BE49-F238E27FC236}">
+                <a16:creationId xmlns:a16="http://schemas.microsoft.com/office/drawing/2014/main" id="{44B4008D-8B5D-44E2-8E70-5A45B95AE6D1}"/>
+              </a:ext>
+            </a:extLst>
+          </p:cNvPr>
+          <p:cNvSpPr txBox="1"/>
+          <p:nvPr/>
+        </p:nvSpPr>
+        <p:spPr>
+          <a:xfrm>
+            <a:off x="9538778" y="5752345"/>
+            <a:ext cx="2353901" cy="369332"/>
+          </a:xfrm>
+          <a:prstGeom prst="rect">
+            <a:avLst/>
+          </a:prstGeom>
+          <a:noFill/>
+        </p:spPr>
+        <p:txBody>
+          <a:bodyPr wrap="square" rtlCol="0">
+            <a:spAutoFit/>
+          </a:bodyPr>
+          <a:lstStyle/>
+          <a:p>
+            <a:r>
+              <a:rPr lang="sk-SK" dirty="0"/>
+              <a:t>Jazykové blogy</a:t>
+            </a:r>
+          </a:p>
+        </p:txBody>
+      </p:sp>
     </p:spTree>
     <p:extLst>
       <p:ext uri="{BB962C8B-B14F-4D97-AF65-F5344CB8AC3E}">
@@ -14815,6 +17412,628 @@
   <p:clrMapOvr>
     <a:masterClrMapping/>
   </p:clrMapOvr>
+  <p:timing>
+    <p:tnLst>
+      <p:par>
+        <p:cTn id="1" dur="indefinite" restart="never" nodeType="tmRoot">
+          <p:childTnLst>
+            <p:seq concurrent="1" nextAc="seek">
+              <p:cTn id="2" dur="indefinite" nodeType="mainSeq">
+                <p:childTnLst>
+                  <p:par>
+                    <p:cTn id="3" fill="hold">
+                      <p:stCondLst>
+                        <p:cond delay="indefinite"/>
+                      </p:stCondLst>
+                      <p:childTnLst>
+                        <p:par>
+                          <p:cTn id="4" fill="hold">
+                            <p:stCondLst>
+                              <p:cond delay="0"/>
+                            </p:stCondLst>
+                            <p:childTnLst>
+                              <p:par>
+                                <p:cTn id="5" presetID="10" presetClass="entr" presetSubtype="0" fill="hold" grpId="0" nodeType="clickEffect">
+                                  <p:stCondLst>
+                                    <p:cond delay="0"/>
+                                  </p:stCondLst>
+                                  <p:childTnLst>
+                                    <p:set>
+                                      <p:cBhvr>
+                                        <p:cTn id="6" dur="1" fill="hold">
+                                          <p:stCondLst>
+                                            <p:cond delay="0"/>
+                                          </p:stCondLst>
+                                        </p:cTn>
+                                        <p:tgtEl>
+                                          <p:spTgt spid="6"/>
+                                        </p:tgtEl>
+                                        <p:attrNameLst>
+                                          <p:attrName>style.visibility</p:attrName>
+                                        </p:attrNameLst>
+                                      </p:cBhvr>
+                                      <p:to>
+                                        <p:strVal val="visible"/>
+                                      </p:to>
+                                    </p:set>
+                                    <p:animEffect transition="in" filter="fade">
+                                      <p:cBhvr>
+                                        <p:cTn id="7" dur="500"/>
+                                        <p:tgtEl>
+                                          <p:spTgt spid="6"/>
+                                        </p:tgtEl>
+                                      </p:cBhvr>
+                                    </p:animEffect>
+                                  </p:childTnLst>
+                                </p:cTn>
+                              </p:par>
+                              <p:par>
+                                <p:cTn id="8" presetID="10" presetClass="entr" presetSubtype="0" fill="hold" grpId="0" nodeType="withEffect">
+                                  <p:stCondLst>
+                                    <p:cond delay="0"/>
+                                  </p:stCondLst>
+                                  <p:childTnLst>
+                                    <p:set>
+                                      <p:cBhvr>
+                                        <p:cTn id="9" dur="1" fill="hold">
+                                          <p:stCondLst>
+                                            <p:cond delay="0"/>
+                                          </p:stCondLst>
+                                        </p:cTn>
+                                        <p:tgtEl>
+                                          <p:spTgt spid="25"/>
+                                        </p:tgtEl>
+                                        <p:attrNameLst>
+                                          <p:attrName>style.visibility</p:attrName>
+                                        </p:attrNameLst>
+                                      </p:cBhvr>
+                                      <p:to>
+                                        <p:strVal val="visible"/>
+                                      </p:to>
+                                    </p:set>
+                                    <p:animEffect transition="in" filter="fade">
+                                      <p:cBhvr>
+                                        <p:cTn id="10" dur="500"/>
+                                        <p:tgtEl>
+                                          <p:spTgt spid="25"/>
+                                        </p:tgtEl>
+                                      </p:cBhvr>
+                                    </p:animEffect>
+                                  </p:childTnLst>
+                                </p:cTn>
+                              </p:par>
+                            </p:childTnLst>
+                          </p:cTn>
+                        </p:par>
+                      </p:childTnLst>
+                    </p:cTn>
+                  </p:par>
+                  <p:par>
+                    <p:cTn id="11" fill="hold">
+                      <p:stCondLst>
+                        <p:cond delay="indefinite"/>
+                      </p:stCondLst>
+                      <p:childTnLst>
+                        <p:par>
+                          <p:cTn id="12" fill="hold">
+                            <p:stCondLst>
+                              <p:cond delay="0"/>
+                            </p:stCondLst>
+                            <p:childTnLst>
+                              <p:par>
+                                <p:cTn id="13" presetID="10" presetClass="entr" presetSubtype="0" fill="hold" nodeType="clickEffect">
+                                  <p:stCondLst>
+                                    <p:cond delay="0"/>
+                                  </p:stCondLst>
+                                  <p:childTnLst>
+                                    <p:set>
+                                      <p:cBhvr>
+                                        <p:cTn id="14" dur="1" fill="hold">
+                                          <p:stCondLst>
+                                            <p:cond delay="0"/>
+                                          </p:stCondLst>
+                                        </p:cTn>
+                                        <p:tgtEl>
+                                          <p:spTgt spid="13"/>
+                                        </p:tgtEl>
+                                        <p:attrNameLst>
+                                          <p:attrName>style.visibility</p:attrName>
+                                        </p:attrNameLst>
+                                      </p:cBhvr>
+                                      <p:to>
+                                        <p:strVal val="visible"/>
+                                      </p:to>
+                                    </p:set>
+                                    <p:animEffect transition="in" filter="fade">
+                                      <p:cBhvr>
+                                        <p:cTn id="15" dur="500"/>
+                                        <p:tgtEl>
+                                          <p:spTgt spid="13"/>
+                                        </p:tgtEl>
+                                      </p:cBhvr>
+                                    </p:animEffect>
+                                  </p:childTnLst>
+                                </p:cTn>
+                              </p:par>
+                              <p:par>
+                                <p:cTn id="16" presetID="10" presetClass="entr" presetSubtype="0" fill="hold" grpId="0" nodeType="withEffect">
+                                  <p:stCondLst>
+                                    <p:cond delay="0"/>
+                                  </p:stCondLst>
+                                  <p:childTnLst>
+                                    <p:set>
+                                      <p:cBhvr>
+                                        <p:cTn id="17" dur="1" fill="hold">
+                                          <p:stCondLst>
+                                            <p:cond delay="0"/>
+                                          </p:stCondLst>
+                                        </p:cTn>
+                                        <p:tgtEl>
+                                          <p:spTgt spid="8"/>
+                                        </p:tgtEl>
+                                        <p:attrNameLst>
+                                          <p:attrName>style.visibility</p:attrName>
+                                        </p:attrNameLst>
+                                      </p:cBhvr>
+                                      <p:to>
+                                        <p:strVal val="visible"/>
+                                      </p:to>
+                                    </p:set>
+                                    <p:animEffect transition="in" filter="fade">
+                                      <p:cBhvr>
+                                        <p:cTn id="18" dur="500"/>
+                                        <p:tgtEl>
+                                          <p:spTgt spid="8"/>
+                                        </p:tgtEl>
+                                      </p:cBhvr>
+                                    </p:animEffect>
+                                  </p:childTnLst>
+                                </p:cTn>
+                              </p:par>
+                              <p:par>
+                                <p:cTn id="19" presetID="10" presetClass="entr" presetSubtype="0" fill="hold" grpId="0" nodeType="withEffect">
+                                  <p:stCondLst>
+                                    <p:cond delay="0"/>
+                                  </p:stCondLst>
+                                  <p:childTnLst>
+                                    <p:set>
+                                      <p:cBhvr>
+                                        <p:cTn id="20" dur="1" fill="hold">
+                                          <p:stCondLst>
+                                            <p:cond delay="0"/>
+                                          </p:stCondLst>
+                                        </p:cTn>
+                                        <p:tgtEl>
+                                          <p:spTgt spid="26"/>
+                                        </p:tgtEl>
+                                        <p:attrNameLst>
+                                          <p:attrName>style.visibility</p:attrName>
+                                        </p:attrNameLst>
+                                      </p:cBhvr>
+                                      <p:to>
+                                        <p:strVal val="visible"/>
+                                      </p:to>
+                                    </p:set>
+                                    <p:animEffect transition="in" filter="fade">
+                                      <p:cBhvr>
+                                        <p:cTn id="21" dur="500"/>
+                                        <p:tgtEl>
+                                          <p:spTgt spid="26"/>
+                                        </p:tgtEl>
+                                      </p:cBhvr>
+                                    </p:animEffect>
+                                  </p:childTnLst>
+                                </p:cTn>
+                              </p:par>
+                            </p:childTnLst>
+                          </p:cTn>
+                        </p:par>
+                      </p:childTnLst>
+                    </p:cTn>
+                  </p:par>
+                  <p:par>
+                    <p:cTn id="22" fill="hold">
+                      <p:stCondLst>
+                        <p:cond delay="indefinite"/>
+                      </p:stCondLst>
+                      <p:childTnLst>
+                        <p:par>
+                          <p:cTn id="23" fill="hold">
+                            <p:stCondLst>
+                              <p:cond delay="0"/>
+                            </p:stCondLst>
+                            <p:childTnLst>
+                              <p:par>
+                                <p:cTn id="24" presetID="10" presetClass="entr" presetSubtype="0" fill="hold" nodeType="clickEffect">
+                                  <p:stCondLst>
+                                    <p:cond delay="0"/>
+                                  </p:stCondLst>
+                                  <p:childTnLst>
+                                    <p:set>
+                                      <p:cBhvr>
+                                        <p:cTn id="25" dur="1" fill="hold">
+                                          <p:stCondLst>
+                                            <p:cond delay="0"/>
+                                          </p:stCondLst>
+                                        </p:cTn>
+                                        <p:tgtEl>
+                                          <p:spTgt spid="15"/>
+                                        </p:tgtEl>
+                                        <p:attrNameLst>
+                                          <p:attrName>style.visibility</p:attrName>
+                                        </p:attrNameLst>
+                                      </p:cBhvr>
+                                      <p:to>
+                                        <p:strVal val="visible"/>
+                                      </p:to>
+                                    </p:set>
+                                    <p:animEffect transition="in" filter="fade">
+                                      <p:cBhvr>
+                                        <p:cTn id="26" dur="500"/>
+                                        <p:tgtEl>
+                                          <p:spTgt spid="15"/>
+                                        </p:tgtEl>
+                                      </p:cBhvr>
+                                    </p:animEffect>
+                                  </p:childTnLst>
+                                </p:cTn>
+                              </p:par>
+                              <p:par>
+                                <p:cTn id="27" presetID="10" presetClass="entr" presetSubtype="0" fill="hold" grpId="0" nodeType="withEffect">
+                                  <p:stCondLst>
+                                    <p:cond delay="0"/>
+                                  </p:stCondLst>
+                                  <p:childTnLst>
+                                    <p:set>
+                                      <p:cBhvr>
+                                        <p:cTn id="28" dur="1" fill="hold">
+                                          <p:stCondLst>
+                                            <p:cond delay="0"/>
+                                          </p:stCondLst>
+                                        </p:cTn>
+                                        <p:tgtEl>
+                                          <p:spTgt spid="9"/>
+                                        </p:tgtEl>
+                                        <p:attrNameLst>
+                                          <p:attrName>style.visibility</p:attrName>
+                                        </p:attrNameLst>
+                                      </p:cBhvr>
+                                      <p:to>
+                                        <p:strVal val="visible"/>
+                                      </p:to>
+                                    </p:set>
+                                    <p:animEffect transition="in" filter="fade">
+                                      <p:cBhvr>
+                                        <p:cTn id="29" dur="500"/>
+                                        <p:tgtEl>
+                                          <p:spTgt spid="9"/>
+                                        </p:tgtEl>
+                                      </p:cBhvr>
+                                    </p:animEffect>
+                                  </p:childTnLst>
+                                </p:cTn>
+                              </p:par>
+                              <p:par>
+                                <p:cTn id="30" presetID="10" presetClass="entr" presetSubtype="0" fill="hold" grpId="0" nodeType="withEffect">
+                                  <p:stCondLst>
+                                    <p:cond delay="0"/>
+                                  </p:stCondLst>
+                                  <p:childTnLst>
+                                    <p:set>
+                                      <p:cBhvr>
+                                        <p:cTn id="31" dur="1" fill="hold">
+                                          <p:stCondLst>
+                                            <p:cond delay="0"/>
+                                          </p:stCondLst>
+                                        </p:cTn>
+                                        <p:tgtEl>
+                                          <p:spTgt spid="27"/>
+                                        </p:tgtEl>
+                                        <p:attrNameLst>
+                                          <p:attrName>style.visibility</p:attrName>
+                                        </p:attrNameLst>
+                                      </p:cBhvr>
+                                      <p:to>
+                                        <p:strVal val="visible"/>
+                                      </p:to>
+                                    </p:set>
+                                    <p:animEffect transition="in" filter="fade">
+                                      <p:cBhvr>
+                                        <p:cTn id="32" dur="500"/>
+                                        <p:tgtEl>
+                                          <p:spTgt spid="27"/>
+                                        </p:tgtEl>
+                                      </p:cBhvr>
+                                    </p:animEffect>
+                                  </p:childTnLst>
+                                </p:cTn>
+                              </p:par>
+                            </p:childTnLst>
+                          </p:cTn>
+                        </p:par>
+                      </p:childTnLst>
+                    </p:cTn>
+                  </p:par>
+                  <p:par>
+                    <p:cTn id="33" fill="hold">
+                      <p:stCondLst>
+                        <p:cond delay="indefinite"/>
+                      </p:stCondLst>
+                      <p:childTnLst>
+                        <p:par>
+                          <p:cTn id="34" fill="hold">
+                            <p:stCondLst>
+                              <p:cond delay="0"/>
+                            </p:stCondLst>
+                            <p:childTnLst>
+                              <p:par>
+                                <p:cTn id="35" presetID="10" presetClass="entr" presetSubtype="0" fill="hold" nodeType="clickEffect">
+                                  <p:stCondLst>
+                                    <p:cond delay="0"/>
+                                  </p:stCondLst>
+                                  <p:childTnLst>
+                                    <p:set>
+                                      <p:cBhvr>
+                                        <p:cTn id="36" dur="1" fill="hold">
+                                          <p:stCondLst>
+                                            <p:cond delay="0"/>
+                                          </p:stCondLst>
+                                        </p:cTn>
+                                        <p:tgtEl>
+                                          <p:spTgt spid="17"/>
+                                        </p:tgtEl>
+                                        <p:attrNameLst>
+                                          <p:attrName>style.visibility</p:attrName>
+                                        </p:attrNameLst>
+                                      </p:cBhvr>
+                                      <p:to>
+                                        <p:strVal val="visible"/>
+                                      </p:to>
+                                    </p:set>
+                                    <p:animEffect transition="in" filter="fade">
+                                      <p:cBhvr>
+                                        <p:cTn id="37" dur="500"/>
+                                        <p:tgtEl>
+                                          <p:spTgt spid="17"/>
+                                        </p:tgtEl>
+                                      </p:cBhvr>
+                                    </p:animEffect>
+                                  </p:childTnLst>
+                                </p:cTn>
+                              </p:par>
+                              <p:par>
+                                <p:cTn id="38" presetID="10" presetClass="entr" presetSubtype="0" fill="hold" grpId="0" nodeType="withEffect">
+                                  <p:stCondLst>
+                                    <p:cond delay="0"/>
+                                  </p:stCondLst>
+                                  <p:childTnLst>
+                                    <p:set>
+                                      <p:cBhvr>
+                                        <p:cTn id="39" dur="1" fill="hold">
+                                          <p:stCondLst>
+                                            <p:cond delay="0"/>
+                                          </p:stCondLst>
+                                        </p:cTn>
+                                        <p:tgtEl>
+                                          <p:spTgt spid="28"/>
+                                        </p:tgtEl>
+                                        <p:attrNameLst>
+                                          <p:attrName>style.visibility</p:attrName>
+                                        </p:attrNameLst>
+                                      </p:cBhvr>
+                                      <p:to>
+                                        <p:strVal val="visible"/>
+                                      </p:to>
+                                    </p:set>
+                                    <p:animEffect transition="in" filter="fade">
+                                      <p:cBhvr>
+                                        <p:cTn id="40" dur="500"/>
+                                        <p:tgtEl>
+                                          <p:spTgt spid="28"/>
+                                        </p:tgtEl>
+                                      </p:cBhvr>
+                                    </p:animEffect>
+                                  </p:childTnLst>
+                                </p:cTn>
+                              </p:par>
+                              <p:par>
+                                <p:cTn id="41" presetID="10" presetClass="entr" presetSubtype="0" fill="hold" grpId="0" nodeType="withEffect">
+                                  <p:stCondLst>
+                                    <p:cond delay="0"/>
+                                  </p:stCondLst>
+                                  <p:childTnLst>
+                                    <p:set>
+                                      <p:cBhvr>
+                                        <p:cTn id="42" dur="1" fill="hold">
+                                          <p:stCondLst>
+                                            <p:cond delay="0"/>
+                                          </p:stCondLst>
+                                        </p:cTn>
+                                        <p:tgtEl>
+                                          <p:spTgt spid="11"/>
+                                        </p:tgtEl>
+                                        <p:attrNameLst>
+                                          <p:attrName>style.visibility</p:attrName>
+                                        </p:attrNameLst>
+                                      </p:cBhvr>
+                                      <p:to>
+                                        <p:strVal val="visible"/>
+                                      </p:to>
+                                    </p:set>
+                                    <p:animEffect transition="in" filter="fade">
+                                      <p:cBhvr>
+                                        <p:cTn id="43" dur="500"/>
+                                        <p:tgtEl>
+                                          <p:spTgt spid="11"/>
+                                        </p:tgtEl>
+                                      </p:cBhvr>
+                                    </p:animEffect>
+                                  </p:childTnLst>
+                                </p:cTn>
+                              </p:par>
+                            </p:childTnLst>
+                          </p:cTn>
+                        </p:par>
+                      </p:childTnLst>
+                    </p:cTn>
+                  </p:par>
+                  <p:par>
+                    <p:cTn id="44" fill="hold">
+                      <p:stCondLst>
+                        <p:cond delay="indefinite"/>
+                      </p:stCondLst>
+                      <p:childTnLst>
+                        <p:par>
+                          <p:cTn id="45" fill="hold">
+                            <p:stCondLst>
+                              <p:cond delay="0"/>
+                            </p:stCondLst>
+                            <p:childTnLst>
+                              <p:par>
+                                <p:cTn id="46" presetID="10" presetClass="entr" presetSubtype="0" fill="hold" nodeType="clickEffect">
+                                  <p:stCondLst>
+                                    <p:cond delay="0"/>
+                                  </p:stCondLst>
+                                  <p:childTnLst>
+                                    <p:set>
+                                      <p:cBhvr>
+                                        <p:cTn id="47" dur="1" fill="hold">
+                                          <p:stCondLst>
+                                            <p:cond delay="0"/>
+                                          </p:stCondLst>
+                                        </p:cTn>
+                                        <p:tgtEl>
+                                          <p:spTgt spid="22"/>
+                                        </p:tgtEl>
+                                        <p:attrNameLst>
+                                          <p:attrName>style.visibility</p:attrName>
+                                        </p:attrNameLst>
+                                      </p:cBhvr>
+                                      <p:to>
+                                        <p:strVal val="visible"/>
+                                      </p:to>
+                                    </p:set>
+                                    <p:animEffect transition="in" filter="fade">
+                                      <p:cBhvr>
+                                        <p:cTn id="48" dur="500"/>
+                                        <p:tgtEl>
+                                          <p:spTgt spid="22"/>
+                                        </p:tgtEl>
+                                      </p:cBhvr>
+                                    </p:animEffect>
+                                  </p:childTnLst>
+                                </p:cTn>
+                              </p:par>
+                              <p:par>
+                                <p:cTn id="49" presetID="10" presetClass="entr" presetSubtype="0" fill="hold" grpId="0" nodeType="withEffect">
+                                  <p:stCondLst>
+                                    <p:cond delay="0"/>
+                                  </p:stCondLst>
+                                  <p:childTnLst>
+                                    <p:set>
+                                      <p:cBhvr>
+                                        <p:cTn id="50" dur="1" fill="hold">
+                                          <p:stCondLst>
+                                            <p:cond delay="0"/>
+                                          </p:stCondLst>
+                                        </p:cTn>
+                                        <p:tgtEl>
+                                          <p:spTgt spid="12"/>
+                                        </p:tgtEl>
+                                        <p:attrNameLst>
+                                          <p:attrName>style.visibility</p:attrName>
+                                        </p:attrNameLst>
+                                      </p:cBhvr>
+                                      <p:to>
+                                        <p:strVal val="visible"/>
+                                      </p:to>
+                                    </p:set>
+                                    <p:animEffect transition="in" filter="fade">
+                                      <p:cBhvr>
+                                        <p:cTn id="51" dur="500"/>
+                                        <p:tgtEl>
+                                          <p:spTgt spid="12"/>
+                                        </p:tgtEl>
+                                      </p:cBhvr>
+                                    </p:animEffect>
+                                  </p:childTnLst>
+                                </p:cTn>
+                              </p:par>
+                              <p:par>
+                                <p:cTn id="52" presetID="10" presetClass="entr" presetSubtype="0" fill="hold" grpId="0" nodeType="withEffect">
+                                  <p:stCondLst>
+                                    <p:cond delay="0"/>
+                                  </p:stCondLst>
+                                  <p:childTnLst>
+                                    <p:set>
+                                      <p:cBhvr>
+                                        <p:cTn id="53" dur="1" fill="hold">
+                                          <p:stCondLst>
+                                            <p:cond delay="0"/>
+                                          </p:stCondLst>
+                                        </p:cTn>
+                                        <p:tgtEl>
+                                          <p:spTgt spid="29"/>
+                                        </p:tgtEl>
+                                        <p:attrNameLst>
+                                          <p:attrName>style.visibility</p:attrName>
+                                        </p:attrNameLst>
+                                      </p:cBhvr>
+                                      <p:to>
+                                        <p:strVal val="visible"/>
+                                      </p:to>
+                                    </p:set>
+                                    <p:animEffect transition="in" filter="fade">
+                                      <p:cBhvr>
+                                        <p:cTn id="54" dur="500"/>
+                                        <p:tgtEl>
+                                          <p:spTgt spid="29"/>
+                                        </p:tgtEl>
+                                      </p:cBhvr>
+                                    </p:animEffect>
+                                  </p:childTnLst>
+                                </p:cTn>
+                              </p:par>
+                            </p:childTnLst>
+                          </p:cTn>
+                        </p:par>
+                      </p:childTnLst>
+                    </p:cTn>
+                  </p:par>
+                </p:childTnLst>
+              </p:cTn>
+              <p:prevCondLst>
+                <p:cond evt="onPrev" delay="0">
+                  <p:tgtEl>
+                    <p:sldTgt/>
+                  </p:tgtEl>
+                </p:cond>
+              </p:prevCondLst>
+              <p:nextCondLst>
+                <p:cond evt="onNext" delay="0">
+                  <p:tgtEl>
+                    <p:sldTgt/>
+                  </p:tgtEl>
+                </p:cond>
+              </p:nextCondLst>
+            </p:seq>
+          </p:childTnLst>
+        </p:cTn>
+      </p:par>
+    </p:tnLst>
+    <p:bldLst>
+      <p:bldP spid="6" grpId="0" animBg="1"/>
+      <p:bldP spid="8" grpId="0" animBg="1"/>
+      <p:bldP spid="9" grpId="0" animBg="1"/>
+      <p:bldP spid="11" grpId="0" animBg="1"/>
+      <p:bldP spid="12" grpId="0" animBg="1"/>
+      <p:bldP spid="25" grpId="0"/>
+      <p:bldP spid="26" grpId="0"/>
+      <p:bldP spid="27" grpId="0"/>
+      <p:bldP spid="28" grpId="0"/>
+      <p:bldP spid="29" grpId="0"/>
+    </p:bldLst>
+  </p:timing>
 </p:sld>
 </file>
 
@@ -15035,8 +18254,8 @@
           <a:lstStyle/>
           <a:p>
             <a:pPr marL="285750" indent="-285750">
-              <a:buFont typeface="Arial" panose="020B0604020202020204" pitchFamily="34" charset="0"/>
-              <a:buChar char="•"/>
+              <a:buFont typeface="Wingdings" panose="05000000000000000000" pitchFamily="2" charset="2"/>
+              <a:buChar char="q"/>
             </a:pPr>
             <a:r>
               <a:rPr lang="sk-SK" dirty="0"/>
@@ -15045,15 +18264,15 @@
           </a:p>
           <a:p>
             <a:pPr marL="285750" indent="-285750">
-              <a:buFont typeface="Arial" panose="020B0604020202020204" pitchFamily="34" charset="0"/>
-              <a:buChar char="•"/>
+              <a:buFont typeface="Wingdings" panose="05000000000000000000" pitchFamily="2" charset="2"/>
+              <a:buChar char="q"/>
             </a:pPr>
             <a:endParaRPr lang="sk-SK" dirty="0"/>
           </a:p>
           <a:p>
             <a:pPr marL="285750" indent="-285750">
-              <a:buFont typeface="Arial" panose="020B0604020202020204" pitchFamily="34" charset="0"/>
-              <a:buChar char="•"/>
+              <a:buFont typeface="Wingdings" panose="05000000000000000000" pitchFamily="2" charset="2"/>
+              <a:buChar char="q"/>
             </a:pPr>
             <a:r>
               <a:rPr lang="sk-SK" dirty="0"/>
@@ -15067,12 +18286,16 @@
             </a:r>
           </a:p>
           <a:p>
+            <a:pPr marL="285750" indent="-285750">
+              <a:buFont typeface="Wingdings" panose="05000000000000000000" pitchFamily="2" charset="2"/>
+              <a:buChar char="q"/>
+            </a:pPr>
             <a:endParaRPr lang="sk-SK" dirty="0"/>
           </a:p>
           <a:p>
             <a:pPr marL="285750" indent="-285750">
-              <a:buFont typeface="Arial" panose="020B0604020202020204" pitchFamily="34" charset="0"/>
-              <a:buChar char="•"/>
+              <a:buFont typeface="Wingdings" panose="05000000000000000000" pitchFamily="2" charset="2"/>
+              <a:buChar char="q"/>
             </a:pPr>
             <a:r>
               <a:rPr lang="sk-SK" dirty="0"/>
@@ -15355,6 +18578,74 @@
                 <a:hlinkClick r:id="rId3"/>
               </a:rPr>
               <a:t>www.businessofapps.com/data/duolingo-statistics </a:t>
+            </a:r>
+            <a:endParaRPr lang="sk-SK" dirty="0"/>
+          </a:p>
+        </p:txBody>
+      </p:sp>
+      <p:pic>
+        <p:nvPicPr>
+          <p:cNvPr id="11" name="Obrázok 10">
+            <a:extLst>
+              <a:ext uri="{FF2B5EF4-FFF2-40B4-BE49-F238E27FC236}">
+                <a16:creationId xmlns:a16="http://schemas.microsoft.com/office/drawing/2014/main" id="{B1FB303F-B7F7-40B4-819D-326DB724C83E}"/>
+              </a:ext>
+            </a:extLst>
+          </p:cNvPr>
+          <p:cNvPicPr>
+            <a:picLocks noChangeAspect="1"/>
+          </p:cNvPicPr>
+          <p:nvPr/>
+        </p:nvPicPr>
+        <p:blipFill>
+          <a:blip r:embed="rId4"/>
+          <a:stretch>
+            <a:fillRect/>
+          </a:stretch>
+        </p:blipFill>
+        <p:spPr>
+          <a:xfrm>
+            <a:off x="1586600" y="4128117"/>
+            <a:ext cx="2181225" cy="1857375"/>
+          </a:xfrm>
+          <a:prstGeom prst="rect">
+            <a:avLst/>
+          </a:prstGeom>
+        </p:spPr>
+      </p:pic>
+      <p:sp>
+        <p:nvSpPr>
+          <p:cNvPr id="15" name="BlokTextu 14">
+            <a:extLst>
+              <a:ext uri="{FF2B5EF4-FFF2-40B4-BE49-F238E27FC236}">
+                <a16:creationId xmlns:a16="http://schemas.microsoft.com/office/drawing/2014/main" id="{D400B8F8-06AC-4BCE-8E60-DCAB06B576E1}"/>
+              </a:ext>
+            </a:extLst>
+          </p:cNvPr>
+          <p:cNvSpPr txBox="1"/>
+          <p:nvPr/>
+        </p:nvSpPr>
+        <p:spPr>
+          <a:xfrm>
+            <a:off x="1691942" y="5971327"/>
+            <a:ext cx="2320765" cy="369332"/>
+          </a:xfrm>
+          <a:prstGeom prst="rect">
+            <a:avLst/>
+          </a:prstGeom>
+          <a:noFill/>
+        </p:spPr>
+        <p:txBody>
+          <a:bodyPr wrap="square" rtlCol="0">
+            <a:spAutoFit/>
+          </a:bodyPr>
+          <a:lstStyle/>
+          <a:p>
+            <a:r>
+              <a:rPr lang="sk-SK" dirty="0">
+                <a:hlinkClick r:id="rId5"/>
+              </a:rPr>
+              <a:t>www.duolingo.com</a:t>
             </a:r>
             <a:endParaRPr lang="sk-SK" dirty="0"/>
           </a:p>
@@ -15560,8 +18851,8 @@
           <a:lstStyle/>
           <a:p>
             <a:pPr marL="285750" indent="-285750">
-              <a:buFont typeface="Arial" panose="020B0604020202020204" pitchFamily="34" charset="0"/>
-              <a:buChar char="•"/>
+              <a:buFont typeface="Wingdings" panose="05000000000000000000" pitchFamily="2" charset="2"/>
+              <a:buChar char="q"/>
             </a:pPr>
             <a:r>
               <a:rPr lang="sk-SK" dirty="0"/>
@@ -15570,15 +18861,15 @@
           </a:p>
           <a:p>
             <a:pPr marL="285750" indent="-285750">
-              <a:buFont typeface="Arial" panose="020B0604020202020204" pitchFamily="34" charset="0"/>
-              <a:buChar char="•"/>
+              <a:buFont typeface="Wingdings" panose="05000000000000000000" pitchFamily="2" charset="2"/>
+              <a:buChar char="q"/>
             </a:pPr>
             <a:endParaRPr lang="sk-SK" dirty="0"/>
           </a:p>
           <a:p>
             <a:pPr marL="285750" indent="-285750">
-              <a:buFont typeface="Arial" panose="020B0604020202020204" pitchFamily="34" charset="0"/>
-              <a:buChar char="•"/>
+              <a:buFont typeface="Wingdings" panose="05000000000000000000" pitchFamily="2" charset="2"/>
+              <a:buChar char="q"/>
             </a:pPr>
             <a:r>
               <a:rPr lang="sk-SK" dirty="0"/>
@@ -15626,7 +18917,7 @@
             </a:pPr>
             <a:r>
               <a:rPr lang="sk-SK" dirty="0"/>
-              <a:t>Možnosť bezplatného hovoru,</a:t>
+              <a:t>Možnosť bezplatného hovoru</a:t>
             </a:r>
           </a:p>
           <a:p>
@@ -15643,7 +18934,7 @@
             </a:pPr>
             <a:r>
               <a:rPr lang="sk-SK" dirty="0"/>
-              <a:t> automatické prekladanie konverzácie, čo zabezpečuje plynulosť  konverzácie,</a:t>
+              <a:t> automatické prekladanie konverzácie, čo zabezpečuje plynulosť  konverzácie</a:t>
             </a:r>
           </a:p>
           <a:p>
@@ -15660,7 +18951,7 @@
             </a:pPr>
             <a:r>
               <a:rPr lang="sk-SK" dirty="0"/>
-              <a:t> omoc pri výslovnosti pri jazykoch, ktoré nepoužívajú latinskú abecedu.</a:t>
+              <a:t> omoc pri výslovnosti pri jazykoch, ktoré nepoužívajú latinskú abecedu</a:t>
             </a:r>
           </a:p>
           <a:p>
@@ -16006,6 +19297,382 @@
           </p:txBody>
         </p:sp>
       </p:grpSp>
+      <p:pic>
+        <p:nvPicPr>
+          <p:cNvPr id="6" name="Obrázok 5" descr="Obrázok, na ktorom je text&#10;&#10;Automaticky generovaný popis">
+            <a:extLst>
+              <a:ext uri="{FF2B5EF4-FFF2-40B4-BE49-F238E27FC236}">
+                <a16:creationId xmlns:a16="http://schemas.microsoft.com/office/drawing/2014/main" id="{8E602D7E-70F9-42C8-AE57-70CD4263DB06}"/>
+              </a:ext>
+            </a:extLst>
+          </p:cNvPr>
+          <p:cNvPicPr>
+            <a:picLocks noChangeAspect="1"/>
+          </p:cNvPicPr>
+          <p:nvPr/>
+        </p:nvPicPr>
+        <p:blipFill>
+          <a:blip r:embed="rId2">
+            <a:extLst>
+              <a:ext uri="{28A0092B-C50C-407E-A947-70E740481C1C}">
+                <a14:useLocalDpi xmlns:a14="http://schemas.microsoft.com/office/drawing/2010/main" val="0"/>
+              </a:ext>
+            </a:extLst>
+          </a:blip>
+          <a:stretch>
+            <a:fillRect/>
+          </a:stretch>
+        </p:blipFill>
+        <p:spPr>
+          <a:xfrm>
+            <a:off x="8857838" y="1231854"/>
+            <a:ext cx="2876951" cy="2705478"/>
+          </a:xfrm>
+          <a:prstGeom prst="roundRect">
+            <a:avLst>
+              <a:gd name="adj" fmla="val 16667"/>
+            </a:avLst>
+          </a:prstGeom>
+          <a:ln>
+            <a:noFill/>
+          </a:ln>
+          <a:effectLst>
+            <a:outerShdw blurRad="76200" dist="38100" dir="7800000" algn="tl" rotWithShape="0">
+              <a:srgbClr val="000000">
+                <a:alpha val="40000"/>
+              </a:srgbClr>
+            </a:outerShdw>
+          </a:effectLst>
+          <a:scene3d>
+            <a:camera prst="orthographicFront"/>
+            <a:lightRig rig="contrasting" dir="t">
+              <a:rot lat="0" lon="0" rev="4200000"/>
+            </a:lightRig>
+          </a:scene3d>
+          <a:sp3d prstMaterial="plastic">
+            <a:bevelT w="381000" h="114300" prst="relaxedInset"/>
+            <a:contourClr>
+              <a:srgbClr val="969696"/>
+            </a:contourClr>
+          </a:sp3d>
+        </p:spPr>
+      </p:pic>
+      <p:sp>
+        <p:nvSpPr>
+          <p:cNvPr id="8" name="BlokTextu 7">
+            <a:extLst>
+              <a:ext uri="{FF2B5EF4-FFF2-40B4-BE49-F238E27FC236}">
+                <a16:creationId xmlns:a16="http://schemas.microsoft.com/office/drawing/2014/main" id="{C5F99D6E-64D8-469E-8A71-B511782741A1}"/>
+              </a:ext>
+            </a:extLst>
+          </p:cNvPr>
+          <p:cNvSpPr txBox="1"/>
+          <p:nvPr/>
+        </p:nvSpPr>
+        <p:spPr>
+          <a:xfrm>
+            <a:off x="1047565" y="1438183"/>
+            <a:ext cx="5264458" cy="923330"/>
+          </a:xfrm>
+          <a:prstGeom prst="rect">
+            <a:avLst/>
+          </a:prstGeom>
+          <a:noFill/>
+        </p:spPr>
+        <p:txBody>
+          <a:bodyPr wrap="square" rtlCol="0">
+            <a:spAutoFit/>
+          </a:bodyPr>
+          <a:lstStyle/>
+          <a:p>
+            <a:pPr marL="285750" indent="-285750">
+              <a:buFont typeface="Wingdings" panose="05000000000000000000" pitchFamily="2" charset="2"/>
+              <a:buChar char="q"/>
+            </a:pPr>
+            <a:r>
+              <a:rPr lang="sk-SK" dirty="0"/>
+              <a:t>Rozhovor medzi dvomi Tandem partnermi</a:t>
+            </a:r>
+          </a:p>
+          <a:p>
+            <a:pPr marL="285750" indent="-285750">
+              <a:buFont typeface="Wingdings" panose="05000000000000000000" pitchFamily="2" charset="2"/>
+              <a:buChar char="q"/>
+            </a:pPr>
+            <a:endParaRPr lang="sk-SK" dirty="0"/>
+          </a:p>
+          <a:p>
+            <a:pPr marL="285750" indent="-285750">
+              <a:buFont typeface="Wingdings" panose="05000000000000000000" pitchFamily="2" charset="2"/>
+              <a:buChar char="q"/>
+            </a:pPr>
+            <a:r>
+              <a:rPr lang="sk-SK" dirty="0"/>
+              <a:t>Posudzovanie nových užívateľov</a:t>
+            </a:r>
+          </a:p>
+        </p:txBody>
+      </p:sp>
+      <p:sp>
+        <p:nvSpPr>
+          <p:cNvPr id="9" name="BlokTextu 8">
+            <a:extLst>
+              <a:ext uri="{FF2B5EF4-FFF2-40B4-BE49-F238E27FC236}">
+                <a16:creationId xmlns:a16="http://schemas.microsoft.com/office/drawing/2014/main" id="{2E33011F-7151-4E3A-A80F-E6E0697A5696}"/>
+              </a:ext>
+            </a:extLst>
+          </p:cNvPr>
+          <p:cNvSpPr txBox="1"/>
+          <p:nvPr/>
+        </p:nvSpPr>
+        <p:spPr>
+          <a:xfrm>
+            <a:off x="334391" y="3697354"/>
+            <a:ext cx="5433134" cy="2862322"/>
+          </a:xfrm>
+          <a:prstGeom prst="rect">
+            <a:avLst/>
+          </a:prstGeom>
+          <a:noFill/>
+          <a:ln>
+            <a:solidFill>
+              <a:srgbClr val="00B050"/>
+            </a:solidFill>
+          </a:ln>
+        </p:spPr>
+        <p:txBody>
+          <a:bodyPr wrap="square">
+            <a:spAutoFit/>
+          </a:bodyPr>
+          <a:lstStyle/>
+          <a:p>
+            <a:pPr marL="285750" indent="-285750">
+              <a:buFont typeface="Arial" panose="020B0604020202020204" pitchFamily="34" charset="0"/>
+              <a:buChar char="•"/>
+            </a:pPr>
+            <a:r>
+              <a:rPr lang="sk-SK" dirty="0"/>
+              <a:t>Tandem partner sa dá vybrať podľa záujmov uvedených v profile</a:t>
+            </a:r>
+          </a:p>
+          <a:p>
+            <a:pPr marL="285750" indent="-285750">
+              <a:buFont typeface="Arial" panose="020B0604020202020204" pitchFamily="34" charset="0"/>
+              <a:buChar char="•"/>
+            </a:pPr>
+            <a:endParaRPr lang="sk-SK" dirty="0"/>
+          </a:p>
+          <a:p>
+            <a:pPr marL="285750" indent="-285750">
+              <a:buFont typeface="Arial" panose="020B0604020202020204" pitchFamily="34" charset="0"/>
+              <a:buChar char="•"/>
+            </a:pPr>
+            <a:r>
+              <a:rPr lang="sk-SK" dirty="0"/>
+              <a:t> Tandem partneri si vedia navzájom opravovať gramatiku,</a:t>
+            </a:r>
+          </a:p>
+          <a:p>
+            <a:pPr marL="285750" indent="-285750">
+              <a:buFont typeface="Arial" panose="020B0604020202020204" pitchFamily="34" charset="0"/>
+              <a:buChar char="•"/>
+            </a:pPr>
+            <a:endParaRPr lang="sk-SK" dirty="0"/>
+          </a:p>
+          <a:p>
+            <a:pPr marL="285750" indent="-285750">
+              <a:buFont typeface="Arial" panose="020B0604020202020204" pitchFamily="34" charset="0"/>
+              <a:buChar char="•"/>
+            </a:pPr>
+            <a:r>
+              <a:rPr lang="sk-SK" dirty="0"/>
+              <a:t> </a:t>
+            </a:r>
+            <a:r>
+              <a:rPr lang="sk-SK" dirty="0" err="1"/>
+              <a:t>Videochat</a:t>
+            </a:r>
+            <a:r>
+              <a:rPr lang="sk-SK" dirty="0"/>
+              <a:t> a audio-správy</a:t>
+            </a:r>
+          </a:p>
+          <a:p>
+            <a:pPr marL="285750" indent="-285750">
+              <a:buFont typeface="Arial" panose="020B0604020202020204" pitchFamily="34" charset="0"/>
+              <a:buChar char="•"/>
+            </a:pPr>
+            <a:endParaRPr lang="sk-SK" dirty="0"/>
+          </a:p>
+          <a:p>
+            <a:pPr marL="285750" indent="-285750">
+              <a:buFont typeface="Arial" panose="020B0604020202020204" pitchFamily="34" charset="0"/>
+              <a:buChar char="•"/>
+            </a:pPr>
+            <a:r>
+              <a:rPr lang="pl-PL" dirty="0"/>
+              <a:t>Uživatelia vedia filtrovať kto ich profil vidí (prerušiť kontakt)</a:t>
+            </a:r>
+            <a:endParaRPr lang="sk-SK" dirty="0"/>
+          </a:p>
+        </p:txBody>
+      </p:sp>
+      <p:sp>
+        <p:nvSpPr>
+          <p:cNvPr id="10" name="BlokTextu 9">
+            <a:extLst>
+              <a:ext uri="{FF2B5EF4-FFF2-40B4-BE49-F238E27FC236}">
+                <a16:creationId xmlns:a16="http://schemas.microsoft.com/office/drawing/2014/main" id="{AF4455E2-CA42-48ED-AF93-AD0A2F1BFFD0}"/>
+              </a:ext>
+            </a:extLst>
+          </p:cNvPr>
+          <p:cNvSpPr txBox="1"/>
+          <p:nvPr/>
+        </p:nvSpPr>
+        <p:spPr>
+          <a:xfrm>
+            <a:off x="6505255" y="4698997"/>
+            <a:ext cx="5131294" cy="1754326"/>
+          </a:xfrm>
+          <a:prstGeom prst="rect">
+            <a:avLst/>
+          </a:prstGeom>
+          <a:noFill/>
+          <a:ln>
+            <a:solidFill>
+              <a:srgbClr val="FF0000"/>
+            </a:solidFill>
+          </a:ln>
+        </p:spPr>
+        <p:txBody>
+          <a:bodyPr wrap="square" rtlCol="0">
+            <a:spAutoFit/>
+          </a:bodyPr>
+          <a:lstStyle/>
+          <a:p>
+            <a:pPr marL="285750" indent="-285750">
+              <a:buFont typeface="Arial" panose="020B0604020202020204" pitchFamily="34" charset="0"/>
+              <a:buChar char="•"/>
+            </a:pPr>
+            <a:r>
+              <a:rPr lang="sk-SK" dirty="0"/>
+              <a:t>Treba mať základné znalosti jazyka (alebo využiť učiteľov)</a:t>
+            </a:r>
+          </a:p>
+          <a:p>
+            <a:pPr marL="285750" indent="-285750">
+              <a:buFont typeface="Arial" panose="020B0604020202020204" pitchFamily="34" charset="0"/>
+              <a:buChar char="•"/>
+            </a:pPr>
+            <a:endParaRPr lang="sk-SK" dirty="0"/>
+          </a:p>
+          <a:p>
+            <a:pPr marL="285750" indent="-285750">
+              <a:buFont typeface="Arial" panose="020B0604020202020204" pitchFamily="34" charset="0"/>
+              <a:buChar char="•"/>
+            </a:pPr>
+            <a:r>
+              <a:rPr lang="pl-PL" dirty="0"/>
+              <a:t>Veľa ľudí využíva aplikáciu ako zoznamku</a:t>
+            </a:r>
+          </a:p>
+          <a:p>
+            <a:pPr marL="285750" indent="-285750">
+              <a:buFont typeface="Arial" panose="020B0604020202020204" pitchFamily="34" charset="0"/>
+              <a:buChar char="•"/>
+            </a:pPr>
+            <a:endParaRPr lang="pl-PL" dirty="0"/>
+          </a:p>
+          <a:p>
+            <a:pPr marL="285750" indent="-285750">
+              <a:buFont typeface="Arial" panose="020B0604020202020204" pitchFamily="34" charset="0"/>
+              <a:buChar char="•"/>
+            </a:pPr>
+            <a:r>
+              <a:rPr lang="sk-SK" dirty="0"/>
+              <a:t>Proces posudzovania trvá niekedy dlho</a:t>
+            </a:r>
+          </a:p>
+        </p:txBody>
+      </p:sp>
+      <p:sp>
+        <p:nvSpPr>
+          <p:cNvPr id="11" name="BlokTextu 10">
+            <a:extLst>
+              <a:ext uri="{FF2B5EF4-FFF2-40B4-BE49-F238E27FC236}">
+                <a16:creationId xmlns:a16="http://schemas.microsoft.com/office/drawing/2014/main" id="{7CC413C9-7687-4F52-AC43-5548713BAF95}"/>
+              </a:ext>
+            </a:extLst>
+          </p:cNvPr>
+          <p:cNvSpPr txBox="1"/>
+          <p:nvPr/>
+        </p:nvSpPr>
+        <p:spPr>
+          <a:xfrm>
+            <a:off x="2521258" y="3301585"/>
+            <a:ext cx="1518082" cy="369332"/>
+          </a:xfrm>
+          <a:prstGeom prst="rect">
+            <a:avLst/>
+          </a:prstGeom>
+          <a:noFill/>
+        </p:spPr>
+        <p:txBody>
+          <a:bodyPr wrap="square" rtlCol="0">
+            <a:spAutoFit/>
+          </a:bodyPr>
+          <a:lstStyle/>
+          <a:p>
+            <a:r>
+              <a:rPr lang="sk-SK" dirty="0">
+                <a:solidFill>
+                  <a:srgbClr val="00B050"/>
+                </a:solidFill>
+              </a:rPr>
+              <a:t>Výhody</a:t>
+            </a:r>
+          </a:p>
+        </p:txBody>
+      </p:sp>
+      <p:sp>
+        <p:nvSpPr>
+          <p:cNvPr id="12" name="BlokTextu 11">
+            <a:extLst>
+              <a:ext uri="{FF2B5EF4-FFF2-40B4-BE49-F238E27FC236}">
+                <a16:creationId xmlns:a16="http://schemas.microsoft.com/office/drawing/2014/main" id="{57CF97D0-C92F-4D48-8F5C-29B69F23E941}"/>
+              </a:ext>
+            </a:extLst>
+          </p:cNvPr>
+          <p:cNvSpPr txBox="1"/>
+          <p:nvPr/>
+        </p:nvSpPr>
+        <p:spPr>
+          <a:xfrm>
+            <a:off x="8448875" y="4185324"/>
+            <a:ext cx="1518082" cy="369332"/>
+          </a:xfrm>
+          <a:prstGeom prst="rect">
+            <a:avLst/>
+          </a:prstGeom>
+          <a:noFill/>
+        </p:spPr>
+        <p:txBody>
+          <a:bodyPr wrap="square" rtlCol="0">
+            <a:spAutoFit/>
+          </a:bodyPr>
+          <a:lstStyle/>
+          <a:p>
+            <a:r>
+              <a:rPr lang="sk-SK" dirty="0">
+                <a:solidFill>
+                  <a:srgbClr val="FF0000"/>
+                </a:solidFill>
+              </a:rPr>
+              <a:t>Nevýhody</a:t>
+            </a:r>
+          </a:p>
+        </p:txBody>
+      </p:sp>
     </p:spTree>
     <p:extLst>
       <p:ext uri="{BB962C8B-B14F-4D97-AF65-F5344CB8AC3E}">

</xml_diff>

<commit_message>
dorabanie 3.1 prezentacia a zdroj v exceli tabulka
</commit_message>
<xml_diff>
--- a/Prezentacia_clanok.pptx
+++ b/Prezentacia_clanok.pptx
@@ -17,6 +17,8 @@
     <p:sldId id="265" r:id="rId11"/>
     <p:sldId id="266" r:id="rId12"/>
     <p:sldId id="267" r:id="rId13"/>
+    <p:sldId id="268" r:id="rId14"/>
+    <p:sldId id="269" r:id="rId15"/>
   </p:sldIdLst>
   <p:sldSz cx="12192000" cy="6858000"/>
   <p:notesSz cx="6858000" cy="9144000"/>
@@ -2132,10 +2134,18 @@
         <a:lstStyle/>
         <a:p>
           <a:r>
-            <a:rPr lang="sk-SK"/>
-            <a:t>3.1   Vplyv Duolinga na slovnú zásobu</a:t>
+            <a:rPr lang="sk-SK" dirty="0"/>
+            <a:t>3.1   Vplyv </a:t>
           </a:r>
-          <a:endParaRPr lang="en-US"/>
+          <a:r>
+            <a:rPr lang="sk-SK" dirty="0" err="1"/>
+            <a:t>Duolinga</a:t>
+          </a:r>
+          <a:r>
+            <a:rPr lang="sk-SK" dirty="0"/>
+            <a:t> na slovnú zásobu</a:t>
+          </a:r>
+          <a:endParaRPr lang="en-US" dirty="0"/>
         </a:p>
       </dgm:t>
     </dgm:pt>
@@ -2796,10 +2806,18 @@
             <a:buChar char="•"/>
           </a:pPr>
           <a:r>
-            <a:rPr lang="sk-SK" sz="1800" kern="1200"/>
-            <a:t>3.1   Vplyv Duolinga na slovnú zásobu</a:t>
+            <a:rPr lang="sk-SK" sz="1800" kern="1200" dirty="0"/>
+            <a:t>3.1   Vplyv </a:t>
           </a:r>
-          <a:endParaRPr lang="en-US" sz="1800" kern="1200"/>
+          <a:r>
+            <a:rPr lang="sk-SK" sz="1800" kern="1200" dirty="0" err="1"/>
+            <a:t>Duolinga</a:t>
+          </a:r>
+          <a:r>
+            <a:rPr lang="sk-SK" sz="1800" kern="1200" dirty="0"/>
+            <a:t> na slovnú zásobu</a:t>
+          </a:r>
+          <a:endParaRPr lang="en-US" sz="1800" kern="1200" dirty="0"/>
         </a:p>
       </dsp:txBody>
       <dsp:txXfrm>
@@ -11047,10 +11065,2300 @@
           <a:chExt cx="0" cy="0"/>
         </a:xfrm>
       </p:grpSpPr>
+      <p:grpSp>
+        <p:nvGrpSpPr>
+          <p:cNvPr id="4" name="Skupina 3">
+            <a:extLst>
+              <a:ext uri="{FF2B5EF4-FFF2-40B4-BE49-F238E27FC236}">
+                <a16:creationId xmlns:a16="http://schemas.microsoft.com/office/drawing/2014/main" id="{C25239A7-BC6B-4B6A-98EB-2E30F9B7CEA2}"/>
+              </a:ext>
+            </a:extLst>
+          </p:cNvPr>
+          <p:cNvGrpSpPr/>
+          <p:nvPr/>
+        </p:nvGrpSpPr>
+        <p:grpSpPr>
+          <a:xfrm>
+            <a:off x="2962994" y="213002"/>
+            <a:ext cx="6266011" cy="874575"/>
+            <a:chOff x="0" y="3589308"/>
+            <a:chExt cx="6266011" cy="874575"/>
+          </a:xfrm>
+        </p:grpSpPr>
+        <p:sp>
+          <p:nvSpPr>
+            <p:cNvPr id="5" name="Obdĺžnik: zaoblené rohy 4">
+              <a:extLst>
+                <a:ext uri="{FF2B5EF4-FFF2-40B4-BE49-F238E27FC236}">
+                  <a16:creationId xmlns:a16="http://schemas.microsoft.com/office/drawing/2014/main" id="{3A88E234-93CB-4C0E-95A1-31E2FA21DC34}"/>
+                </a:ext>
+              </a:extLst>
+            </p:cNvPr>
+            <p:cNvSpPr/>
+            <p:nvPr/>
+          </p:nvSpPr>
+          <p:spPr>
+            <a:xfrm>
+              <a:off x="0" y="3589308"/>
+              <a:ext cx="6266011" cy="874575"/>
+            </a:xfrm>
+            <a:prstGeom prst="roundRect">
+              <a:avLst/>
+            </a:prstGeom>
+          </p:spPr>
+          <p:style>
+            <a:lnRef idx="0">
+              <a:schemeClr val="lt1">
+                <a:hueOff val="0"/>
+                <a:satOff val="0"/>
+                <a:lumOff val="0"/>
+                <a:alphaOff val="0"/>
+              </a:schemeClr>
+            </a:lnRef>
+            <a:fillRef idx="3">
+              <a:schemeClr val="accent2">
+                <a:hueOff val="20113132"/>
+                <a:satOff val="-656"/>
+                <a:lumOff val="7059"/>
+                <a:alphaOff val="0"/>
+              </a:schemeClr>
+            </a:fillRef>
+            <a:effectRef idx="2">
+              <a:schemeClr val="accent2">
+                <a:hueOff val="20113132"/>
+                <a:satOff val="-656"/>
+                <a:lumOff val="7059"/>
+                <a:alphaOff val="0"/>
+              </a:schemeClr>
+            </a:effectRef>
+            <a:fontRef idx="minor">
+              <a:schemeClr val="lt1"/>
+            </a:fontRef>
+          </p:style>
+        </p:sp>
+        <p:sp>
+          <p:nvSpPr>
+            <p:cNvPr id="6" name="Obdĺžnik: zaoblené rohy 4">
+              <a:extLst>
+                <a:ext uri="{FF2B5EF4-FFF2-40B4-BE49-F238E27FC236}">
+                  <a16:creationId xmlns:a16="http://schemas.microsoft.com/office/drawing/2014/main" id="{7DA9D23C-4076-435E-9CF8-C9BFEACBC362}"/>
+                </a:ext>
+              </a:extLst>
+            </p:cNvPr>
+            <p:cNvSpPr txBox="1"/>
+            <p:nvPr/>
+          </p:nvSpPr>
+          <p:spPr>
+            <a:xfrm>
+              <a:off x="42693" y="3632001"/>
+              <a:ext cx="6180625" cy="789189"/>
+            </a:xfrm>
+            <a:prstGeom prst="rect">
+              <a:avLst/>
+            </a:prstGeom>
+          </p:spPr>
+          <p:style>
+            <a:lnRef idx="0">
+              <a:scrgbClr r="0" g="0" b="0"/>
+            </a:lnRef>
+            <a:fillRef idx="0">
+              <a:scrgbClr r="0" g="0" b="0"/>
+            </a:fillRef>
+            <a:effectRef idx="0">
+              <a:scrgbClr r="0" g="0" b="0"/>
+            </a:effectRef>
+            <a:fontRef idx="minor">
+              <a:schemeClr val="lt1"/>
+            </a:fontRef>
+          </p:style>
+          <p:txBody>
+            <a:bodyPr spcFirstLastPara="0" vert="horz" wrap="square" lIns="87630" tIns="87630" rIns="87630" bIns="87630" numCol="1" spcCol="1270" anchor="ctr" anchorCtr="0">
+              <a:noAutofit/>
+            </a:bodyPr>
+            <a:lstStyle/>
+            <a:p>
+              <a:pPr lvl="0" algn="ctr"/>
+              <a:r>
+                <a:rPr lang="sk-SK" sz="2400" dirty="0"/>
+                <a:t>3.1   Vplyv </a:t>
+              </a:r>
+              <a:r>
+                <a:rPr lang="sk-SK" sz="2400" dirty="0" err="1"/>
+                <a:t>Duolinga</a:t>
+              </a:r>
+              <a:r>
+                <a:rPr lang="sk-SK" sz="2400" dirty="0"/>
+                <a:t> na slovnú zásobu</a:t>
+              </a:r>
+              <a:endParaRPr lang="en-US" sz="2400" dirty="0"/>
+            </a:p>
+          </p:txBody>
+        </p:sp>
+      </p:grpSp>
+      <p:graphicFrame>
+        <p:nvGraphicFramePr>
+          <p:cNvPr id="7" name="Tabuľka 6">
+            <a:extLst>
+              <a:ext uri="{FF2B5EF4-FFF2-40B4-BE49-F238E27FC236}">
+                <a16:creationId xmlns:a16="http://schemas.microsoft.com/office/drawing/2014/main" id="{79F249AA-71C2-471D-A4D8-CC77189FF302}"/>
+              </a:ext>
+            </a:extLst>
+          </p:cNvPr>
+          <p:cNvGraphicFramePr>
+            <a:graphicFrameLocks noGrp="1"/>
+          </p:cNvGraphicFramePr>
+          <p:nvPr>
+            <p:extLst>
+              <p:ext uri="{D42A27DB-BD31-4B8C-83A1-F6EECF244321}">
+                <p14:modId xmlns:p14="http://schemas.microsoft.com/office/powerpoint/2010/main" val="1273050461"/>
+              </p:ext>
+            </p:extLst>
+          </p:nvPr>
+        </p:nvGraphicFramePr>
+        <p:xfrm>
+          <a:off x="2636657" y="2734323"/>
+          <a:ext cx="6549655" cy="3706154"/>
+        </p:xfrm>
+        <a:graphic>
+          <a:graphicData uri="http://schemas.openxmlformats.org/drawingml/2006/table">
+            <a:tbl>
+              <a:tblPr>
+                <a:tableStyleId>{0505E3EF-67EA-436B-97B2-0124C06EBD24}</a:tableStyleId>
+              </a:tblPr>
+              <a:tblGrid>
+                <a:gridCol w="1015481">
+                  <a:extLst>
+                    <a:ext uri="{9D8B030D-6E8A-4147-A177-3AD203B41FA5}">
+                      <a16:colId xmlns:a16="http://schemas.microsoft.com/office/drawing/2014/main" val="3550253638"/>
+                    </a:ext>
+                  </a:extLst>
+                </a:gridCol>
+                <a:gridCol w="2385771">
+                  <a:extLst>
+                    <a:ext uri="{9D8B030D-6E8A-4147-A177-3AD203B41FA5}">
+                      <a16:colId xmlns:a16="http://schemas.microsoft.com/office/drawing/2014/main" val="633144391"/>
+                    </a:ext>
+                  </a:extLst>
+                </a:gridCol>
+                <a:gridCol w="1663923">
+                  <a:extLst>
+                    <a:ext uri="{9D8B030D-6E8A-4147-A177-3AD203B41FA5}">
+                      <a16:colId xmlns:a16="http://schemas.microsoft.com/office/drawing/2014/main" val="141543706"/>
+                    </a:ext>
+                  </a:extLst>
+                </a:gridCol>
+                <a:gridCol w="1484480">
+                  <a:extLst>
+                    <a:ext uri="{9D8B030D-6E8A-4147-A177-3AD203B41FA5}">
+                      <a16:colId xmlns:a16="http://schemas.microsoft.com/office/drawing/2014/main" val="2150532881"/>
+                    </a:ext>
+                  </a:extLst>
+                </a:gridCol>
+              </a:tblGrid>
+              <a:tr h="243100">
+                <a:tc>
+                  <a:txBody>
+                    <a:bodyPr/>
+                    <a:lstStyle/>
+                    <a:p>
+                      <a:pPr algn="ctr" fontAlgn="ctr"/>
+                      <a:r>
+                        <a:rPr lang="sk-SK" sz="1000" u="none" strike="noStrike">
+                          <a:effectLst/>
+                        </a:rPr>
+                        <a:t>Číslo</a:t>
+                      </a:r>
+                      <a:endParaRPr lang="sk-SK" sz="1000" b="1" i="0" u="none" strike="noStrike">
+                        <a:solidFill>
+                          <a:srgbClr val="000000"/>
+                        </a:solidFill>
+                        <a:effectLst/>
+                        <a:latin typeface="Calibri" panose="020F0502020204030204" pitchFamily="34" charset="0"/>
+                      </a:endParaRPr>
+                    </a:p>
+                  </a:txBody>
+                  <a:tcPr marL="8679" marR="8679" marT="8679" marB="0" anchor="ctr"/>
+                </a:tc>
+                <a:tc>
+                  <a:txBody>
+                    <a:bodyPr/>
+                    <a:lstStyle/>
+                    <a:p>
+                      <a:pPr algn="ctr" fontAlgn="ctr"/>
+                      <a:r>
+                        <a:rPr lang="sk-SK" sz="1000" u="none" strike="noStrike">
+                          <a:effectLst/>
+                        </a:rPr>
+                        <a:t>Iniciály študenta</a:t>
+                      </a:r>
+                      <a:endParaRPr lang="sk-SK" sz="1000" b="1" i="0" u="none" strike="noStrike">
+                        <a:solidFill>
+                          <a:srgbClr val="000000"/>
+                        </a:solidFill>
+                        <a:effectLst/>
+                        <a:latin typeface="Calibri" panose="020F0502020204030204" pitchFamily="34" charset="0"/>
+                      </a:endParaRPr>
+                    </a:p>
+                  </a:txBody>
+                  <a:tcPr marL="8679" marR="8679" marT="8679" marB="0" anchor="ctr"/>
+                </a:tc>
+                <a:tc>
+                  <a:txBody>
+                    <a:bodyPr/>
+                    <a:lstStyle/>
+                    <a:p>
+                      <a:pPr algn="ctr" fontAlgn="ctr"/>
+                      <a:r>
+                        <a:rPr lang="sk-SK" sz="1000" u="none" strike="noStrike">
+                          <a:effectLst/>
+                        </a:rPr>
+                        <a:t>Test pred Duolingom</a:t>
+                      </a:r>
+                      <a:endParaRPr lang="sk-SK" sz="1000" b="1" i="0" u="none" strike="noStrike">
+                        <a:solidFill>
+                          <a:srgbClr val="000000"/>
+                        </a:solidFill>
+                        <a:effectLst/>
+                        <a:latin typeface="Calibri" panose="020F0502020204030204" pitchFamily="34" charset="0"/>
+                      </a:endParaRPr>
+                    </a:p>
+                  </a:txBody>
+                  <a:tcPr marL="8679" marR="8679" marT="8679" marB="0" anchor="ctr"/>
+                </a:tc>
+                <a:tc>
+                  <a:txBody>
+                    <a:bodyPr/>
+                    <a:lstStyle/>
+                    <a:p>
+                      <a:pPr algn="ctr" fontAlgn="ctr"/>
+                      <a:r>
+                        <a:rPr lang="sk-SK" sz="1000" u="none" strike="noStrike">
+                          <a:effectLst/>
+                        </a:rPr>
+                        <a:t>Test po Duolingu</a:t>
+                      </a:r>
+                      <a:endParaRPr lang="sk-SK" sz="1000" b="1" i="0" u="none" strike="noStrike">
+                        <a:solidFill>
+                          <a:srgbClr val="000000"/>
+                        </a:solidFill>
+                        <a:effectLst/>
+                        <a:latin typeface="Calibri" panose="020F0502020204030204" pitchFamily="34" charset="0"/>
+                      </a:endParaRPr>
+                    </a:p>
+                  </a:txBody>
+                  <a:tcPr marL="8679" marR="8679" marT="8679" marB="0" anchor="ctr"/>
+                </a:tc>
+                <a:extLst>
+                  <a:ext uri="{0D108BD9-81ED-4DB2-BD59-A6C34878D82A}">
+                    <a16:rowId xmlns:a16="http://schemas.microsoft.com/office/drawing/2014/main" val="1980548252"/>
+                  </a:ext>
+                </a:extLst>
+              </a:tr>
+              <a:tr h="182266">
+                <a:tc>
+                  <a:txBody>
+                    <a:bodyPr/>
+                    <a:lstStyle/>
+                    <a:p>
+                      <a:pPr algn="ctr" fontAlgn="ctr"/>
+                      <a:r>
+                        <a:rPr lang="sk-SK" sz="1000" u="none" strike="noStrike">
+                          <a:effectLst/>
+                        </a:rPr>
+                        <a:t>1</a:t>
+                      </a:r>
+                      <a:endParaRPr lang="sk-SK" sz="1000" b="0" i="0" u="none" strike="noStrike">
+                        <a:solidFill>
+                          <a:srgbClr val="000000"/>
+                        </a:solidFill>
+                        <a:effectLst/>
+                        <a:latin typeface="Calibri" panose="020F0502020204030204" pitchFamily="34" charset="0"/>
+                      </a:endParaRPr>
+                    </a:p>
+                  </a:txBody>
+                  <a:tcPr marL="8679" marR="8679" marT="8679" marB="0" anchor="ctr"/>
+                </a:tc>
+                <a:tc>
+                  <a:txBody>
+                    <a:bodyPr/>
+                    <a:lstStyle/>
+                    <a:p>
+                      <a:pPr algn="ctr" fontAlgn="ctr"/>
+                      <a:r>
+                        <a:rPr lang="sk-SK" sz="1000" u="none" strike="noStrike">
+                          <a:effectLst/>
+                        </a:rPr>
+                        <a:t>TK</a:t>
+                      </a:r>
+                      <a:endParaRPr lang="sk-SK" sz="1000" b="0" i="0" u="none" strike="noStrike">
+                        <a:solidFill>
+                          <a:srgbClr val="000000"/>
+                        </a:solidFill>
+                        <a:effectLst/>
+                        <a:latin typeface="Calibri" panose="020F0502020204030204" pitchFamily="34" charset="0"/>
+                      </a:endParaRPr>
+                    </a:p>
+                  </a:txBody>
+                  <a:tcPr marL="8679" marR="8679" marT="8679" marB="0" anchor="ctr"/>
+                </a:tc>
+                <a:tc>
+                  <a:txBody>
+                    <a:bodyPr/>
+                    <a:lstStyle/>
+                    <a:p>
+                      <a:pPr algn="ctr" fontAlgn="ctr"/>
+                      <a:r>
+                        <a:rPr lang="sk-SK" sz="1000" u="none" strike="noStrike">
+                          <a:effectLst/>
+                        </a:rPr>
+                        <a:t>72</a:t>
+                      </a:r>
+                      <a:endParaRPr lang="sk-SK" sz="1000" b="0" i="0" u="none" strike="noStrike">
+                        <a:solidFill>
+                          <a:srgbClr val="000000"/>
+                        </a:solidFill>
+                        <a:effectLst/>
+                        <a:latin typeface="Calibri" panose="020F0502020204030204" pitchFamily="34" charset="0"/>
+                      </a:endParaRPr>
+                    </a:p>
+                  </a:txBody>
+                  <a:tcPr marL="8679" marR="8679" marT="8679" marB="0" anchor="ctr"/>
+                </a:tc>
+                <a:tc>
+                  <a:txBody>
+                    <a:bodyPr/>
+                    <a:lstStyle/>
+                    <a:p>
+                      <a:pPr algn="ctr" fontAlgn="ctr"/>
+                      <a:r>
+                        <a:rPr lang="sk-SK" sz="1000" u="none" strike="noStrike">
+                          <a:effectLst/>
+                        </a:rPr>
+                        <a:t>72</a:t>
+                      </a:r>
+                      <a:endParaRPr lang="sk-SK" sz="1000" b="0" i="0" u="none" strike="noStrike">
+                        <a:solidFill>
+                          <a:srgbClr val="000000"/>
+                        </a:solidFill>
+                        <a:effectLst/>
+                        <a:latin typeface="Calibri" panose="020F0502020204030204" pitchFamily="34" charset="0"/>
+                      </a:endParaRPr>
+                    </a:p>
+                  </a:txBody>
+                  <a:tcPr marL="8679" marR="8679" marT="8679" marB="0" anchor="ctr"/>
+                </a:tc>
+                <a:extLst>
+                  <a:ext uri="{0D108BD9-81ED-4DB2-BD59-A6C34878D82A}">
+                    <a16:rowId xmlns:a16="http://schemas.microsoft.com/office/drawing/2014/main" val="1407276658"/>
+                  </a:ext>
+                </a:extLst>
+              </a:tr>
+              <a:tr h="182266">
+                <a:tc>
+                  <a:txBody>
+                    <a:bodyPr/>
+                    <a:lstStyle/>
+                    <a:p>
+                      <a:pPr algn="ctr" fontAlgn="ctr"/>
+                      <a:r>
+                        <a:rPr lang="sk-SK" sz="1000" u="none" strike="noStrike">
+                          <a:effectLst/>
+                        </a:rPr>
+                        <a:t>2</a:t>
+                      </a:r>
+                      <a:endParaRPr lang="sk-SK" sz="1000" b="0" i="0" u="none" strike="noStrike">
+                        <a:solidFill>
+                          <a:srgbClr val="000000"/>
+                        </a:solidFill>
+                        <a:effectLst/>
+                        <a:latin typeface="Calibri" panose="020F0502020204030204" pitchFamily="34" charset="0"/>
+                      </a:endParaRPr>
+                    </a:p>
+                  </a:txBody>
+                  <a:tcPr marL="8679" marR="8679" marT="8679" marB="0" anchor="ctr"/>
+                </a:tc>
+                <a:tc>
+                  <a:txBody>
+                    <a:bodyPr/>
+                    <a:lstStyle/>
+                    <a:p>
+                      <a:pPr algn="ctr" fontAlgn="ctr"/>
+                      <a:r>
+                        <a:rPr lang="sk-SK" sz="1000" u="none" strike="noStrike">
+                          <a:effectLst/>
+                        </a:rPr>
+                        <a:t>AZ</a:t>
+                      </a:r>
+                      <a:endParaRPr lang="sk-SK" sz="1000" b="0" i="0" u="none" strike="noStrike">
+                        <a:solidFill>
+                          <a:srgbClr val="000000"/>
+                        </a:solidFill>
+                        <a:effectLst/>
+                        <a:latin typeface="Calibri" panose="020F0502020204030204" pitchFamily="34" charset="0"/>
+                      </a:endParaRPr>
+                    </a:p>
+                  </a:txBody>
+                  <a:tcPr marL="8679" marR="8679" marT="8679" marB="0" anchor="ctr"/>
+                </a:tc>
+                <a:tc>
+                  <a:txBody>
+                    <a:bodyPr/>
+                    <a:lstStyle/>
+                    <a:p>
+                      <a:pPr algn="ctr" fontAlgn="ctr"/>
+                      <a:r>
+                        <a:rPr lang="sk-SK" sz="1000" u="none" strike="noStrike">
+                          <a:effectLst/>
+                        </a:rPr>
+                        <a:t>72</a:t>
+                      </a:r>
+                      <a:endParaRPr lang="sk-SK" sz="1000" b="0" i="0" u="none" strike="noStrike">
+                        <a:solidFill>
+                          <a:srgbClr val="000000"/>
+                        </a:solidFill>
+                        <a:effectLst/>
+                        <a:latin typeface="Calibri" panose="020F0502020204030204" pitchFamily="34" charset="0"/>
+                      </a:endParaRPr>
+                    </a:p>
+                  </a:txBody>
+                  <a:tcPr marL="8679" marR="8679" marT="8679" marB="0" anchor="ctr"/>
+                </a:tc>
+                <a:tc>
+                  <a:txBody>
+                    <a:bodyPr/>
+                    <a:lstStyle/>
+                    <a:p>
+                      <a:pPr algn="ctr" fontAlgn="ctr"/>
+                      <a:r>
+                        <a:rPr lang="sk-SK" sz="1000" u="none" strike="noStrike">
+                          <a:effectLst/>
+                        </a:rPr>
+                        <a:t>76</a:t>
+                      </a:r>
+                      <a:endParaRPr lang="sk-SK" sz="1000" b="0" i="0" u="none" strike="noStrike">
+                        <a:solidFill>
+                          <a:srgbClr val="000000"/>
+                        </a:solidFill>
+                        <a:effectLst/>
+                        <a:latin typeface="Calibri" panose="020F0502020204030204" pitchFamily="34" charset="0"/>
+                      </a:endParaRPr>
+                    </a:p>
+                  </a:txBody>
+                  <a:tcPr marL="8679" marR="8679" marT="8679" marB="0" anchor="ctr"/>
+                </a:tc>
+                <a:extLst>
+                  <a:ext uri="{0D108BD9-81ED-4DB2-BD59-A6C34878D82A}">
+                    <a16:rowId xmlns:a16="http://schemas.microsoft.com/office/drawing/2014/main" val="2737040631"/>
+                  </a:ext>
+                </a:extLst>
+              </a:tr>
+              <a:tr h="182266">
+                <a:tc>
+                  <a:txBody>
+                    <a:bodyPr/>
+                    <a:lstStyle/>
+                    <a:p>
+                      <a:pPr algn="ctr" fontAlgn="ctr"/>
+                      <a:r>
+                        <a:rPr lang="sk-SK" sz="1000" u="none" strike="noStrike">
+                          <a:effectLst/>
+                        </a:rPr>
+                        <a:t>3</a:t>
+                      </a:r>
+                      <a:endParaRPr lang="sk-SK" sz="1000" b="0" i="0" u="none" strike="noStrike">
+                        <a:solidFill>
+                          <a:srgbClr val="000000"/>
+                        </a:solidFill>
+                        <a:effectLst/>
+                        <a:latin typeface="Calibri" panose="020F0502020204030204" pitchFamily="34" charset="0"/>
+                      </a:endParaRPr>
+                    </a:p>
+                  </a:txBody>
+                  <a:tcPr marL="8679" marR="8679" marT="8679" marB="0" anchor="ctr"/>
+                </a:tc>
+                <a:tc>
+                  <a:txBody>
+                    <a:bodyPr/>
+                    <a:lstStyle/>
+                    <a:p>
+                      <a:pPr algn="ctr" fontAlgn="ctr"/>
+                      <a:r>
+                        <a:rPr lang="sk-SK" sz="1000" u="none" strike="noStrike">
+                          <a:effectLst/>
+                        </a:rPr>
+                        <a:t>SY</a:t>
+                      </a:r>
+                      <a:endParaRPr lang="sk-SK" sz="1000" b="0" i="0" u="none" strike="noStrike">
+                        <a:solidFill>
+                          <a:srgbClr val="000000"/>
+                        </a:solidFill>
+                        <a:effectLst/>
+                        <a:latin typeface="Calibri" panose="020F0502020204030204" pitchFamily="34" charset="0"/>
+                      </a:endParaRPr>
+                    </a:p>
+                  </a:txBody>
+                  <a:tcPr marL="8679" marR="8679" marT="8679" marB="0" anchor="ctr"/>
+                </a:tc>
+                <a:tc>
+                  <a:txBody>
+                    <a:bodyPr/>
+                    <a:lstStyle/>
+                    <a:p>
+                      <a:pPr algn="ctr" fontAlgn="ctr"/>
+                      <a:r>
+                        <a:rPr lang="sk-SK" sz="1000" u="none" strike="noStrike">
+                          <a:effectLst/>
+                        </a:rPr>
+                        <a:t>64</a:t>
+                      </a:r>
+                      <a:endParaRPr lang="sk-SK" sz="1000" b="0" i="0" u="none" strike="noStrike">
+                        <a:solidFill>
+                          <a:srgbClr val="000000"/>
+                        </a:solidFill>
+                        <a:effectLst/>
+                        <a:latin typeface="Calibri" panose="020F0502020204030204" pitchFamily="34" charset="0"/>
+                      </a:endParaRPr>
+                    </a:p>
+                  </a:txBody>
+                  <a:tcPr marL="8679" marR="8679" marT="8679" marB="0" anchor="ctr"/>
+                </a:tc>
+                <a:tc>
+                  <a:txBody>
+                    <a:bodyPr/>
+                    <a:lstStyle/>
+                    <a:p>
+                      <a:pPr algn="ctr" fontAlgn="ctr"/>
+                      <a:r>
+                        <a:rPr lang="sk-SK" sz="1000" u="none" strike="noStrike">
+                          <a:effectLst/>
+                        </a:rPr>
+                        <a:t>80</a:t>
+                      </a:r>
+                      <a:endParaRPr lang="sk-SK" sz="1000" b="0" i="0" u="none" strike="noStrike">
+                        <a:solidFill>
+                          <a:srgbClr val="000000"/>
+                        </a:solidFill>
+                        <a:effectLst/>
+                        <a:latin typeface="Calibri" panose="020F0502020204030204" pitchFamily="34" charset="0"/>
+                      </a:endParaRPr>
+                    </a:p>
+                  </a:txBody>
+                  <a:tcPr marL="8679" marR="8679" marT="8679" marB="0" anchor="ctr"/>
+                </a:tc>
+                <a:extLst>
+                  <a:ext uri="{0D108BD9-81ED-4DB2-BD59-A6C34878D82A}">
+                    <a16:rowId xmlns:a16="http://schemas.microsoft.com/office/drawing/2014/main" val="4040141554"/>
+                  </a:ext>
+                </a:extLst>
+              </a:tr>
+              <a:tr h="182266">
+                <a:tc>
+                  <a:txBody>
+                    <a:bodyPr/>
+                    <a:lstStyle/>
+                    <a:p>
+                      <a:pPr algn="ctr" fontAlgn="ctr"/>
+                      <a:r>
+                        <a:rPr lang="sk-SK" sz="1000" u="none" strike="noStrike">
+                          <a:effectLst/>
+                        </a:rPr>
+                        <a:t>4</a:t>
+                      </a:r>
+                      <a:endParaRPr lang="sk-SK" sz="1000" b="0" i="0" u="none" strike="noStrike">
+                        <a:solidFill>
+                          <a:srgbClr val="000000"/>
+                        </a:solidFill>
+                        <a:effectLst/>
+                        <a:latin typeface="Calibri" panose="020F0502020204030204" pitchFamily="34" charset="0"/>
+                      </a:endParaRPr>
+                    </a:p>
+                  </a:txBody>
+                  <a:tcPr marL="8679" marR="8679" marT="8679" marB="0" anchor="ctr"/>
+                </a:tc>
+                <a:tc>
+                  <a:txBody>
+                    <a:bodyPr/>
+                    <a:lstStyle/>
+                    <a:p>
+                      <a:pPr algn="ctr" fontAlgn="ctr"/>
+                      <a:r>
+                        <a:rPr lang="sk-SK" sz="1000" u="none" strike="noStrike">
+                          <a:effectLst/>
+                        </a:rPr>
+                        <a:t>AT</a:t>
+                      </a:r>
+                      <a:endParaRPr lang="sk-SK" sz="1000" b="0" i="0" u="none" strike="noStrike">
+                        <a:solidFill>
+                          <a:srgbClr val="000000"/>
+                        </a:solidFill>
+                        <a:effectLst/>
+                        <a:latin typeface="Calibri" panose="020F0502020204030204" pitchFamily="34" charset="0"/>
+                      </a:endParaRPr>
+                    </a:p>
+                  </a:txBody>
+                  <a:tcPr marL="8679" marR="8679" marT="8679" marB="0" anchor="ctr"/>
+                </a:tc>
+                <a:tc>
+                  <a:txBody>
+                    <a:bodyPr/>
+                    <a:lstStyle/>
+                    <a:p>
+                      <a:pPr algn="ctr" fontAlgn="ctr"/>
+                      <a:r>
+                        <a:rPr lang="sk-SK" sz="1000" u="none" strike="noStrike">
+                          <a:effectLst/>
+                        </a:rPr>
+                        <a:t>64</a:t>
+                      </a:r>
+                      <a:endParaRPr lang="sk-SK" sz="1000" b="0" i="0" u="none" strike="noStrike">
+                        <a:solidFill>
+                          <a:srgbClr val="000000"/>
+                        </a:solidFill>
+                        <a:effectLst/>
+                        <a:latin typeface="Calibri" panose="020F0502020204030204" pitchFamily="34" charset="0"/>
+                      </a:endParaRPr>
+                    </a:p>
+                  </a:txBody>
+                  <a:tcPr marL="8679" marR="8679" marT="8679" marB="0" anchor="ctr"/>
+                </a:tc>
+                <a:tc>
+                  <a:txBody>
+                    <a:bodyPr/>
+                    <a:lstStyle/>
+                    <a:p>
+                      <a:pPr algn="ctr" fontAlgn="ctr"/>
+                      <a:r>
+                        <a:rPr lang="sk-SK" sz="1000" u="none" strike="noStrike">
+                          <a:effectLst/>
+                        </a:rPr>
+                        <a:t>84</a:t>
+                      </a:r>
+                      <a:endParaRPr lang="sk-SK" sz="1000" b="0" i="0" u="none" strike="noStrike">
+                        <a:solidFill>
+                          <a:srgbClr val="000000"/>
+                        </a:solidFill>
+                        <a:effectLst/>
+                        <a:latin typeface="Calibri" panose="020F0502020204030204" pitchFamily="34" charset="0"/>
+                      </a:endParaRPr>
+                    </a:p>
+                  </a:txBody>
+                  <a:tcPr marL="8679" marR="8679" marT="8679" marB="0" anchor="ctr"/>
+                </a:tc>
+                <a:extLst>
+                  <a:ext uri="{0D108BD9-81ED-4DB2-BD59-A6C34878D82A}">
+                    <a16:rowId xmlns:a16="http://schemas.microsoft.com/office/drawing/2014/main" val="362798954"/>
+                  </a:ext>
+                </a:extLst>
+              </a:tr>
+              <a:tr h="182266">
+                <a:tc>
+                  <a:txBody>
+                    <a:bodyPr/>
+                    <a:lstStyle/>
+                    <a:p>
+                      <a:pPr algn="ctr" fontAlgn="ctr"/>
+                      <a:r>
+                        <a:rPr lang="sk-SK" sz="1000" u="none" strike="noStrike">
+                          <a:effectLst/>
+                        </a:rPr>
+                        <a:t>5</a:t>
+                      </a:r>
+                      <a:endParaRPr lang="sk-SK" sz="1000" b="0" i="0" u="none" strike="noStrike">
+                        <a:solidFill>
+                          <a:srgbClr val="000000"/>
+                        </a:solidFill>
+                        <a:effectLst/>
+                        <a:latin typeface="Calibri" panose="020F0502020204030204" pitchFamily="34" charset="0"/>
+                      </a:endParaRPr>
+                    </a:p>
+                  </a:txBody>
+                  <a:tcPr marL="8679" marR="8679" marT="8679" marB="0" anchor="ctr"/>
+                </a:tc>
+                <a:tc>
+                  <a:txBody>
+                    <a:bodyPr/>
+                    <a:lstStyle/>
+                    <a:p>
+                      <a:pPr algn="ctr" fontAlgn="ctr"/>
+                      <a:r>
+                        <a:rPr lang="sk-SK" sz="1000" u="none" strike="noStrike">
+                          <a:effectLst/>
+                        </a:rPr>
+                        <a:t>JI</a:t>
+                      </a:r>
+                      <a:endParaRPr lang="sk-SK" sz="1000" b="0" i="0" u="none" strike="noStrike">
+                        <a:solidFill>
+                          <a:srgbClr val="000000"/>
+                        </a:solidFill>
+                        <a:effectLst/>
+                        <a:latin typeface="Calibri" panose="020F0502020204030204" pitchFamily="34" charset="0"/>
+                      </a:endParaRPr>
+                    </a:p>
+                  </a:txBody>
+                  <a:tcPr marL="8679" marR="8679" marT="8679" marB="0" anchor="ctr"/>
+                </a:tc>
+                <a:tc>
+                  <a:txBody>
+                    <a:bodyPr/>
+                    <a:lstStyle/>
+                    <a:p>
+                      <a:pPr algn="ctr" fontAlgn="ctr"/>
+                      <a:r>
+                        <a:rPr lang="sk-SK" sz="1000" u="none" strike="noStrike">
+                          <a:effectLst/>
+                        </a:rPr>
+                        <a:t>52</a:t>
+                      </a:r>
+                      <a:endParaRPr lang="sk-SK" sz="1000" b="0" i="0" u="none" strike="noStrike">
+                        <a:solidFill>
+                          <a:srgbClr val="000000"/>
+                        </a:solidFill>
+                        <a:effectLst/>
+                        <a:latin typeface="Calibri" panose="020F0502020204030204" pitchFamily="34" charset="0"/>
+                      </a:endParaRPr>
+                    </a:p>
+                  </a:txBody>
+                  <a:tcPr marL="8679" marR="8679" marT="8679" marB="0" anchor="ctr"/>
+                </a:tc>
+                <a:tc>
+                  <a:txBody>
+                    <a:bodyPr/>
+                    <a:lstStyle/>
+                    <a:p>
+                      <a:pPr algn="ctr" fontAlgn="ctr"/>
+                      <a:r>
+                        <a:rPr lang="sk-SK" sz="1000" u="none" strike="noStrike">
+                          <a:effectLst/>
+                        </a:rPr>
+                        <a:t>64</a:t>
+                      </a:r>
+                      <a:endParaRPr lang="sk-SK" sz="1000" b="0" i="0" u="none" strike="noStrike">
+                        <a:solidFill>
+                          <a:srgbClr val="000000"/>
+                        </a:solidFill>
+                        <a:effectLst/>
+                        <a:latin typeface="Calibri" panose="020F0502020204030204" pitchFamily="34" charset="0"/>
+                      </a:endParaRPr>
+                    </a:p>
+                  </a:txBody>
+                  <a:tcPr marL="8679" marR="8679" marT="8679" marB="0" anchor="ctr"/>
+                </a:tc>
+                <a:extLst>
+                  <a:ext uri="{0D108BD9-81ED-4DB2-BD59-A6C34878D82A}">
+                    <a16:rowId xmlns:a16="http://schemas.microsoft.com/office/drawing/2014/main" val="2938362281"/>
+                  </a:ext>
+                </a:extLst>
+              </a:tr>
+              <a:tr h="182266">
+                <a:tc>
+                  <a:txBody>
+                    <a:bodyPr/>
+                    <a:lstStyle/>
+                    <a:p>
+                      <a:pPr algn="ctr" fontAlgn="ctr"/>
+                      <a:r>
+                        <a:rPr lang="sk-SK" sz="1000" u="none" strike="noStrike">
+                          <a:effectLst/>
+                        </a:rPr>
+                        <a:t>6</a:t>
+                      </a:r>
+                      <a:endParaRPr lang="sk-SK" sz="1000" b="0" i="0" u="none" strike="noStrike">
+                        <a:solidFill>
+                          <a:srgbClr val="000000"/>
+                        </a:solidFill>
+                        <a:effectLst/>
+                        <a:latin typeface="Calibri" panose="020F0502020204030204" pitchFamily="34" charset="0"/>
+                      </a:endParaRPr>
+                    </a:p>
+                  </a:txBody>
+                  <a:tcPr marL="8679" marR="8679" marT="8679" marB="0" anchor="ctr"/>
+                </a:tc>
+                <a:tc>
+                  <a:txBody>
+                    <a:bodyPr/>
+                    <a:lstStyle/>
+                    <a:p>
+                      <a:pPr algn="ctr" fontAlgn="ctr"/>
+                      <a:r>
+                        <a:rPr lang="sk-SK" sz="1000" u="none" strike="noStrike">
+                          <a:effectLst/>
+                        </a:rPr>
+                        <a:t>EA</a:t>
+                      </a:r>
+                      <a:endParaRPr lang="sk-SK" sz="1000" b="0" i="0" u="none" strike="noStrike">
+                        <a:solidFill>
+                          <a:srgbClr val="000000"/>
+                        </a:solidFill>
+                        <a:effectLst/>
+                        <a:latin typeface="Calibri" panose="020F0502020204030204" pitchFamily="34" charset="0"/>
+                      </a:endParaRPr>
+                    </a:p>
+                  </a:txBody>
+                  <a:tcPr marL="8679" marR="8679" marT="8679" marB="0" anchor="ctr"/>
+                </a:tc>
+                <a:tc>
+                  <a:txBody>
+                    <a:bodyPr/>
+                    <a:lstStyle/>
+                    <a:p>
+                      <a:pPr algn="ctr" fontAlgn="ctr"/>
+                      <a:r>
+                        <a:rPr lang="sk-SK" sz="1000" u="none" strike="noStrike">
+                          <a:effectLst/>
+                        </a:rPr>
+                        <a:t>72</a:t>
+                      </a:r>
+                      <a:endParaRPr lang="sk-SK" sz="1000" b="0" i="0" u="none" strike="noStrike">
+                        <a:solidFill>
+                          <a:srgbClr val="000000"/>
+                        </a:solidFill>
+                        <a:effectLst/>
+                        <a:latin typeface="Calibri" panose="020F0502020204030204" pitchFamily="34" charset="0"/>
+                      </a:endParaRPr>
+                    </a:p>
+                  </a:txBody>
+                  <a:tcPr marL="8679" marR="8679" marT="8679" marB="0" anchor="ctr"/>
+                </a:tc>
+                <a:tc>
+                  <a:txBody>
+                    <a:bodyPr/>
+                    <a:lstStyle/>
+                    <a:p>
+                      <a:pPr algn="ctr" fontAlgn="ctr"/>
+                      <a:r>
+                        <a:rPr lang="sk-SK" sz="1000" u="none" strike="noStrike">
+                          <a:effectLst/>
+                        </a:rPr>
+                        <a:t>76</a:t>
+                      </a:r>
+                      <a:endParaRPr lang="sk-SK" sz="1000" b="0" i="0" u="none" strike="noStrike">
+                        <a:solidFill>
+                          <a:srgbClr val="000000"/>
+                        </a:solidFill>
+                        <a:effectLst/>
+                        <a:latin typeface="Calibri" panose="020F0502020204030204" pitchFamily="34" charset="0"/>
+                      </a:endParaRPr>
+                    </a:p>
+                  </a:txBody>
+                  <a:tcPr marL="8679" marR="8679" marT="8679" marB="0" anchor="ctr"/>
+                </a:tc>
+                <a:extLst>
+                  <a:ext uri="{0D108BD9-81ED-4DB2-BD59-A6C34878D82A}">
+                    <a16:rowId xmlns:a16="http://schemas.microsoft.com/office/drawing/2014/main" val="547590118"/>
+                  </a:ext>
+                </a:extLst>
+              </a:tr>
+              <a:tr h="182266">
+                <a:tc>
+                  <a:txBody>
+                    <a:bodyPr/>
+                    <a:lstStyle/>
+                    <a:p>
+                      <a:pPr algn="ctr" fontAlgn="ctr"/>
+                      <a:r>
+                        <a:rPr lang="sk-SK" sz="1000" u="none" strike="noStrike">
+                          <a:effectLst/>
+                        </a:rPr>
+                        <a:t>7</a:t>
+                      </a:r>
+                      <a:endParaRPr lang="sk-SK" sz="1000" b="0" i="0" u="none" strike="noStrike">
+                        <a:solidFill>
+                          <a:srgbClr val="000000"/>
+                        </a:solidFill>
+                        <a:effectLst/>
+                        <a:latin typeface="Calibri" panose="020F0502020204030204" pitchFamily="34" charset="0"/>
+                      </a:endParaRPr>
+                    </a:p>
+                  </a:txBody>
+                  <a:tcPr marL="8679" marR="8679" marT="8679" marB="0" anchor="ctr"/>
+                </a:tc>
+                <a:tc>
+                  <a:txBody>
+                    <a:bodyPr/>
+                    <a:lstStyle/>
+                    <a:p>
+                      <a:pPr algn="ctr" fontAlgn="ctr"/>
+                      <a:r>
+                        <a:rPr lang="sk-SK" sz="1000" u="none" strike="noStrike">
+                          <a:effectLst/>
+                        </a:rPr>
+                        <a:t>AA</a:t>
+                      </a:r>
+                      <a:endParaRPr lang="sk-SK" sz="1000" b="0" i="0" u="none" strike="noStrike">
+                        <a:solidFill>
+                          <a:srgbClr val="000000"/>
+                        </a:solidFill>
+                        <a:effectLst/>
+                        <a:latin typeface="Calibri" panose="020F0502020204030204" pitchFamily="34" charset="0"/>
+                      </a:endParaRPr>
+                    </a:p>
+                  </a:txBody>
+                  <a:tcPr marL="8679" marR="8679" marT="8679" marB="0" anchor="ctr"/>
+                </a:tc>
+                <a:tc>
+                  <a:txBody>
+                    <a:bodyPr/>
+                    <a:lstStyle/>
+                    <a:p>
+                      <a:pPr algn="ctr" fontAlgn="ctr"/>
+                      <a:r>
+                        <a:rPr lang="sk-SK" sz="1000" u="none" strike="noStrike">
+                          <a:effectLst/>
+                        </a:rPr>
+                        <a:t>68</a:t>
+                      </a:r>
+                      <a:endParaRPr lang="sk-SK" sz="1000" b="0" i="0" u="none" strike="noStrike">
+                        <a:solidFill>
+                          <a:srgbClr val="000000"/>
+                        </a:solidFill>
+                        <a:effectLst/>
+                        <a:latin typeface="Calibri" panose="020F0502020204030204" pitchFamily="34" charset="0"/>
+                      </a:endParaRPr>
+                    </a:p>
+                  </a:txBody>
+                  <a:tcPr marL="8679" marR="8679" marT="8679" marB="0" anchor="ctr"/>
+                </a:tc>
+                <a:tc>
+                  <a:txBody>
+                    <a:bodyPr/>
+                    <a:lstStyle/>
+                    <a:p>
+                      <a:pPr algn="ctr" fontAlgn="ctr"/>
+                      <a:r>
+                        <a:rPr lang="sk-SK" sz="1000" u="none" strike="noStrike">
+                          <a:effectLst/>
+                        </a:rPr>
+                        <a:t>92</a:t>
+                      </a:r>
+                      <a:endParaRPr lang="sk-SK" sz="1000" b="0" i="0" u="none" strike="noStrike">
+                        <a:solidFill>
+                          <a:srgbClr val="000000"/>
+                        </a:solidFill>
+                        <a:effectLst/>
+                        <a:latin typeface="Calibri" panose="020F0502020204030204" pitchFamily="34" charset="0"/>
+                      </a:endParaRPr>
+                    </a:p>
+                  </a:txBody>
+                  <a:tcPr marL="8679" marR="8679" marT="8679" marB="0" anchor="ctr"/>
+                </a:tc>
+                <a:extLst>
+                  <a:ext uri="{0D108BD9-81ED-4DB2-BD59-A6C34878D82A}">
+                    <a16:rowId xmlns:a16="http://schemas.microsoft.com/office/drawing/2014/main" val="403938254"/>
+                  </a:ext>
+                </a:extLst>
+              </a:tr>
+              <a:tr h="182266">
+                <a:tc>
+                  <a:txBody>
+                    <a:bodyPr/>
+                    <a:lstStyle/>
+                    <a:p>
+                      <a:pPr algn="ctr" fontAlgn="ctr"/>
+                      <a:r>
+                        <a:rPr lang="sk-SK" sz="1000" u="none" strike="noStrike">
+                          <a:effectLst/>
+                        </a:rPr>
+                        <a:t>8</a:t>
+                      </a:r>
+                      <a:endParaRPr lang="sk-SK" sz="1000" b="0" i="0" u="none" strike="noStrike">
+                        <a:solidFill>
+                          <a:srgbClr val="000000"/>
+                        </a:solidFill>
+                        <a:effectLst/>
+                        <a:latin typeface="Calibri" panose="020F0502020204030204" pitchFamily="34" charset="0"/>
+                      </a:endParaRPr>
+                    </a:p>
+                  </a:txBody>
+                  <a:tcPr marL="8679" marR="8679" marT="8679" marB="0" anchor="ctr"/>
+                </a:tc>
+                <a:tc>
+                  <a:txBody>
+                    <a:bodyPr/>
+                    <a:lstStyle/>
+                    <a:p>
+                      <a:pPr algn="ctr" fontAlgn="ctr"/>
+                      <a:r>
+                        <a:rPr lang="sk-SK" sz="1000" u="none" strike="noStrike">
+                          <a:effectLst/>
+                        </a:rPr>
+                        <a:t>IN</a:t>
+                      </a:r>
+                      <a:endParaRPr lang="sk-SK" sz="1000" b="0" i="0" u="none" strike="noStrike">
+                        <a:solidFill>
+                          <a:srgbClr val="000000"/>
+                        </a:solidFill>
+                        <a:effectLst/>
+                        <a:latin typeface="Calibri" panose="020F0502020204030204" pitchFamily="34" charset="0"/>
+                      </a:endParaRPr>
+                    </a:p>
+                  </a:txBody>
+                  <a:tcPr marL="8679" marR="8679" marT="8679" marB="0" anchor="ctr"/>
+                </a:tc>
+                <a:tc>
+                  <a:txBody>
+                    <a:bodyPr/>
+                    <a:lstStyle/>
+                    <a:p>
+                      <a:pPr algn="ctr" fontAlgn="ctr"/>
+                      <a:r>
+                        <a:rPr lang="sk-SK" sz="1000" u="none" strike="noStrike">
+                          <a:effectLst/>
+                        </a:rPr>
+                        <a:t>60</a:t>
+                      </a:r>
+                      <a:endParaRPr lang="sk-SK" sz="1000" b="0" i="0" u="none" strike="noStrike">
+                        <a:solidFill>
+                          <a:srgbClr val="000000"/>
+                        </a:solidFill>
+                        <a:effectLst/>
+                        <a:latin typeface="Calibri" panose="020F0502020204030204" pitchFamily="34" charset="0"/>
+                      </a:endParaRPr>
+                    </a:p>
+                  </a:txBody>
+                  <a:tcPr marL="8679" marR="8679" marT="8679" marB="0" anchor="ctr"/>
+                </a:tc>
+                <a:tc>
+                  <a:txBody>
+                    <a:bodyPr/>
+                    <a:lstStyle/>
+                    <a:p>
+                      <a:pPr algn="ctr" fontAlgn="ctr"/>
+                      <a:r>
+                        <a:rPr lang="sk-SK" sz="1000" u="none" strike="noStrike">
+                          <a:effectLst/>
+                        </a:rPr>
+                        <a:t>84</a:t>
+                      </a:r>
+                      <a:endParaRPr lang="sk-SK" sz="1000" b="0" i="0" u="none" strike="noStrike">
+                        <a:solidFill>
+                          <a:srgbClr val="000000"/>
+                        </a:solidFill>
+                        <a:effectLst/>
+                        <a:latin typeface="Calibri" panose="020F0502020204030204" pitchFamily="34" charset="0"/>
+                      </a:endParaRPr>
+                    </a:p>
+                  </a:txBody>
+                  <a:tcPr marL="8679" marR="8679" marT="8679" marB="0" anchor="ctr"/>
+                </a:tc>
+                <a:extLst>
+                  <a:ext uri="{0D108BD9-81ED-4DB2-BD59-A6C34878D82A}">
+                    <a16:rowId xmlns:a16="http://schemas.microsoft.com/office/drawing/2014/main" val="4166445894"/>
+                  </a:ext>
+                </a:extLst>
+              </a:tr>
+              <a:tr h="182266">
+                <a:tc>
+                  <a:txBody>
+                    <a:bodyPr/>
+                    <a:lstStyle/>
+                    <a:p>
+                      <a:pPr algn="ctr" fontAlgn="ctr"/>
+                      <a:r>
+                        <a:rPr lang="sk-SK" sz="1000" u="none" strike="noStrike">
+                          <a:effectLst/>
+                        </a:rPr>
+                        <a:t>9</a:t>
+                      </a:r>
+                      <a:endParaRPr lang="sk-SK" sz="1000" b="0" i="0" u="none" strike="noStrike">
+                        <a:solidFill>
+                          <a:srgbClr val="000000"/>
+                        </a:solidFill>
+                        <a:effectLst/>
+                        <a:latin typeface="Calibri" panose="020F0502020204030204" pitchFamily="34" charset="0"/>
+                      </a:endParaRPr>
+                    </a:p>
+                  </a:txBody>
+                  <a:tcPr marL="8679" marR="8679" marT="8679" marB="0" anchor="ctr"/>
+                </a:tc>
+                <a:tc>
+                  <a:txBody>
+                    <a:bodyPr/>
+                    <a:lstStyle/>
+                    <a:p>
+                      <a:pPr algn="ctr" fontAlgn="ctr"/>
+                      <a:r>
+                        <a:rPr lang="sk-SK" sz="1000" u="none" strike="noStrike">
+                          <a:effectLst/>
+                        </a:rPr>
+                        <a:t>PJ</a:t>
+                      </a:r>
+                      <a:endParaRPr lang="sk-SK" sz="1000" b="0" i="0" u="none" strike="noStrike">
+                        <a:solidFill>
+                          <a:srgbClr val="000000"/>
+                        </a:solidFill>
+                        <a:effectLst/>
+                        <a:latin typeface="Calibri" panose="020F0502020204030204" pitchFamily="34" charset="0"/>
+                      </a:endParaRPr>
+                    </a:p>
+                  </a:txBody>
+                  <a:tcPr marL="8679" marR="8679" marT="8679" marB="0" anchor="ctr"/>
+                </a:tc>
+                <a:tc>
+                  <a:txBody>
+                    <a:bodyPr/>
+                    <a:lstStyle/>
+                    <a:p>
+                      <a:pPr algn="ctr" fontAlgn="ctr"/>
+                      <a:r>
+                        <a:rPr lang="sk-SK" sz="1000" u="none" strike="noStrike" dirty="0">
+                          <a:effectLst/>
+                        </a:rPr>
+                        <a:t>68</a:t>
+                      </a:r>
+                      <a:endParaRPr lang="sk-SK" sz="1000" b="0" i="0" u="none" strike="noStrike" dirty="0">
+                        <a:solidFill>
+                          <a:srgbClr val="000000"/>
+                        </a:solidFill>
+                        <a:effectLst/>
+                        <a:latin typeface="Calibri" panose="020F0502020204030204" pitchFamily="34" charset="0"/>
+                      </a:endParaRPr>
+                    </a:p>
+                  </a:txBody>
+                  <a:tcPr marL="8679" marR="8679" marT="8679" marB="0" anchor="ctr"/>
+                </a:tc>
+                <a:tc>
+                  <a:txBody>
+                    <a:bodyPr/>
+                    <a:lstStyle/>
+                    <a:p>
+                      <a:pPr algn="ctr" fontAlgn="ctr"/>
+                      <a:r>
+                        <a:rPr lang="sk-SK" sz="1000" u="none" strike="noStrike">
+                          <a:effectLst/>
+                        </a:rPr>
+                        <a:t>72</a:t>
+                      </a:r>
+                      <a:endParaRPr lang="sk-SK" sz="1000" b="0" i="0" u="none" strike="noStrike">
+                        <a:solidFill>
+                          <a:srgbClr val="000000"/>
+                        </a:solidFill>
+                        <a:effectLst/>
+                        <a:latin typeface="Calibri" panose="020F0502020204030204" pitchFamily="34" charset="0"/>
+                      </a:endParaRPr>
+                    </a:p>
+                  </a:txBody>
+                  <a:tcPr marL="8679" marR="8679" marT="8679" marB="0" anchor="ctr"/>
+                </a:tc>
+                <a:extLst>
+                  <a:ext uri="{0D108BD9-81ED-4DB2-BD59-A6C34878D82A}">
+                    <a16:rowId xmlns:a16="http://schemas.microsoft.com/office/drawing/2014/main" val="142145010"/>
+                  </a:ext>
+                </a:extLst>
+              </a:tr>
+              <a:tr h="182266">
+                <a:tc>
+                  <a:txBody>
+                    <a:bodyPr/>
+                    <a:lstStyle/>
+                    <a:p>
+                      <a:pPr algn="ctr" fontAlgn="ctr"/>
+                      <a:r>
+                        <a:rPr lang="sk-SK" sz="1000" u="none" strike="noStrike">
+                          <a:effectLst/>
+                        </a:rPr>
+                        <a:t>10</a:t>
+                      </a:r>
+                      <a:endParaRPr lang="sk-SK" sz="1000" b="0" i="0" u="none" strike="noStrike">
+                        <a:solidFill>
+                          <a:srgbClr val="000000"/>
+                        </a:solidFill>
+                        <a:effectLst/>
+                        <a:latin typeface="Calibri" panose="020F0502020204030204" pitchFamily="34" charset="0"/>
+                      </a:endParaRPr>
+                    </a:p>
+                  </a:txBody>
+                  <a:tcPr marL="8679" marR="8679" marT="8679" marB="0" anchor="ctr"/>
+                </a:tc>
+                <a:tc>
+                  <a:txBody>
+                    <a:bodyPr/>
+                    <a:lstStyle/>
+                    <a:p>
+                      <a:pPr algn="ctr" fontAlgn="ctr"/>
+                      <a:r>
+                        <a:rPr lang="sk-SK" sz="1000" u="none" strike="noStrike">
+                          <a:effectLst/>
+                        </a:rPr>
+                        <a:t>MG</a:t>
+                      </a:r>
+                      <a:endParaRPr lang="sk-SK" sz="1000" b="0" i="0" u="none" strike="noStrike">
+                        <a:solidFill>
+                          <a:srgbClr val="000000"/>
+                        </a:solidFill>
+                        <a:effectLst/>
+                        <a:latin typeface="Calibri" panose="020F0502020204030204" pitchFamily="34" charset="0"/>
+                      </a:endParaRPr>
+                    </a:p>
+                  </a:txBody>
+                  <a:tcPr marL="8679" marR="8679" marT="8679" marB="0" anchor="ctr"/>
+                </a:tc>
+                <a:tc>
+                  <a:txBody>
+                    <a:bodyPr/>
+                    <a:lstStyle/>
+                    <a:p>
+                      <a:pPr algn="ctr" fontAlgn="ctr"/>
+                      <a:r>
+                        <a:rPr lang="sk-SK" sz="1000" u="none" strike="noStrike">
+                          <a:effectLst/>
+                        </a:rPr>
+                        <a:t>64</a:t>
+                      </a:r>
+                      <a:endParaRPr lang="sk-SK" sz="1000" b="0" i="0" u="none" strike="noStrike">
+                        <a:solidFill>
+                          <a:srgbClr val="000000"/>
+                        </a:solidFill>
+                        <a:effectLst/>
+                        <a:latin typeface="Calibri" panose="020F0502020204030204" pitchFamily="34" charset="0"/>
+                      </a:endParaRPr>
+                    </a:p>
+                  </a:txBody>
+                  <a:tcPr marL="8679" marR="8679" marT="8679" marB="0" anchor="ctr"/>
+                </a:tc>
+                <a:tc>
+                  <a:txBody>
+                    <a:bodyPr/>
+                    <a:lstStyle/>
+                    <a:p>
+                      <a:pPr algn="ctr" fontAlgn="ctr"/>
+                      <a:r>
+                        <a:rPr lang="sk-SK" sz="1000" u="none" strike="noStrike">
+                          <a:effectLst/>
+                        </a:rPr>
+                        <a:t>80</a:t>
+                      </a:r>
+                      <a:endParaRPr lang="sk-SK" sz="1000" b="0" i="0" u="none" strike="noStrike">
+                        <a:solidFill>
+                          <a:srgbClr val="000000"/>
+                        </a:solidFill>
+                        <a:effectLst/>
+                        <a:latin typeface="Calibri" panose="020F0502020204030204" pitchFamily="34" charset="0"/>
+                      </a:endParaRPr>
+                    </a:p>
+                  </a:txBody>
+                  <a:tcPr marL="8679" marR="8679" marT="8679" marB="0" anchor="ctr"/>
+                </a:tc>
+                <a:extLst>
+                  <a:ext uri="{0D108BD9-81ED-4DB2-BD59-A6C34878D82A}">
+                    <a16:rowId xmlns:a16="http://schemas.microsoft.com/office/drawing/2014/main" val="4118311325"/>
+                  </a:ext>
+                </a:extLst>
+              </a:tr>
+              <a:tr h="182266">
+                <a:tc>
+                  <a:txBody>
+                    <a:bodyPr/>
+                    <a:lstStyle/>
+                    <a:p>
+                      <a:pPr algn="ctr" fontAlgn="ctr"/>
+                      <a:r>
+                        <a:rPr lang="sk-SK" sz="1000" u="none" strike="noStrike">
+                          <a:effectLst/>
+                        </a:rPr>
+                        <a:t>11</a:t>
+                      </a:r>
+                      <a:endParaRPr lang="sk-SK" sz="1000" b="0" i="0" u="none" strike="noStrike">
+                        <a:solidFill>
+                          <a:srgbClr val="000000"/>
+                        </a:solidFill>
+                        <a:effectLst/>
+                        <a:latin typeface="Calibri" panose="020F0502020204030204" pitchFamily="34" charset="0"/>
+                      </a:endParaRPr>
+                    </a:p>
+                  </a:txBody>
+                  <a:tcPr marL="8679" marR="8679" marT="8679" marB="0" anchor="ctr"/>
+                </a:tc>
+                <a:tc>
+                  <a:txBody>
+                    <a:bodyPr/>
+                    <a:lstStyle/>
+                    <a:p>
+                      <a:pPr algn="ctr" fontAlgn="ctr"/>
+                      <a:r>
+                        <a:rPr lang="sk-SK" sz="1000" u="none" strike="noStrike">
+                          <a:effectLst/>
+                        </a:rPr>
+                        <a:t>YR</a:t>
+                      </a:r>
+                      <a:endParaRPr lang="sk-SK" sz="1000" b="0" i="0" u="none" strike="noStrike">
+                        <a:solidFill>
+                          <a:srgbClr val="000000"/>
+                        </a:solidFill>
+                        <a:effectLst/>
+                        <a:latin typeface="Calibri" panose="020F0502020204030204" pitchFamily="34" charset="0"/>
+                      </a:endParaRPr>
+                    </a:p>
+                  </a:txBody>
+                  <a:tcPr marL="8679" marR="8679" marT="8679" marB="0" anchor="ctr"/>
+                </a:tc>
+                <a:tc>
+                  <a:txBody>
+                    <a:bodyPr/>
+                    <a:lstStyle/>
+                    <a:p>
+                      <a:pPr algn="ctr" fontAlgn="ctr"/>
+                      <a:r>
+                        <a:rPr lang="sk-SK" sz="1000" u="none" strike="noStrike">
+                          <a:effectLst/>
+                        </a:rPr>
+                        <a:t>48</a:t>
+                      </a:r>
+                      <a:endParaRPr lang="sk-SK" sz="1000" b="0" i="0" u="none" strike="noStrike">
+                        <a:solidFill>
+                          <a:srgbClr val="000000"/>
+                        </a:solidFill>
+                        <a:effectLst/>
+                        <a:latin typeface="Calibri" panose="020F0502020204030204" pitchFamily="34" charset="0"/>
+                      </a:endParaRPr>
+                    </a:p>
+                  </a:txBody>
+                  <a:tcPr marL="8679" marR="8679" marT="8679" marB="0" anchor="ctr"/>
+                </a:tc>
+                <a:tc>
+                  <a:txBody>
+                    <a:bodyPr/>
+                    <a:lstStyle/>
+                    <a:p>
+                      <a:pPr algn="ctr" fontAlgn="ctr"/>
+                      <a:r>
+                        <a:rPr lang="sk-SK" sz="1000" u="none" strike="noStrike">
+                          <a:effectLst/>
+                        </a:rPr>
+                        <a:t>68</a:t>
+                      </a:r>
+                      <a:endParaRPr lang="sk-SK" sz="1000" b="0" i="0" u="none" strike="noStrike">
+                        <a:solidFill>
+                          <a:srgbClr val="000000"/>
+                        </a:solidFill>
+                        <a:effectLst/>
+                        <a:latin typeface="Calibri" panose="020F0502020204030204" pitchFamily="34" charset="0"/>
+                      </a:endParaRPr>
+                    </a:p>
+                  </a:txBody>
+                  <a:tcPr marL="8679" marR="8679" marT="8679" marB="0" anchor="ctr"/>
+                </a:tc>
+                <a:extLst>
+                  <a:ext uri="{0D108BD9-81ED-4DB2-BD59-A6C34878D82A}">
+                    <a16:rowId xmlns:a16="http://schemas.microsoft.com/office/drawing/2014/main" val="1398774279"/>
+                  </a:ext>
+                </a:extLst>
+              </a:tr>
+              <a:tr h="182266">
+                <a:tc>
+                  <a:txBody>
+                    <a:bodyPr/>
+                    <a:lstStyle/>
+                    <a:p>
+                      <a:pPr algn="ctr" fontAlgn="ctr"/>
+                      <a:r>
+                        <a:rPr lang="sk-SK" sz="1000" u="none" strike="noStrike">
+                          <a:effectLst/>
+                        </a:rPr>
+                        <a:t>12</a:t>
+                      </a:r>
+                      <a:endParaRPr lang="sk-SK" sz="1000" b="0" i="0" u="none" strike="noStrike">
+                        <a:solidFill>
+                          <a:srgbClr val="000000"/>
+                        </a:solidFill>
+                        <a:effectLst/>
+                        <a:latin typeface="Calibri" panose="020F0502020204030204" pitchFamily="34" charset="0"/>
+                      </a:endParaRPr>
+                    </a:p>
+                  </a:txBody>
+                  <a:tcPr marL="8679" marR="8679" marT="8679" marB="0" anchor="ctr"/>
+                </a:tc>
+                <a:tc>
+                  <a:txBody>
+                    <a:bodyPr/>
+                    <a:lstStyle/>
+                    <a:p>
+                      <a:pPr algn="ctr" fontAlgn="ctr"/>
+                      <a:r>
+                        <a:rPr lang="sk-SK" sz="1000" u="none" strike="noStrike">
+                          <a:effectLst/>
+                        </a:rPr>
+                        <a:t>RW</a:t>
+                      </a:r>
+                      <a:endParaRPr lang="sk-SK" sz="1000" b="0" i="0" u="none" strike="noStrike">
+                        <a:solidFill>
+                          <a:srgbClr val="000000"/>
+                        </a:solidFill>
+                        <a:effectLst/>
+                        <a:latin typeface="Calibri" panose="020F0502020204030204" pitchFamily="34" charset="0"/>
+                      </a:endParaRPr>
+                    </a:p>
+                  </a:txBody>
+                  <a:tcPr marL="8679" marR="8679" marT="8679" marB="0" anchor="ctr"/>
+                </a:tc>
+                <a:tc>
+                  <a:txBody>
+                    <a:bodyPr/>
+                    <a:lstStyle/>
+                    <a:p>
+                      <a:pPr algn="ctr" fontAlgn="ctr"/>
+                      <a:r>
+                        <a:rPr lang="sk-SK" sz="1000" u="none" strike="noStrike">
+                          <a:effectLst/>
+                        </a:rPr>
+                        <a:t>56</a:t>
+                      </a:r>
+                      <a:endParaRPr lang="sk-SK" sz="1000" b="0" i="0" u="none" strike="noStrike">
+                        <a:solidFill>
+                          <a:srgbClr val="000000"/>
+                        </a:solidFill>
+                        <a:effectLst/>
+                        <a:latin typeface="Calibri" panose="020F0502020204030204" pitchFamily="34" charset="0"/>
+                      </a:endParaRPr>
+                    </a:p>
+                  </a:txBody>
+                  <a:tcPr marL="8679" marR="8679" marT="8679" marB="0" anchor="ctr"/>
+                </a:tc>
+                <a:tc>
+                  <a:txBody>
+                    <a:bodyPr/>
+                    <a:lstStyle/>
+                    <a:p>
+                      <a:pPr algn="ctr" fontAlgn="ctr"/>
+                      <a:r>
+                        <a:rPr lang="sk-SK" sz="1000" u="none" strike="noStrike">
+                          <a:effectLst/>
+                        </a:rPr>
+                        <a:t>72</a:t>
+                      </a:r>
+                      <a:endParaRPr lang="sk-SK" sz="1000" b="0" i="0" u="none" strike="noStrike">
+                        <a:solidFill>
+                          <a:srgbClr val="000000"/>
+                        </a:solidFill>
+                        <a:effectLst/>
+                        <a:latin typeface="Calibri" panose="020F0502020204030204" pitchFamily="34" charset="0"/>
+                      </a:endParaRPr>
+                    </a:p>
+                  </a:txBody>
+                  <a:tcPr marL="8679" marR="8679" marT="8679" marB="0" anchor="ctr"/>
+                </a:tc>
+                <a:extLst>
+                  <a:ext uri="{0D108BD9-81ED-4DB2-BD59-A6C34878D82A}">
+                    <a16:rowId xmlns:a16="http://schemas.microsoft.com/office/drawing/2014/main" val="3921168555"/>
+                  </a:ext>
+                </a:extLst>
+              </a:tr>
+              <a:tr h="182266">
+                <a:tc>
+                  <a:txBody>
+                    <a:bodyPr/>
+                    <a:lstStyle/>
+                    <a:p>
+                      <a:pPr algn="ctr" fontAlgn="ctr"/>
+                      <a:r>
+                        <a:rPr lang="sk-SK" sz="1000" u="none" strike="noStrike">
+                          <a:effectLst/>
+                        </a:rPr>
+                        <a:t>13</a:t>
+                      </a:r>
+                      <a:endParaRPr lang="sk-SK" sz="1000" b="0" i="0" u="none" strike="noStrike">
+                        <a:solidFill>
+                          <a:srgbClr val="000000"/>
+                        </a:solidFill>
+                        <a:effectLst/>
+                        <a:latin typeface="Calibri" panose="020F0502020204030204" pitchFamily="34" charset="0"/>
+                      </a:endParaRPr>
+                    </a:p>
+                  </a:txBody>
+                  <a:tcPr marL="8679" marR="8679" marT="8679" marB="0" anchor="ctr"/>
+                </a:tc>
+                <a:tc>
+                  <a:txBody>
+                    <a:bodyPr/>
+                    <a:lstStyle/>
+                    <a:p>
+                      <a:pPr algn="ctr" fontAlgn="ctr"/>
+                      <a:r>
+                        <a:rPr lang="sk-SK" sz="1000" u="none" strike="noStrike">
+                          <a:effectLst/>
+                        </a:rPr>
+                        <a:t>NV</a:t>
+                      </a:r>
+                      <a:endParaRPr lang="sk-SK" sz="1000" b="0" i="0" u="none" strike="noStrike">
+                        <a:solidFill>
+                          <a:srgbClr val="000000"/>
+                        </a:solidFill>
+                        <a:effectLst/>
+                        <a:latin typeface="Calibri" panose="020F0502020204030204" pitchFamily="34" charset="0"/>
+                      </a:endParaRPr>
+                    </a:p>
+                  </a:txBody>
+                  <a:tcPr marL="8679" marR="8679" marT="8679" marB="0" anchor="ctr"/>
+                </a:tc>
+                <a:tc>
+                  <a:txBody>
+                    <a:bodyPr/>
+                    <a:lstStyle/>
+                    <a:p>
+                      <a:pPr algn="ctr" fontAlgn="ctr"/>
+                      <a:r>
+                        <a:rPr lang="sk-SK" sz="1000" u="none" strike="noStrike">
+                          <a:effectLst/>
+                        </a:rPr>
+                        <a:t>48</a:t>
+                      </a:r>
+                      <a:endParaRPr lang="sk-SK" sz="1000" b="0" i="0" u="none" strike="noStrike">
+                        <a:solidFill>
+                          <a:srgbClr val="000000"/>
+                        </a:solidFill>
+                        <a:effectLst/>
+                        <a:latin typeface="Calibri" panose="020F0502020204030204" pitchFamily="34" charset="0"/>
+                      </a:endParaRPr>
+                    </a:p>
+                  </a:txBody>
+                  <a:tcPr marL="8679" marR="8679" marT="8679" marB="0" anchor="ctr"/>
+                </a:tc>
+                <a:tc>
+                  <a:txBody>
+                    <a:bodyPr/>
+                    <a:lstStyle/>
+                    <a:p>
+                      <a:pPr algn="ctr" fontAlgn="ctr"/>
+                      <a:r>
+                        <a:rPr lang="sk-SK" sz="1000" u="none" strike="noStrike">
+                          <a:effectLst/>
+                        </a:rPr>
+                        <a:t>80</a:t>
+                      </a:r>
+                      <a:endParaRPr lang="sk-SK" sz="1000" b="0" i="0" u="none" strike="noStrike">
+                        <a:solidFill>
+                          <a:srgbClr val="000000"/>
+                        </a:solidFill>
+                        <a:effectLst/>
+                        <a:latin typeface="Calibri" panose="020F0502020204030204" pitchFamily="34" charset="0"/>
+                      </a:endParaRPr>
+                    </a:p>
+                  </a:txBody>
+                  <a:tcPr marL="8679" marR="8679" marT="8679" marB="0" anchor="ctr"/>
+                </a:tc>
+                <a:extLst>
+                  <a:ext uri="{0D108BD9-81ED-4DB2-BD59-A6C34878D82A}">
+                    <a16:rowId xmlns:a16="http://schemas.microsoft.com/office/drawing/2014/main" val="2221604031"/>
+                  </a:ext>
+                </a:extLst>
+              </a:tr>
+              <a:tr h="182266">
+                <a:tc>
+                  <a:txBody>
+                    <a:bodyPr/>
+                    <a:lstStyle/>
+                    <a:p>
+                      <a:pPr algn="ctr" fontAlgn="ctr"/>
+                      <a:r>
+                        <a:rPr lang="sk-SK" sz="1000" u="none" strike="noStrike">
+                          <a:effectLst/>
+                        </a:rPr>
+                        <a:t>14</a:t>
+                      </a:r>
+                      <a:endParaRPr lang="sk-SK" sz="1000" b="0" i="0" u="none" strike="noStrike">
+                        <a:solidFill>
+                          <a:srgbClr val="000000"/>
+                        </a:solidFill>
+                        <a:effectLst/>
+                        <a:latin typeface="Calibri" panose="020F0502020204030204" pitchFamily="34" charset="0"/>
+                      </a:endParaRPr>
+                    </a:p>
+                  </a:txBody>
+                  <a:tcPr marL="8679" marR="8679" marT="8679" marB="0" anchor="ctr"/>
+                </a:tc>
+                <a:tc>
+                  <a:txBody>
+                    <a:bodyPr/>
+                    <a:lstStyle/>
+                    <a:p>
+                      <a:pPr algn="ctr" fontAlgn="ctr"/>
+                      <a:r>
+                        <a:rPr lang="sk-SK" sz="1000" u="none" strike="noStrike">
+                          <a:effectLst/>
+                        </a:rPr>
+                        <a:t>NM</a:t>
+                      </a:r>
+                      <a:endParaRPr lang="sk-SK" sz="1000" b="0" i="0" u="none" strike="noStrike">
+                        <a:solidFill>
+                          <a:srgbClr val="000000"/>
+                        </a:solidFill>
+                        <a:effectLst/>
+                        <a:latin typeface="Calibri" panose="020F0502020204030204" pitchFamily="34" charset="0"/>
+                      </a:endParaRPr>
+                    </a:p>
+                  </a:txBody>
+                  <a:tcPr marL="8679" marR="8679" marT="8679" marB="0" anchor="ctr"/>
+                </a:tc>
+                <a:tc>
+                  <a:txBody>
+                    <a:bodyPr/>
+                    <a:lstStyle/>
+                    <a:p>
+                      <a:pPr algn="ctr" fontAlgn="ctr"/>
+                      <a:r>
+                        <a:rPr lang="sk-SK" sz="1000" u="none" strike="noStrike">
+                          <a:effectLst/>
+                        </a:rPr>
+                        <a:t>44</a:t>
+                      </a:r>
+                      <a:endParaRPr lang="sk-SK" sz="1000" b="0" i="0" u="none" strike="noStrike">
+                        <a:solidFill>
+                          <a:srgbClr val="000000"/>
+                        </a:solidFill>
+                        <a:effectLst/>
+                        <a:latin typeface="Calibri" panose="020F0502020204030204" pitchFamily="34" charset="0"/>
+                      </a:endParaRPr>
+                    </a:p>
+                  </a:txBody>
+                  <a:tcPr marL="8679" marR="8679" marT="8679" marB="0" anchor="ctr"/>
+                </a:tc>
+                <a:tc>
+                  <a:txBody>
+                    <a:bodyPr/>
+                    <a:lstStyle/>
+                    <a:p>
+                      <a:pPr algn="ctr" fontAlgn="ctr"/>
+                      <a:r>
+                        <a:rPr lang="sk-SK" sz="1000" u="none" strike="noStrike">
+                          <a:effectLst/>
+                        </a:rPr>
+                        <a:t>84</a:t>
+                      </a:r>
+                      <a:endParaRPr lang="sk-SK" sz="1000" b="0" i="0" u="none" strike="noStrike">
+                        <a:solidFill>
+                          <a:srgbClr val="000000"/>
+                        </a:solidFill>
+                        <a:effectLst/>
+                        <a:latin typeface="Calibri" panose="020F0502020204030204" pitchFamily="34" charset="0"/>
+                      </a:endParaRPr>
+                    </a:p>
+                  </a:txBody>
+                  <a:tcPr marL="8679" marR="8679" marT="8679" marB="0" anchor="ctr"/>
+                </a:tc>
+                <a:extLst>
+                  <a:ext uri="{0D108BD9-81ED-4DB2-BD59-A6C34878D82A}">
+                    <a16:rowId xmlns:a16="http://schemas.microsoft.com/office/drawing/2014/main" val="1636100894"/>
+                  </a:ext>
+                </a:extLst>
+              </a:tr>
+              <a:tr h="182266">
+                <a:tc>
+                  <a:txBody>
+                    <a:bodyPr/>
+                    <a:lstStyle/>
+                    <a:p>
+                      <a:pPr algn="ctr" fontAlgn="ctr"/>
+                      <a:r>
+                        <a:rPr lang="sk-SK" sz="1000" u="none" strike="noStrike">
+                          <a:effectLst/>
+                        </a:rPr>
+                        <a:t>15</a:t>
+                      </a:r>
+                      <a:endParaRPr lang="sk-SK" sz="1000" b="0" i="0" u="none" strike="noStrike">
+                        <a:solidFill>
+                          <a:srgbClr val="000000"/>
+                        </a:solidFill>
+                        <a:effectLst/>
+                        <a:latin typeface="Calibri" panose="020F0502020204030204" pitchFamily="34" charset="0"/>
+                      </a:endParaRPr>
+                    </a:p>
+                  </a:txBody>
+                  <a:tcPr marL="8679" marR="8679" marT="8679" marB="0" anchor="ctr"/>
+                </a:tc>
+                <a:tc>
+                  <a:txBody>
+                    <a:bodyPr/>
+                    <a:lstStyle/>
+                    <a:p>
+                      <a:pPr algn="ctr" fontAlgn="ctr"/>
+                      <a:r>
+                        <a:rPr lang="sk-SK" sz="1000" u="none" strike="noStrike">
+                          <a:effectLst/>
+                        </a:rPr>
+                        <a:t>MA</a:t>
+                      </a:r>
+                      <a:endParaRPr lang="sk-SK" sz="1000" b="0" i="0" u="none" strike="noStrike">
+                        <a:solidFill>
+                          <a:srgbClr val="000000"/>
+                        </a:solidFill>
+                        <a:effectLst/>
+                        <a:latin typeface="Calibri" panose="020F0502020204030204" pitchFamily="34" charset="0"/>
+                      </a:endParaRPr>
+                    </a:p>
+                  </a:txBody>
+                  <a:tcPr marL="8679" marR="8679" marT="8679" marB="0" anchor="ctr"/>
+                </a:tc>
+                <a:tc>
+                  <a:txBody>
+                    <a:bodyPr/>
+                    <a:lstStyle/>
+                    <a:p>
+                      <a:pPr algn="ctr" fontAlgn="ctr"/>
+                      <a:r>
+                        <a:rPr lang="sk-SK" sz="1000" u="none" strike="noStrike">
+                          <a:effectLst/>
+                        </a:rPr>
+                        <a:t>60</a:t>
+                      </a:r>
+                      <a:endParaRPr lang="sk-SK" sz="1000" b="0" i="0" u="none" strike="noStrike">
+                        <a:solidFill>
+                          <a:srgbClr val="000000"/>
+                        </a:solidFill>
+                        <a:effectLst/>
+                        <a:latin typeface="Calibri" panose="020F0502020204030204" pitchFamily="34" charset="0"/>
+                      </a:endParaRPr>
+                    </a:p>
+                  </a:txBody>
+                  <a:tcPr marL="8679" marR="8679" marT="8679" marB="0" anchor="ctr"/>
+                </a:tc>
+                <a:tc>
+                  <a:txBody>
+                    <a:bodyPr/>
+                    <a:lstStyle/>
+                    <a:p>
+                      <a:pPr algn="ctr" fontAlgn="ctr"/>
+                      <a:r>
+                        <a:rPr lang="sk-SK" sz="1000" u="none" strike="noStrike">
+                          <a:effectLst/>
+                        </a:rPr>
+                        <a:t>84</a:t>
+                      </a:r>
+                      <a:endParaRPr lang="sk-SK" sz="1000" b="0" i="0" u="none" strike="noStrike">
+                        <a:solidFill>
+                          <a:srgbClr val="000000"/>
+                        </a:solidFill>
+                        <a:effectLst/>
+                        <a:latin typeface="Calibri" panose="020F0502020204030204" pitchFamily="34" charset="0"/>
+                      </a:endParaRPr>
+                    </a:p>
+                  </a:txBody>
+                  <a:tcPr marL="8679" marR="8679" marT="8679" marB="0" anchor="ctr"/>
+                </a:tc>
+                <a:extLst>
+                  <a:ext uri="{0D108BD9-81ED-4DB2-BD59-A6C34878D82A}">
+                    <a16:rowId xmlns:a16="http://schemas.microsoft.com/office/drawing/2014/main" val="3044623861"/>
+                  </a:ext>
+                </a:extLst>
+              </a:tr>
+              <a:tr h="182266">
+                <a:tc>
+                  <a:txBody>
+                    <a:bodyPr/>
+                    <a:lstStyle/>
+                    <a:p>
+                      <a:pPr algn="ctr" fontAlgn="ctr"/>
+                      <a:r>
+                        <a:rPr lang="sk-SK" sz="1000" u="none" strike="noStrike">
+                          <a:effectLst/>
+                        </a:rPr>
+                        <a:t>16</a:t>
+                      </a:r>
+                      <a:endParaRPr lang="sk-SK" sz="1000" b="0" i="0" u="none" strike="noStrike">
+                        <a:solidFill>
+                          <a:srgbClr val="000000"/>
+                        </a:solidFill>
+                        <a:effectLst/>
+                        <a:latin typeface="Calibri" panose="020F0502020204030204" pitchFamily="34" charset="0"/>
+                      </a:endParaRPr>
+                    </a:p>
+                  </a:txBody>
+                  <a:tcPr marL="8679" marR="8679" marT="8679" marB="0" anchor="ctr"/>
+                </a:tc>
+                <a:tc>
+                  <a:txBody>
+                    <a:bodyPr/>
+                    <a:lstStyle/>
+                    <a:p>
+                      <a:pPr algn="ctr" fontAlgn="ctr"/>
+                      <a:r>
+                        <a:rPr lang="sk-SK" sz="1000" u="none" strike="noStrike">
+                          <a:effectLst/>
+                        </a:rPr>
+                        <a:t>LA</a:t>
+                      </a:r>
+                      <a:endParaRPr lang="sk-SK" sz="1000" b="0" i="0" u="none" strike="noStrike">
+                        <a:solidFill>
+                          <a:srgbClr val="000000"/>
+                        </a:solidFill>
+                        <a:effectLst/>
+                        <a:latin typeface="Calibri" panose="020F0502020204030204" pitchFamily="34" charset="0"/>
+                      </a:endParaRPr>
+                    </a:p>
+                  </a:txBody>
+                  <a:tcPr marL="8679" marR="8679" marT="8679" marB="0" anchor="ctr"/>
+                </a:tc>
+                <a:tc>
+                  <a:txBody>
+                    <a:bodyPr/>
+                    <a:lstStyle/>
+                    <a:p>
+                      <a:pPr algn="ctr" fontAlgn="ctr"/>
+                      <a:r>
+                        <a:rPr lang="sk-SK" sz="1000" u="none" strike="noStrike">
+                          <a:effectLst/>
+                        </a:rPr>
+                        <a:t>44</a:t>
+                      </a:r>
+                      <a:endParaRPr lang="sk-SK" sz="1000" b="0" i="0" u="none" strike="noStrike">
+                        <a:solidFill>
+                          <a:srgbClr val="000000"/>
+                        </a:solidFill>
+                        <a:effectLst/>
+                        <a:latin typeface="Calibri" panose="020F0502020204030204" pitchFamily="34" charset="0"/>
+                      </a:endParaRPr>
+                    </a:p>
+                  </a:txBody>
+                  <a:tcPr marL="8679" marR="8679" marT="8679" marB="0" anchor="ctr"/>
+                </a:tc>
+                <a:tc>
+                  <a:txBody>
+                    <a:bodyPr/>
+                    <a:lstStyle/>
+                    <a:p>
+                      <a:pPr algn="ctr" fontAlgn="ctr"/>
+                      <a:r>
+                        <a:rPr lang="sk-SK" sz="1000" u="none" strike="noStrike">
+                          <a:effectLst/>
+                        </a:rPr>
+                        <a:t>92</a:t>
+                      </a:r>
+                      <a:endParaRPr lang="sk-SK" sz="1000" b="0" i="0" u="none" strike="noStrike">
+                        <a:solidFill>
+                          <a:srgbClr val="000000"/>
+                        </a:solidFill>
+                        <a:effectLst/>
+                        <a:latin typeface="Calibri" panose="020F0502020204030204" pitchFamily="34" charset="0"/>
+                      </a:endParaRPr>
+                    </a:p>
+                  </a:txBody>
+                  <a:tcPr marL="8679" marR="8679" marT="8679" marB="0" anchor="ctr"/>
+                </a:tc>
+                <a:extLst>
+                  <a:ext uri="{0D108BD9-81ED-4DB2-BD59-A6C34878D82A}">
+                    <a16:rowId xmlns:a16="http://schemas.microsoft.com/office/drawing/2014/main" val="4088633274"/>
+                  </a:ext>
+                </a:extLst>
+              </a:tr>
+              <a:tr h="182266">
+                <a:tc>
+                  <a:txBody>
+                    <a:bodyPr/>
+                    <a:lstStyle/>
+                    <a:p>
+                      <a:pPr algn="ctr" fontAlgn="ctr"/>
+                      <a:r>
+                        <a:rPr lang="sk-SK" sz="1000" u="none" strike="noStrike">
+                          <a:effectLst/>
+                        </a:rPr>
+                        <a:t>17</a:t>
+                      </a:r>
+                      <a:endParaRPr lang="sk-SK" sz="1000" b="0" i="0" u="none" strike="noStrike">
+                        <a:solidFill>
+                          <a:srgbClr val="000000"/>
+                        </a:solidFill>
+                        <a:effectLst/>
+                        <a:latin typeface="Calibri" panose="020F0502020204030204" pitchFamily="34" charset="0"/>
+                      </a:endParaRPr>
+                    </a:p>
+                  </a:txBody>
+                  <a:tcPr marL="8679" marR="8679" marT="8679" marB="0" anchor="ctr"/>
+                </a:tc>
+                <a:tc>
+                  <a:txBody>
+                    <a:bodyPr/>
+                    <a:lstStyle/>
+                    <a:p>
+                      <a:pPr algn="ctr" fontAlgn="ctr"/>
+                      <a:r>
+                        <a:rPr lang="sk-SK" sz="1000" u="none" strike="noStrike">
+                          <a:effectLst/>
+                        </a:rPr>
+                        <a:t>AM</a:t>
+                      </a:r>
+                      <a:endParaRPr lang="sk-SK" sz="1000" b="0" i="0" u="none" strike="noStrike">
+                        <a:solidFill>
+                          <a:srgbClr val="000000"/>
+                        </a:solidFill>
+                        <a:effectLst/>
+                        <a:latin typeface="Calibri" panose="020F0502020204030204" pitchFamily="34" charset="0"/>
+                      </a:endParaRPr>
+                    </a:p>
+                  </a:txBody>
+                  <a:tcPr marL="8679" marR="8679" marT="8679" marB="0" anchor="ctr"/>
+                </a:tc>
+                <a:tc>
+                  <a:txBody>
+                    <a:bodyPr/>
+                    <a:lstStyle/>
+                    <a:p>
+                      <a:pPr algn="ctr" fontAlgn="ctr"/>
+                      <a:r>
+                        <a:rPr lang="sk-SK" sz="1000" u="none" strike="noStrike">
+                          <a:effectLst/>
+                        </a:rPr>
+                        <a:t>48</a:t>
+                      </a:r>
+                      <a:endParaRPr lang="sk-SK" sz="1000" b="0" i="0" u="none" strike="noStrike">
+                        <a:solidFill>
+                          <a:srgbClr val="000000"/>
+                        </a:solidFill>
+                        <a:effectLst/>
+                        <a:latin typeface="Calibri" panose="020F0502020204030204" pitchFamily="34" charset="0"/>
+                      </a:endParaRPr>
+                    </a:p>
+                  </a:txBody>
+                  <a:tcPr marL="8679" marR="8679" marT="8679" marB="0" anchor="ctr"/>
+                </a:tc>
+                <a:tc>
+                  <a:txBody>
+                    <a:bodyPr/>
+                    <a:lstStyle/>
+                    <a:p>
+                      <a:pPr algn="ctr" fontAlgn="ctr"/>
+                      <a:r>
+                        <a:rPr lang="sk-SK" sz="1000" u="none" strike="noStrike">
+                          <a:effectLst/>
+                        </a:rPr>
+                        <a:t>80</a:t>
+                      </a:r>
+                      <a:endParaRPr lang="sk-SK" sz="1000" b="0" i="0" u="none" strike="noStrike">
+                        <a:solidFill>
+                          <a:srgbClr val="000000"/>
+                        </a:solidFill>
+                        <a:effectLst/>
+                        <a:latin typeface="Calibri" panose="020F0502020204030204" pitchFamily="34" charset="0"/>
+                      </a:endParaRPr>
+                    </a:p>
+                  </a:txBody>
+                  <a:tcPr marL="8679" marR="8679" marT="8679" marB="0" anchor="ctr"/>
+                </a:tc>
+                <a:extLst>
+                  <a:ext uri="{0D108BD9-81ED-4DB2-BD59-A6C34878D82A}">
+                    <a16:rowId xmlns:a16="http://schemas.microsoft.com/office/drawing/2014/main" val="1987088842"/>
+                  </a:ext>
+                </a:extLst>
+              </a:tr>
+              <a:tr h="182266">
+                <a:tc>
+                  <a:txBody>
+                    <a:bodyPr/>
+                    <a:lstStyle/>
+                    <a:p>
+                      <a:pPr algn="ctr" fontAlgn="ctr"/>
+                      <a:r>
+                        <a:rPr lang="sk-SK" sz="1000" u="none" strike="noStrike">
+                          <a:effectLst/>
+                        </a:rPr>
+                        <a:t>18</a:t>
+                      </a:r>
+                      <a:endParaRPr lang="sk-SK" sz="1000" b="0" i="0" u="none" strike="noStrike">
+                        <a:solidFill>
+                          <a:srgbClr val="000000"/>
+                        </a:solidFill>
+                        <a:effectLst/>
+                        <a:latin typeface="Calibri" panose="020F0502020204030204" pitchFamily="34" charset="0"/>
+                      </a:endParaRPr>
+                    </a:p>
+                  </a:txBody>
+                  <a:tcPr marL="8679" marR="8679" marT="8679" marB="0" anchor="ctr"/>
+                </a:tc>
+                <a:tc>
+                  <a:txBody>
+                    <a:bodyPr/>
+                    <a:lstStyle/>
+                    <a:p>
+                      <a:pPr algn="ctr" fontAlgn="ctr"/>
+                      <a:r>
+                        <a:rPr lang="sk-SK" sz="1000" u="none" strike="noStrike">
+                          <a:effectLst/>
+                        </a:rPr>
+                        <a:t>FS</a:t>
+                      </a:r>
+                      <a:endParaRPr lang="sk-SK" sz="1000" b="0" i="0" u="none" strike="noStrike">
+                        <a:solidFill>
+                          <a:srgbClr val="000000"/>
+                        </a:solidFill>
+                        <a:effectLst/>
+                        <a:latin typeface="Calibri" panose="020F0502020204030204" pitchFamily="34" charset="0"/>
+                      </a:endParaRPr>
+                    </a:p>
+                  </a:txBody>
+                  <a:tcPr marL="8679" marR="8679" marT="8679" marB="0" anchor="ctr"/>
+                </a:tc>
+                <a:tc>
+                  <a:txBody>
+                    <a:bodyPr/>
+                    <a:lstStyle/>
+                    <a:p>
+                      <a:pPr algn="ctr" fontAlgn="ctr"/>
+                      <a:r>
+                        <a:rPr lang="sk-SK" sz="1000" u="none" strike="noStrike">
+                          <a:effectLst/>
+                        </a:rPr>
+                        <a:t>40</a:t>
+                      </a:r>
+                      <a:endParaRPr lang="sk-SK" sz="1000" b="0" i="0" u="none" strike="noStrike">
+                        <a:solidFill>
+                          <a:srgbClr val="000000"/>
+                        </a:solidFill>
+                        <a:effectLst/>
+                        <a:latin typeface="Calibri" panose="020F0502020204030204" pitchFamily="34" charset="0"/>
+                      </a:endParaRPr>
+                    </a:p>
+                  </a:txBody>
+                  <a:tcPr marL="8679" marR="8679" marT="8679" marB="0" anchor="ctr"/>
+                </a:tc>
+                <a:tc>
+                  <a:txBody>
+                    <a:bodyPr/>
+                    <a:lstStyle/>
+                    <a:p>
+                      <a:pPr algn="ctr" fontAlgn="ctr"/>
+                      <a:r>
+                        <a:rPr lang="sk-SK" sz="1000" u="none" strike="noStrike">
+                          <a:effectLst/>
+                        </a:rPr>
+                        <a:t>80</a:t>
+                      </a:r>
+                      <a:endParaRPr lang="sk-SK" sz="1000" b="0" i="0" u="none" strike="noStrike">
+                        <a:solidFill>
+                          <a:srgbClr val="000000"/>
+                        </a:solidFill>
+                        <a:effectLst/>
+                        <a:latin typeface="Calibri" panose="020F0502020204030204" pitchFamily="34" charset="0"/>
+                      </a:endParaRPr>
+                    </a:p>
+                  </a:txBody>
+                  <a:tcPr marL="8679" marR="8679" marT="8679" marB="0" anchor="ctr"/>
+                </a:tc>
+                <a:extLst>
+                  <a:ext uri="{0D108BD9-81ED-4DB2-BD59-A6C34878D82A}">
+                    <a16:rowId xmlns:a16="http://schemas.microsoft.com/office/drawing/2014/main" val="2904866141"/>
+                  </a:ext>
+                </a:extLst>
+              </a:tr>
+              <a:tr h="182266">
+                <a:tc>
+                  <a:txBody>
+                    <a:bodyPr/>
+                    <a:lstStyle/>
+                    <a:p>
+                      <a:pPr algn="ctr" fontAlgn="ctr"/>
+                      <a:r>
+                        <a:rPr lang="sk-SK" sz="1000" u="none" strike="noStrike">
+                          <a:effectLst/>
+                        </a:rPr>
+                        <a:t>19</a:t>
+                      </a:r>
+                      <a:endParaRPr lang="sk-SK" sz="1000" b="0" i="0" u="none" strike="noStrike">
+                        <a:solidFill>
+                          <a:srgbClr val="000000"/>
+                        </a:solidFill>
+                        <a:effectLst/>
+                        <a:latin typeface="Calibri" panose="020F0502020204030204" pitchFamily="34" charset="0"/>
+                      </a:endParaRPr>
+                    </a:p>
+                  </a:txBody>
+                  <a:tcPr marL="8679" marR="8679" marT="8679" marB="0" anchor="ctr"/>
+                </a:tc>
+                <a:tc>
+                  <a:txBody>
+                    <a:bodyPr/>
+                    <a:lstStyle/>
+                    <a:p>
+                      <a:pPr algn="ctr" fontAlgn="ctr"/>
+                      <a:r>
+                        <a:rPr lang="sk-SK" sz="1000" u="none" strike="noStrike">
+                          <a:effectLst/>
+                        </a:rPr>
+                        <a:t>AP</a:t>
+                      </a:r>
+                      <a:endParaRPr lang="sk-SK" sz="1000" b="0" i="0" u="none" strike="noStrike">
+                        <a:solidFill>
+                          <a:srgbClr val="000000"/>
+                        </a:solidFill>
+                        <a:effectLst/>
+                        <a:latin typeface="Calibri" panose="020F0502020204030204" pitchFamily="34" charset="0"/>
+                      </a:endParaRPr>
+                    </a:p>
+                  </a:txBody>
+                  <a:tcPr marL="8679" marR="8679" marT="8679" marB="0" anchor="ctr"/>
+                </a:tc>
+                <a:tc>
+                  <a:txBody>
+                    <a:bodyPr/>
+                    <a:lstStyle/>
+                    <a:p>
+                      <a:pPr algn="ctr" fontAlgn="ctr"/>
+                      <a:r>
+                        <a:rPr lang="sk-SK" sz="1000" u="none" strike="noStrike">
+                          <a:effectLst/>
+                        </a:rPr>
+                        <a:t>48</a:t>
+                      </a:r>
+                      <a:endParaRPr lang="sk-SK" sz="1000" b="0" i="0" u="none" strike="noStrike">
+                        <a:solidFill>
+                          <a:srgbClr val="000000"/>
+                        </a:solidFill>
+                        <a:effectLst/>
+                        <a:latin typeface="Calibri" panose="020F0502020204030204" pitchFamily="34" charset="0"/>
+                      </a:endParaRPr>
+                    </a:p>
+                  </a:txBody>
+                  <a:tcPr marL="8679" marR="8679" marT="8679" marB="0" anchor="ctr"/>
+                </a:tc>
+                <a:tc>
+                  <a:txBody>
+                    <a:bodyPr/>
+                    <a:lstStyle/>
+                    <a:p>
+                      <a:pPr algn="ctr" fontAlgn="ctr"/>
+                      <a:r>
+                        <a:rPr lang="sk-SK" sz="1000" u="none" strike="noStrike" dirty="0">
+                          <a:effectLst/>
+                        </a:rPr>
+                        <a:t>84</a:t>
+                      </a:r>
+                      <a:endParaRPr lang="sk-SK" sz="1000" b="0" i="0" u="none" strike="noStrike" dirty="0">
+                        <a:solidFill>
+                          <a:srgbClr val="000000"/>
+                        </a:solidFill>
+                        <a:effectLst/>
+                        <a:latin typeface="Calibri" panose="020F0502020204030204" pitchFamily="34" charset="0"/>
+                      </a:endParaRPr>
+                    </a:p>
+                  </a:txBody>
+                  <a:tcPr marL="8679" marR="8679" marT="8679" marB="0" anchor="ctr"/>
+                </a:tc>
+                <a:extLst>
+                  <a:ext uri="{0D108BD9-81ED-4DB2-BD59-A6C34878D82A}">
+                    <a16:rowId xmlns:a16="http://schemas.microsoft.com/office/drawing/2014/main" val="2257588609"/>
+                  </a:ext>
+                </a:extLst>
+              </a:tr>
+            </a:tbl>
+          </a:graphicData>
+        </a:graphic>
+      </p:graphicFrame>
+      <p:sp>
+        <p:nvSpPr>
+          <p:cNvPr id="8" name="BlokTextu 7">
+            <a:extLst>
+              <a:ext uri="{FF2B5EF4-FFF2-40B4-BE49-F238E27FC236}">
+                <a16:creationId xmlns:a16="http://schemas.microsoft.com/office/drawing/2014/main" id="{6555E36B-1B91-4978-9260-F571ECC3F9D4}"/>
+              </a:ext>
+            </a:extLst>
+          </p:cNvPr>
+          <p:cNvSpPr txBox="1"/>
+          <p:nvPr/>
+        </p:nvSpPr>
+        <p:spPr>
+          <a:xfrm>
+            <a:off x="2380575" y="1264343"/>
+            <a:ext cx="5779363" cy="923330"/>
+          </a:xfrm>
+          <a:prstGeom prst="rect">
+            <a:avLst/>
+          </a:prstGeom>
+          <a:noFill/>
+        </p:spPr>
+        <p:txBody>
+          <a:bodyPr wrap="square" rtlCol="0">
+            <a:spAutoFit/>
+          </a:bodyPr>
+          <a:lstStyle/>
+          <a:p>
+            <a:pPr marL="285750" indent="-285750">
+              <a:buFont typeface="Arial" panose="020B0604020202020204" pitchFamily="34" charset="0"/>
+              <a:buChar char="•"/>
+            </a:pPr>
+            <a:r>
+              <a:rPr lang="sk-SK" dirty="0"/>
+              <a:t>19 študenti danej katedry</a:t>
+            </a:r>
+          </a:p>
+          <a:p>
+            <a:pPr marL="285750" indent="-285750">
+              <a:buFont typeface="Arial" panose="020B0604020202020204" pitchFamily="34" charset="0"/>
+              <a:buChar char="•"/>
+            </a:pPr>
+            <a:endParaRPr lang="sk-SK" dirty="0"/>
+          </a:p>
+          <a:p>
+            <a:pPr marL="285750" indent="-285750">
+              <a:buFont typeface="Arial" panose="020B0604020202020204" pitchFamily="34" charset="0"/>
+              <a:buChar char="•"/>
+            </a:pPr>
+            <a:r>
+              <a:rPr lang="sk-SK" dirty="0"/>
+              <a:t>20 bodov skúsenosti denne po dobu 30 dní  </a:t>
+            </a:r>
+          </a:p>
+        </p:txBody>
+      </p:sp>
     </p:spTree>
     <p:extLst>
       <p:ext uri="{BB962C8B-B14F-4D97-AF65-F5344CB8AC3E}">
         <p14:creationId xmlns:p14="http://schemas.microsoft.com/office/powerpoint/2010/main" val="1251570293"/>
+      </p:ext>
+    </p:extLst>
+  </p:cSld>
+  <p:clrMapOvr>
+    <a:masterClrMapping/>
+  </p:clrMapOvr>
+</p:sld>
+</file>
+
+<file path=ppt/slides/slide13.xml><?xml version="1.0" encoding="utf-8"?>
+<p:sld xmlns:a="http://schemas.openxmlformats.org/drawingml/2006/main" xmlns:r="http://schemas.openxmlformats.org/officeDocument/2006/relationships" xmlns:p="http://schemas.openxmlformats.org/presentationml/2006/main">
+  <p:cSld>
+    <p:spTree>
+      <p:nvGrpSpPr>
+        <p:cNvPr id="1" name=""/>
+        <p:cNvGrpSpPr/>
+        <p:nvPr/>
+      </p:nvGrpSpPr>
+      <p:grpSpPr>
+        <a:xfrm>
+          <a:off x="0" y="0"/>
+          <a:ext cx="0" cy="0"/>
+          <a:chOff x="0" y="0"/>
+          <a:chExt cx="0" cy="0"/>
+        </a:xfrm>
+      </p:grpSpPr>
+    </p:spTree>
+    <p:extLst>
+      <p:ext uri="{BB962C8B-B14F-4D97-AF65-F5344CB8AC3E}">
+        <p14:creationId xmlns:p14="http://schemas.microsoft.com/office/powerpoint/2010/main" val="2027762359"/>
+      </p:ext>
+    </p:extLst>
+  </p:cSld>
+  <p:clrMapOvr>
+    <a:masterClrMapping/>
+  </p:clrMapOvr>
+</p:sld>
+</file>
+
+<file path=ppt/slides/slide14.xml><?xml version="1.0" encoding="utf-8"?>
+<p:sld xmlns:a="http://schemas.openxmlformats.org/drawingml/2006/main" xmlns:r="http://schemas.openxmlformats.org/officeDocument/2006/relationships" xmlns:p="http://schemas.openxmlformats.org/presentationml/2006/main">
+  <p:cSld>
+    <p:spTree>
+      <p:nvGrpSpPr>
+        <p:cNvPr id="1" name=""/>
+        <p:cNvGrpSpPr/>
+        <p:nvPr/>
+      </p:nvGrpSpPr>
+      <p:grpSpPr>
+        <a:xfrm>
+          <a:off x="0" y="0"/>
+          <a:ext cx="0" cy="0"/>
+          <a:chOff x="0" y="0"/>
+          <a:chExt cx="0" cy="0"/>
+        </a:xfrm>
+      </p:grpSpPr>
+    </p:spTree>
+    <p:extLst>
+      <p:ext uri="{BB962C8B-B14F-4D97-AF65-F5344CB8AC3E}">
+        <p14:creationId xmlns:p14="http://schemas.microsoft.com/office/powerpoint/2010/main" val="546501022"/>
       </p:ext>
     </p:extLst>
   </p:cSld>

</xml_diff>

<commit_message>
Pisanie reakcii na prednasky a robenie diagramu
</commit_message>
<xml_diff>
--- a/Prezentacia_clanok.pptx
+++ b/Prezentacia_clanok.pptx
@@ -9,7 +9,7 @@
     <p:sldId id="257" r:id="rId3"/>
     <p:sldId id="258" r:id="rId4"/>
     <p:sldId id="259" r:id="rId5"/>
-    <p:sldId id="260" r:id="rId6"/>
+    <p:sldId id="271" r:id="rId6"/>
     <p:sldId id="261" r:id="rId7"/>
     <p:sldId id="262" r:id="rId8"/>
     <p:sldId id="263" r:id="rId9"/>
@@ -4216,7 +4216,7 @@
           <a:p>
             <a:fld id="{88D38747-4367-4BD2-8D51-C97E202738E2}" type="datetime1">
               <a:rPr lang="en-US" smtClean="0"/>
-              <a:t>11/21/2020</a:t>
+              <a:t>12/7/2020</a:t>
             </a:fld>
             <a:endParaRPr lang="en-US" dirty="0"/>
           </a:p>
@@ -4521,7 +4521,7 @@
           <a:p>
             <a:fld id="{11F1B079-7EF0-44EE-B798-BCC497C9F3B2}" type="datetime1">
               <a:rPr lang="en-US" smtClean="0"/>
-              <a:t>11/21/2020</a:t>
+              <a:t>12/7/2020</a:t>
             </a:fld>
             <a:endParaRPr lang="en-US" dirty="0"/>
           </a:p>
@@ -4715,7 +4715,7 @@
           <a:p>
             <a:fld id="{28FF70A8-1D13-4657-95F0-A9EA54967B8D}" type="datetime1">
               <a:rPr lang="en-US" smtClean="0"/>
-              <a:t>11/21/2020</a:t>
+              <a:t>12/7/2020</a:t>
             </a:fld>
             <a:endParaRPr lang="en-US" dirty="0"/>
           </a:p>
@@ -4978,7 +4978,7 @@
           <a:p>
             <a:fld id="{21EB90AC-71BD-4C7F-8ACA-7B3F18292E63}" type="datetime1">
               <a:rPr lang="en-US" smtClean="0"/>
-              <a:t>11/21/2020</a:t>
+              <a:t>12/7/2020</a:t>
             </a:fld>
             <a:endParaRPr lang="en-US" dirty="0"/>
           </a:p>
@@ -5414,7 +5414,7 @@
           <a:p>
             <a:fld id="{4E6EFC2C-8905-46F0-B443-CE905B76BA01}" type="datetime1">
               <a:rPr lang="en-US" smtClean="0"/>
-              <a:t>11/21/2020</a:t>
+              <a:t>12/7/2020</a:t>
             </a:fld>
             <a:endParaRPr lang="en-US" dirty="0"/>
           </a:p>
@@ -5951,7 +5951,7 @@
           <a:p>
             <a:fld id="{D9079DC3-C9B5-499E-9140-0DC28B7074E2}" type="datetime1">
               <a:rPr lang="en-US" smtClean="0"/>
-              <a:t>11/21/2020</a:t>
+              <a:t>12/7/2020</a:t>
             </a:fld>
             <a:endParaRPr lang="en-US" dirty="0"/>
           </a:p>
@@ -6833,7 +6833,7 @@
           <a:p>
             <a:fld id="{30BB33EA-E472-4D22-9C03-A9C14AA21CED}" type="datetime1">
               <a:rPr lang="en-US" smtClean="0"/>
-              <a:t>11/21/2020</a:t>
+              <a:t>12/7/2020</a:t>
             </a:fld>
             <a:endParaRPr lang="en-US" dirty="0"/>
           </a:p>
@@ -7003,7 +7003,7 @@
           <a:p>
             <a:fld id="{217E833E-1B6D-415F-AD29-75AE8C43BD0D}" type="datetime1">
               <a:rPr lang="en-US" smtClean="0"/>
-              <a:t>11/21/2020</a:t>
+              <a:t>12/7/2020</a:t>
             </a:fld>
             <a:endParaRPr lang="en-US" dirty="0"/>
           </a:p>
@@ -7187,7 +7187,7 @@
           <a:p>
             <a:fld id="{8452596F-08A7-4B70-989A-F2B1CF31E66B}" type="datetime1">
               <a:rPr lang="en-US" smtClean="0"/>
-              <a:t>11/21/2020</a:t>
+              <a:t>12/7/2020</a:t>
             </a:fld>
             <a:endParaRPr lang="en-US" dirty="0"/>
           </a:p>
@@ -7357,7 +7357,7 @@
           <a:p>
             <a:fld id="{73C55A3C-5767-4844-A0A3-83778C2E5409}" type="datetime1">
               <a:rPr lang="en-US" smtClean="0"/>
-              <a:t>11/21/2020</a:t>
+              <a:t>12/7/2020</a:t>
             </a:fld>
             <a:endParaRPr lang="en-US" dirty="0"/>
           </a:p>
@@ -7601,7 +7601,7 @@
           <a:p>
             <a:fld id="{CAE507A8-A5CF-4D38-AB86-7EDDA87A85D4}" type="datetime1">
               <a:rPr lang="en-US" smtClean="0"/>
-              <a:t>11/21/2020</a:t>
+              <a:t>12/7/2020</a:t>
             </a:fld>
             <a:endParaRPr lang="en-US" dirty="0"/>
           </a:p>
@@ -7843,7 +7843,7 @@
           <a:p>
             <a:fld id="{BDFCD27C-8599-43EF-BA1D-14DDC1946E06}" type="datetime1">
               <a:rPr lang="en-US" smtClean="0"/>
-              <a:t>11/21/2020</a:t>
+              <a:t>12/7/2020</a:t>
             </a:fld>
             <a:endParaRPr lang="en-US" dirty="0"/>
           </a:p>
@@ -8324,7 +8324,7 @@
           <a:p>
             <a:fld id="{49343D99-809A-49C0-96E5-4250D0B498EE}" type="datetime1">
               <a:rPr lang="en-US" smtClean="0"/>
-              <a:t>11/21/2020</a:t>
+              <a:t>12/7/2020</a:t>
             </a:fld>
             <a:endParaRPr lang="en-US" dirty="0"/>
           </a:p>
@@ -8442,7 +8442,7 @@
           <a:p>
             <a:fld id="{A143DE9B-B678-4EFB-BB7D-A4370204A0B0}" type="datetime1">
               <a:rPr lang="en-US" smtClean="0"/>
-              <a:t>11/21/2020</a:t>
+              <a:t>12/7/2020</a:t>
             </a:fld>
             <a:endParaRPr lang="en-US" dirty="0"/>
           </a:p>
@@ -8537,7 +8537,7 @@
           <a:p>
             <a:fld id="{E68812DA-F765-4142-A6A3-A8ED7235E082}" type="datetime1">
               <a:rPr lang="en-US" smtClean="0"/>
-              <a:t>11/21/2020</a:t>
+              <a:t>12/7/2020</a:t>
             </a:fld>
             <a:endParaRPr lang="en-US" dirty="0"/>
           </a:p>
@@ -8792,7 +8792,7 @@
           <a:p>
             <a:fld id="{3E0277FD-7DE6-41D4-930D-AC99F5AFE54E}" type="datetime1">
               <a:rPr lang="en-US" smtClean="0"/>
-              <a:t>11/21/2020</a:t>
+              <a:t>12/7/2020</a:t>
             </a:fld>
             <a:endParaRPr lang="en-US" dirty="0"/>
           </a:p>
@@ -9099,7 +9099,7 @@
           <a:p>
             <a:fld id="{9EA15526-7079-4B7B-987C-1B5FAE11A0FF}" type="datetime1">
               <a:rPr lang="en-US" smtClean="0"/>
-              <a:t>11/21/2020</a:t>
+              <a:t>12/7/2020</a:t>
             </a:fld>
             <a:endParaRPr lang="en-US" dirty="0"/>
           </a:p>
@@ -9334,7 +9334,7 @@
           <a:p>
             <a:fld id="{073ED0CC-082F-4160-86E5-0D6041F12778}" type="datetime1">
               <a:rPr lang="en-US" smtClean="0"/>
-              <a:t>11/21/2020</a:t>
+              <a:t>12/7/2020</a:t>
             </a:fld>
             <a:endParaRPr lang="en-US" dirty="0"/>
           </a:p>
@@ -10771,6 +10771,18 @@
   <p:clrMapOvr>
     <a:masterClrMapping/>
   </p:clrMapOvr>
+  <mc:AlternateContent xmlns:mc="http://schemas.openxmlformats.org/markup-compatibility/2006" xmlns:p14="http://schemas.microsoft.com/office/powerpoint/2010/main">
+    <mc:Choice Requires="p14">
+      <p:transition spd="med" p14:dur="700">
+        <p:fade/>
+      </p:transition>
+    </mc:Choice>
+    <mc:Fallback xmlns="">
+      <p:transition spd="med">
+        <p:fade/>
+      </p:transition>
+    </mc:Fallback>
+  </mc:AlternateContent>
 </p:sld>
 </file>
 
@@ -10963,7 +10975,23 @@
             </a:r>
             <a:r>
               <a:rPr lang="sk-SK" dirty="0"/>
-              <a:t>. </a:t>
+              <a:t> (</a:t>
+            </a:r>
+            <a:r>
+              <a:rPr lang="en-US" sz="1800" dirty="0" err="1"/>
+              <a:t>Pangkuh</a:t>
+            </a:r>
+            <a:r>
+              <a:rPr lang="en-US" sz="1800" dirty="0"/>
+              <a:t> </a:t>
+            </a:r>
+            <a:r>
+              <a:rPr lang="en-US" sz="1800" dirty="0" err="1"/>
+              <a:t>Ajisoko</a:t>
+            </a:r>
+            <a:r>
+              <a:rPr lang="sk-SK" dirty="0"/>
+              <a:t>). </a:t>
             </a:r>
           </a:p>
         </p:txBody>
@@ -11059,6 +11087,18 @@
   <p:clrMapOvr>
     <a:masterClrMapping/>
   </p:clrMapOvr>
+  <mc:AlternateContent xmlns:mc="http://schemas.openxmlformats.org/markup-compatibility/2006" xmlns:p14="http://schemas.microsoft.com/office/powerpoint/2010/main">
+    <mc:Choice Requires="p14">
+      <p:transition spd="med" p14:dur="700">
+        <p:fade/>
+      </p:transition>
+    </mc:Choice>
+    <mc:Fallback xmlns="">
+      <p:transition spd="med">
+        <p:fade/>
+      </p:transition>
+    </mc:Fallback>
+  </mc:AlternateContent>
 </p:sld>
 </file>
 
@@ -13319,6 +13359,18 @@
   <p:clrMapOvr>
     <a:masterClrMapping/>
   </p:clrMapOvr>
+  <mc:AlternateContent xmlns:mc="http://schemas.openxmlformats.org/markup-compatibility/2006" xmlns:p14="http://schemas.microsoft.com/office/powerpoint/2010/main">
+    <mc:Choice Requires="p14">
+      <p:transition spd="med" p14:dur="700">
+        <p:fade/>
+      </p:transition>
+    </mc:Choice>
+    <mc:Fallback xmlns="">
+      <p:transition spd="med">
+        <p:fade/>
+      </p:transition>
+    </mc:Fallback>
+  </mc:AlternateContent>
 </p:sld>
 </file>
 
@@ -13471,6 +13523,18 @@
   <p:clrMapOvr>
     <a:masterClrMapping/>
   </p:clrMapOvr>
+  <mc:AlternateContent xmlns:mc="http://schemas.openxmlformats.org/markup-compatibility/2006" xmlns:p14="http://schemas.microsoft.com/office/powerpoint/2010/main">
+    <mc:Choice Requires="p14">
+      <p:transition spd="med" p14:dur="700">
+        <p:fade/>
+      </p:transition>
+    </mc:Choice>
+    <mc:Fallback xmlns="">
+      <p:transition spd="med">
+        <p:fade/>
+      </p:transition>
+    </mc:Fallback>
+  </mc:AlternateContent>
 </p:sld>
 </file>
 
@@ -13994,6 +14058,18 @@
   <p:clrMapOvr>
     <a:masterClrMapping/>
   </p:clrMapOvr>
+  <mc:AlternateContent xmlns:mc="http://schemas.openxmlformats.org/markup-compatibility/2006" xmlns:p14="http://schemas.microsoft.com/office/powerpoint/2010/main">
+    <mc:Choice Requires="p14">
+      <p:transition spd="med" p14:dur="700">
+        <p:fade/>
+      </p:transition>
+    </mc:Choice>
+    <mc:Fallback xmlns="">
+      <p:transition spd="med">
+        <p:fade/>
+      </p:transition>
+    </mc:Fallback>
+  </mc:AlternateContent>
 </p:sld>
 </file>
 
@@ -14146,6 +14222,18 @@
   <p:clrMapOvr>
     <a:masterClrMapping/>
   </p:clrMapOvr>
+  <mc:AlternateContent xmlns:mc="http://schemas.openxmlformats.org/markup-compatibility/2006" xmlns:p14="http://schemas.microsoft.com/office/powerpoint/2010/main">
+    <mc:Choice Requires="p14">
+      <p:transition spd="med" p14:dur="700">
+        <p:fade/>
+      </p:transition>
+    </mc:Choice>
+    <mc:Fallback xmlns="">
+      <p:transition spd="med">
+        <p:fade/>
+      </p:transition>
+    </mc:Fallback>
+  </mc:AlternateContent>
 </p:sld>
 </file>
 
@@ -14331,6 +14419,18 @@
   <p:clrMapOvr>
     <a:masterClrMapping/>
   </p:clrMapOvr>
+  <mc:AlternateContent xmlns:mc="http://schemas.openxmlformats.org/markup-compatibility/2006" xmlns:p14="http://schemas.microsoft.com/office/powerpoint/2010/main">
+    <mc:Choice Requires="p14">
+      <p:transition spd="med" p14:dur="700">
+        <p:fade/>
+      </p:transition>
+    </mc:Choice>
+    <mc:Fallback xmlns="">
+      <p:transition spd="med">
+        <p:fade/>
+      </p:transition>
+    </mc:Fallback>
+  </mc:AlternateContent>
 </p:sld>
 </file>
 
@@ -15394,6 +15494,18 @@
   <p:clrMapOvr>
     <a:masterClrMapping/>
   </p:clrMapOvr>
+  <mc:AlternateContent xmlns:mc="http://schemas.openxmlformats.org/markup-compatibility/2006" xmlns:p14="http://schemas.microsoft.com/office/powerpoint/2010/main">
+    <mc:Choice Requires="p14">
+      <p:transition spd="med" p14:dur="700">
+        <p:fade/>
+      </p:transition>
+    </mc:Choice>
+    <mc:Fallback xmlns="">
+      <p:transition spd="med">
+        <p:fade/>
+      </p:transition>
+    </mc:Fallback>
+  </mc:AlternateContent>
 </p:sld>
 </file>
 
@@ -15551,7 +15663,7 @@
         </p:nvSpPr>
         <p:spPr>
           <a:xfrm>
-            <a:off x="5279472" y="2396565"/>
+            <a:off x="5588862" y="1910576"/>
             <a:ext cx="5844760" cy="3298283"/>
           </a:xfrm>
           <a:prstGeom prst="rect">
@@ -17585,12 +17697,43 @@
   <p:clrMapOvr>
     <a:masterClrMapping/>
   </p:clrMapOvr>
+  <mc:AlternateContent xmlns:mc="http://schemas.openxmlformats.org/markup-compatibility/2006" xmlns:p14="http://schemas.microsoft.com/office/powerpoint/2010/main">
+    <mc:Choice Requires="p14">
+      <p:transition spd="med" p14:dur="700">
+        <p:fade/>
+      </p:transition>
+    </mc:Choice>
+    <mc:Fallback xmlns="">
+      <p:transition spd="med">
+        <p:fade/>
+      </p:transition>
+    </mc:Fallback>
+  </mc:AlternateContent>
 </p:sld>
 </file>
 
 <file path=ppt/slides/slide5.xml><?xml version="1.0" encoding="utf-8"?>
 <p:sld xmlns:a="http://schemas.openxmlformats.org/drawingml/2006/main" xmlns:r="http://schemas.openxmlformats.org/officeDocument/2006/relationships" xmlns:p="http://schemas.openxmlformats.org/presentationml/2006/main">
   <p:cSld>
+    <p:bg>
+      <p:bgPr>
+        <a:blipFill rotWithShape="1">
+          <a:blip r:embed="rId2">
+            <a:duotone>
+              <a:schemeClr val="bg1">
+                <a:shade val="80000"/>
+                <a:lumMod val="80000"/>
+              </a:schemeClr>
+              <a:schemeClr val="bg1">
+                <a:tint val="98000"/>
+              </a:schemeClr>
+            </a:duotone>
+          </a:blip>
+          <a:stretch/>
+        </a:blipFill>
+        <a:effectLst/>
+      </p:bgPr>
+    </p:bg>
     <p:spTree>
       <p:nvGrpSpPr>
         <p:cNvPr id="1" name=""/>
@@ -17605,6 +17748,110 @@
           <a:chExt cx="0" cy="0"/>
         </a:xfrm>
       </p:grpSpPr>
+      <p:sp useBgFill="1">
+        <p:nvSpPr>
+          <p:cNvPr id="17" name="Rectangle 16">
+            <a:extLst>
+              <a:ext uri="{FF2B5EF4-FFF2-40B4-BE49-F238E27FC236}">
+                <a16:creationId xmlns:a16="http://schemas.microsoft.com/office/drawing/2014/main" id="{991E3E68-B79D-4D0B-9917-2CDE4CDF587B}"/>
+              </a:ext>
+              <a:ext uri="{C183D7F6-B498-43B3-948B-1728B52AA6E4}">
+                <adec:decorative xmlns:adec="http://schemas.microsoft.com/office/drawing/2017/decorative" val="1"/>
+              </a:ext>
+            </a:extLst>
+          </p:cNvPr>
+          <p:cNvSpPr>
+            <a:spLocks noGrp="1" noRot="1" noChangeAspect="1" noMove="1" noResize="1" noEditPoints="1" noAdjustHandles="1" noChangeArrowheads="1" noChangeShapeType="1" noTextEdit="1"/>
+          </p:cNvSpPr>
+          <p:nvPr>
+            <p:extLst>
+              <p:ext uri="{386F3935-93C4-4BCD-93E2-E3B085C9AB24}">
+                <p16:designElem xmlns:p16="http://schemas.microsoft.com/office/powerpoint/2015/main" val="1"/>
+              </p:ext>
+            </p:extLst>
+          </p:nvPr>
+        </p:nvSpPr>
+        <p:spPr>
+          <a:xfrm>
+            <a:off x="0" y="0"/>
+            <a:ext cx="12192000" cy="6858000"/>
+          </a:xfrm>
+          <a:prstGeom prst="rect">
+            <a:avLst/>
+          </a:prstGeom>
+          <a:ln>
+            <a:noFill/>
+          </a:ln>
+        </p:spPr>
+        <p:style>
+          <a:lnRef idx="2">
+            <a:schemeClr val="accent1">
+              <a:shade val="50000"/>
+            </a:schemeClr>
+          </a:lnRef>
+          <a:fillRef idx="1">
+            <a:schemeClr val="accent1"/>
+          </a:fillRef>
+          <a:effectRef idx="0">
+            <a:schemeClr val="accent1"/>
+          </a:effectRef>
+          <a:fontRef idx="minor">
+            <a:schemeClr val="lt1"/>
+          </a:fontRef>
+        </p:style>
+        <p:txBody>
+          <a:bodyPr rtlCol="0" anchor="ctr"/>
+          <a:lstStyle/>
+          <a:p>
+            <a:pPr algn="ctr"/>
+            <a:endParaRPr lang="en-US"/>
+          </a:p>
+        </p:txBody>
+      </p:sp>
+      <p:pic>
+        <p:nvPicPr>
+          <p:cNvPr id="19" name="Picture 18">
+            <a:extLst>
+              <a:ext uri="{FF2B5EF4-FFF2-40B4-BE49-F238E27FC236}">
+                <a16:creationId xmlns:a16="http://schemas.microsoft.com/office/drawing/2014/main" id="{5405F23C-C82E-4181-95EA-321F3D891A40}"/>
+              </a:ext>
+              <a:ext uri="{C183D7F6-B498-43B3-948B-1728B52AA6E4}">
+                <adec:decorative xmlns:adec="http://schemas.microsoft.com/office/drawing/2017/decorative" val="1"/>
+              </a:ext>
+            </a:extLst>
+          </p:cNvPr>
+          <p:cNvPicPr>
+            <a:picLocks noGrp="1" noRot="1" noChangeAspect="1" noMove="1" noResize="1" noEditPoints="1" noAdjustHandles="1" noChangeArrowheads="1" noChangeShapeType="1" noCrop="1"/>
+          </p:cNvPicPr>
+          <p:nvPr>
+            <p:extLst>
+              <p:ext uri="{386F3935-93C4-4BCD-93E2-E3B085C9AB24}">
+                <p16:designElem xmlns:p16="http://schemas.microsoft.com/office/powerpoint/2015/main" val="1"/>
+              </p:ext>
+            </p:extLst>
+          </p:nvPr>
+        </p:nvPicPr>
+        <p:blipFill rotWithShape="1">
+          <a:blip r:embed="rId3">
+            <a:extLst>
+              <a:ext uri="{28A0092B-C50C-407E-A947-70E740481C1C}">
+                <a14:useLocalDpi xmlns:a14="http://schemas.microsoft.com/office/drawing/2010/main" val="0"/>
+              </a:ext>
+            </a:extLst>
+          </a:blip>
+          <a:srcRect t="964" r="2807" b="1446"/>
+          <a:stretch/>
+        </p:blipFill>
+        <p:spPr>
+          <a:xfrm>
+            <a:off x="-10650" y="1"/>
+            <a:ext cx="4966697" cy="6858000"/>
+          </a:xfrm>
+          <a:prstGeom prst="rect">
+            <a:avLst/>
+          </a:prstGeom>
+        </p:spPr>
+      </p:pic>
       <p:sp>
         <p:nvSpPr>
           <p:cNvPr id="12" name="BlokTextu 11">
@@ -17619,7 +17866,7 @@
         </p:nvSpPr>
         <p:spPr>
           <a:xfrm>
-            <a:off x="5590190" y="2343299"/>
+            <a:off x="5419431" y="1825380"/>
             <a:ext cx="5844760" cy="3298283"/>
           </a:xfrm>
           <a:prstGeom prst="rect">
@@ -17650,7 +17897,7 @@
               <a:buChar char="q"/>
             </a:pPr>
             <a:r>
-              <a:rPr lang="en-US" sz="1500" dirty="0">
+              <a:rPr lang="sk-SK" sz="1500" dirty="0">
                 <a:ln>
                   <a:solidFill>
                     <a:schemeClr val="bg1">
@@ -17671,344 +17918,29 @@
                   </a:outerShdw>
                 </a:effectLst>
               </a:rPr>
-              <a:t>e-learning je </a:t>
-            </a:r>
-            <a:r>
-              <a:rPr lang="en-US" sz="1500" dirty="0" err="1">
-                <a:ln>
-                  <a:solidFill>
-                    <a:schemeClr val="bg1">
-                      <a:lumMod val="75000"/>
-                      <a:lumOff val="25000"/>
-                      <a:alpha val="10000"/>
-                    </a:schemeClr>
-                  </a:solidFill>
-                </a:ln>
+              <a:t>Jazykové a kultúrne rozdiely</a:t>
+            </a:r>
+            <a:endParaRPr lang="en-US" sz="1500" dirty="0">
+              <a:ln>
                 <a:solidFill>
-                  <a:schemeClr val="tx2"/>
+                  <a:schemeClr val="bg1">
+                    <a:lumMod val="75000"/>
+                    <a:lumOff val="25000"/>
+                    <a:alpha val="10000"/>
+                  </a:schemeClr>
                 </a:solidFill>
-                <a:effectLst>
-                  <a:outerShdw blurRad="9525" dist="25400" dir="14640000" algn="tl" rotWithShape="0">
-                    <a:schemeClr val="bg1">
-                      <a:alpha val="30000"/>
-                    </a:schemeClr>
-                  </a:outerShdw>
-                </a:effectLst>
-              </a:rPr>
-              <a:t>rýchly</a:t>
-            </a:r>
-            <a:r>
-              <a:rPr lang="en-US" sz="1500" dirty="0">
-                <a:ln>
-                  <a:solidFill>
-                    <a:schemeClr val="bg1">
-                      <a:lumMod val="75000"/>
-                      <a:lumOff val="25000"/>
-                      <a:alpha val="10000"/>
-                    </a:schemeClr>
-                  </a:solidFill>
-                </a:ln>
-                <a:solidFill>
-                  <a:schemeClr val="tx2"/>
-                </a:solidFill>
-                <a:effectLst>
-                  <a:outerShdw blurRad="9525" dist="25400" dir="14640000" algn="tl" rotWithShape="0">
-                    <a:schemeClr val="bg1">
-                      <a:alpha val="30000"/>
-                    </a:schemeClr>
-                  </a:outerShdw>
-                </a:effectLst>
-              </a:rPr>
-              <a:t>, </a:t>
-            </a:r>
-            <a:r>
-              <a:rPr lang="en-US" sz="1500" dirty="0" err="1">
-                <a:ln>
-                  <a:solidFill>
-                    <a:schemeClr val="bg1">
-                      <a:lumMod val="75000"/>
-                      <a:lumOff val="25000"/>
-                      <a:alpha val="10000"/>
-                    </a:schemeClr>
-                  </a:solidFill>
-                </a:ln>
-                <a:solidFill>
-                  <a:schemeClr val="tx2"/>
-                </a:solidFill>
-                <a:effectLst>
-                  <a:outerShdw blurRad="9525" dist="25400" dir="14640000" algn="tl" rotWithShape="0">
-                    <a:schemeClr val="bg1">
-                      <a:alpha val="30000"/>
-                    </a:schemeClr>
-                  </a:outerShdw>
-                </a:effectLst>
-              </a:rPr>
-              <a:t>dynamický</a:t>
-            </a:r>
-            <a:r>
-              <a:rPr lang="en-US" sz="1500" dirty="0">
-                <a:ln>
-                  <a:solidFill>
-                    <a:schemeClr val="bg1">
-                      <a:lumMod val="75000"/>
-                      <a:lumOff val="25000"/>
-                      <a:alpha val="10000"/>
-                    </a:schemeClr>
-                  </a:solidFill>
-                </a:ln>
-                <a:solidFill>
-                  <a:schemeClr val="tx2"/>
-                </a:solidFill>
-                <a:effectLst>
-                  <a:outerShdw blurRad="9525" dist="25400" dir="14640000" algn="tl" rotWithShape="0">
-                    <a:schemeClr val="bg1">
-                      <a:alpha val="30000"/>
-                    </a:schemeClr>
-                  </a:outerShdw>
-                </a:effectLst>
-              </a:rPr>
-              <a:t> a </a:t>
-            </a:r>
-            <a:r>
-              <a:rPr lang="en-US" sz="1500" dirty="0" err="1">
-                <a:ln>
-                  <a:solidFill>
-                    <a:schemeClr val="bg1">
-                      <a:lumMod val="75000"/>
-                      <a:lumOff val="25000"/>
-                      <a:alpha val="10000"/>
-                    </a:schemeClr>
-                  </a:solidFill>
-                </a:ln>
-                <a:solidFill>
-                  <a:schemeClr val="tx2"/>
-                </a:solidFill>
-                <a:effectLst>
-                  <a:outerShdw blurRad="9525" dist="25400" dir="14640000" algn="tl" rotWithShape="0">
-                    <a:schemeClr val="bg1">
-                      <a:alpha val="30000"/>
-                    </a:schemeClr>
-                  </a:outerShdw>
-                </a:effectLst>
-              </a:rPr>
-              <a:t>znižuje</a:t>
-            </a:r>
-            <a:r>
-              <a:rPr lang="en-US" sz="1500" dirty="0">
-                <a:ln>
-                  <a:solidFill>
-                    <a:schemeClr val="bg1">
-                      <a:lumMod val="75000"/>
-                      <a:lumOff val="25000"/>
-                      <a:alpha val="10000"/>
-                    </a:schemeClr>
-                  </a:solidFill>
-                </a:ln>
-                <a:solidFill>
-                  <a:schemeClr val="tx2"/>
-                </a:solidFill>
-                <a:effectLst>
-                  <a:outerShdw blurRad="9525" dist="25400" dir="14640000" algn="tl" rotWithShape="0">
-                    <a:schemeClr val="bg1">
-                      <a:alpha val="30000"/>
-                    </a:schemeClr>
-                  </a:outerShdw>
-                </a:effectLst>
-              </a:rPr>
-              <a:t> </a:t>
-            </a:r>
-            <a:r>
-              <a:rPr lang="en-US" sz="1500" dirty="0" err="1">
-                <a:ln>
-                  <a:solidFill>
-                    <a:schemeClr val="bg1">
-                      <a:lumMod val="75000"/>
-                      <a:lumOff val="25000"/>
-                      <a:alpha val="10000"/>
-                    </a:schemeClr>
-                  </a:solidFill>
-                </a:ln>
-                <a:solidFill>
-                  <a:schemeClr val="tx2"/>
-                </a:solidFill>
-                <a:effectLst>
-                  <a:outerShdw blurRad="9525" dist="25400" dir="14640000" algn="tl" rotWithShape="0">
-                    <a:schemeClr val="bg1">
-                      <a:alpha val="30000"/>
-                    </a:schemeClr>
-                  </a:outerShdw>
-                </a:effectLst>
-              </a:rPr>
-              <a:t>výdavky</a:t>
-            </a:r>
-            <a:r>
-              <a:rPr lang="en-US" sz="1500" dirty="0">
-                <a:ln>
-                  <a:solidFill>
-                    <a:schemeClr val="bg1">
-                      <a:lumMod val="75000"/>
-                      <a:lumOff val="25000"/>
-                      <a:alpha val="10000"/>
-                    </a:schemeClr>
-                  </a:solidFill>
-                </a:ln>
-                <a:solidFill>
-                  <a:schemeClr val="tx2"/>
-                </a:solidFill>
-                <a:effectLst>
-                  <a:outerShdw blurRad="9525" dist="25400" dir="14640000" algn="tl" rotWithShape="0">
-                    <a:schemeClr val="bg1">
-                      <a:alpha val="30000"/>
-                    </a:schemeClr>
-                  </a:outerShdw>
-                </a:effectLst>
-              </a:rPr>
-              <a:t> (</a:t>
-            </a:r>
-            <a:r>
-              <a:rPr lang="en-US" sz="1500" dirty="0" err="1">
-                <a:ln>
-                  <a:solidFill>
-                    <a:schemeClr val="bg1">
-                      <a:lumMod val="75000"/>
-                      <a:lumOff val="25000"/>
-                      <a:alpha val="10000"/>
-                    </a:schemeClr>
-                  </a:solidFill>
-                </a:ln>
-                <a:solidFill>
-                  <a:schemeClr val="tx2"/>
-                </a:solidFill>
-                <a:effectLst>
-                  <a:outerShdw blurRad="9525" dist="25400" dir="14640000" algn="tl" rotWithShape="0">
-                    <a:schemeClr val="bg1">
-                      <a:alpha val="30000"/>
-                    </a:schemeClr>
-                  </a:outerShdw>
-                </a:effectLst>
-              </a:rPr>
-              <a:t>ako</a:t>
-            </a:r>
-            <a:r>
-              <a:rPr lang="en-US" sz="1500" dirty="0">
-                <a:ln>
-                  <a:solidFill>
-                    <a:schemeClr val="bg1">
-                      <a:lumMod val="75000"/>
-                      <a:lumOff val="25000"/>
-                      <a:alpha val="10000"/>
-                    </a:schemeClr>
-                  </a:solidFill>
-                </a:ln>
-                <a:solidFill>
-                  <a:schemeClr val="tx2"/>
-                </a:solidFill>
-                <a:effectLst>
-                  <a:outerShdw blurRad="9525" dist="25400" dir="14640000" algn="tl" rotWithShape="0">
-                    <a:schemeClr val="bg1">
-                      <a:alpha val="30000"/>
-                    </a:schemeClr>
-                  </a:outerShdw>
-                </a:effectLst>
-              </a:rPr>
-              <a:t> </a:t>
-            </a:r>
-            <a:r>
-              <a:rPr lang="en-US" sz="1500" dirty="0" err="1">
-                <a:ln>
-                  <a:solidFill>
-                    <a:schemeClr val="bg1">
-                      <a:lumMod val="75000"/>
-                      <a:lumOff val="25000"/>
-                      <a:alpha val="10000"/>
-                    </a:schemeClr>
-                  </a:solidFill>
-                </a:ln>
-                <a:solidFill>
-                  <a:schemeClr val="tx2"/>
-                </a:solidFill>
-                <a:effectLst>
-                  <a:outerShdw blurRad="9525" dist="25400" dir="14640000" algn="tl" rotWithShape="0">
-                    <a:schemeClr val="bg1">
-                      <a:alpha val="30000"/>
-                    </a:schemeClr>
-                  </a:outerShdw>
-                </a:effectLst>
-              </a:rPr>
-              <a:t>napríklad</a:t>
-            </a:r>
-            <a:r>
-              <a:rPr lang="en-US" sz="1500" dirty="0">
-                <a:ln>
-                  <a:solidFill>
-                    <a:schemeClr val="bg1">
-                      <a:lumMod val="75000"/>
-                      <a:lumOff val="25000"/>
-                      <a:alpha val="10000"/>
-                    </a:schemeClr>
-                  </a:solidFill>
-                </a:ln>
-                <a:solidFill>
-                  <a:schemeClr val="tx2"/>
-                </a:solidFill>
-                <a:effectLst>
-                  <a:outerShdw blurRad="9525" dist="25400" dir="14640000" algn="tl" rotWithShape="0">
-                    <a:schemeClr val="bg1">
-                      <a:alpha val="30000"/>
-                    </a:schemeClr>
-                  </a:outerShdw>
-                </a:effectLst>
-              </a:rPr>
-              <a:t> </a:t>
-            </a:r>
-            <a:r>
-              <a:rPr lang="en-US" sz="1500" dirty="0" err="1">
-                <a:ln>
-                  <a:solidFill>
-                    <a:schemeClr val="bg1">
-                      <a:lumMod val="75000"/>
-                      <a:lumOff val="25000"/>
-                      <a:alpha val="10000"/>
-                    </a:schemeClr>
-                  </a:solidFill>
-                </a:ln>
-                <a:solidFill>
-                  <a:schemeClr val="tx2"/>
-                </a:solidFill>
-                <a:effectLst>
-                  <a:outerShdw blurRad="9525" dist="25400" dir="14640000" algn="tl" rotWithShape="0">
-                    <a:schemeClr val="bg1">
-                      <a:alpha val="30000"/>
-                    </a:schemeClr>
-                  </a:outerShdw>
-                </a:effectLst>
-              </a:rPr>
-              <a:t>cestovanie</a:t>
-            </a:r>
-            <a:r>
-              <a:rPr lang="en-US" sz="1500" dirty="0">
-                <a:ln>
-                  <a:solidFill>
-                    <a:schemeClr val="bg1">
-                      <a:lumMod val="75000"/>
-                      <a:lumOff val="25000"/>
-                      <a:alpha val="10000"/>
-                    </a:schemeClr>
-                  </a:solidFill>
-                </a:ln>
-                <a:solidFill>
-                  <a:schemeClr val="tx2"/>
-                </a:solidFill>
-                <a:effectLst>
-                  <a:outerShdw blurRad="9525" dist="25400" dir="14640000" algn="tl" rotWithShape="0">
-                    <a:schemeClr val="bg1">
-                      <a:alpha val="30000"/>
-                    </a:schemeClr>
-                  </a:outerShdw>
-                </a:effectLst>
-              </a:rPr>
-              <a:t>)</a:t>
-            </a:r>
+              </a:ln>
+              <a:solidFill>
+                <a:schemeClr val="tx2"/>
+              </a:solidFill>
+              <a:effectLst>
+                <a:outerShdw blurRad="9525" dist="25400" dir="14640000" algn="tl" rotWithShape="0">
+                  <a:schemeClr val="bg1">
+                    <a:alpha val="30000"/>
+                  </a:schemeClr>
+                </a:outerShdw>
+              </a:effectLst>
+            </a:endParaRPr>
           </a:p>
           <a:p>
             <a:pPr marL="285750" indent="-285750" defTabSz="457200">
@@ -18069,7 +18001,7 @@
               <a:buChar char="q"/>
             </a:pPr>
             <a:r>
-              <a:rPr lang="en-US" sz="1500" dirty="0" err="1">
+              <a:rPr lang="sk-SK" sz="1500" dirty="0">
                 <a:ln>
                   <a:solidFill>
                     <a:schemeClr val="bg1">
@@ -18090,10 +18022,10 @@
                   </a:outerShdw>
                 </a:effectLst>
               </a:rPr>
-              <a:t>lekcie</a:t>
-            </a:r>
-            <a:r>
-              <a:rPr lang="en-US" sz="1500" dirty="0">
+              <a:t>Technologické problémy u študentov (</a:t>
+            </a:r>
+            <a:r>
+              <a:rPr lang="sk-SK" sz="1500" dirty="0" err="1">
                 <a:ln>
                   <a:solidFill>
                     <a:schemeClr val="bg1">
@@ -18114,10 +18046,10 @@
                   </a:outerShdw>
                 </a:effectLst>
               </a:rPr>
-              <a:t> </a:t>
-            </a:r>
-            <a:r>
-              <a:rPr lang="en-US" sz="1500" dirty="0" err="1">
+              <a:t>technofóbia</a:t>
+            </a:r>
+            <a:r>
+              <a:rPr lang="sk-SK" sz="1500" dirty="0">
                 <a:ln>
                   <a:solidFill>
                     <a:schemeClr val="bg1">
@@ -18138,151 +18070,7 @@
                   </a:outerShdw>
                 </a:effectLst>
               </a:rPr>
-              <a:t>sú</a:t>
-            </a:r>
-            <a:r>
-              <a:rPr lang="en-US" sz="1500" dirty="0">
-                <a:ln>
-                  <a:solidFill>
-                    <a:schemeClr val="bg1">
-                      <a:lumMod val="75000"/>
-                      <a:lumOff val="25000"/>
-                      <a:alpha val="10000"/>
-                    </a:schemeClr>
-                  </a:solidFill>
-                </a:ln>
-                <a:solidFill>
-                  <a:schemeClr val="tx2"/>
-                </a:solidFill>
-                <a:effectLst>
-                  <a:outerShdw blurRad="9525" dist="25400" dir="14640000" algn="tl" rotWithShape="0">
-                    <a:schemeClr val="bg1">
-                      <a:alpha val="30000"/>
-                    </a:schemeClr>
-                  </a:outerShdw>
-                </a:effectLst>
-              </a:rPr>
-              <a:t> </a:t>
-            </a:r>
-            <a:r>
-              <a:rPr lang="en-US" sz="1500" dirty="0" err="1">
-                <a:ln>
-                  <a:solidFill>
-                    <a:schemeClr val="bg1">
-                      <a:lumMod val="75000"/>
-                      <a:lumOff val="25000"/>
-                      <a:alpha val="10000"/>
-                    </a:schemeClr>
-                  </a:solidFill>
-                </a:ln>
-                <a:solidFill>
-                  <a:schemeClr val="tx2"/>
-                </a:solidFill>
-                <a:effectLst>
-                  <a:outerShdw blurRad="9525" dist="25400" dir="14640000" algn="tl" rotWithShape="0">
-                    <a:schemeClr val="bg1">
-                      <a:alpha val="30000"/>
-                    </a:schemeClr>
-                  </a:outerShdw>
-                </a:effectLst>
-              </a:rPr>
-              <a:t>pripravované</a:t>
-            </a:r>
-            <a:r>
-              <a:rPr lang="en-US" sz="1500" dirty="0">
-                <a:ln>
-                  <a:solidFill>
-                    <a:schemeClr val="bg1">
-                      <a:lumMod val="75000"/>
-                      <a:lumOff val="25000"/>
-                      <a:alpha val="10000"/>
-                    </a:schemeClr>
-                  </a:solidFill>
-                </a:ln>
-                <a:solidFill>
-                  <a:schemeClr val="tx2"/>
-                </a:solidFill>
-                <a:effectLst>
-                  <a:outerShdw blurRad="9525" dist="25400" dir="14640000" algn="tl" rotWithShape="0">
-                    <a:schemeClr val="bg1">
-                      <a:alpha val="30000"/>
-                    </a:schemeClr>
-                  </a:outerShdw>
-                </a:effectLst>
-              </a:rPr>
-              <a:t> </a:t>
-            </a:r>
-            <a:r>
-              <a:rPr lang="en-US" sz="1500" dirty="0" err="1">
-                <a:ln>
-                  <a:solidFill>
-                    <a:schemeClr val="bg1">
-                      <a:lumMod val="75000"/>
-                      <a:lumOff val="25000"/>
-                      <a:alpha val="10000"/>
-                    </a:schemeClr>
-                  </a:solidFill>
-                </a:ln>
-                <a:solidFill>
-                  <a:schemeClr val="tx2"/>
-                </a:solidFill>
-                <a:effectLst>
-                  <a:outerShdw blurRad="9525" dist="25400" dir="14640000" algn="tl" rotWithShape="0">
-                    <a:schemeClr val="bg1">
-                      <a:alpha val="30000"/>
-                    </a:schemeClr>
-                  </a:outerShdw>
-                </a:effectLst>
-              </a:rPr>
-              <a:t>rôznymi</a:t>
-            </a:r>
-            <a:r>
-              <a:rPr lang="en-US" sz="1500" dirty="0">
-                <a:ln>
-                  <a:solidFill>
-                    <a:schemeClr val="bg1">
-                      <a:lumMod val="75000"/>
-                      <a:lumOff val="25000"/>
-                      <a:alpha val="10000"/>
-                    </a:schemeClr>
-                  </a:solidFill>
-                </a:ln>
-                <a:solidFill>
-                  <a:schemeClr val="tx2"/>
-                </a:solidFill>
-                <a:effectLst>
-                  <a:outerShdw blurRad="9525" dist="25400" dir="14640000" algn="tl" rotWithShape="0">
-                    <a:schemeClr val="bg1">
-                      <a:alpha val="30000"/>
-                    </a:schemeClr>
-                  </a:outerShdw>
-                </a:effectLst>
-              </a:rPr>
-              <a:t> </a:t>
-            </a:r>
-            <a:r>
-              <a:rPr lang="en-US" sz="1500" dirty="0" err="1">
-                <a:ln>
-                  <a:solidFill>
-                    <a:schemeClr val="bg1">
-                      <a:lumMod val="75000"/>
-                      <a:lumOff val="25000"/>
-                      <a:alpha val="10000"/>
-                    </a:schemeClr>
-                  </a:solidFill>
-                </a:ln>
-                <a:solidFill>
-                  <a:schemeClr val="tx2"/>
-                </a:solidFill>
-                <a:effectLst>
-                  <a:outerShdw blurRad="9525" dist="25400" dir="14640000" algn="tl" rotWithShape="0">
-                    <a:schemeClr val="bg1">
-                      <a:alpha val="30000"/>
-                    </a:schemeClr>
-                  </a:outerShdw>
-                </a:effectLst>
-              </a:rPr>
-              <a:t>učiteľmi</a:t>
+              <a:t>), alebo nedostatok technológií </a:t>
             </a:r>
             <a:endParaRPr lang="en-US" sz="1500" dirty="0">
               <a:ln>
@@ -18365,7 +18153,7 @@
               <a:buChar char="q"/>
             </a:pPr>
             <a:r>
-              <a:rPr lang="en-US" sz="1500" dirty="0" err="1">
+              <a:rPr lang="sk-SK" sz="1500" dirty="0">
                 <a:ln>
                   <a:solidFill>
                     <a:schemeClr val="bg1">
@@ -18386,199 +18174,7 @@
                   </a:outerShdw>
                 </a:effectLst>
               </a:rPr>
-              <a:t>interaktívne</a:t>
-            </a:r>
-            <a:r>
-              <a:rPr lang="en-US" sz="1500" dirty="0">
-                <a:ln>
-                  <a:solidFill>
-                    <a:schemeClr val="bg1">
-                      <a:lumMod val="75000"/>
-                      <a:lumOff val="25000"/>
-                      <a:alpha val="10000"/>
-                    </a:schemeClr>
-                  </a:solidFill>
-                </a:ln>
-                <a:solidFill>
-                  <a:schemeClr val="tx2"/>
-                </a:solidFill>
-                <a:effectLst>
-                  <a:outerShdw blurRad="9525" dist="25400" dir="14640000" algn="tl" rotWithShape="0">
-                    <a:schemeClr val="bg1">
-                      <a:alpha val="30000"/>
-                    </a:schemeClr>
-                  </a:outerShdw>
-                </a:effectLst>
-              </a:rPr>
-              <a:t> </a:t>
-            </a:r>
-            <a:r>
-              <a:rPr lang="en-US" sz="1500" dirty="0" err="1">
-                <a:ln>
-                  <a:solidFill>
-                    <a:schemeClr val="bg1">
-                      <a:lumMod val="75000"/>
-                      <a:lumOff val="25000"/>
-                      <a:alpha val="10000"/>
-                    </a:schemeClr>
-                  </a:solidFill>
-                </a:ln>
-                <a:solidFill>
-                  <a:schemeClr val="tx2"/>
-                </a:solidFill>
-                <a:effectLst>
-                  <a:outerShdw blurRad="9525" dist="25400" dir="14640000" algn="tl" rotWithShape="0">
-                    <a:schemeClr val="bg1">
-                      <a:alpha val="30000"/>
-                    </a:schemeClr>
-                  </a:outerShdw>
-                </a:effectLst>
-              </a:rPr>
-              <a:t>cvičenia</a:t>
-            </a:r>
-            <a:r>
-              <a:rPr lang="en-US" sz="1500" dirty="0">
-                <a:ln>
-                  <a:solidFill>
-                    <a:schemeClr val="bg1">
-                      <a:lumMod val="75000"/>
-                      <a:lumOff val="25000"/>
-                      <a:alpha val="10000"/>
-                    </a:schemeClr>
-                  </a:solidFill>
-                </a:ln>
-                <a:solidFill>
-                  <a:schemeClr val="tx2"/>
-                </a:solidFill>
-                <a:effectLst>
-                  <a:outerShdw blurRad="9525" dist="25400" dir="14640000" algn="tl" rotWithShape="0">
-                    <a:schemeClr val="bg1">
-                      <a:alpha val="30000"/>
-                    </a:schemeClr>
-                  </a:outerShdw>
-                </a:effectLst>
-              </a:rPr>
-              <a:t> </a:t>
-            </a:r>
-            <a:r>
-              <a:rPr lang="en-US" sz="1500" dirty="0" err="1">
-                <a:ln>
-                  <a:solidFill>
-                    <a:schemeClr val="bg1">
-                      <a:lumMod val="75000"/>
-                      <a:lumOff val="25000"/>
-                      <a:alpha val="10000"/>
-                    </a:schemeClr>
-                  </a:solidFill>
-                </a:ln>
-                <a:solidFill>
-                  <a:schemeClr val="tx2"/>
-                </a:solidFill>
-                <a:effectLst>
-                  <a:outerShdw blurRad="9525" dist="25400" dir="14640000" algn="tl" rotWithShape="0">
-                    <a:schemeClr val="bg1">
-                      <a:alpha val="30000"/>
-                    </a:schemeClr>
-                  </a:outerShdw>
-                </a:effectLst>
-              </a:rPr>
-              <a:t>zvyšujú</a:t>
-            </a:r>
-            <a:r>
-              <a:rPr lang="en-US" sz="1500" dirty="0">
-                <a:ln>
-                  <a:solidFill>
-                    <a:schemeClr val="bg1">
-                      <a:lumMod val="75000"/>
-                      <a:lumOff val="25000"/>
-                      <a:alpha val="10000"/>
-                    </a:schemeClr>
-                  </a:solidFill>
-                </a:ln>
-                <a:solidFill>
-                  <a:schemeClr val="tx2"/>
-                </a:solidFill>
-                <a:effectLst>
-                  <a:outerShdw blurRad="9525" dist="25400" dir="14640000" algn="tl" rotWithShape="0">
-                    <a:schemeClr val="bg1">
-                      <a:alpha val="30000"/>
-                    </a:schemeClr>
-                  </a:outerShdw>
-                </a:effectLst>
-              </a:rPr>
-              <a:t> </a:t>
-            </a:r>
-            <a:r>
-              <a:rPr lang="en-US" sz="1500" dirty="0" err="1">
-                <a:ln>
-                  <a:solidFill>
-                    <a:schemeClr val="bg1">
-                      <a:lumMod val="75000"/>
-                      <a:lumOff val="25000"/>
-                      <a:alpha val="10000"/>
-                    </a:schemeClr>
-                  </a:solidFill>
-                </a:ln>
-                <a:solidFill>
-                  <a:schemeClr val="tx2"/>
-                </a:solidFill>
-                <a:effectLst>
-                  <a:outerShdw blurRad="9525" dist="25400" dir="14640000" algn="tl" rotWithShape="0">
-                    <a:schemeClr val="bg1">
-                      <a:alpha val="30000"/>
-                    </a:schemeClr>
-                  </a:outerShdw>
-                </a:effectLst>
-              </a:rPr>
-              <a:t>motiváciu</a:t>
-            </a:r>
-            <a:r>
-              <a:rPr lang="en-US" sz="1500" dirty="0">
-                <a:ln>
-                  <a:solidFill>
-                    <a:schemeClr val="bg1">
-                      <a:lumMod val="75000"/>
-                      <a:lumOff val="25000"/>
-                      <a:alpha val="10000"/>
-                    </a:schemeClr>
-                  </a:solidFill>
-                </a:ln>
-                <a:solidFill>
-                  <a:schemeClr val="tx2"/>
-                </a:solidFill>
-                <a:effectLst>
-                  <a:outerShdw blurRad="9525" dist="25400" dir="14640000" algn="tl" rotWithShape="0">
-                    <a:schemeClr val="bg1">
-                      <a:alpha val="30000"/>
-                    </a:schemeClr>
-                  </a:outerShdw>
-                </a:effectLst>
-              </a:rPr>
-              <a:t> </a:t>
-            </a:r>
-            <a:r>
-              <a:rPr lang="en-US" sz="1500" dirty="0" err="1">
-                <a:ln>
-                  <a:solidFill>
-                    <a:schemeClr val="bg1">
-                      <a:lumMod val="75000"/>
-                      <a:lumOff val="25000"/>
-                      <a:alpha val="10000"/>
-                    </a:schemeClr>
-                  </a:solidFill>
-                </a:ln>
-                <a:solidFill>
-                  <a:schemeClr val="tx2"/>
-                </a:solidFill>
-                <a:effectLst>
-                  <a:outerShdw blurRad="9525" dist="25400" dir="14640000" algn="tl" rotWithShape="0">
-                    <a:schemeClr val="bg1">
-                      <a:alpha val="30000"/>
-                    </a:schemeClr>
-                  </a:outerShdw>
-                </a:effectLst>
-              </a:rPr>
-              <a:t>študentov</a:t>
+              <a:t>Znížená sociálna interakcia</a:t>
             </a:r>
             <a:endParaRPr lang="en-US" sz="1500" dirty="0">
               <a:ln>
@@ -18603,7 +18199,7 @@
             </a:endParaRPr>
           </a:p>
           <a:p>
-            <a:pPr marL="285750" indent="-285750" defTabSz="457200">
+            <a:pPr defTabSz="457200">
               <a:lnSpc>
                 <a:spcPct val="90000"/>
               </a:lnSpc>
@@ -18617,651 +18213,6 @@
                 <a:schemeClr val="tx2"/>
               </a:buClr>
               <a:buSzPct val="70000"/>
-              <a:buFont typeface="Wingdings" panose="05000000000000000000" pitchFamily="2" charset="2"/>
-              <a:buChar char="q"/>
-            </a:pPr>
-            <a:r>
-              <a:rPr lang="en-US" sz="1500" dirty="0" err="1">
-                <a:ln>
-                  <a:solidFill>
-                    <a:schemeClr val="bg1">
-                      <a:lumMod val="75000"/>
-                      <a:lumOff val="25000"/>
-                      <a:alpha val="10000"/>
-                    </a:schemeClr>
-                  </a:solidFill>
-                </a:ln>
-                <a:solidFill>
-                  <a:schemeClr val="tx2"/>
-                </a:solidFill>
-                <a:effectLst>
-                  <a:outerShdw blurRad="9525" dist="25400" dir="14640000" algn="tl" rotWithShape="0">
-                    <a:schemeClr val="bg1">
-                      <a:alpha val="30000"/>
-                    </a:schemeClr>
-                  </a:outerShdw>
-                </a:effectLst>
-              </a:rPr>
-              <a:t>aktivity</a:t>
-            </a:r>
-            <a:r>
-              <a:rPr lang="en-US" sz="1500" dirty="0">
-                <a:ln>
-                  <a:solidFill>
-                    <a:schemeClr val="bg1">
-                      <a:lumMod val="75000"/>
-                      <a:lumOff val="25000"/>
-                      <a:alpha val="10000"/>
-                    </a:schemeClr>
-                  </a:solidFill>
-                </a:ln>
-                <a:solidFill>
-                  <a:schemeClr val="tx2"/>
-                </a:solidFill>
-                <a:effectLst>
-                  <a:outerShdw blurRad="9525" dist="25400" dir="14640000" algn="tl" rotWithShape="0">
-                    <a:schemeClr val="bg1">
-                      <a:alpha val="30000"/>
-                    </a:schemeClr>
-                  </a:outerShdw>
-                </a:effectLst>
-              </a:rPr>
-              <a:t> e-</a:t>
-            </a:r>
-            <a:r>
-              <a:rPr lang="en-US" sz="1500" dirty="0" err="1">
-                <a:ln>
-                  <a:solidFill>
-                    <a:schemeClr val="bg1">
-                      <a:lumMod val="75000"/>
-                      <a:lumOff val="25000"/>
-                      <a:alpha val="10000"/>
-                    </a:schemeClr>
-                  </a:solidFill>
-                </a:ln>
-                <a:solidFill>
-                  <a:schemeClr val="tx2"/>
-                </a:solidFill>
-                <a:effectLst>
-                  <a:outerShdw blurRad="9525" dist="25400" dir="14640000" algn="tl" rotWithShape="0">
-                    <a:schemeClr val="bg1">
-                      <a:alpha val="30000"/>
-                    </a:schemeClr>
-                  </a:outerShdw>
-                </a:effectLst>
-              </a:rPr>
-              <a:t>learningu</a:t>
-            </a:r>
-            <a:r>
-              <a:rPr lang="en-US" sz="1500" dirty="0">
-                <a:ln>
-                  <a:solidFill>
-                    <a:schemeClr val="bg1">
-                      <a:lumMod val="75000"/>
-                      <a:lumOff val="25000"/>
-                      <a:alpha val="10000"/>
-                    </a:schemeClr>
-                  </a:solidFill>
-                </a:ln>
-                <a:solidFill>
-                  <a:schemeClr val="tx2"/>
-                </a:solidFill>
-                <a:effectLst>
-                  <a:outerShdw blurRad="9525" dist="25400" dir="14640000" algn="tl" rotWithShape="0">
-                    <a:schemeClr val="bg1">
-                      <a:alpha val="30000"/>
-                    </a:schemeClr>
-                  </a:outerShdw>
-                </a:effectLst>
-              </a:rPr>
-              <a:t> </a:t>
-            </a:r>
-            <a:r>
-              <a:rPr lang="en-US" sz="1500" dirty="0" err="1">
-                <a:ln>
-                  <a:solidFill>
-                    <a:schemeClr val="bg1">
-                      <a:lumMod val="75000"/>
-                      <a:lumOff val="25000"/>
-                      <a:alpha val="10000"/>
-                    </a:schemeClr>
-                  </a:solidFill>
-                </a:ln>
-                <a:solidFill>
-                  <a:schemeClr val="tx2"/>
-                </a:solidFill>
-                <a:effectLst>
-                  <a:outerShdw blurRad="9525" dist="25400" dir="14640000" algn="tl" rotWithShape="0">
-                    <a:schemeClr val="bg1">
-                      <a:alpha val="30000"/>
-                    </a:schemeClr>
-                  </a:outerShdw>
-                </a:effectLst>
-              </a:rPr>
-              <a:t>prinášajú</a:t>
-            </a:r>
-            <a:r>
-              <a:rPr lang="en-US" sz="1500" dirty="0">
-                <a:ln>
-                  <a:solidFill>
-                    <a:schemeClr val="bg1">
-                      <a:lumMod val="75000"/>
-                      <a:lumOff val="25000"/>
-                      <a:alpha val="10000"/>
-                    </a:schemeClr>
-                  </a:solidFill>
-                </a:ln>
-                <a:solidFill>
-                  <a:schemeClr val="tx2"/>
-                </a:solidFill>
-                <a:effectLst>
-                  <a:outerShdw blurRad="9525" dist="25400" dir="14640000" algn="tl" rotWithShape="0">
-                    <a:schemeClr val="bg1">
-                      <a:alpha val="30000"/>
-                    </a:schemeClr>
-                  </a:outerShdw>
-                </a:effectLst>
-              </a:rPr>
-              <a:t> </a:t>
-            </a:r>
-            <a:r>
-              <a:rPr lang="en-US" sz="1500" dirty="0" err="1">
-                <a:ln>
-                  <a:solidFill>
-                    <a:schemeClr val="bg1">
-                      <a:lumMod val="75000"/>
-                      <a:lumOff val="25000"/>
-                      <a:alpha val="10000"/>
-                    </a:schemeClr>
-                  </a:solidFill>
-                </a:ln>
-                <a:solidFill>
-                  <a:schemeClr val="tx2"/>
-                </a:solidFill>
-                <a:effectLst>
-                  <a:outerShdw blurRad="9525" dist="25400" dir="14640000" algn="tl" rotWithShape="0">
-                    <a:schemeClr val="bg1">
-                      <a:alpha val="30000"/>
-                    </a:schemeClr>
-                  </a:outerShdw>
-                </a:effectLst>
-              </a:rPr>
-              <a:t>rozličné</a:t>
-            </a:r>
-            <a:r>
-              <a:rPr lang="en-US" sz="1500" dirty="0">
-                <a:ln>
-                  <a:solidFill>
-                    <a:schemeClr val="bg1">
-                      <a:lumMod val="75000"/>
-                      <a:lumOff val="25000"/>
-                      <a:alpha val="10000"/>
-                    </a:schemeClr>
-                  </a:solidFill>
-                </a:ln>
-                <a:solidFill>
-                  <a:schemeClr val="tx2"/>
-                </a:solidFill>
-                <a:effectLst>
-                  <a:outerShdw blurRad="9525" dist="25400" dir="14640000" algn="tl" rotWithShape="0">
-                    <a:schemeClr val="bg1">
-                      <a:alpha val="30000"/>
-                    </a:schemeClr>
-                  </a:outerShdw>
-                </a:effectLst>
-              </a:rPr>
-              <a:t> </a:t>
-            </a:r>
-            <a:r>
-              <a:rPr lang="en-US" sz="1500" dirty="0" err="1">
-                <a:ln>
-                  <a:solidFill>
-                    <a:schemeClr val="bg1">
-                      <a:lumMod val="75000"/>
-                      <a:lumOff val="25000"/>
-                      <a:alpha val="10000"/>
-                    </a:schemeClr>
-                  </a:solidFill>
-                </a:ln>
-                <a:solidFill>
-                  <a:schemeClr val="tx2"/>
-                </a:solidFill>
-                <a:effectLst>
-                  <a:outerShdw blurRad="9525" dist="25400" dir="14640000" algn="tl" rotWithShape="0">
-                    <a:schemeClr val="bg1">
-                      <a:alpha val="30000"/>
-                    </a:schemeClr>
-                  </a:outerShdw>
-                </a:effectLst>
-              </a:rPr>
-              <a:t>skúsenosti</a:t>
-            </a:r>
-            <a:r>
-              <a:rPr lang="en-US" sz="1500" dirty="0">
-                <a:ln>
-                  <a:solidFill>
-                    <a:schemeClr val="bg1">
-                      <a:lumMod val="75000"/>
-                      <a:lumOff val="25000"/>
-                      <a:alpha val="10000"/>
-                    </a:schemeClr>
-                  </a:solidFill>
-                </a:ln>
-                <a:solidFill>
-                  <a:schemeClr val="tx2"/>
-                </a:solidFill>
-                <a:effectLst>
-                  <a:outerShdw blurRad="9525" dist="25400" dir="14640000" algn="tl" rotWithShape="0">
-                    <a:schemeClr val="bg1">
-                      <a:alpha val="30000"/>
-                    </a:schemeClr>
-                  </a:outerShdw>
-                </a:effectLst>
-              </a:rPr>
-              <a:t> </a:t>
-            </a:r>
-            <a:r>
-              <a:rPr lang="en-US" sz="1500" dirty="0" err="1">
-                <a:ln>
-                  <a:solidFill>
-                    <a:schemeClr val="bg1">
-                      <a:lumMod val="75000"/>
-                      <a:lumOff val="25000"/>
-                      <a:alpha val="10000"/>
-                    </a:schemeClr>
-                  </a:solidFill>
-                </a:ln>
-                <a:solidFill>
-                  <a:schemeClr val="tx2"/>
-                </a:solidFill>
-                <a:effectLst>
-                  <a:outerShdw blurRad="9525" dist="25400" dir="14640000" algn="tl" rotWithShape="0">
-                    <a:schemeClr val="bg1">
-                      <a:alpha val="30000"/>
-                    </a:schemeClr>
-                  </a:outerShdw>
-                </a:effectLst>
-              </a:rPr>
-              <a:t>rôznym</a:t>
-            </a:r>
-            <a:r>
-              <a:rPr lang="en-US" sz="1500" dirty="0">
-                <a:ln>
-                  <a:solidFill>
-                    <a:schemeClr val="bg1">
-                      <a:lumMod val="75000"/>
-                      <a:lumOff val="25000"/>
-                      <a:alpha val="10000"/>
-                    </a:schemeClr>
-                  </a:solidFill>
-                </a:ln>
-                <a:solidFill>
-                  <a:schemeClr val="tx2"/>
-                </a:solidFill>
-                <a:effectLst>
-                  <a:outerShdw blurRad="9525" dist="25400" dir="14640000" algn="tl" rotWithShape="0">
-                    <a:schemeClr val="bg1">
-                      <a:alpha val="30000"/>
-                    </a:schemeClr>
-                  </a:outerShdw>
-                </a:effectLst>
-              </a:rPr>
-              <a:t> </a:t>
-            </a:r>
-            <a:r>
-              <a:rPr lang="en-US" sz="1500" dirty="0" err="1">
-                <a:ln>
-                  <a:solidFill>
-                    <a:schemeClr val="bg1">
-                      <a:lumMod val="75000"/>
-                      <a:lumOff val="25000"/>
-                      <a:alpha val="10000"/>
-                    </a:schemeClr>
-                  </a:solidFill>
-                </a:ln>
-                <a:solidFill>
-                  <a:schemeClr val="tx2"/>
-                </a:solidFill>
-                <a:effectLst>
-                  <a:outerShdw blurRad="9525" dist="25400" dir="14640000" algn="tl" rotWithShape="0">
-                    <a:schemeClr val="bg1">
-                      <a:alpha val="30000"/>
-                    </a:schemeClr>
-                  </a:outerShdw>
-                </a:effectLst>
-              </a:rPr>
-              <a:t>ľuďom</a:t>
-            </a:r>
-            <a:r>
-              <a:rPr lang="en-US" sz="1500" dirty="0">
-                <a:ln>
-                  <a:solidFill>
-                    <a:schemeClr val="bg1">
-                      <a:lumMod val="75000"/>
-                      <a:lumOff val="25000"/>
-                      <a:alpha val="10000"/>
-                    </a:schemeClr>
-                  </a:solidFill>
-                </a:ln>
-                <a:solidFill>
-                  <a:schemeClr val="tx2"/>
-                </a:solidFill>
-                <a:effectLst>
-                  <a:outerShdw blurRad="9525" dist="25400" dir="14640000" algn="tl" rotWithShape="0">
-                    <a:schemeClr val="bg1">
-                      <a:alpha val="30000"/>
-                    </a:schemeClr>
-                  </a:outerShdw>
-                </a:effectLst>
-              </a:rPr>
-              <a:t> a </a:t>
-            </a:r>
-            <a:r>
-              <a:rPr lang="en-US" sz="1500" dirty="0" err="1">
-                <a:ln>
-                  <a:solidFill>
-                    <a:schemeClr val="bg1">
-                      <a:lumMod val="75000"/>
-                      <a:lumOff val="25000"/>
-                      <a:alpha val="10000"/>
-                    </a:schemeClr>
-                  </a:solidFill>
-                </a:ln>
-                <a:solidFill>
-                  <a:schemeClr val="tx2"/>
-                </a:solidFill>
-                <a:effectLst>
-                  <a:outerShdw blurRad="9525" dist="25400" dir="14640000" algn="tl" rotWithShape="0">
-                    <a:schemeClr val="bg1">
-                      <a:alpha val="30000"/>
-                    </a:schemeClr>
-                  </a:outerShdw>
-                </a:effectLst>
-              </a:rPr>
-              <a:t>takéto</a:t>
-            </a:r>
-            <a:r>
-              <a:rPr lang="en-US" sz="1500" dirty="0">
-                <a:ln>
-                  <a:solidFill>
-                    <a:schemeClr val="bg1">
-                      <a:lumMod val="75000"/>
-                      <a:lumOff val="25000"/>
-                      <a:alpha val="10000"/>
-                    </a:schemeClr>
-                  </a:solidFill>
-                </a:ln>
-                <a:solidFill>
-                  <a:schemeClr val="tx2"/>
-                </a:solidFill>
-                <a:effectLst>
-                  <a:outerShdw blurRad="9525" dist="25400" dir="14640000" algn="tl" rotWithShape="0">
-                    <a:schemeClr val="bg1">
-                      <a:alpha val="30000"/>
-                    </a:schemeClr>
-                  </a:outerShdw>
-                </a:effectLst>
-              </a:rPr>
-              <a:t> </a:t>
-            </a:r>
-            <a:r>
-              <a:rPr lang="en-US" sz="1500" dirty="0" err="1">
-                <a:ln>
-                  <a:solidFill>
-                    <a:schemeClr val="bg1">
-                      <a:lumMod val="75000"/>
-                      <a:lumOff val="25000"/>
-                      <a:alpha val="10000"/>
-                    </a:schemeClr>
-                  </a:solidFill>
-                </a:ln>
-                <a:solidFill>
-                  <a:schemeClr val="tx2"/>
-                </a:solidFill>
-                <a:effectLst>
-                  <a:outerShdw blurRad="9525" dist="25400" dir="14640000" algn="tl" rotWithShape="0">
-                    <a:schemeClr val="bg1">
-                      <a:alpha val="30000"/>
-                    </a:schemeClr>
-                  </a:outerShdw>
-                </a:effectLst>
-              </a:rPr>
-              <a:t>aktivity</a:t>
-            </a:r>
-            <a:r>
-              <a:rPr lang="en-US" sz="1500" dirty="0">
-                <a:ln>
-                  <a:solidFill>
-                    <a:schemeClr val="bg1">
-                      <a:lumMod val="75000"/>
-                      <a:lumOff val="25000"/>
-                      <a:alpha val="10000"/>
-                    </a:schemeClr>
-                  </a:solidFill>
-                </a:ln>
-                <a:solidFill>
-                  <a:schemeClr val="tx2"/>
-                </a:solidFill>
-                <a:effectLst>
-                  <a:outerShdw blurRad="9525" dist="25400" dir="14640000" algn="tl" rotWithShape="0">
-                    <a:schemeClr val="bg1">
-                      <a:alpha val="30000"/>
-                    </a:schemeClr>
-                  </a:outerShdw>
-                </a:effectLst>
-              </a:rPr>
-              <a:t> </a:t>
-            </a:r>
-            <a:r>
-              <a:rPr lang="en-US" sz="1500" dirty="0" err="1">
-                <a:ln>
-                  <a:solidFill>
-                    <a:schemeClr val="bg1">
-                      <a:lumMod val="75000"/>
-                      <a:lumOff val="25000"/>
-                      <a:alpha val="10000"/>
-                    </a:schemeClr>
-                  </a:solidFill>
-                </a:ln>
-                <a:solidFill>
-                  <a:schemeClr val="tx2"/>
-                </a:solidFill>
-                <a:effectLst>
-                  <a:outerShdw blurRad="9525" dist="25400" dir="14640000" algn="tl" rotWithShape="0">
-                    <a:schemeClr val="bg1">
-                      <a:alpha val="30000"/>
-                    </a:schemeClr>
-                  </a:outerShdw>
-                </a:effectLst>
-              </a:rPr>
-              <a:t>pomáhajú</a:t>
-            </a:r>
-            <a:r>
-              <a:rPr lang="en-US" sz="1500" dirty="0">
-                <a:ln>
-                  <a:solidFill>
-                    <a:schemeClr val="bg1">
-                      <a:lumMod val="75000"/>
-                      <a:lumOff val="25000"/>
-                      <a:alpha val="10000"/>
-                    </a:schemeClr>
-                  </a:solidFill>
-                </a:ln>
-                <a:solidFill>
-                  <a:schemeClr val="tx2"/>
-                </a:solidFill>
-                <a:effectLst>
-                  <a:outerShdw blurRad="9525" dist="25400" dir="14640000" algn="tl" rotWithShape="0">
-                    <a:schemeClr val="bg1">
-                      <a:alpha val="30000"/>
-                    </a:schemeClr>
-                  </a:outerShdw>
-                </a:effectLst>
-              </a:rPr>
-              <a:t> </a:t>
-            </a:r>
-            <a:r>
-              <a:rPr lang="en-US" sz="1500" dirty="0" err="1">
-                <a:ln>
-                  <a:solidFill>
-                    <a:schemeClr val="bg1">
-                      <a:lumMod val="75000"/>
-                      <a:lumOff val="25000"/>
-                      <a:alpha val="10000"/>
-                    </a:schemeClr>
-                  </a:solidFill>
-                </a:ln>
-                <a:solidFill>
-                  <a:schemeClr val="tx2"/>
-                </a:solidFill>
-                <a:effectLst>
-                  <a:outerShdw blurRad="9525" dist="25400" dir="14640000" algn="tl" rotWithShape="0">
-                    <a:schemeClr val="bg1">
-                      <a:alpha val="30000"/>
-                    </a:schemeClr>
-                  </a:outerShdw>
-                </a:effectLst>
-              </a:rPr>
-              <a:t>tiež</a:t>
-            </a:r>
-            <a:r>
-              <a:rPr lang="en-US" sz="1500" dirty="0">
-                <a:ln>
-                  <a:solidFill>
-                    <a:schemeClr val="bg1">
-                      <a:lumMod val="75000"/>
-                      <a:lumOff val="25000"/>
-                      <a:alpha val="10000"/>
-                    </a:schemeClr>
-                  </a:solidFill>
-                </a:ln>
-                <a:solidFill>
-                  <a:schemeClr val="tx2"/>
-                </a:solidFill>
-                <a:effectLst>
-                  <a:outerShdw blurRad="9525" dist="25400" dir="14640000" algn="tl" rotWithShape="0">
-                    <a:schemeClr val="bg1">
-                      <a:alpha val="30000"/>
-                    </a:schemeClr>
-                  </a:outerShdw>
-                </a:effectLst>
-              </a:rPr>
-              <a:t> </a:t>
-            </a:r>
-            <a:r>
-              <a:rPr lang="en-US" sz="1500" dirty="0" err="1">
-                <a:ln>
-                  <a:solidFill>
-                    <a:schemeClr val="bg1">
-                      <a:lumMod val="75000"/>
-                      <a:lumOff val="25000"/>
-                      <a:alpha val="10000"/>
-                    </a:schemeClr>
-                  </a:solidFill>
-                </a:ln>
-                <a:solidFill>
-                  <a:schemeClr val="tx2"/>
-                </a:solidFill>
-                <a:effectLst>
-                  <a:outerShdw blurRad="9525" dist="25400" dir="14640000" algn="tl" rotWithShape="0">
-                    <a:schemeClr val="bg1">
-                      <a:alpha val="30000"/>
-                    </a:schemeClr>
-                  </a:outerShdw>
-                </a:effectLst>
-              </a:rPr>
-              <a:t>ľahšiemu</a:t>
-            </a:r>
-            <a:r>
-              <a:rPr lang="en-US" sz="1500" dirty="0">
-                <a:ln>
-                  <a:solidFill>
-                    <a:schemeClr val="bg1">
-                      <a:lumMod val="75000"/>
-                      <a:lumOff val="25000"/>
-                      <a:alpha val="10000"/>
-                    </a:schemeClr>
-                  </a:solidFill>
-                </a:ln>
-                <a:solidFill>
-                  <a:schemeClr val="tx2"/>
-                </a:solidFill>
-                <a:effectLst>
-                  <a:outerShdw blurRad="9525" dist="25400" dir="14640000" algn="tl" rotWithShape="0">
-                    <a:schemeClr val="bg1">
-                      <a:alpha val="30000"/>
-                    </a:schemeClr>
-                  </a:outerShdw>
-                </a:effectLst>
-              </a:rPr>
-              <a:t> </a:t>
-            </a:r>
-            <a:r>
-              <a:rPr lang="en-US" sz="1500" dirty="0" err="1">
-                <a:ln>
-                  <a:solidFill>
-                    <a:schemeClr val="bg1">
-                      <a:lumMod val="75000"/>
-                      <a:lumOff val="25000"/>
-                      <a:alpha val="10000"/>
-                    </a:schemeClr>
-                  </a:solidFill>
-                </a:ln>
-                <a:solidFill>
-                  <a:schemeClr val="tx2"/>
-                </a:solidFill>
-                <a:effectLst>
-                  <a:outerShdw blurRad="9525" dist="25400" dir="14640000" algn="tl" rotWithShape="0">
-                    <a:schemeClr val="bg1">
-                      <a:alpha val="30000"/>
-                    </a:schemeClr>
-                  </a:outerShdw>
-                </a:effectLst>
-              </a:rPr>
-              <a:t>učeniu</a:t>
-            </a:r>
-            <a:r>
-              <a:rPr lang="en-US" sz="1500" dirty="0">
-                <a:ln>
-                  <a:solidFill>
-                    <a:schemeClr val="bg1">
-                      <a:lumMod val="75000"/>
-                      <a:lumOff val="25000"/>
-                      <a:alpha val="10000"/>
-                    </a:schemeClr>
-                  </a:solidFill>
-                </a:ln>
-                <a:solidFill>
-                  <a:schemeClr val="tx2"/>
-                </a:solidFill>
-                <a:effectLst>
-                  <a:outerShdw blurRad="9525" dist="25400" dir="14640000" algn="tl" rotWithShape="0">
-                    <a:schemeClr val="bg1">
-                      <a:alpha val="30000"/>
-                    </a:schemeClr>
-                  </a:outerShdw>
-                </a:effectLst>
-              </a:rPr>
-              <a:t>,</a:t>
-            </a:r>
-          </a:p>
-          <a:p>
-            <a:pPr marL="285750" indent="-285750" defTabSz="457200">
-              <a:lnSpc>
-                <a:spcPct val="90000"/>
-              </a:lnSpc>
-              <a:spcBef>
-                <a:spcPct val="20000"/>
-              </a:spcBef>
-              <a:spcAft>
-                <a:spcPts val="600"/>
-              </a:spcAft>
-              <a:buClr>
-                <a:schemeClr val="tx2"/>
-              </a:buClr>
-              <a:buSzPct val="70000"/>
-              <a:buFont typeface="Wingdings" panose="05000000000000000000" pitchFamily="2" charset="2"/>
-              <a:buChar char="q"/>
             </a:pPr>
             <a:endParaRPr lang="en-US" sz="1500" dirty="0">
               <a:ln>
@@ -19304,7 +18255,7 @@
               <a:buChar char="q"/>
             </a:pPr>
             <a:r>
-              <a:rPr lang="en-US" sz="1500" dirty="0">
+              <a:rPr lang="sk-SK" sz="1500" dirty="0">
                 <a:ln>
                   <a:solidFill>
                     <a:schemeClr val="bg1">
@@ -19325,127 +18276,7 @@
                   </a:outerShdw>
                 </a:effectLst>
               </a:rPr>
-              <a:t>je to </a:t>
-            </a:r>
-            <a:r>
-              <a:rPr lang="en-US" sz="1500" dirty="0" err="1">
-                <a:ln>
-                  <a:solidFill>
-                    <a:schemeClr val="bg1">
-                      <a:lumMod val="75000"/>
-                      <a:lumOff val="25000"/>
-                      <a:alpha val="10000"/>
-                    </a:schemeClr>
-                  </a:solidFill>
-                </a:ln>
-                <a:solidFill>
-                  <a:schemeClr val="tx2"/>
-                </a:solidFill>
-                <a:effectLst>
-                  <a:outerShdw blurRad="9525" dist="25400" dir="14640000" algn="tl" rotWithShape="0">
-                    <a:schemeClr val="bg1">
-                      <a:alpha val="30000"/>
-                    </a:schemeClr>
-                  </a:outerShdw>
-                </a:effectLst>
-              </a:rPr>
-              <a:t>druh</a:t>
-            </a:r>
-            <a:r>
-              <a:rPr lang="en-US" sz="1500" dirty="0">
-                <a:ln>
-                  <a:solidFill>
-                    <a:schemeClr val="bg1">
-                      <a:lumMod val="75000"/>
-                      <a:lumOff val="25000"/>
-                      <a:alpha val="10000"/>
-                    </a:schemeClr>
-                  </a:solidFill>
-                </a:ln>
-                <a:solidFill>
-                  <a:schemeClr val="tx2"/>
-                </a:solidFill>
-                <a:effectLst>
-                  <a:outerShdw blurRad="9525" dist="25400" dir="14640000" algn="tl" rotWithShape="0">
-                    <a:schemeClr val="bg1">
-                      <a:alpha val="30000"/>
-                    </a:schemeClr>
-                  </a:outerShdw>
-                </a:effectLst>
-              </a:rPr>
-              <a:t> </a:t>
-            </a:r>
-            <a:r>
-              <a:rPr lang="en-US" sz="1500" dirty="0" err="1">
-                <a:ln>
-                  <a:solidFill>
-                    <a:schemeClr val="bg1">
-                      <a:lumMod val="75000"/>
-                      <a:lumOff val="25000"/>
-                      <a:alpha val="10000"/>
-                    </a:schemeClr>
-                  </a:solidFill>
-                </a:ln>
-                <a:solidFill>
-                  <a:schemeClr val="tx2"/>
-                </a:solidFill>
-                <a:effectLst>
-                  <a:outerShdw blurRad="9525" dist="25400" dir="14640000" algn="tl" rotWithShape="0">
-                    <a:schemeClr val="bg1">
-                      <a:alpha val="30000"/>
-                    </a:schemeClr>
-                  </a:outerShdw>
-                </a:effectLst>
-              </a:rPr>
-              <a:t>kooperatívneho</a:t>
-            </a:r>
-            <a:r>
-              <a:rPr lang="en-US" sz="1500" dirty="0">
-                <a:ln>
-                  <a:solidFill>
-                    <a:schemeClr val="bg1">
-                      <a:lumMod val="75000"/>
-                      <a:lumOff val="25000"/>
-                      <a:alpha val="10000"/>
-                    </a:schemeClr>
-                  </a:solidFill>
-                </a:ln>
-                <a:solidFill>
-                  <a:schemeClr val="tx2"/>
-                </a:solidFill>
-                <a:effectLst>
-                  <a:outerShdw blurRad="9525" dist="25400" dir="14640000" algn="tl" rotWithShape="0">
-                    <a:schemeClr val="bg1">
-                      <a:alpha val="30000"/>
-                    </a:schemeClr>
-                  </a:outerShdw>
-                </a:effectLst>
-              </a:rPr>
-              <a:t> </a:t>
-            </a:r>
-            <a:r>
-              <a:rPr lang="en-US" sz="1500" dirty="0" err="1">
-                <a:ln>
-                  <a:solidFill>
-                    <a:schemeClr val="bg1">
-                      <a:lumMod val="75000"/>
-                      <a:lumOff val="25000"/>
-                      <a:alpha val="10000"/>
-                    </a:schemeClr>
-                  </a:solidFill>
-                </a:ln>
-                <a:solidFill>
-                  <a:schemeClr val="tx2"/>
-                </a:solidFill>
-                <a:effectLst>
-                  <a:outerShdw blurRad="9525" dist="25400" dir="14640000" algn="tl" rotWithShape="0">
-                    <a:schemeClr val="bg1">
-                      <a:alpha val="30000"/>
-                    </a:schemeClr>
-                  </a:outerShdw>
-                </a:effectLst>
-              </a:rPr>
-              <a:t>vzdelávania</a:t>
+              <a:t>Technické limitácie</a:t>
             </a:r>
             <a:endParaRPr lang="en-US" sz="1500" dirty="0">
               <a:ln>
@@ -19623,10 +18454,20 @@
             </a:bodyPr>
             <a:lstStyle/>
             <a:p>
-              <a:pPr lvl="0" algn="ctr"/>
+              <a:pPr algn="ctr" defTabSz="1022350">
+                <a:lnSpc>
+                  <a:spcPct val="90000"/>
+                </a:lnSpc>
+                <a:spcBef>
+                  <a:spcPct val="0"/>
+                </a:spcBef>
+                <a:spcAft>
+                  <a:spcPct val="35000"/>
+                </a:spcAft>
+              </a:pPr>
               <a:r>
                 <a:rPr lang="sk-SK" sz="2000" dirty="0"/>
-                <a:t>1.2   Nevýhody e-learningu   </a:t>
+                <a:t>1.2   Nevýhody e-learningu</a:t>
               </a:r>
               <a:endParaRPr lang="en-US" sz="2000" dirty="0"/>
             </a:p>
@@ -19636,13 +18477,25 @@
     </p:spTree>
     <p:extLst>
       <p:ext uri="{BB962C8B-B14F-4D97-AF65-F5344CB8AC3E}">
-        <p14:creationId xmlns:p14="http://schemas.microsoft.com/office/powerpoint/2010/main" val="2586770217"/>
+        <p14:creationId xmlns:p14="http://schemas.microsoft.com/office/powerpoint/2010/main" val="1151279631"/>
       </p:ext>
     </p:extLst>
   </p:cSld>
   <p:clrMapOvr>
     <a:masterClrMapping/>
   </p:clrMapOvr>
+  <mc:AlternateContent xmlns:mc="http://schemas.openxmlformats.org/markup-compatibility/2006" xmlns:p14="http://schemas.microsoft.com/office/powerpoint/2010/main">
+    <mc:Choice Requires="p14">
+      <p:transition spd="med" p14:dur="700">
+        <p:fade/>
+      </p:transition>
+    </mc:Choice>
+    <mc:Fallback xmlns="">
+      <p:transition spd="med">
+        <p:fade/>
+      </p:transition>
+    </mc:Fallback>
+  </mc:AlternateContent>
 </p:sld>
 </file>
 
@@ -20501,6 +19354,18 @@
   <p:clrMapOvr>
     <a:masterClrMapping/>
   </p:clrMapOvr>
+  <mc:AlternateContent xmlns:mc="http://schemas.openxmlformats.org/markup-compatibility/2006" xmlns:p14="http://schemas.microsoft.com/office/powerpoint/2010/main">
+    <mc:Choice Requires="p14">
+      <p:transition spd="med" p14:dur="700">
+        <p:fade/>
+      </p:transition>
+    </mc:Choice>
+    <mc:Fallback xmlns="">
+      <p:transition spd="med">
+        <p:fade/>
+      </p:transition>
+    </mc:Fallback>
+  </mc:AlternateContent>
   <p:timing>
     <p:tnLst>
       <p:par>
@@ -21750,6 +20615,18 @@
   <p:clrMapOvr>
     <a:masterClrMapping/>
   </p:clrMapOvr>
+  <mc:AlternateContent xmlns:mc="http://schemas.openxmlformats.org/markup-compatibility/2006" xmlns:p14="http://schemas.microsoft.com/office/powerpoint/2010/main">
+    <mc:Choice Requires="p14">
+      <p:transition spd="med" p14:dur="700">
+        <p:fade/>
+      </p:transition>
+    </mc:Choice>
+    <mc:Fallback xmlns="">
+      <p:transition spd="med">
+        <p:fade/>
+      </p:transition>
+    </mc:Fallback>
+  </mc:AlternateContent>
 </p:sld>
 </file>
 
@@ -22040,7 +20917,7 @@
             </a:pPr>
             <a:r>
               <a:rPr lang="sk-SK" dirty="0"/>
-              <a:t> omoc pri výslovnosti pri jazykoch, ktoré nepoužívajú latinskú abecedu</a:t>
+              <a:t> pomoc pri výslovnosti pri jazykoch, ktoré nepoužívajú latinskú abecedu</a:t>
             </a:r>
           </a:p>
           <a:p>
@@ -22229,6 +21106,18 @@
   <p:clrMapOvr>
     <a:masterClrMapping/>
   </p:clrMapOvr>
+  <mc:AlternateContent xmlns:mc="http://schemas.openxmlformats.org/markup-compatibility/2006" xmlns:p14="http://schemas.microsoft.com/office/powerpoint/2010/main">
+    <mc:Choice Requires="p14">
+      <p:transition spd="med" p14:dur="700">
+        <p:fade/>
+      </p:transition>
+    </mc:Choice>
+    <mc:Fallback xmlns="">
+      <p:transition spd="med">
+        <p:fade/>
+      </p:transition>
+    </mc:Fallback>
+  </mc:AlternateContent>
 </p:sld>
 </file>
 
@@ -22772,6 +21661,18 @@
   <p:clrMapOvr>
     <a:masterClrMapping/>
   </p:clrMapOvr>
+  <mc:AlternateContent xmlns:mc="http://schemas.openxmlformats.org/markup-compatibility/2006" xmlns:p14="http://schemas.microsoft.com/office/powerpoint/2010/main">
+    <mc:Choice Requires="p14">
+      <p:transition spd="med" p14:dur="700">
+        <p:fade/>
+      </p:transition>
+    </mc:Choice>
+    <mc:Fallback xmlns="">
+      <p:transition spd="med">
+        <p:fade/>
+      </p:transition>
+    </mc:Fallback>
+  </mc:AlternateContent>
 </p:sld>
 </file>
 

</xml_diff>